<commit_message>
Add AutoZoom and HighlightBullets tests
</commit_message>
<xml_diff>
--- a/doc/test/AutoZoom.pptx
+++ b/doc/test/AutoZoom.pptx
@@ -12,14 +12,16 @@
     <p:sldId id="292" r:id="rId6"/>
     <p:sldId id="301" r:id="rId7"/>
     <p:sldId id="302" r:id="rId8"/>
-    <p:sldId id="303" r:id="rId9"/>
-    <p:sldId id="308" r:id="rId10"/>
-    <p:sldId id="304" r:id="rId11"/>
-    <p:sldId id="305" r:id="rId12"/>
-    <p:sldId id="306" r:id="rId13"/>
-    <p:sldId id="307" r:id="rId14"/>
-    <p:sldId id="309" r:id="rId15"/>
-    <p:sldId id="274" r:id="rId16"/>
+    <p:sldId id="310" r:id="rId9"/>
+    <p:sldId id="311" r:id="rId10"/>
+    <p:sldId id="308" r:id="rId11"/>
+    <p:sldId id="304" r:id="rId12"/>
+    <p:sldId id="305" r:id="rId13"/>
+    <p:sldId id="306" r:id="rId14"/>
+    <p:sldId id="313" r:id="rId15"/>
+    <p:sldId id="315" r:id="rId16"/>
+    <p:sldId id="314" r:id="rId17"/>
+    <p:sldId id="312" r:id="rId18"/>
   </p:sldIdLst>
   <p:sldSz cx="9144000" cy="6858000" type="screen4x3"/>
   <p:notesSz cx="6858000" cy="9144000"/>
@@ -132,20 +134,22 @@
             <p14:sldId id="292"/>
             <p14:sldId id="301"/>
             <p14:sldId id="302"/>
-            <p14:sldId id="303"/>
+            <p14:sldId id="310"/>
+            <p14:sldId id="311"/>
             <p14:sldId id="308"/>
             <p14:sldId id="304"/>
             <p14:sldId id="305"/>
             <p14:sldId id="306"/>
-            <p14:sldId id="307"/>
-            <p14:sldId id="309"/>
-            <p14:sldId id="274"/>
+            <p14:sldId id="313"/>
+            <p14:sldId id="315"/>
+            <p14:sldId id="314"/>
+            <p14:sldId id="312"/>
           </p14:sldIdLst>
         </p14:section>
       </p14:sectionLst>
     </p:ext>
     <p:ext uri="{EFAFB233-063F-42B5-8137-9DF3F51BA10A}">
-      <p15:sldGuideLst xmlns:p15="http://schemas.microsoft.com/office/powerpoint/2012/main">
+      <p15:sldGuideLst xmlns="" xmlns:p15="http://schemas.microsoft.com/office/powerpoint/2012/main">
         <p15:guide id="1" orient="horz" pos="2160">
           <p15:clr>
             <a:srgbClr val="A4A3A4"/>
@@ -343,7 +347,7 @@
           <a:p>
             <a:fld id="{699DC775-C286-4358-8C92-D7E584E969B3}" type="datetimeFigureOut">
               <a:rPr lang="en-US" smtClean="0"/>
-              <a:t>3/26/2014</a:t>
+              <a:t>18-Jun-15</a:t>
             </a:fld>
             <a:endParaRPr lang="en-US"/>
           </a:p>
@@ -513,7 +517,7 @@
           <a:p>
             <a:fld id="{699DC775-C286-4358-8C92-D7E584E969B3}" type="datetimeFigureOut">
               <a:rPr lang="en-US" smtClean="0"/>
-              <a:t>3/26/2014</a:t>
+              <a:t>18-Jun-15</a:t>
             </a:fld>
             <a:endParaRPr lang="en-US"/>
           </a:p>
@@ -693,7 +697,7 @@
           <a:p>
             <a:fld id="{699DC775-C286-4358-8C92-D7E584E969B3}" type="datetimeFigureOut">
               <a:rPr lang="en-US" smtClean="0"/>
-              <a:t>3/26/2014</a:t>
+              <a:t>18-Jun-15</a:t>
             </a:fld>
             <a:endParaRPr lang="en-US"/>
           </a:p>
@@ -935,7 +939,7 @@
           <a:p>
             <a:fld id="{699DC775-C286-4358-8C92-D7E584E969B3}" type="datetimeFigureOut">
               <a:rPr lang="en-US" smtClean="0"/>
-              <a:t>3/26/2014</a:t>
+              <a:t>18-Jun-15</a:t>
             </a:fld>
             <a:endParaRPr lang="en-US"/>
           </a:p>
@@ -1105,7 +1109,7 @@
           <a:p>
             <a:fld id="{699DC775-C286-4358-8C92-D7E584E969B3}" type="datetimeFigureOut">
               <a:rPr lang="en-US" smtClean="0"/>
-              <a:t>3/26/2014</a:t>
+              <a:t>18-Jun-15</a:t>
             </a:fld>
             <a:endParaRPr lang="en-US"/>
           </a:p>
@@ -1351,7 +1355,7 @@
           <a:p>
             <a:fld id="{699DC775-C286-4358-8C92-D7E584E969B3}" type="datetimeFigureOut">
               <a:rPr lang="en-US" smtClean="0"/>
-              <a:t>3/26/2014</a:t>
+              <a:t>18-Jun-15</a:t>
             </a:fld>
             <a:endParaRPr lang="en-US"/>
           </a:p>
@@ -1639,7 +1643,7 @@
           <a:p>
             <a:fld id="{699DC775-C286-4358-8C92-D7E584E969B3}" type="datetimeFigureOut">
               <a:rPr lang="en-US" smtClean="0"/>
-              <a:t>3/26/2014</a:t>
+              <a:t>18-Jun-15</a:t>
             </a:fld>
             <a:endParaRPr lang="en-US"/>
           </a:p>
@@ -2061,7 +2065,7 @@
           <a:p>
             <a:fld id="{699DC775-C286-4358-8C92-D7E584E969B3}" type="datetimeFigureOut">
               <a:rPr lang="en-US" smtClean="0"/>
-              <a:t>3/26/2014</a:t>
+              <a:t>18-Jun-15</a:t>
             </a:fld>
             <a:endParaRPr lang="en-US"/>
           </a:p>
@@ -2179,7 +2183,7 @@
           <a:p>
             <a:fld id="{699DC775-C286-4358-8C92-D7E584E969B3}" type="datetimeFigureOut">
               <a:rPr lang="en-US" smtClean="0"/>
-              <a:t>3/26/2014</a:t>
+              <a:t>18-Jun-15</a:t>
             </a:fld>
             <a:endParaRPr lang="en-US"/>
           </a:p>
@@ -2274,7 +2278,7 @@
           <a:p>
             <a:fld id="{699DC775-C286-4358-8C92-D7E584E969B3}" type="datetimeFigureOut">
               <a:rPr lang="en-US" smtClean="0"/>
-              <a:t>3/26/2014</a:t>
+              <a:t>18-Jun-15</a:t>
             </a:fld>
             <a:endParaRPr lang="en-US"/>
           </a:p>
@@ -2551,7 +2555,7 @@
           <a:p>
             <a:fld id="{699DC775-C286-4358-8C92-D7E584E969B3}" type="datetimeFigureOut">
               <a:rPr lang="en-US" smtClean="0"/>
-              <a:t>3/26/2014</a:t>
+              <a:t>18-Jun-15</a:t>
             </a:fld>
             <a:endParaRPr lang="en-US"/>
           </a:p>
@@ -2721,7 +2725,7 @@
           <a:p>
             <a:fld id="{699DC775-C286-4358-8C92-D7E584E969B3}" type="datetimeFigureOut">
               <a:rPr lang="en-US" smtClean="0"/>
-              <a:t>3/26/2014</a:t>
+              <a:t>18-Jun-15</a:t>
             </a:fld>
             <a:endParaRPr lang="en-US"/>
           </a:p>
@@ -2974,7 +2978,7 @@
           <a:p>
             <a:fld id="{699DC775-C286-4358-8C92-D7E584E969B3}" type="datetimeFigureOut">
               <a:rPr lang="en-US" smtClean="0"/>
-              <a:t>3/26/2014</a:t>
+              <a:t>18-Jun-15</a:t>
             </a:fld>
             <a:endParaRPr lang="en-US"/>
           </a:p>
@@ -3144,7 +3148,7 @@
           <a:p>
             <a:fld id="{699DC775-C286-4358-8C92-D7E584E969B3}" type="datetimeFigureOut">
               <a:rPr lang="en-US" smtClean="0"/>
-              <a:t>3/26/2014</a:t>
+              <a:t>18-Jun-15</a:t>
             </a:fld>
             <a:endParaRPr lang="en-US"/>
           </a:p>
@@ -3324,7 +3328,7 @@
           <a:p>
             <a:fld id="{699DC775-C286-4358-8C92-D7E584E969B3}" type="datetimeFigureOut">
               <a:rPr lang="en-US" smtClean="0"/>
-              <a:t>3/26/2014</a:t>
+              <a:t>18-Jun-15</a:t>
             </a:fld>
             <a:endParaRPr lang="en-US"/>
           </a:p>
@@ -3574,7 +3578,7 @@
           <a:p>
             <a:fld id="{699DC775-C286-4358-8C92-D7E584E969B3}" type="datetimeFigureOut">
               <a:rPr lang="en-US" smtClean="0"/>
-              <a:t>3/26/2014</a:t>
+              <a:t>18-Jun-15</a:t>
             </a:fld>
             <a:endParaRPr lang="en-US"/>
           </a:p>
@@ -3752,7 +3756,7 @@
           <a:p>
             <a:fld id="{699DC775-C286-4358-8C92-D7E584E969B3}" type="datetimeFigureOut">
               <a:rPr lang="en-US" smtClean="0"/>
-              <a:t>3/26/2014</a:t>
+              <a:t>18-Jun-15</a:t>
             </a:fld>
             <a:endParaRPr lang="en-US"/>
           </a:p>
@@ -4006,7 +4010,7 @@
           <a:p>
             <a:fld id="{699DC775-C286-4358-8C92-D7E584E969B3}" type="datetimeFigureOut">
               <a:rPr lang="en-US" smtClean="0"/>
-              <a:t>3/26/2014</a:t>
+              <a:t>18-Jun-15</a:t>
             </a:fld>
             <a:endParaRPr lang="en-US"/>
           </a:p>
@@ -4302,7 +4306,7 @@
           <a:p>
             <a:fld id="{699DC775-C286-4358-8C92-D7E584E969B3}" type="datetimeFigureOut">
               <a:rPr lang="en-US" smtClean="0"/>
-              <a:t>3/26/2014</a:t>
+              <a:t>18-Jun-15</a:t>
             </a:fld>
             <a:endParaRPr lang="en-US"/>
           </a:p>
@@ -4732,7 +4736,7 @@
           <a:p>
             <a:fld id="{699DC775-C286-4358-8C92-D7E584E969B3}" type="datetimeFigureOut">
               <a:rPr lang="en-US" smtClean="0"/>
-              <a:t>3/26/2014</a:t>
+              <a:t>18-Jun-15</a:t>
             </a:fld>
             <a:endParaRPr lang="en-US"/>
           </a:p>
@@ -4858,7 +4862,7 @@
           <a:p>
             <a:fld id="{699DC775-C286-4358-8C92-D7E584E969B3}" type="datetimeFigureOut">
               <a:rPr lang="en-US" smtClean="0"/>
-              <a:t>3/26/2014</a:t>
+              <a:t>18-Jun-15</a:t>
             </a:fld>
             <a:endParaRPr lang="en-US"/>
           </a:p>
@@ -4961,7 +4965,7 @@
           <a:p>
             <a:fld id="{699DC775-C286-4358-8C92-D7E584E969B3}" type="datetimeFigureOut">
               <a:rPr lang="en-US" smtClean="0"/>
-              <a:t>3/26/2014</a:t>
+              <a:t>18-Jun-15</a:t>
             </a:fld>
             <a:endParaRPr lang="en-US"/>
           </a:p>
@@ -5207,7 +5211,7 @@
           <a:p>
             <a:fld id="{699DC775-C286-4358-8C92-D7E584E969B3}" type="datetimeFigureOut">
               <a:rPr lang="en-US" smtClean="0"/>
-              <a:t>3/26/2014</a:t>
+              <a:t>18-Jun-15</a:t>
             </a:fld>
             <a:endParaRPr lang="en-US"/>
           </a:p>
@@ -5492,7 +5496,7 @@
           <a:p>
             <a:fld id="{699DC775-C286-4358-8C92-D7E584E969B3}" type="datetimeFigureOut">
               <a:rPr lang="en-US" smtClean="0"/>
-              <a:t>3/26/2014</a:t>
+              <a:t>18-Jun-15</a:t>
             </a:fld>
             <a:endParaRPr lang="en-US"/>
           </a:p>
@@ -5753,7 +5757,7 @@
           <a:p>
             <a:fld id="{699DC775-C286-4358-8C92-D7E584E969B3}" type="datetimeFigureOut">
               <a:rPr lang="en-US" smtClean="0"/>
-              <a:t>3/26/2014</a:t>
+              <a:t>18-Jun-15</a:t>
             </a:fld>
             <a:endParaRPr lang="en-US"/>
           </a:p>
@@ -5931,7 +5935,7 @@
           <a:p>
             <a:fld id="{699DC775-C286-4358-8C92-D7E584E969B3}" type="datetimeFigureOut">
               <a:rPr lang="en-US" smtClean="0"/>
-              <a:t>3/26/2014</a:t>
+              <a:t>18-Jun-15</a:t>
             </a:fld>
             <a:endParaRPr lang="en-US"/>
           </a:p>
@@ -6119,7 +6123,7 @@
           <a:p>
             <a:fld id="{699DC775-C286-4358-8C92-D7E584E969B3}" type="datetimeFigureOut">
               <a:rPr lang="en-US" smtClean="0"/>
-              <a:t>3/26/2014</a:t>
+              <a:t>18-Jun-15</a:t>
             </a:fld>
             <a:endParaRPr lang="en-US"/>
           </a:p>
@@ -6407,7 +6411,7 @@
           <a:p>
             <a:fld id="{699DC775-C286-4358-8C92-D7E584E969B3}" type="datetimeFigureOut">
               <a:rPr lang="en-US" smtClean="0"/>
-              <a:t>3/26/2014</a:t>
+              <a:t>18-Jun-15</a:t>
             </a:fld>
             <a:endParaRPr lang="en-US"/>
           </a:p>
@@ -6829,7 +6833,7 @@
           <a:p>
             <a:fld id="{699DC775-C286-4358-8C92-D7E584E969B3}" type="datetimeFigureOut">
               <a:rPr lang="en-US" smtClean="0"/>
-              <a:t>3/26/2014</a:t>
+              <a:t>18-Jun-15</a:t>
             </a:fld>
             <a:endParaRPr lang="en-US"/>
           </a:p>
@@ -6947,7 +6951,7 @@
           <a:p>
             <a:fld id="{699DC775-C286-4358-8C92-D7E584E969B3}" type="datetimeFigureOut">
               <a:rPr lang="en-US" smtClean="0"/>
-              <a:t>3/26/2014</a:t>
+              <a:t>18-Jun-15</a:t>
             </a:fld>
             <a:endParaRPr lang="en-US"/>
           </a:p>
@@ -7042,7 +7046,7 @@
           <a:p>
             <a:fld id="{699DC775-C286-4358-8C92-D7E584E969B3}" type="datetimeFigureOut">
               <a:rPr lang="en-US" smtClean="0"/>
-              <a:t>3/26/2014</a:t>
+              <a:t>18-Jun-15</a:t>
             </a:fld>
             <a:endParaRPr lang="en-US"/>
           </a:p>
@@ -7319,7 +7323,7 @@
           <a:p>
             <a:fld id="{699DC775-C286-4358-8C92-D7E584E969B3}" type="datetimeFigureOut">
               <a:rPr lang="en-US" smtClean="0"/>
-              <a:t>3/26/2014</a:t>
+              <a:t>18-Jun-15</a:t>
             </a:fld>
             <a:endParaRPr lang="en-US"/>
           </a:p>
@@ -7572,7 +7576,7 @@
           <a:p>
             <a:fld id="{699DC775-C286-4358-8C92-D7E584E969B3}" type="datetimeFigureOut">
               <a:rPr lang="en-US" smtClean="0"/>
-              <a:t>3/26/2014</a:t>
+              <a:t>18-Jun-15</a:t>
             </a:fld>
             <a:endParaRPr lang="en-US"/>
           </a:p>
@@ -7785,7 +7789,7 @@
           <a:p>
             <a:fld id="{699DC775-C286-4358-8C92-D7E584E969B3}" type="datetimeFigureOut">
               <a:rPr lang="en-US" smtClean="0"/>
-              <a:t>3/26/2014</a:t>
+              <a:t>18-Jun-15</a:t>
             </a:fld>
             <a:endParaRPr lang="en-US"/>
           </a:p>
@@ -8300,7 +8304,7 @@
           <a:p>
             <a:fld id="{699DC775-C286-4358-8C92-D7E584E969B3}" type="datetimeFigureOut">
               <a:rPr lang="en-US" smtClean="0"/>
-              <a:t>3/26/2014</a:t>
+              <a:t>18-Jun-15</a:t>
             </a:fld>
             <a:endParaRPr lang="en-US"/>
           </a:p>
@@ -8813,7 +8817,7 @@
           <a:p>
             <a:fld id="{699DC775-C286-4358-8C92-D7E584E969B3}" type="datetimeFigureOut">
               <a:rPr lang="en-US" smtClean="0"/>
-              <a:t>3/26/2014</a:t>
+              <a:t>18-Jun-15</a:t>
             </a:fld>
             <a:endParaRPr lang="en-US"/>
           </a:p>
@@ -9395,6 +9399,217 @@
       </p:grpSpPr>
       <p:sp>
         <p:nvSpPr>
+          <p:cNvPr id="2" name="Rectangle 1"/>
+          <p:cNvSpPr/>
+          <p:nvPr/>
+        </p:nvSpPr>
+        <p:spPr>
+          <a:xfrm>
+            <a:off x="755576" y="836712"/>
+            <a:ext cx="3240360" cy="1944216"/>
+          </a:xfrm>
+          <a:prstGeom prst="rect">
+            <a:avLst/>
+          </a:prstGeom>
+          <a:solidFill>
+            <a:schemeClr val="bg2"/>
+          </a:solidFill>
+          <a:ln>
+            <a:noFill/>
+          </a:ln>
+        </p:spPr>
+        <p:style>
+          <a:lnRef idx="2">
+            <a:schemeClr val="accent1">
+              <a:shade val="50000"/>
+            </a:schemeClr>
+          </a:lnRef>
+          <a:fillRef idx="1">
+            <a:schemeClr val="accent1"/>
+          </a:fillRef>
+          <a:effectRef idx="0">
+            <a:schemeClr val="accent1"/>
+          </a:effectRef>
+          <a:fontRef idx="minor">
+            <a:schemeClr val="lt1"/>
+          </a:fontRef>
+        </p:style>
+        <p:txBody>
+          <a:bodyPr rtlCol="0" anchor="ctr"/>
+          <a:lstStyle/>
+          <a:p>
+            <a:pPr algn="ctr"/>
+            <a:endParaRPr lang="en-SG"/>
+          </a:p>
+        </p:txBody>
+      </p:sp>
+      <p:sp>
+        <p:nvSpPr>
+          <p:cNvPr id="3" name="TextBox 2"/>
+          <p:cNvSpPr txBox="1"/>
+          <p:nvPr/>
+        </p:nvSpPr>
+        <p:spPr>
+          <a:xfrm>
+            <a:off x="899592" y="3356992"/>
+            <a:ext cx="3096344" cy="1754326"/>
+          </a:xfrm>
+          <a:prstGeom prst="rect">
+            <a:avLst/>
+          </a:prstGeom>
+          <a:noFill/>
+        </p:spPr>
+        <p:txBody>
+          <a:bodyPr wrap="square" rtlCol="0">
+            <a:spAutoFit/>
+          </a:bodyPr>
+          <a:lstStyle/>
+          <a:p>
+            <a:pPr marL="571500" indent="-571500">
+              <a:buFont typeface="Arial" panose="020B0604020202020204" pitchFamily="34" charset="0"/>
+              <a:buChar char="•"/>
+            </a:pPr>
+            <a:r>
+              <a:rPr lang="en-US" sz="3600" dirty="0" smtClean="0"/>
+              <a:t>Blah </a:t>
+            </a:r>
+            <a:r>
+              <a:rPr lang="en-US" sz="3600" dirty="0" err="1" smtClean="0"/>
+              <a:t>blah</a:t>
+            </a:r>
+            <a:endParaRPr lang="en-US" sz="3600" dirty="0" smtClean="0"/>
+          </a:p>
+          <a:p>
+            <a:pPr marL="571500" indent="-571500">
+              <a:buFont typeface="Arial" panose="020B0604020202020204" pitchFamily="34" charset="0"/>
+              <a:buChar char="•"/>
+            </a:pPr>
+            <a:r>
+              <a:rPr lang="en-US" sz="3600" dirty="0" smtClean="0"/>
+              <a:t>Blah </a:t>
+            </a:r>
+            <a:r>
+              <a:rPr lang="en-US" sz="3600" dirty="0" err="1" smtClean="0"/>
+              <a:t>blah</a:t>
+            </a:r>
+            <a:endParaRPr lang="en-US" sz="3600" dirty="0" smtClean="0"/>
+          </a:p>
+          <a:p>
+            <a:pPr marL="571500" indent="-571500">
+              <a:buFont typeface="Arial" panose="020B0604020202020204" pitchFamily="34" charset="0"/>
+              <a:buChar char="•"/>
+            </a:pPr>
+            <a:r>
+              <a:rPr lang="en-US" sz="3600" dirty="0" smtClean="0"/>
+              <a:t>Blah </a:t>
+            </a:r>
+            <a:r>
+              <a:rPr lang="en-US" sz="3600" dirty="0" err="1" smtClean="0"/>
+              <a:t>blah</a:t>
+            </a:r>
+            <a:endParaRPr lang="en-SG" sz="3600" dirty="0"/>
+          </a:p>
+        </p:txBody>
+      </p:sp>
+      <p:sp>
+        <p:nvSpPr>
+          <p:cNvPr id="4" name="Rectangle 3"/>
+          <p:cNvSpPr/>
+          <p:nvPr/>
+        </p:nvSpPr>
+        <p:spPr>
+          <a:xfrm>
+            <a:off x="4788024" y="836712"/>
+            <a:ext cx="3600400" cy="4392488"/>
+          </a:xfrm>
+          <a:prstGeom prst="rect">
+            <a:avLst/>
+          </a:prstGeom>
+        </p:spPr>
+        <p:style>
+          <a:lnRef idx="2">
+            <a:schemeClr val="accent3">
+              <a:shade val="50000"/>
+            </a:schemeClr>
+          </a:lnRef>
+          <a:fillRef idx="1">
+            <a:schemeClr val="accent3"/>
+          </a:fillRef>
+          <a:effectRef idx="0">
+            <a:schemeClr val="accent3"/>
+          </a:effectRef>
+          <a:fontRef idx="minor">
+            <a:schemeClr val="lt1"/>
+          </a:fontRef>
+        </p:style>
+        <p:txBody>
+          <a:bodyPr rtlCol="0" anchor="ctr"/>
+          <a:lstStyle/>
+          <a:p>
+            <a:pPr algn="ctr"/>
+            <a:endParaRPr lang="en-SG"/>
+          </a:p>
+        </p:txBody>
+      </p:sp>
+    </p:spTree>
+    <p:extLst>
+      <p:ext uri="{BB962C8B-B14F-4D97-AF65-F5344CB8AC3E}">
+        <p14:creationId xmlns:p14="http://schemas.microsoft.com/office/powerpoint/2010/main" val="3818889738"/>
+      </p:ext>
+    </p:extLst>
+  </p:cSld>
+  <p:clrMapOvr>
+    <a:masterClrMapping/>
+  </p:clrMapOvr>
+  <mc:AlternateContent xmlns:mc="http://schemas.openxmlformats.org/markup-compatibility/2006" xmlns:p14="http://schemas.microsoft.com/office/powerpoint/2010/main">
+    <mc:Choice Requires="p14">
+      <p:transition spd="med" p14:dur="700">
+        <p:fade/>
+      </p:transition>
+    </mc:Choice>
+    <mc:Fallback xmlns="">
+      <p:transition spd="med">
+        <p:fade/>
+      </p:transition>
+    </mc:Fallback>
+  </mc:AlternateContent>
+  <p:timing>
+    <p:tnLst>
+      <p:par>
+        <p:cTn id="1" dur="indefinite" restart="never" nodeType="tmRoot"/>
+      </p:par>
+    </p:tnLst>
+  </p:timing>
+</p:sld>
+</file>
+
+<file path=ppt/slides/slide11.xml><?xml version="1.0" encoding="utf-8"?>
+<p:sld xmlns:a="http://schemas.openxmlformats.org/drawingml/2006/main" xmlns:r="http://schemas.openxmlformats.org/officeDocument/2006/relationships" xmlns:p="http://schemas.openxmlformats.org/presentationml/2006/main">
+  <p:cSld>
+    <p:bg>
+      <p:bgPr>
+        <a:solidFill>
+          <a:schemeClr val="bg1"/>
+        </a:solidFill>
+        <a:effectLst/>
+      </p:bgPr>
+    </p:bg>
+    <p:spTree>
+      <p:nvGrpSpPr>
+        <p:cNvPr id="1" name=""/>
+        <p:cNvGrpSpPr/>
+        <p:nvPr/>
+      </p:nvGrpSpPr>
+      <p:grpSpPr>
+        <a:xfrm>
+          <a:off x="0" y="0"/>
+          <a:ext cx="0" cy="0"/>
+          <a:chOff x="0" y="0"/>
+          <a:chExt cx="0" cy="0"/>
+        </a:xfrm>
+      </p:grpSpPr>
+      <p:sp>
+        <p:nvSpPr>
           <p:cNvPr id="4" name="Rectangle 3"/>
           <p:cNvSpPr/>
           <p:nvPr/>
@@ -9521,7 +9736,7 @@
       </p:sp>
       <p:sp>
         <p:nvSpPr>
-          <p:cNvPr id="8" name="Rectangle 7"/>
+          <p:cNvPr id="8" name="Step Back This Shape"/>
           <p:cNvSpPr/>
           <p:nvPr/>
         </p:nvSpPr>
@@ -9574,13 +9789,13 @@
   <p:clrMapOvr>
     <a:masterClrMapping/>
   </p:clrMapOvr>
-  <mc:AlternateContent xmlns:mc="http://schemas.openxmlformats.org/markup-compatibility/2006">
-    <mc:Choice xmlns:p14="http://schemas.microsoft.com/office/powerpoint/2010/main" Requires="p14">
+  <mc:AlternateContent xmlns:mc="http://schemas.openxmlformats.org/markup-compatibility/2006" xmlns:p14="http://schemas.microsoft.com/office/powerpoint/2010/main">
+    <mc:Choice Requires="p14">
       <p:transition spd="slow" p14:dur="1500">
         <p:split orient="vert"/>
       </p:transition>
     </mc:Choice>
-    <mc:Fallback>
+    <mc:Fallback xmlns="">
       <p:transition spd="slow">
         <p:split orient="vert"/>
       </p:transition>
@@ -9596,9 +9811,17 @@
 </p:sld>
 </file>
 
-<file path=ppt/slides/slide11.xml><?xml version="1.0" encoding="utf-8"?>
+<file path=ppt/slides/slide12.xml><?xml version="1.0" encoding="utf-8"?>
 <p:sld xmlns:a="http://schemas.openxmlformats.org/drawingml/2006/main" xmlns:r="http://schemas.openxmlformats.org/officeDocument/2006/relationships" xmlns:p="http://schemas.openxmlformats.org/presentationml/2006/main">
   <p:cSld>
+    <p:bg>
+      <p:bgPr>
+        <a:solidFill>
+          <a:schemeClr val="bg1"/>
+        </a:solidFill>
+        <a:effectLst/>
+      </p:bgPr>
+    </p:bg>
     <p:spTree>
       <p:nvGrpSpPr>
         <p:cNvPr id="1" name=""/>
@@ -9613,724 +9836,404 @@
           <a:chExt cx="0" cy="0"/>
         </a:xfrm>
       </p:grpSpPr>
-      <p:grpSp>
-        <p:nvGrpSpPr>
-          <p:cNvPr id="4" name="组合 3"/>
-          <p:cNvGrpSpPr>
-            <a:grpSpLocks/>
-          </p:cNvGrpSpPr>
+      <p:sp>
+        <p:nvSpPr>
+          <p:cNvPr id="2" name="Rectangle 1"/>
+          <p:cNvSpPr/>
           <p:nvPr/>
-        </p:nvGrpSpPr>
-        <p:grpSpPr>
+        </p:nvSpPr>
+        <p:spPr>
           <a:xfrm>
-            <a:off x="-44094722" y="-5539924"/>
-            <a:ext cx="59568166" cy="44676123"/>
-            <a:chOff x="0" y="-1"/>
-            <a:chExt cx="9144000" cy="6858000"/>
+            <a:off x="755576" y="836712"/>
+            <a:ext cx="3240360" cy="1944216"/>
           </a:xfrm>
-        </p:grpSpPr>
-        <p:pic>
-          <p:nvPicPr>
-            <p:cNvPr id="2" name="图片 1"/>
-            <p:cNvPicPr>
-              <a:picLocks/>
-            </p:cNvPicPr>
-            <p:nvPr/>
-          </p:nvPicPr>
-          <p:blipFill>
-            <a:blip r:embed="rId2"/>
-            <a:stretch>
-              <a:fillRect/>
-            </a:stretch>
-          </p:blipFill>
-          <p:spPr>
-            <a:xfrm>
-              <a:off x="0" y="-1"/>
-              <a:ext cx="9144000" cy="6858000"/>
-            </a:xfrm>
-            <a:prstGeom prst="rect">
-              <a:avLst/>
-            </a:prstGeom>
-          </p:spPr>
-        </p:pic>
-        <p:pic>
-          <p:nvPicPr>
-            <p:cNvPr id="3" name="PPTZoomOutShape201403260335363954"/>
-            <p:cNvPicPr>
-              <a:picLocks noChangeAspect="1"/>
-            </p:cNvPicPr>
-            <p:nvPr/>
-          </p:nvPicPr>
-          <p:blipFill>
-            <a:blip r:embed="rId3"/>
-            <a:stretch>
-              <a:fillRect/>
-            </a:stretch>
-          </p:blipFill>
-          <p:spPr>
-            <a:xfrm>
-              <a:off x="6768752" y="850404"/>
-              <a:ext cx="1403648" cy="1052736"/>
-            </a:xfrm>
-            <a:prstGeom prst="rect">
-              <a:avLst/>
-            </a:prstGeom>
-          </p:spPr>
-        </p:pic>
-      </p:grpSp>
-      <p:grpSp>
-        <p:nvGrpSpPr>
-          <p:cNvPr id="6" name="组合 5"/>
-          <p:cNvGrpSpPr>
-            <a:grpSpLocks/>
-          </p:cNvGrpSpPr>
+          <a:prstGeom prst="rect">
+            <a:avLst/>
+          </a:prstGeom>
+          <a:solidFill>
+            <a:schemeClr val="bg2"/>
+          </a:solidFill>
+          <a:ln>
+            <a:noFill/>
+          </a:ln>
+        </p:spPr>
+        <p:style>
+          <a:lnRef idx="2">
+            <a:schemeClr val="accent1">
+              <a:shade val="50000"/>
+            </a:schemeClr>
+          </a:lnRef>
+          <a:fillRef idx="1">
+            <a:schemeClr val="accent1"/>
+          </a:fillRef>
+          <a:effectRef idx="0">
+            <a:schemeClr val="accent1"/>
+          </a:effectRef>
+          <a:fontRef idx="minor">
+            <a:schemeClr val="lt1"/>
+          </a:fontRef>
+        </p:style>
+        <p:txBody>
+          <a:bodyPr rtlCol="0" anchor="ctr"/>
+          <a:lstStyle/>
+          <a:p>
+            <a:pPr algn="ctr"/>
+            <a:endParaRPr lang="en-SG"/>
+          </a:p>
+        </p:txBody>
+      </p:sp>
+      <p:sp>
+        <p:nvSpPr>
+          <p:cNvPr id="3" name="TextBox 2"/>
+          <p:cNvSpPr txBox="1"/>
           <p:nvPr/>
-        </p:nvGrpSpPr>
-        <p:grpSpPr>
+        </p:nvSpPr>
+        <p:spPr>
           <a:xfrm>
-            <a:off x="-39685249" y="-4985932"/>
-            <a:ext cx="54525750" cy="40894311"/>
-            <a:chOff x="0" y="-1"/>
-            <a:chExt cx="9144000" cy="6858000"/>
+            <a:off x="899592" y="3356992"/>
+            <a:ext cx="3096344" cy="1754326"/>
           </a:xfrm>
-        </p:grpSpPr>
-        <p:pic>
-          <p:nvPicPr>
-            <p:cNvPr id="7" name="图片 6"/>
-            <p:cNvPicPr>
-              <a:picLocks/>
-            </p:cNvPicPr>
-            <p:nvPr/>
-          </p:nvPicPr>
-          <p:blipFill>
-            <a:blip r:embed="rId2"/>
-            <a:stretch>
-              <a:fillRect/>
-            </a:stretch>
-          </p:blipFill>
-          <p:spPr>
-            <a:xfrm>
-              <a:off x="0" y="-1"/>
-              <a:ext cx="9144000" cy="6858000"/>
-            </a:xfrm>
-            <a:prstGeom prst="rect">
-              <a:avLst/>
-            </a:prstGeom>
-          </p:spPr>
-        </p:pic>
-        <p:pic>
-          <p:nvPicPr>
-            <p:cNvPr id="8" name="PPTZoomOutShape201403260335363954"/>
-            <p:cNvPicPr>
-              <a:picLocks noChangeAspect="1"/>
-            </p:cNvPicPr>
-            <p:nvPr/>
-          </p:nvPicPr>
-          <p:blipFill>
-            <a:blip r:embed="rId3"/>
-            <a:stretch>
-              <a:fillRect/>
-            </a:stretch>
-          </p:blipFill>
-          <p:spPr>
-            <a:xfrm>
-              <a:off x="6768752" y="850404"/>
-              <a:ext cx="1403648" cy="1052736"/>
-            </a:xfrm>
-            <a:prstGeom prst="rect">
-              <a:avLst/>
-            </a:prstGeom>
-          </p:spPr>
-        </p:pic>
-      </p:grpSp>
-      <p:grpSp>
-        <p:nvGrpSpPr>
-          <p:cNvPr id="9" name="组合 8"/>
-          <p:cNvGrpSpPr>
-            <a:grpSpLocks/>
-          </p:cNvGrpSpPr>
+          <a:prstGeom prst="rect">
+            <a:avLst/>
+          </a:prstGeom>
+          <a:noFill/>
+        </p:spPr>
+        <p:txBody>
+          <a:bodyPr wrap="square" rtlCol="0">
+            <a:spAutoFit/>
+          </a:bodyPr>
+          <a:lstStyle/>
+          <a:p>
+            <a:pPr marL="571500" indent="-571500">
+              <a:buFont typeface="Arial" panose="020B0604020202020204" pitchFamily="34" charset="0"/>
+              <a:buChar char="•"/>
+            </a:pPr>
+            <a:r>
+              <a:rPr lang="en-US" sz="3600" dirty="0" smtClean="0"/>
+              <a:t>Blah </a:t>
+            </a:r>
+            <a:r>
+              <a:rPr lang="en-US" sz="3600" dirty="0" err="1" smtClean="0"/>
+              <a:t>blah</a:t>
+            </a:r>
+            <a:endParaRPr lang="en-US" sz="3600" dirty="0" smtClean="0"/>
+          </a:p>
+          <a:p>
+            <a:pPr marL="571500" indent="-571500">
+              <a:buFont typeface="Arial" panose="020B0604020202020204" pitchFamily="34" charset="0"/>
+              <a:buChar char="•"/>
+            </a:pPr>
+            <a:r>
+              <a:rPr lang="en-US" sz="3600" dirty="0" smtClean="0"/>
+              <a:t>Blah </a:t>
+            </a:r>
+            <a:r>
+              <a:rPr lang="en-US" sz="3600" dirty="0" err="1" smtClean="0"/>
+              <a:t>blah</a:t>
+            </a:r>
+            <a:endParaRPr lang="en-US" sz="3600" dirty="0" smtClean="0"/>
+          </a:p>
+          <a:p>
+            <a:pPr marL="571500" indent="-571500">
+              <a:buFont typeface="Arial" panose="020B0604020202020204" pitchFamily="34" charset="0"/>
+              <a:buChar char="•"/>
+            </a:pPr>
+            <a:r>
+              <a:rPr lang="en-US" sz="3600" dirty="0" smtClean="0"/>
+              <a:t>Blah </a:t>
+            </a:r>
+            <a:r>
+              <a:rPr lang="en-US" sz="3600" dirty="0" err="1" smtClean="0"/>
+              <a:t>blah</a:t>
+            </a:r>
+            <a:endParaRPr lang="en-SG" sz="3600" dirty="0"/>
+          </a:p>
+        </p:txBody>
+      </p:sp>
+      <p:sp>
+        <p:nvSpPr>
+          <p:cNvPr id="4" name="Rectangle 3"/>
+          <p:cNvSpPr/>
           <p:nvPr/>
-        </p:nvGrpSpPr>
-        <p:grpSpPr>
+        </p:nvSpPr>
+        <p:spPr>
           <a:xfrm>
-            <a:off x="-35275779" y="-4431940"/>
-            <a:ext cx="49483335" cy="37112500"/>
-            <a:chOff x="0" y="-1"/>
-            <a:chExt cx="9144000" cy="6858000"/>
+            <a:off x="4788024" y="836712"/>
+            <a:ext cx="3600400" cy="4392488"/>
           </a:xfrm>
-        </p:grpSpPr>
-        <p:pic>
-          <p:nvPicPr>
-            <p:cNvPr id="10" name="图片 9"/>
-            <p:cNvPicPr>
-              <a:picLocks/>
-            </p:cNvPicPr>
-            <p:nvPr/>
-          </p:nvPicPr>
-          <p:blipFill>
-            <a:blip r:embed="rId2"/>
-            <a:stretch>
-              <a:fillRect/>
-            </a:stretch>
-          </p:blipFill>
-          <p:spPr>
-            <a:xfrm>
-              <a:off x="0" y="-1"/>
-              <a:ext cx="9144000" cy="6858000"/>
-            </a:xfrm>
-            <a:prstGeom prst="rect">
-              <a:avLst/>
-            </a:prstGeom>
-          </p:spPr>
-        </p:pic>
-        <p:pic>
-          <p:nvPicPr>
-            <p:cNvPr id="11" name="PPTZoomOutShape201403260335363954"/>
-            <p:cNvPicPr>
-              <a:picLocks noChangeAspect="1"/>
-            </p:cNvPicPr>
-            <p:nvPr/>
-          </p:nvPicPr>
-          <p:blipFill>
-            <a:blip r:embed="rId3"/>
-            <a:stretch>
-              <a:fillRect/>
-            </a:stretch>
-          </p:blipFill>
-          <p:spPr>
-            <a:xfrm>
-              <a:off x="6768752" y="850404"/>
-              <a:ext cx="1403648" cy="1052736"/>
-            </a:xfrm>
-            <a:prstGeom prst="rect">
-              <a:avLst/>
-            </a:prstGeom>
-          </p:spPr>
-        </p:pic>
-      </p:grpSp>
-      <p:grpSp>
-        <p:nvGrpSpPr>
-          <p:cNvPr id="12" name="组合 11"/>
-          <p:cNvGrpSpPr>
-            <a:grpSpLocks/>
-          </p:cNvGrpSpPr>
+          <a:prstGeom prst="rect">
+            <a:avLst/>
+          </a:prstGeom>
+        </p:spPr>
+        <p:style>
+          <a:lnRef idx="2">
+            <a:schemeClr val="accent3">
+              <a:shade val="50000"/>
+            </a:schemeClr>
+          </a:lnRef>
+          <a:fillRef idx="1">
+            <a:schemeClr val="accent3"/>
+          </a:fillRef>
+          <a:effectRef idx="0">
+            <a:schemeClr val="accent3"/>
+          </a:effectRef>
+          <a:fontRef idx="minor">
+            <a:schemeClr val="lt1"/>
+          </a:fontRef>
+        </p:style>
+        <p:txBody>
+          <a:bodyPr rtlCol="0" anchor="ctr"/>
+          <a:lstStyle/>
+          <a:p>
+            <a:pPr algn="ctr"/>
+            <a:endParaRPr lang="en-SG"/>
+          </a:p>
+        </p:txBody>
+      </p:sp>
+    </p:spTree>
+    <p:extLst>
+      <p:ext uri="{BB962C8B-B14F-4D97-AF65-F5344CB8AC3E}">
+        <p14:creationId xmlns:p14="http://schemas.microsoft.com/office/powerpoint/2010/main" val="3184203851"/>
+      </p:ext>
+    </p:extLst>
+  </p:cSld>
+  <p:clrMapOvr>
+    <a:masterClrMapping/>
+  </p:clrMapOvr>
+  <mc:AlternateContent xmlns:mc="http://schemas.openxmlformats.org/markup-compatibility/2006" xmlns:p14="http://schemas.microsoft.com/office/powerpoint/2010/main">
+    <mc:Choice Requires="p14">
+      <p:transition spd="med" p14:dur="700">
+        <p:fade/>
+      </p:transition>
+    </mc:Choice>
+    <mc:Fallback xmlns="">
+      <p:transition spd="med">
+        <p:fade/>
+      </p:transition>
+    </mc:Fallback>
+  </mc:AlternateContent>
+  <p:timing>
+    <p:tnLst>
+      <p:par>
+        <p:cTn id="1" dur="indefinite" restart="never" nodeType="tmRoot"/>
+      </p:par>
+    </p:tnLst>
+  </p:timing>
+</p:sld>
+</file>
+
+<file path=ppt/slides/slide13.xml><?xml version="1.0" encoding="utf-8"?>
+<p:sld xmlns:a="http://schemas.openxmlformats.org/drawingml/2006/main" xmlns:r="http://schemas.openxmlformats.org/officeDocument/2006/relationships" xmlns:p="http://schemas.openxmlformats.org/presentationml/2006/main">
+  <p:cSld name="PPTLabsZoomOut201506181134006137">
+    <p:bg>
+      <p:bgPr>
+        <a:solidFill>
+          <a:schemeClr val="bg1"/>
+        </a:solidFill>
+        <a:effectLst/>
+      </p:bgPr>
+    </p:bg>
+    <p:spTree>
+      <p:nvGrpSpPr>
+        <p:cNvPr id="1" name=""/>
+        <p:cNvGrpSpPr/>
+        <p:nvPr/>
+      </p:nvGrpSpPr>
+      <p:grpSpPr>
+        <a:xfrm>
+          <a:off x="0" y="0"/>
+          <a:ext cx="0" cy="0"/>
+          <a:chOff x="0" y="0"/>
+          <a:chExt cx="0" cy="0"/>
+        </a:xfrm>
+      </p:grpSpPr>
+      <p:pic>
+        <p:nvPicPr>
+          <p:cNvPr id="4098" name="PPTZoomOutShape201506181134006293"/>
+          <p:cNvPicPr>
+            <a:picLocks noChangeArrowheads="1"/>
+          </p:cNvPicPr>
           <p:nvPr/>
-        </p:nvGrpSpPr>
-        <p:grpSpPr>
-          <a:xfrm>
-            <a:off x="-30866302" y="-3877946"/>
-            <a:ext cx="44440915" cy="33330685"/>
-            <a:chOff x="0" y="-1"/>
-            <a:chExt cx="9144000" cy="6858000"/>
-          </a:xfrm>
-        </p:grpSpPr>
-        <p:pic>
-          <p:nvPicPr>
-            <p:cNvPr id="13" name="图片 12"/>
-            <p:cNvPicPr>
-              <a:picLocks/>
-            </p:cNvPicPr>
-            <p:nvPr/>
-          </p:nvPicPr>
-          <p:blipFill>
-            <a:blip r:embed="rId2"/>
-            <a:stretch>
-              <a:fillRect/>
-            </a:stretch>
-          </p:blipFill>
-          <p:spPr>
-            <a:xfrm>
-              <a:off x="0" y="-1"/>
-              <a:ext cx="9144000" cy="6858000"/>
-            </a:xfrm>
-            <a:prstGeom prst="rect">
-              <a:avLst/>
-            </a:prstGeom>
-          </p:spPr>
-        </p:pic>
-        <p:pic>
-          <p:nvPicPr>
-            <p:cNvPr id="14" name="PPTZoomOutShape201403260335363954"/>
-            <p:cNvPicPr>
-              <a:picLocks noChangeAspect="1"/>
-            </p:cNvPicPr>
-            <p:nvPr/>
-          </p:nvPicPr>
-          <p:blipFill>
-            <a:blip r:embed="rId3"/>
-            <a:stretch>
-              <a:fillRect/>
-            </a:stretch>
-          </p:blipFill>
-          <p:spPr>
-            <a:xfrm>
-              <a:off x="6768752" y="850404"/>
-              <a:ext cx="1403648" cy="1052736"/>
-            </a:xfrm>
-            <a:prstGeom prst="rect">
-              <a:avLst/>
-            </a:prstGeom>
-          </p:spPr>
-        </p:pic>
-      </p:grpSp>
-      <p:grpSp>
-        <p:nvGrpSpPr>
-          <p:cNvPr id="15" name="组合 14"/>
-          <p:cNvGrpSpPr>
-            <a:grpSpLocks/>
-          </p:cNvGrpSpPr>
-          <p:nvPr/>
-        </p:nvGrpSpPr>
-        <p:grpSpPr>
-          <a:xfrm>
-            <a:off x="-26456832" y="-3323955"/>
-            <a:ext cx="39398500" cy="29548874"/>
-            <a:chOff x="0" y="-1"/>
-            <a:chExt cx="9144000" cy="6858000"/>
-          </a:xfrm>
-        </p:grpSpPr>
-        <p:pic>
-          <p:nvPicPr>
-            <p:cNvPr id="16" name="图片 15"/>
-            <p:cNvPicPr>
-              <a:picLocks/>
-            </p:cNvPicPr>
-            <p:nvPr/>
-          </p:nvPicPr>
-          <p:blipFill>
-            <a:blip r:embed="rId2"/>
-            <a:stretch>
-              <a:fillRect/>
-            </a:stretch>
-          </p:blipFill>
-          <p:spPr>
-            <a:xfrm>
-              <a:off x="0" y="-1"/>
-              <a:ext cx="9144000" cy="6858000"/>
-            </a:xfrm>
-            <a:prstGeom prst="rect">
-              <a:avLst/>
-            </a:prstGeom>
-          </p:spPr>
-        </p:pic>
-        <p:pic>
-          <p:nvPicPr>
-            <p:cNvPr id="17" name="PPTZoomOutShape201403260335363954"/>
-            <p:cNvPicPr>
-              <a:picLocks noChangeAspect="1"/>
-            </p:cNvPicPr>
-            <p:nvPr/>
-          </p:nvPicPr>
-          <p:blipFill>
-            <a:blip r:embed="rId3"/>
-            <a:stretch>
-              <a:fillRect/>
-            </a:stretch>
-          </p:blipFill>
-          <p:spPr>
-            <a:xfrm>
-              <a:off x="6768752" y="850404"/>
-              <a:ext cx="1403648" cy="1052736"/>
-            </a:xfrm>
-            <a:prstGeom prst="rect">
-              <a:avLst/>
-            </a:prstGeom>
-          </p:spPr>
-        </p:pic>
-      </p:grpSp>
-      <p:grpSp>
-        <p:nvGrpSpPr>
-          <p:cNvPr id="18" name="组合 17"/>
-          <p:cNvGrpSpPr>
-            <a:grpSpLocks/>
-          </p:cNvGrpSpPr>
-          <p:nvPr/>
-        </p:nvGrpSpPr>
-        <p:grpSpPr>
-          <a:xfrm>
-            <a:off x="-22047361" y="-2769963"/>
-            <a:ext cx="34356084" cy="25767062"/>
-            <a:chOff x="0" y="-1"/>
-            <a:chExt cx="9144000" cy="6858000"/>
-          </a:xfrm>
-        </p:grpSpPr>
-        <p:pic>
-          <p:nvPicPr>
-            <p:cNvPr id="19" name="图片 18"/>
-            <p:cNvPicPr>
-              <a:picLocks/>
-            </p:cNvPicPr>
-            <p:nvPr/>
-          </p:nvPicPr>
-          <p:blipFill>
-            <a:blip r:embed="rId2"/>
-            <a:stretch>
-              <a:fillRect/>
-            </a:stretch>
-          </p:blipFill>
-          <p:spPr>
-            <a:xfrm>
-              <a:off x="0" y="-1"/>
-              <a:ext cx="9144000" cy="6858000"/>
-            </a:xfrm>
-            <a:prstGeom prst="rect">
-              <a:avLst/>
-            </a:prstGeom>
-          </p:spPr>
-        </p:pic>
-        <p:pic>
-          <p:nvPicPr>
-            <p:cNvPr id="20" name="PPTZoomOutShape201403260335363954"/>
-            <p:cNvPicPr>
-              <a:picLocks noChangeAspect="1"/>
-            </p:cNvPicPr>
-            <p:nvPr/>
-          </p:nvPicPr>
-          <p:blipFill>
-            <a:blip r:embed="rId3"/>
-            <a:stretch>
-              <a:fillRect/>
-            </a:stretch>
-          </p:blipFill>
-          <p:spPr>
-            <a:xfrm>
-              <a:off x="6768752" y="850404"/>
-              <a:ext cx="1403648" cy="1052736"/>
-            </a:xfrm>
-            <a:prstGeom prst="rect">
-              <a:avLst/>
-            </a:prstGeom>
-          </p:spPr>
-        </p:pic>
-      </p:grpSp>
-      <p:grpSp>
-        <p:nvGrpSpPr>
-          <p:cNvPr id="21" name="组合 20"/>
-          <p:cNvGrpSpPr>
-            <a:grpSpLocks/>
-          </p:cNvGrpSpPr>
-          <p:nvPr/>
-        </p:nvGrpSpPr>
-        <p:grpSpPr>
-          <a:xfrm>
-            <a:off x="-17637888" y="-2215969"/>
-            <a:ext cx="29313665" cy="21985248"/>
-            <a:chOff x="0" y="-1"/>
-            <a:chExt cx="9144000" cy="6858000"/>
-          </a:xfrm>
-        </p:grpSpPr>
-        <p:pic>
-          <p:nvPicPr>
-            <p:cNvPr id="22" name="图片 21"/>
-            <p:cNvPicPr>
-              <a:picLocks/>
-            </p:cNvPicPr>
-            <p:nvPr/>
-          </p:nvPicPr>
-          <p:blipFill>
-            <a:blip r:embed="rId2"/>
-            <a:stretch>
-              <a:fillRect/>
-            </a:stretch>
-          </p:blipFill>
-          <p:spPr>
-            <a:xfrm>
-              <a:off x="0" y="-1"/>
-              <a:ext cx="9144000" cy="6858000"/>
-            </a:xfrm>
-            <a:prstGeom prst="rect">
-              <a:avLst/>
-            </a:prstGeom>
-          </p:spPr>
-        </p:pic>
-        <p:pic>
-          <p:nvPicPr>
-            <p:cNvPr id="23" name="PPTZoomOutShape201403260335363954"/>
-            <p:cNvPicPr>
-              <a:picLocks noChangeAspect="1"/>
-            </p:cNvPicPr>
-            <p:nvPr/>
-          </p:nvPicPr>
-          <p:blipFill>
-            <a:blip r:embed="rId3"/>
-            <a:stretch>
-              <a:fillRect/>
-            </a:stretch>
-          </p:blipFill>
-          <p:spPr>
-            <a:xfrm>
-              <a:off x="6768752" y="850404"/>
-              <a:ext cx="1403648" cy="1052736"/>
-            </a:xfrm>
-            <a:prstGeom prst="rect">
-              <a:avLst/>
-            </a:prstGeom>
-          </p:spPr>
-        </p:pic>
-      </p:grpSp>
-      <p:grpSp>
-        <p:nvGrpSpPr>
-          <p:cNvPr id="24" name="组合 23"/>
-          <p:cNvGrpSpPr>
-            <a:grpSpLocks/>
-          </p:cNvGrpSpPr>
-          <p:nvPr/>
-        </p:nvGrpSpPr>
-        <p:grpSpPr>
-          <a:xfrm>
-            <a:off x="-13228413" y="-1661977"/>
-            <a:ext cx="24271249" cy="18203436"/>
-            <a:chOff x="0" y="-1"/>
-            <a:chExt cx="9144000" cy="6858000"/>
-          </a:xfrm>
-        </p:grpSpPr>
-        <p:pic>
-          <p:nvPicPr>
-            <p:cNvPr id="25" name="图片 24"/>
-            <p:cNvPicPr>
-              <a:picLocks/>
-            </p:cNvPicPr>
-            <p:nvPr/>
-          </p:nvPicPr>
-          <p:blipFill>
-            <a:blip r:embed="rId2"/>
-            <a:stretch>
-              <a:fillRect/>
-            </a:stretch>
-          </p:blipFill>
-          <p:spPr>
-            <a:xfrm>
-              <a:off x="0" y="-1"/>
-              <a:ext cx="9144000" cy="6858000"/>
-            </a:xfrm>
-            <a:prstGeom prst="rect">
-              <a:avLst/>
-            </a:prstGeom>
-          </p:spPr>
-        </p:pic>
-        <p:pic>
-          <p:nvPicPr>
-            <p:cNvPr id="26" name="PPTZoomOutShape201403260335363954"/>
-            <p:cNvPicPr>
-              <a:picLocks noChangeAspect="1"/>
-            </p:cNvPicPr>
-            <p:nvPr/>
-          </p:nvPicPr>
-          <p:blipFill>
-            <a:blip r:embed="rId3"/>
-            <a:stretch>
-              <a:fillRect/>
-            </a:stretch>
-          </p:blipFill>
-          <p:spPr>
-            <a:xfrm>
-              <a:off x="6768752" y="850404"/>
-              <a:ext cx="1403648" cy="1052736"/>
-            </a:xfrm>
-            <a:prstGeom prst="rect">
-              <a:avLst/>
-            </a:prstGeom>
-          </p:spPr>
-        </p:pic>
-      </p:grpSp>
-      <p:grpSp>
-        <p:nvGrpSpPr>
-          <p:cNvPr id="27" name="组合 26"/>
-          <p:cNvGrpSpPr>
-            <a:grpSpLocks/>
-          </p:cNvGrpSpPr>
-          <p:nvPr/>
-        </p:nvGrpSpPr>
-        <p:grpSpPr>
-          <a:xfrm>
-            <a:off x="-8818942" y="-1107985"/>
-            <a:ext cx="19228834" cy="14421625"/>
-            <a:chOff x="0" y="-1"/>
-            <a:chExt cx="9144000" cy="6858000"/>
-          </a:xfrm>
-        </p:grpSpPr>
-        <p:pic>
-          <p:nvPicPr>
-            <p:cNvPr id="28" name="图片 27"/>
-            <p:cNvPicPr>
-              <a:picLocks/>
-            </p:cNvPicPr>
-            <p:nvPr/>
-          </p:nvPicPr>
-          <p:blipFill>
-            <a:blip r:embed="rId2"/>
-            <a:stretch>
-              <a:fillRect/>
-            </a:stretch>
-          </p:blipFill>
-          <p:spPr>
-            <a:xfrm>
-              <a:off x="0" y="-1"/>
-              <a:ext cx="9144000" cy="6858000"/>
-            </a:xfrm>
-            <a:prstGeom prst="rect">
-              <a:avLst/>
-            </a:prstGeom>
-          </p:spPr>
-        </p:pic>
-        <p:pic>
-          <p:nvPicPr>
-            <p:cNvPr id="29" name="PPTZoomOutShape201403260335363954"/>
-            <p:cNvPicPr>
-              <a:picLocks noChangeAspect="1"/>
-            </p:cNvPicPr>
-            <p:nvPr/>
-          </p:nvPicPr>
-          <p:blipFill>
-            <a:blip r:embed="rId3"/>
-            <a:stretch>
-              <a:fillRect/>
-            </a:stretch>
-          </p:blipFill>
-          <p:spPr>
-            <a:xfrm>
-              <a:off x="6768752" y="850404"/>
-              <a:ext cx="1403648" cy="1052736"/>
-            </a:xfrm>
-            <a:prstGeom prst="rect">
-              <a:avLst/>
-            </a:prstGeom>
-          </p:spPr>
-        </p:pic>
-      </p:grpSp>
-      <p:grpSp>
-        <p:nvGrpSpPr>
-          <p:cNvPr id="30" name="组合 29"/>
-          <p:cNvGrpSpPr>
-            <a:grpSpLocks/>
-          </p:cNvGrpSpPr>
-          <p:nvPr/>
-        </p:nvGrpSpPr>
-        <p:grpSpPr>
-          <a:xfrm>
-            <a:off x="-4409472" y="-553993"/>
-            <a:ext cx="14186418" cy="10639813"/>
-            <a:chOff x="0" y="-1"/>
-            <a:chExt cx="9144000" cy="6858000"/>
-          </a:xfrm>
-        </p:grpSpPr>
-        <p:pic>
-          <p:nvPicPr>
-            <p:cNvPr id="31" name="图片 30"/>
-            <p:cNvPicPr>
-              <a:picLocks/>
-            </p:cNvPicPr>
-            <p:nvPr/>
-          </p:nvPicPr>
-          <p:blipFill>
-            <a:blip r:embed="rId2"/>
-            <a:stretch>
-              <a:fillRect/>
-            </a:stretch>
-          </p:blipFill>
-          <p:spPr>
-            <a:xfrm>
-              <a:off x="0" y="-1"/>
-              <a:ext cx="9144000" cy="6858000"/>
-            </a:xfrm>
-            <a:prstGeom prst="rect">
-              <a:avLst/>
-            </a:prstGeom>
-          </p:spPr>
-        </p:pic>
-        <p:pic>
-          <p:nvPicPr>
-            <p:cNvPr id="32" name="PPTZoomOutShape201403260335363954"/>
-            <p:cNvPicPr>
-              <a:picLocks noChangeAspect="1"/>
-            </p:cNvPicPr>
-            <p:nvPr/>
-          </p:nvPicPr>
-          <p:blipFill>
-            <a:blip r:embed="rId3"/>
-            <a:stretch>
-              <a:fillRect/>
-            </a:stretch>
-          </p:blipFill>
-          <p:spPr>
-            <a:xfrm>
-              <a:off x="6768752" y="850404"/>
-              <a:ext cx="1403648" cy="1052736"/>
-            </a:xfrm>
-            <a:prstGeom prst="rect">
-              <a:avLst/>
-            </a:prstGeom>
-          </p:spPr>
-        </p:pic>
-      </p:grpSp>
-      <p:grpSp>
-        <p:nvGrpSpPr>
-          <p:cNvPr id="33" name="组合 32"/>
-          <p:cNvGrpSpPr>
-            <a:grpSpLocks/>
-          </p:cNvGrpSpPr>
-          <p:nvPr/>
-        </p:nvGrpSpPr>
-        <p:grpSpPr>
+        </p:nvPicPr>
+        <p:blipFill>
+          <a:blip r:embed="rId2">
+            <a:extLst>
+              <a:ext uri="{28A0092B-C50C-407E-A947-70E740481C1C}">
+                <a14:useLocalDpi xmlns:a14="http://schemas.microsoft.com/office/drawing/2010/main" val="0"/>
+              </a:ext>
+            </a:extLst>
+          </a:blip>
+          <a:srcRect/>
+          <a:stretch>
+            <a:fillRect/>
+          </a:stretch>
+        </p:blipFill>
+        <p:spPr bwMode="auto">
           <a:xfrm>
             <a:off x="0" y="0"/>
-            <a:ext cx="9144002" cy="6858001"/>
-            <a:chOff x="0" y="-1"/>
-            <a:chExt cx="9144000" cy="6858000"/>
+            <a:ext cx="9143999" cy="6858000"/>
           </a:xfrm>
-        </p:grpSpPr>
-        <p:pic>
-          <p:nvPicPr>
-            <p:cNvPr id="34" name="图片 33"/>
-            <p:cNvPicPr>
-              <a:picLocks/>
-            </p:cNvPicPr>
-            <p:nvPr/>
-          </p:nvPicPr>
-          <p:blipFill>
-            <a:blip r:embed="rId2"/>
-            <a:stretch>
-              <a:fillRect/>
-            </a:stretch>
-          </p:blipFill>
-          <p:spPr>
-            <a:xfrm>
-              <a:off x="0" y="-1"/>
-              <a:ext cx="9144000" cy="6858000"/>
-            </a:xfrm>
-            <a:prstGeom prst="rect">
-              <a:avLst/>
-            </a:prstGeom>
-          </p:spPr>
-        </p:pic>
-        <p:pic>
-          <p:nvPicPr>
-            <p:cNvPr id="35" name="PPTZoomOutShape201403260335363954"/>
-            <p:cNvPicPr>
-              <a:picLocks noChangeAspect="1"/>
-            </p:cNvPicPr>
-            <p:nvPr/>
-          </p:nvPicPr>
-          <p:blipFill>
-            <a:blip r:embed="rId3"/>
-            <a:stretch>
-              <a:fillRect/>
-            </a:stretch>
-          </p:blipFill>
-          <p:spPr>
-            <a:xfrm>
-              <a:off x="6768752" y="850404"/>
-              <a:ext cx="1403648" cy="1052736"/>
-            </a:xfrm>
-            <a:prstGeom prst="rect">
-              <a:avLst/>
-            </a:prstGeom>
-          </p:spPr>
-        </p:pic>
-      </p:grpSp>
+          <a:prstGeom prst="rect">
+            <a:avLst/>
+          </a:prstGeom>
+          <a:noFill/>
+          <a:ln>
+            <a:noFill/>
+          </a:ln>
+          <a:effectLst/>
+          <a:extLst>
+            <a:ext uri="{909E8E84-426E-40DD-AFC4-6F175D3DCCD1}">
+              <a14:hiddenFill xmlns:a14="http://schemas.microsoft.com/office/drawing/2010/main">
+                <a:solidFill>
+                  <a:schemeClr val="accent1"/>
+                </a:solidFill>
+              </a14:hiddenFill>
+            </a:ext>
+            <a:ext uri="{91240B29-F687-4F45-9708-019B960494DF}">
+              <a14:hiddenLine xmlns:a14="http://schemas.microsoft.com/office/drawing/2010/main" w="9525">
+                <a:solidFill>
+                  <a:schemeClr val="tx1"/>
+                </a:solidFill>
+                <a:miter lim="800000"/>
+                <a:headEnd/>
+                <a:tailEnd/>
+              </a14:hiddenLine>
+            </a:ext>
+            <a:ext uri="{AF507438-7753-43E0-B8FC-AC1667EBCBE1}">
+              <a14:hiddenEffects xmlns:a14="http://schemas.microsoft.com/office/drawing/2010/main">
+                <a:effectLst>
+                  <a:outerShdw dist="35921" dir="2700000" algn="ctr" rotWithShape="0">
+                    <a:schemeClr val="bg2"/>
+                  </a:outerShdw>
+                </a:effectLst>
+              </a14:hiddenEffects>
+            </a:ext>
+          </a:extLst>
+        </p:spPr>
+      </p:pic>
       <p:pic>
         <p:nvPicPr>
-          <p:cNvPr id="5" name="PPIndicator201403260335364864"/>
+          <p:cNvPr id="6" name="PPTZoomOutShape201506181134006137"/>
+          <p:cNvPicPr>
+            <a:picLocks noChangeArrowheads="1"/>
+          </p:cNvPicPr>
+          <p:nvPr/>
+        </p:nvPicPr>
+        <p:blipFill>
+          <a:blip r:embed="rId3">
+            <a:extLst>
+              <a:ext uri="{28A0092B-C50C-407E-A947-70E740481C1C}">
+                <a14:useLocalDpi xmlns:a14="http://schemas.microsoft.com/office/drawing/2010/main" val="0"/>
+              </a:ext>
+            </a:extLst>
+          </a:blip>
+          <a:srcRect/>
+          <a:stretch>
+            <a:fillRect/>
+          </a:stretch>
+        </p:blipFill>
+        <p:spPr bwMode="auto">
+          <a:xfrm>
+            <a:off x="0" y="0"/>
+            <a:ext cx="9144000" cy="6858000"/>
+          </a:xfrm>
+          <a:prstGeom prst="rect">
+            <a:avLst/>
+          </a:prstGeom>
+          <a:ln/>
+          <a:extLst>
+            <a:ext uri="{909E8E84-426E-40DD-AFC4-6F175D3DCCD1}">
+              <a14:hiddenFill xmlns:a14="http://schemas.microsoft.com/office/drawing/2010/main">
+                <a:solidFill>
+                  <a:schemeClr val="accent1"/>
+                </a:solidFill>
+              </a14:hiddenFill>
+            </a:ext>
+            <a:ext uri="{91240B29-F687-4F45-9708-019B960494DF}">
+              <a14:hiddenLine xmlns:a14="http://schemas.microsoft.com/office/drawing/2010/main" w="9525">
+                <a:solidFill>
+                  <a:schemeClr val="tx1"/>
+                </a:solidFill>
+                <a:miter lim="800000"/>
+                <a:headEnd/>
+                <a:tailEnd/>
+              </a14:hiddenLine>
+            </a:ext>
+            <a:ext uri="{AF507438-7753-43E0-B8FC-AC1667EBCBE1}">
+              <a14:hiddenEffects xmlns:a14="http://schemas.microsoft.com/office/drawing/2010/main">
+                <a:effectLst>
+                  <a:outerShdw dist="35921" dir="2700000" algn="ctr" rotWithShape="0">
+                    <a:schemeClr val="bg2"/>
+                  </a:outerShdw>
+                </a:effectLst>
+              </a14:hiddenEffects>
+            </a:ext>
+          </a:extLst>
+        </p:spPr>
+      </p:pic>
+      <p:pic>
+        <p:nvPicPr>
+          <p:cNvPr id="8" name="PPTZoomOutShape201506181134006137"/>
+          <p:cNvPicPr>
+            <a:picLocks noChangeArrowheads="1"/>
+          </p:cNvPicPr>
+          <p:nvPr/>
+        </p:nvPicPr>
+        <p:blipFill>
+          <a:blip r:embed="rId3">
+            <a:extLst>
+              <a:ext uri="{28A0092B-C50C-407E-A947-70E740481C1C}">
+                <a14:useLocalDpi xmlns:a14="http://schemas.microsoft.com/office/drawing/2010/main" val="0"/>
+              </a:ext>
+            </a:extLst>
+          </a:blip>
+          <a:srcRect/>
+          <a:stretch>
+            <a:fillRect/>
+          </a:stretch>
+        </p:blipFill>
+        <p:spPr bwMode="auto">
+          <a:xfrm>
+            <a:off x="0" y="0"/>
+            <a:ext cx="9144000" cy="6858000"/>
+          </a:xfrm>
+          <a:prstGeom prst="rect">
+            <a:avLst/>
+          </a:prstGeom>
+          <a:ln/>
+          <a:extLst>
+            <a:ext uri="{909E8E84-426E-40DD-AFC4-6F175D3DCCD1}">
+              <a14:hiddenFill xmlns:a14="http://schemas.microsoft.com/office/drawing/2010/main">
+                <a:solidFill>
+                  <a:schemeClr val="accent1"/>
+                </a:solidFill>
+              </a14:hiddenFill>
+            </a:ext>
+            <a:ext uri="{91240B29-F687-4F45-9708-019B960494DF}">
+              <a14:hiddenLine xmlns:a14="http://schemas.microsoft.com/office/drawing/2010/main" w="9525">
+                <a:solidFill>
+                  <a:schemeClr val="tx1"/>
+                </a:solidFill>
+                <a:miter lim="800000"/>
+                <a:headEnd/>
+                <a:tailEnd/>
+              </a14:hiddenLine>
+            </a:ext>
+            <a:ext uri="{AF507438-7753-43E0-B8FC-AC1667EBCBE1}">
+              <a14:hiddenEffects xmlns:a14="http://schemas.microsoft.com/office/drawing/2010/main">
+                <a:effectLst>
+                  <a:outerShdw dist="35921" dir="2700000" algn="ctr" rotWithShape="0">
+                    <a:schemeClr val="bg2"/>
+                  </a:outerShdw>
+                </a:effectLst>
+              </a14:hiddenEffects>
+            </a:ext>
+          </a:extLst>
+        </p:spPr>
+      </p:pic>
+      <p:pic>
+        <p:nvPicPr>
+          <p:cNvPr id="5" name="PPTIndicator201506181134006605"/>
           <p:cNvPicPr>
             <a:picLocks/>
           </p:cNvPicPr>
@@ -10358,60 +10261,22 @@
           </a:prstGeom>
         </p:spPr>
       </p:pic>
-      <p:sp>
-        <p:nvSpPr>
-          <p:cNvPr id="36" name="text 3"/>
-          <p:cNvSpPr txBox="1"/>
-          <p:nvPr/>
-        </p:nvSpPr>
-        <p:spPr>
-          <a:xfrm>
-            <a:off x="228600" y="48280"/>
-            <a:ext cx="2693814" cy="523220"/>
-          </a:xfrm>
-          <a:prstGeom prst="rect">
-            <a:avLst/>
-          </a:prstGeom>
-          <a:noFill/>
-        </p:spPr>
-        <p:txBody>
-          <a:bodyPr wrap="none" rtlCol="0">
-            <a:spAutoFit/>
-          </a:bodyPr>
-          <a:lstStyle/>
-          <a:p>
-            <a:r>
-              <a:rPr lang="en-US" sz="2800" b="1" dirty="0" smtClean="0">
-                <a:solidFill>
-                  <a:schemeClr val="accent1"/>
-                </a:solidFill>
-              </a:rPr>
-              <a:t>Expected Output</a:t>
-            </a:r>
-            <a:endParaRPr lang="en-SG" sz="2800" b="1" dirty="0">
-              <a:solidFill>
-                <a:schemeClr val="accent1"/>
-              </a:solidFill>
-            </a:endParaRPr>
-          </a:p>
-        </p:txBody>
-      </p:sp>
     </p:spTree>
     <p:extLst>
       <p:ext uri="{BB962C8B-B14F-4D97-AF65-F5344CB8AC3E}">
-        <p14:creationId xmlns:p14="http://schemas.microsoft.com/office/powerpoint/2010/main" val="1493418379"/>
+        <p14:creationId xmlns:p14="http://schemas.microsoft.com/office/powerpoint/2010/main" val="2762710067"/>
       </p:ext>
     </p:extLst>
   </p:cSld>
   <p:clrMapOvr>
     <a:masterClrMapping/>
   </p:clrMapOvr>
-  <mc:AlternateContent xmlns:mc="http://schemas.openxmlformats.org/markup-compatibility/2006">
-    <mc:Choice xmlns:p14="http://schemas.microsoft.com/office/powerpoint/2010/main" Requires="p14">
-      <p:transition spd="slow" p14:dur="2000" advClick="0" advTm="0"/>
+  <mc:AlternateContent xmlns:mc="http://schemas.openxmlformats.org/markup-compatibility/2006" xmlns:p14="http://schemas.microsoft.com/office/powerpoint/2010/main">
+    <mc:Choice Requires="p14">
+      <p:transition spd="med" p14:dur="700" advClick="0" advTm="0"/>
     </mc:Choice>
-    <mc:Fallback>
-      <p:transition spd="slow" advClick="0" advTm="0"/>
+    <mc:Fallback xmlns="">
+      <p:transition spd="med" advClick="0" advTm="0"/>
     </mc:Fallback>
   </mc:AlternateContent>
   <p:timing>
@@ -10438,14 +10303,49 @@
                             </p:stCondLst>
                             <p:childTnLst>
                               <p:par>
-                                <p:cTn id="5" presetID="1" presetClass="entr" presetSubtype="0" fill="hold" nodeType="withEffect">
+                                <p:cTn id="5" presetID="10" presetClass="exit" presetSubtype="0" fill="hold" nodeType="withEffect">
+                                  <p:stCondLst>
+                                    <p:cond delay="0"/>
+                                  </p:stCondLst>
+                                  <p:childTnLst>
+                                    <p:animEffect transition="out" filter="fade">
+                                      <p:cBhvr>
+                                        <p:cTn id="6" dur="10"/>
+                                        <p:tgtEl>
+                                          <p:spTgt spid="8"/>
+                                        </p:tgtEl>
+                                      </p:cBhvr>
+                                    </p:animEffect>
+                                    <p:set>
+                                      <p:cBhvr>
+                                        <p:cTn id="7" dur="1" fill="hold">
+                                          <p:stCondLst>
+                                            <p:cond delay="9"/>
+                                          </p:stCondLst>
+                                        </p:cTn>
+                                        <p:tgtEl>
+                                          <p:spTgt spid="8"/>
+                                        </p:tgtEl>
+                                        <p:attrNameLst>
+                                          <p:attrName>style.visibility</p:attrName>
+                                        </p:attrNameLst>
+                                      </p:cBhvr>
+                                      <p:to>
+                                        <p:strVal val="hidden"/>
+                                      </p:to>
+                                    </p:set>
+                                  </p:childTnLst>
+                                </p:cTn>
+                              </p:par>
+                              <p:par>
+                                <p:cTn id="8" presetID="1" presetClass="entr" presetSubtype="0" fill="hold" nodeType="withEffect">
                                   <p:stCondLst>
                                     <p:cond delay="0"/>
                                   </p:stCondLst>
                                   <p:childTnLst>
                                     <p:set>
                                       <p:cBhvr>
-                                        <p:cTn id="6" dur="1" fill="hold">
+                                        <p:cTn id="9" dur="1" fill="hold">
                                           <p:stCondLst>
                                             <p:cond delay="0"/>
                                           </p:stCondLst>
@@ -10465,14 +10365,14 @@
                                 </p:cTn>
                               </p:par>
                               <p:par>
-                                <p:cTn id="7" presetID="1" presetClass="exit" presetSubtype="0" fill="hold" nodeType="withEffect">
+                                <p:cTn id="10" presetID="1" presetClass="exit" presetSubtype="0" fill="hold" nodeType="withEffect">
                                   <p:stCondLst>
                                     <p:cond delay="0"/>
                                   </p:stCondLst>
                                   <p:childTnLst>
                                     <p:set>
                                       <p:cBhvr>
-                                        <p:cTn id="8" dur="1" fill="hold">
+                                        <p:cTn id="11" dur="1" fill="hold">
                                           <p:stCondLst>
                                             <p:cond delay="0"/>
                                           </p:stCondLst>
@@ -10492,542 +10392,119 @@
                                 </p:cTn>
                               </p:par>
                               <p:par>
-                                <p:cTn id="9" presetID="1" presetClass="entr" presetSubtype="0" fill="hold" nodeType="withEffect">
+                                <p:cTn id="12" presetID="42" presetClass="path" presetSubtype="0" fill="hold" nodeType="withEffect">
                                   <p:stCondLst>
-                                    <p:cond delay="50"/>
+                                    <p:cond delay="0"/>
                                   </p:stCondLst>
                                   <p:childTnLst>
-                                    <p:set>
+                                    <p:animMotion origin="layout" path="M 0 0 C 0.1584961 -0.1496229 0.1584961 -0.1496229 0.3169921 -0.2992458 E" pathEditMode="relative" ptsTypes="">
                                       <p:cBhvr>
-                                        <p:cTn id="10" dur="1" fill="hold">
-                                          <p:stCondLst>
-                                            <p:cond delay="0"/>
-                                          </p:stCondLst>
-                                        </p:cTn>
+                                        <p:cTn id="13" dur="500" fill="hold"/>
                                         <p:tgtEl>
                                           <p:spTgt spid="6"/>
                                         </p:tgtEl>
                                         <p:attrNameLst>
-                                          <p:attrName>style.visibility</p:attrName>
+                                          <p:attrName>ppt_x</p:attrName>
+                                          <p:attrName>ppt_y</p:attrName>
                                         </p:attrNameLst>
                                       </p:cBhvr>
-                                      <p:to>
-                                        <p:strVal val="visible"/>
-                                      </p:to>
-                                    </p:set>
+                                    </p:animMotion>
                                   </p:childTnLst>
                                 </p:cTn>
                               </p:par>
                               <p:par>
-                                <p:cTn id="11" presetID="1" presetClass="exit" presetSubtype="0" fill="hold" nodeType="withEffect">
+                                <p:cTn id="14" presetID="6" presetClass="emph" presetSubtype="0" fill="hold" nodeType="withEffect">
                                   <p:stCondLst>
-                                    <p:cond delay="50"/>
+                                    <p:cond delay="0"/>
                                   </p:stCondLst>
                                   <p:childTnLst>
-                                    <p:set>
+                                    <p:animScale>
                                       <p:cBhvr>
-                                        <p:cTn id="12" dur="1" fill="hold">
-                                          <p:stCondLst>
-                                            <p:cond delay="0"/>
-                                          </p:stCondLst>
-                                        </p:cTn>
+                                        <p:cTn id="15" dur="500" fill="hold"/>
                                         <p:tgtEl>
-                                          <p:spTgt spid="4"/>
+                                          <p:spTgt spid="6"/>
                                         </p:tgtEl>
-                                        <p:attrNameLst>
-                                          <p:attrName>style.visibility</p:attrName>
-                                        </p:attrNameLst>
                                       </p:cBhvr>
-                                      <p:to>
-                                        <p:strVal val="hidden"/>
-                                      </p:to>
-                                    </p:set>
+                                      <p:by x="15350" y="15350"/>
+                                    </p:animScale>
                                   </p:childTnLst>
                                 </p:cTn>
                               </p:par>
                               <p:par>
-                                <p:cTn id="13" presetID="1" presetClass="entr" presetSubtype="0" fill="hold" nodeType="withEffect">
+                                <p:cTn id="16" presetID="42" presetClass="path" presetSubtype="0" fill="hold" nodeType="withEffect">
                                   <p:stCondLst>
-                                    <p:cond delay="100"/>
+                                    <p:cond delay="0"/>
                                   </p:stCondLst>
                                   <p:childTnLst>
-                                    <p:set>
+                                    <p:animMotion origin="layout" path="M 0 0 C -1.032515 0.9747115 -1.032515 0.9747115 -2.065031 1.949423 E" pathEditMode="relative" ptsTypes="">
                                       <p:cBhvr>
-                                        <p:cTn id="14" dur="1" fill="hold">
-                                          <p:stCondLst>
-                                            <p:cond delay="0"/>
-                                          </p:stCondLst>
-                                        </p:cTn>
+                                        <p:cTn id="17" dur="1" fill="hold"/>
                                         <p:tgtEl>
-                                          <p:spTgt spid="9"/>
+                                          <p:spTgt spid="4098"/>
                                         </p:tgtEl>
                                         <p:attrNameLst>
-                                          <p:attrName>style.visibility</p:attrName>
+                                          <p:attrName>ppt_x</p:attrName>
+                                          <p:attrName>ppt_y</p:attrName>
                                         </p:attrNameLst>
                                       </p:cBhvr>
-                                      <p:to>
-                                        <p:strVal val="visible"/>
-                                      </p:to>
-                                    </p:set>
+                                    </p:animMotion>
                                   </p:childTnLst>
                                 </p:cTn>
                               </p:par>
                               <p:par>
-                                <p:cTn id="15" presetID="1" presetClass="exit" presetSubtype="0" fill="hold" nodeType="withEffect">
+                                <p:cTn id="18" presetID="6" presetClass="emph" presetSubtype="0" fill="hold" nodeType="withEffect">
                                   <p:stCondLst>
-                                    <p:cond delay="100"/>
+                                    <p:cond delay="0"/>
                                   </p:stCondLst>
                                   <p:childTnLst>
-                                    <p:set>
+                                    <p:animScale>
                                       <p:cBhvr>
-                                        <p:cTn id="16" dur="1" fill="hold">
-                                          <p:stCondLst>
-                                            <p:cond delay="0"/>
-                                          </p:stCondLst>
-                                        </p:cTn>
+                                        <p:cTn id="19" dur="1" fill="hold"/>
                                         <p:tgtEl>
-                                          <p:spTgt spid="6"/>
+                                          <p:spTgt spid="4098"/>
                                         </p:tgtEl>
-                                        <p:attrNameLst>
-                                          <p:attrName>style.visibility</p:attrName>
-                                        </p:attrNameLst>
                                       </p:cBhvr>
-                                      <p:to>
-                                        <p:strVal val="hidden"/>
-                                      </p:to>
-                                    </p:set>
+                                      <p:by x="651445" y="651445"/>
+                                    </p:animScale>
                                   </p:childTnLst>
                                 </p:cTn>
                               </p:par>
                               <p:par>
-                                <p:cTn id="17" presetID="1" presetClass="entr" presetSubtype="0" fill="hold" nodeType="withEffect">
+                                <p:cTn id="20" presetID="42" presetClass="path" presetSubtype="0" fill="hold" nodeType="withEffect">
                                   <p:stCondLst>
-                                    <p:cond delay="150"/>
+                                    <p:cond delay="0"/>
                                   </p:stCondLst>
                                   <p:childTnLst>
-                                    <p:set>
+                                    <p:animMotion origin="layout" path="M -2.065031 1.949423 C -1.032516 0.9747116 -1.032516 0.9747116 4.768372E-07 1.192093E-07 E" pathEditMode="relative" ptsTypes="">
                                       <p:cBhvr>
-                                        <p:cTn id="18" dur="1" fill="hold">
-                                          <p:stCondLst>
-                                            <p:cond delay="0"/>
-                                          </p:stCondLst>
-                                        </p:cTn>
+                                        <p:cTn id="21" dur="500" fill="hold"/>
                                         <p:tgtEl>
-                                          <p:spTgt spid="12"/>
+                                          <p:spTgt spid="4098"/>
                                         </p:tgtEl>
                                         <p:attrNameLst>
-                                          <p:attrName>style.visibility</p:attrName>
+                                          <p:attrName>ppt_x</p:attrName>
+                                          <p:attrName>ppt_y</p:attrName>
                                         </p:attrNameLst>
                                       </p:cBhvr>
-                                      <p:to>
-                                        <p:strVal val="visible"/>
-                                      </p:to>
-                                    </p:set>
+                                    </p:animMotion>
                                   </p:childTnLst>
                                 </p:cTn>
                               </p:par>
                               <p:par>
-                                <p:cTn id="19" presetID="1" presetClass="exit" presetSubtype="0" fill="hold" nodeType="withEffect">
+                                <p:cTn id="22" presetID="6" presetClass="emph" presetSubtype="0" fill="hold" nodeType="withEffect">
                                   <p:stCondLst>
-                                    <p:cond delay="150"/>
+                                    <p:cond delay="0"/>
                                   </p:stCondLst>
                                   <p:childTnLst>
-                                    <p:set>
+                                    <p:animScale>
                                       <p:cBhvr>
-                                        <p:cTn id="20" dur="1" fill="hold">
-                                          <p:stCondLst>
-                                            <p:cond delay="0"/>
-                                          </p:stCondLst>
-                                        </p:cTn>
+                                        <p:cTn id="23" dur="500" fill="hold"/>
                                         <p:tgtEl>
-                                          <p:spTgt spid="9"/>
+                                          <p:spTgt spid="4098"/>
                                         </p:tgtEl>
-                                        <p:attrNameLst>
-                                          <p:attrName>style.visibility</p:attrName>
-                                        </p:attrNameLst>
                                       </p:cBhvr>
-                                      <p:to>
-                                        <p:strVal val="hidden"/>
-                                      </p:to>
-                                    </p:set>
-                                  </p:childTnLst>
-                                </p:cTn>
-                              </p:par>
-                              <p:par>
-                                <p:cTn id="21" presetID="1" presetClass="entr" presetSubtype="0" fill="hold" nodeType="withEffect">
-                                  <p:stCondLst>
-                                    <p:cond delay="200"/>
-                                  </p:stCondLst>
-                                  <p:childTnLst>
-                                    <p:set>
-                                      <p:cBhvr>
-                                        <p:cTn id="22" dur="1" fill="hold">
-                                          <p:stCondLst>
-                                            <p:cond delay="0"/>
-                                          </p:stCondLst>
-                                        </p:cTn>
-                                        <p:tgtEl>
-                                          <p:spTgt spid="15"/>
-                                        </p:tgtEl>
-                                        <p:attrNameLst>
-                                          <p:attrName>style.visibility</p:attrName>
-                                        </p:attrNameLst>
-                                      </p:cBhvr>
-                                      <p:to>
-                                        <p:strVal val="visible"/>
-                                      </p:to>
-                                    </p:set>
-                                  </p:childTnLst>
-                                </p:cTn>
-                              </p:par>
-                              <p:par>
-                                <p:cTn id="23" presetID="1" presetClass="exit" presetSubtype="0" fill="hold" nodeType="withEffect">
-                                  <p:stCondLst>
-                                    <p:cond delay="200"/>
-                                  </p:stCondLst>
-                                  <p:childTnLst>
-                                    <p:set>
-                                      <p:cBhvr>
-                                        <p:cTn id="24" dur="1" fill="hold">
-                                          <p:stCondLst>
-                                            <p:cond delay="0"/>
-                                          </p:stCondLst>
-                                        </p:cTn>
-                                        <p:tgtEl>
-                                          <p:spTgt spid="12"/>
-                                        </p:tgtEl>
-                                        <p:attrNameLst>
-                                          <p:attrName>style.visibility</p:attrName>
-                                        </p:attrNameLst>
-                                      </p:cBhvr>
-                                      <p:to>
-                                        <p:strVal val="hidden"/>
-                                      </p:to>
-                                    </p:set>
-                                  </p:childTnLst>
-                                </p:cTn>
-                              </p:par>
-                              <p:par>
-                                <p:cTn id="25" presetID="1" presetClass="entr" presetSubtype="0" fill="hold" nodeType="withEffect">
-                                  <p:stCondLst>
-                                    <p:cond delay="250"/>
-                                  </p:stCondLst>
-                                  <p:childTnLst>
-                                    <p:set>
-                                      <p:cBhvr>
-                                        <p:cTn id="26" dur="1" fill="hold">
-                                          <p:stCondLst>
-                                            <p:cond delay="0"/>
-                                          </p:stCondLst>
-                                        </p:cTn>
-                                        <p:tgtEl>
-                                          <p:spTgt spid="18"/>
-                                        </p:tgtEl>
-                                        <p:attrNameLst>
-                                          <p:attrName>style.visibility</p:attrName>
-                                        </p:attrNameLst>
-                                      </p:cBhvr>
-                                      <p:to>
-                                        <p:strVal val="visible"/>
-                                      </p:to>
-                                    </p:set>
-                                  </p:childTnLst>
-                                </p:cTn>
-                              </p:par>
-                              <p:par>
-                                <p:cTn id="27" presetID="1" presetClass="exit" presetSubtype="0" fill="hold" nodeType="withEffect">
-                                  <p:stCondLst>
-                                    <p:cond delay="250"/>
-                                  </p:stCondLst>
-                                  <p:childTnLst>
-                                    <p:set>
-                                      <p:cBhvr>
-                                        <p:cTn id="28" dur="1" fill="hold">
-                                          <p:stCondLst>
-                                            <p:cond delay="0"/>
-                                          </p:stCondLst>
-                                        </p:cTn>
-                                        <p:tgtEl>
-                                          <p:spTgt spid="15"/>
-                                        </p:tgtEl>
-                                        <p:attrNameLst>
-                                          <p:attrName>style.visibility</p:attrName>
-                                        </p:attrNameLst>
-                                      </p:cBhvr>
-                                      <p:to>
-                                        <p:strVal val="hidden"/>
-                                      </p:to>
-                                    </p:set>
-                                  </p:childTnLst>
-                                </p:cTn>
-                              </p:par>
-                              <p:par>
-                                <p:cTn id="29" presetID="1" presetClass="entr" presetSubtype="0" fill="hold" nodeType="withEffect">
-                                  <p:stCondLst>
-                                    <p:cond delay="300"/>
-                                  </p:stCondLst>
-                                  <p:childTnLst>
-                                    <p:set>
-                                      <p:cBhvr>
-                                        <p:cTn id="30" dur="1" fill="hold">
-                                          <p:stCondLst>
-                                            <p:cond delay="0"/>
-                                          </p:stCondLst>
-                                        </p:cTn>
-                                        <p:tgtEl>
-                                          <p:spTgt spid="21"/>
-                                        </p:tgtEl>
-                                        <p:attrNameLst>
-                                          <p:attrName>style.visibility</p:attrName>
-                                        </p:attrNameLst>
-                                      </p:cBhvr>
-                                      <p:to>
-                                        <p:strVal val="visible"/>
-                                      </p:to>
-                                    </p:set>
-                                  </p:childTnLst>
-                                </p:cTn>
-                              </p:par>
-                              <p:par>
-                                <p:cTn id="31" presetID="1" presetClass="exit" presetSubtype="0" fill="hold" nodeType="withEffect">
-                                  <p:stCondLst>
-                                    <p:cond delay="300"/>
-                                  </p:stCondLst>
-                                  <p:childTnLst>
-                                    <p:set>
-                                      <p:cBhvr>
-                                        <p:cTn id="32" dur="1" fill="hold">
-                                          <p:stCondLst>
-                                            <p:cond delay="0"/>
-                                          </p:stCondLst>
-                                        </p:cTn>
-                                        <p:tgtEl>
-                                          <p:spTgt spid="18"/>
-                                        </p:tgtEl>
-                                        <p:attrNameLst>
-                                          <p:attrName>style.visibility</p:attrName>
-                                        </p:attrNameLst>
-                                      </p:cBhvr>
-                                      <p:to>
-                                        <p:strVal val="hidden"/>
-                                      </p:to>
-                                    </p:set>
-                                  </p:childTnLst>
-                                </p:cTn>
-                              </p:par>
-                              <p:par>
-                                <p:cTn id="33" presetID="1" presetClass="entr" presetSubtype="0" fill="hold" nodeType="withEffect">
-                                  <p:stCondLst>
-                                    <p:cond delay="350"/>
-                                  </p:stCondLst>
-                                  <p:childTnLst>
-                                    <p:set>
-                                      <p:cBhvr>
-                                        <p:cTn id="34" dur="1" fill="hold">
-                                          <p:stCondLst>
-                                            <p:cond delay="0"/>
-                                          </p:stCondLst>
-                                        </p:cTn>
-                                        <p:tgtEl>
-                                          <p:spTgt spid="24"/>
-                                        </p:tgtEl>
-                                        <p:attrNameLst>
-                                          <p:attrName>style.visibility</p:attrName>
-                                        </p:attrNameLst>
-                                      </p:cBhvr>
-                                      <p:to>
-                                        <p:strVal val="visible"/>
-                                      </p:to>
-                                    </p:set>
-                                  </p:childTnLst>
-                                </p:cTn>
-                              </p:par>
-                              <p:par>
-                                <p:cTn id="35" presetID="1" presetClass="exit" presetSubtype="0" fill="hold" nodeType="withEffect">
-                                  <p:stCondLst>
-                                    <p:cond delay="350"/>
-                                  </p:stCondLst>
-                                  <p:childTnLst>
-                                    <p:set>
-                                      <p:cBhvr>
-                                        <p:cTn id="36" dur="1" fill="hold">
-                                          <p:stCondLst>
-                                            <p:cond delay="0"/>
-                                          </p:stCondLst>
-                                        </p:cTn>
-                                        <p:tgtEl>
-                                          <p:spTgt spid="21"/>
-                                        </p:tgtEl>
-                                        <p:attrNameLst>
-                                          <p:attrName>style.visibility</p:attrName>
-                                        </p:attrNameLst>
-                                      </p:cBhvr>
-                                      <p:to>
-                                        <p:strVal val="hidden"/>
-                                      </p:to>
-                                    </p:set>
-                                  </p:childTnLst>
-                                </p:cTn>
-                              </p:par>
-                              <p:par>
-                                <p:cTn id="37" presetID="1" presetClass="entr" presetSubtype="0" fill="hold" nodeType="withEffect">
-                                  <p:stCondLst>
-                                    <p:cond delay="400"/>
-                                  </p:stCondLst>
-                                  <p:childTnLst>
-                                    <p:set>
-                                      <p:cBhvr>
-                                        <p:cTn id="38" dur="1" fill="hold">
-                                          <p:stCondLst>
-                                            <p:cond delay="0"/>
-                                          </p:stCondLst>
-                                        </p:cTn>
-                                        <p:tgtEl>
-                                          <p:spTgt spid="27"/>
-                                        </p:tgtEl>
-                                        <p:attrNameLst>
-                                          <p:attrName>style.visibility</p:attrName>
-                                        </p:attrNameLst>
-                                      </p:cBhvr>
-                                      <p:to>
-                                        <p:strVal val="visible"/>
-                                      </p:to>
-                                    </p:set>
-                                  </p:childTnLst>
-                                </p:cTn>
-                              </p:par>
-                              <p:par>
-                                <p:cTn id="39" presetID="1" presetClass="exit" presetSubtype="0" fill="hold" nodeType="withEffect">
-                                  <p:stCondLst>
-                                    <p:cond delay="400"/>
-                                  </p:stCondLst>
-                                  <p:childTnLst>
-                                    <p:set>
-                                      <p:cBhvr>
-                                        <p:cTn id="40" dur="1" fill="hold">
-                                          <p:stCondLst>
-                                            <p:cond delay="0"/>
-                                          </p:stCondLst>
-                                        </p:cTn>
-                                        <p:tgtEl>
-                                          <p:spTgt spid="24"/>
-                                        </p:tgtEl>
-                                        <p:attrNameLst>
-                                          <p:attrName>style.visibility</p:attrName>
-                                        </p:attrNameLst>
-                                      </p:cBhvr>
-                                      <p:to>
-                                        <p:strVal val="hidden"/>
-                                      </p:to>
-                                    </p:set>
-                                  </p:childTnLst>
-                                </p:cTn>
-                              </p:par>
-                              <p:par>
-                                <p:cTn id="41" presetID="1" presetClass="entr" presetSubtype="0" fill="hold" nodeType="withEffect">
-                                  <p:stCondLst>
-                                    <p:cond delay="450"/>
-                                  </p:stCondLst>
-                                  <p:childTnLst>
-                                    <p:set>
-                                      <p:cBhvr>
-                                        <p:cTn id="42" dur="1" fill="hold">
-                                          <p:stCondLst>
-                                            <p:cond delay="0"/>
-                                          </p:stCondLst>
-                                        </p:cTn>
-                                        <p:tgtEl>
-                                          <p:spTgt spid="30"/>
-                                        </p:tgtEl>
-                                        <p:attrNameLst>
-                                          <p:attrName>style.visibility</p:attrName>
-                                        </p:attrNameLst>
-                                      </p:cBhvr>
-                                      <p:to>
-                                        <p:strVal val="visible"/>
-                                      </p:to>
-                                    </p:set>
-                                  </p:childTnLst>
-                                </p:cTn>
-                              </p:par>
-                              <p:par>
-                                <p:cTn id="43" presetID="1" presetClass="exit" presetSubtype="0" fill="hold" nodeType="withEffect">
-                                  <p:stCondLst>
-                                    <p:cond delay="450"/>
-                                  </p:stCondLst>
-                                  <p:childTnLst>
-                                    <p:set>
-                                      <p:cBhvr>
-                                        <p:cTn id="44" dur="1" fill="hold">
-                                          <p:stCondLst>
-                                            <p:cond delay="0"/>
-                                          </p:stCondLst>
-                                        </p:cTn>
-                                        <p:tgtEl>
-                                          <p:spTgt spid="27"/>
-                                        </p:tgtEl>
-                                        <p:attrNameLst>
-                                          <p:attrName>style.visibility</p:attrName>
-                                        </p:attrNameLst>
-                                      </p:cBhvr>
-                                      <p:to>
-                                        <p:strVal val="hidden"/>
-                                      </p:to>
-                                    </p:set>
-                                  </p:childTnLst>
-                                </p:cTn>
-                              </p:par>
-                              <p:par>
-                                <p:cTn id="45" presetID="1" presetClass="entr" presetSubtype="0" fill="hold" nodeType="withEffect">
-                                  <p:stCondLst>
-                                    <p:cond delay="500"/>
-                                  </p:stCondLst>
-                                  <p:childTnLst>
-                                    <p:set>
-                                      <p:cBhvr>
-                                        <p:cTn id="46" dur="1" fill="hold">
-                                          <p:stCondLst>
-                                            <p:cond delay="0"/>
-                                          </p:stCondLst>
-                                        </p:cTn>
-                                        <p:tgtEl>
-                                          <p:spTgt spid="33"/>
-                                        </p:tgtEl>
-                                        <p:attrNameLst>
-                                          <p:attrName>style.visibility</p:attrName>
-                                        </p:attrNameLst>
-                                      </p:cBhvr>
-                                      <p:to>
-                                        <p:strVal val="visible"/>
-                                      </p:to>
-                                    </p:set>
-                                  </p:childTnLst>
-                                </p:cTn>
-                              </p:par>
-                              <p:par>
-                                <p:cTn id="47" presetID="1" presetClass="exit" presetSubtype="0" fill="hold" nodeType="withEffect">
-                                  <p:stCondLst>
-                                    <p:cond delay="500"/>
-                                  </p:stCondLst>
-                                  <p:childTnLst>
-                                    <p:set>
-                                      <p:cBhvr>
-                                        <p:cTn id="48" dur="1" fill="hold">
-                                          <p:stCondLst>
-                                            <p:cond delay="0"/>
-                                          </p:stCondLst>
-                                        </p:cTn>
-                                        <p:tgtEl>
-                                          <p:spTgt spid="30"/>
-                                        </p:tgtEl>
-                                        <p:attrNameLst>
-                                          <p:attrName>style.visibility</p:attrName>
-                                        </p:attrNameLst>
-                                      </p:cBhvr>
-                                      <p:to>
-                                        <p:strVal val="hidden"/>
-                                      </p:to>
-                                    </p:set>
+                                      <p:by x="15350" y="15350"/>
+                                    </p:animScale>
                                   </p:childTnLst>
                                 </p:cTn>
                               </p:par>
@@ -11062,7 +10539,7 @@
 </p:sld>
 </file>
 
-<file path=ppt/slides/slide12.xml><?xml version="1.0" encoding="utf-8"?>
+<file path=ppt/slides/slide14.xml><?xml version="1.0" encoding="utf-8"?>
 <p:sld xmlns:a="http://schemas.openxmlformats.org/drawingml/2006/main" xmlns:r="http://schemas.openxmlformats.org/officeDocument/2006/relationships" xmlns:p="http://schemas.openxmlformats.org/presentationml/2006/main">
   <p:cSld>
     <p:bg>
@@ -11256,19 +10733,26 @@
       </p:sp>
       <p:pic>
         <p:nvPicPr>
-          <p:cNvPr id="3" name="PPTZoomOutShape201403260338036128"/>
+          <p:cNvPr id="3074" name="PPTZoomOutShape201506181134006137"/>
           <p:cNvPicPr>
-            <a:picLocks noChangeAspect="1"/>
+            <a:picLocks noChangeAspect="1" noChangeArrowheads="1"/>
           </p:cNvPicPr>
           <p:nvPr/>
         </p:nvPicPr>
         <p:blipFill>
-          <a:blip r:embed="rId2"/>
+          <a:blip r:embed="rId2" cstate="print">
+            <a:extLst>
+              <a:ext uri="{28A0092B-C50C-407E-A947-70E740481C1C}">
+                <a14:useLocalDpi xmlns:a14="http://schemas.microsoft.com/office/drawing/2010/main" val="0"/>
+              </a:ext>
+            </a:extLst>
+          </a:blip>
+          <a:srcRect/>
           <a:stretch>
             <a:fillRect/>
           </a:stretch>
         </p:blipFill>
-        <p:spPr>
+        <p:spPr bwMode="auto">
           <a:xfrm>
             <a:off x="6768752" y="850404"/>
             <a:ext cx="1403648" cy="1052736"/>
@@ -11276,63 +10760,54 @@
           <a:prstGeom prst="rect">
             <a:avLst/>
           </a:prstGeom>
-        </p:spPr>
-      </p:pic>
-      <p:sp>
-        <p:nvSpPr>
-          <p:cNvPr id="7" name="text 3"/>
-          <p:cNvSpPr txBox="1"/>
-          <p:nvPr/>
-        </p:nvSpPr>
-        <p:spPr>
-          <a:xfrm>
-            <a:off x="228600" y="48280"/>
-            <a:ext cx="2693814" cy="523220"/>
-          </a:xfrm>
-          <a:prstGeom prst="rect">
-            <a:avLst/>
-          </a:prstGeom>
-          <a:noFill/>
-        </p:spPr>
-        <p:txBody>
-          <a:bodyPr wrap="none" rtlCol="0">
-            <a:spAutoFit/>
-          </a:bodyPr>
-          <a:lstStyle/>
-          <a:p>
-            <a:r>
-              <a:rPr lang="en-US" sz="2800" b="1" dirty="0" smtClean="0">
+          <a:ln/>
+          <a:extLst>
+            <a:ext uri="{909E8E84-426E-40DD-AFC4-6F175D3DCCD1}">
+              <a14:hiddenFill xmlns:a14="http://schemas.microsoft.com/office/drawing/2010/main">
                 <a:solidFill>
                   <a:schemeClr val="accent1"/>
                 </a:solidFill>
-              </a:rPr>
-              <a:t>Expected Output</a:t>
-            </a:r>
-            <a:endParaRPr lang="en-SG" sz="2800" b="1" dirty="0">
-              <a:solidFill>
-                <a:schemeClr val="accent1"/>
-              </a:solidFill>
-            </a:endParaRPr>
-          </a:p>
-        </p:txBody>
-      </p:sp>
+              </a14:hiddenFill>
+            </a:ext>
+            <a:ext uri="{91240B29-F687-4F45-9708-019B960494DF}">
+              <a14:hiddenLine xmlns:a14="http://schemas.microsoft.com/office/drawing/2010/main" w="9525">
+                <a:solidFill>
+                  <a:schemeClr val="tx1"/>
+                </a:solidFill>
+                <a:miter lim="800000"/>
+                <a:headEnd/>
+                <a:tailEnd/>
+              </a14:hiddenLine>
+            </a:ext>
+            <a:ext uri="{AF507438-7753-43E0-B8FC-AC1667EBCBE1}">
+              <a14:hiddenEffects xmlns:a14="http://schemas.microsoft.com/office/drawing/2010/main">
+                <a:effectLst>
+                  <a:outerShdw dist="35921" dir="2700000" algn="ctr" rotWithShape="0">
+                    <a:schemeClr val="bg2"/>
+                  </a:outerShdw>
+                </a:effectLst>
+              </a14:hiddenEffects>
+            </a:ext>
+          </a:extLst>
+        </p:spPr>
+      </p:pic>
     </p:spTree>
     <p:extLst>
       <p:ext uri="{BB962C8B-B14F-4D97-AF65-F5344CB8AC3E}">
-        <p14:creationId xmlns:p14="http://schemas.microsoft.com/office/powerpoint/2010/main" val="2730421949"/>
+        <p14:creationId xmlns:p14="http://schemas.microsoft.com/office/powerpoint/2010/main" val="3602732917"/>
       </p:ext>
     </p:extLst>
   </p:cSld>
   <p:clrMapOvr>
     <a:masterClrMapping/>
   </p:clrMapOvr>
-  <mc:AlternateContent xmlns:mc="http://schemas.openxmlformats.org/markup-compatibility/2006">
-    <mc:Choice xmlns:p14="http://schemas.microsoft.com/office/powerpoint/2010/main" Requires="p14">
+  <mc:AlternateContent xmlns:mc="http://schemas.openxmlformats.org/markup-compatibility/2006" xmlns:p14="http://schemas.microsoft.com/office/powerpoint/2010/main">
+    <mc:Choice Requires="p14">
       <p:transition p14:dur="250">
         <p:fade/>
       </p:transition>
     </mc:Choice>
-    <mc:Fallback>
+    <mc:Fallback xmlns="">
       <p:transition>
         <p:fade/>
       </p:transition>
@@ -11348,9 +10823,9 @@
 </p:sld>
 </file>
 
-<file path=ppt/slides/slide13.xml><?xml version="1.0" encoding="utf-8"?>
+<file path=ppt/slides/slide15.xml><?xml version="1.0" encoding="utf-8"?>
 <p:sld xmlns:a="http://schemas.openxmlformats.org/drawingml/2006/main" xmlns:r="http://schemas.openxmlformats.org/officeDocument/2006/relationships" xmlns:p="http://schemas.openxmlformats.org/presentationml/2006/main" show="0">
-  <p:cSld name="PPAck201403240026082737">
+  <p:cSld name="PPTLabsAcknowledgementSlide">
     <p:spTree>
       <p:nvGrpSpPr>
         <p:cNvPr id="1" name=""/>
@@ -11365,34 +10840,13 @@
           <a:chExt cx="0" cy="0"/>
         </a:xfrm>
       </p:grpSpPr>
-      <p:sp>
-        <p:nvSpPr>
-          <p:cNvPr id="2" name="标题 1"/>
-          <p:cNvSpPr>
-            <a:spLocks noGrp="1"/>
-          </p:cNvSpPr>
-          <p:nvPr>
-            <p:ph type="title"/>
-          </p:nvPr>
-        </p:nvSpPr>
-        <p:spPr/>
-        <p:txBody>
-          <a:bodyPr/>
-          <a:lstStyle/>
-          <a:p>
-            <a:endParaRPr lang="en-SG"/>
-          </a:p>
-        </p:txBody>
-      </p:sp>
       <p:pic>
         <p:nvPicPr>
-          <p:cNvPr id="4" name="内容占位符 3"/>
+          <p:cNvPr id="2" name="Picture 1"/>
           <p:cNvPicPr>
-            <a:picLocks noGrp="1"/>
+            <a:picLocks/>
           </p:cNvPicPr>
-          <p:nvPr>
-            <p:ph idx="1"/>
-          </p:nvPr>
+          <p:nvPr/>
         </p:nvPicPr>
         <p:blipFill>
           <a:blip r:embed="rId2">
@@ -11408,15 +10862,18 @@
         </p:blipFill>
         <p:spPr>
           <a:xfrm>
-            <a:off x="1074665" y="1600200"/>
-            <a:ext cx="6994670" cy="4525963"/>
+            <a:off x="649224" y="992124"/>
+            <a:ext cx="7845552" cy="4873752"/>
           </a:xfrm>
+          <a:prstGeom prst="rect">
+            <a:avLst/>
+          </a:prstGeom>
         </p:spPr>
       </p:pic>
     </p:spTree>
     <p:extLst>
       <p:ext uri="{BB962C8B-B14F-4D97-AF65-F5344CB8AC3E}">
-        <p14:creationId xmlns:p14="http://schemas.microsoft.com/office/powerpoint/2010/main" val="2306293579"/>
+        <p14:creationId xmlns:p14="http://schemas.microsoft.com/office/powerpoint/2010/main" val="259766833"/>
       </p:ext>
     </p:extLst>
   </p:cSld>
@@ -11431,13 +10888,6 @@
       <p:transition spd="slow"/>
     </mc:Fallback>
   </mc:AlternateContent>
-  <p:timing>
-    <p:tnLst>
-      <p:par>
-        <p:cTn id="1" dur="indefinite" restart="never" nodeType="tmRoot"/>
-      </p:par>
-    </p:tnLst>
-  </p:timing>
 </p:sld>
 </file>
 
@@ -11565,15 +11015,7 @@
                   <a:schemeClr val="bg1"/>
                 </a:solidFill>
               </a:rPr>
-              <a:t> </a:t>
-            </a:r>
-            <a:r>
-              <a:rPr lang="en-US" sz="2400" dirty="0" smtClean="0">
-                <a:solidFill>
-                  <a:schemeClr val="bg1"/>
-                </a:solidFill>
-              </a:rPr>
-              <a:t>color </a:t>
+              <a:t> color </a:t>
             </a:r>
             <a:r>
               <a:rPr lang="en-US" sz="2400" b="1" dirty="0" smtClean="0">
@@ -11589,15 +11031,7 @@
                   <a:schemeClr val="bg1"/>
                 </a:solidFill>
               </a:rPr>
-              <a:t> </a:t>
-            </a:r>
-            <a:r>
-              <a:rPr lang="en-US" sz="2400" dirty="0" smtClean="0">
-                <a:solidFill>
-                  <a:schemeClr val="bg1"/>
-                </a:solidFill>
-              </a:rPr>
-              <a:t>shape(s).</a:t>
+              <a:t> shape(s).</a:t>
             </a:r>
           </a:p>
           <a:p>
@@ -11627,29 +11061,8 @@
                   <a:schemeClr val="bg1"/>
                 </a:solidFill>
               </a:rPr>
-              <a:t> </a:t>
-            </a:r>
-            <a:r>
-              <a:rPr lang="en-US" sz="2400" dirty="0" smtClean="0">
-                <a:solidFill>
-                  <a:schemeClr val="bg1"/>
-                </a:solidFill>
-              </a:rPr>
-              <a:t>button in the </a:t>
-            </a:r>
-            <a:r>
-              <a:rPr lang="en-US" sz="2400" dirty="0" smtClean="0">
-                <a:solidFill>
-                  <a:schemeClr val="bg1"/>
-                </a:solidFill>
-              </a:rPr>
-              <a:t>ribbon. </a:t>
-            </a:r>
-            <a:endParaRPr lang="en-US" sz="2400" dirty="0" smtClean="0">
-              <a:solidFill>
-                <a:schemeClr val="bg1"/>
-              </a:solidFill>
-            </a:endParaRPr>
+              <a:t> button in the ribbon. </a:t>
+            </a:r>
           </a:p>
           <a:p>
             <a:pPr marL="285750" indent="-285750">
@@ -11982,7 +11395,7 @@
       </p:sp>
       <p:sp>
         <p:nvSpPr>
-          <p:cNvPr id="8" name="Rectangle 7"/>
+          <p:cNvPr id="8" name="Drill Down This Shape"/>
           <p:cNvSpPr/>
           <p:nvPr/>
         </p:nvSpPr>
@@ -12035,13 +11448,13 @@
   <p:clrMapOvr>
     <a:masterClrMapping/>
   </p:clrMapOvr>
-  <mc:AlternateContent xmlns:mc="http://schemas.openxmlformats.org/markup-compatibility/2006">
-    <mc:Choice xmlns:p14="http://schemas.microsoft.com/office/powerpoint/2010/main" Requires="p14">
+  <mc:AlternateContent xmlns:mc="http://schemas.openxmlformats.org/markup-compatibility/2006" xmlns:p14="http://schemas.microsoft.com/office/powerpoint/2010/main">
+    <mc:Choice Requires="p14">
       <p:transition spd="med" p14:dur="700">
         <p:fade/>
       </p:transition>
     </mc:Choice>
-    <mc:Fallback>
+    <mc:Fallback xmlns="">
       <p:transition spd="med">
         <p:fade/>
       </p:transition>
@@ -12246,13 +11659,13 @@
   <p:clrMapOvr>
     <a:masterClrMapping/>
   </p:clrMapOvr>
-  <mc:AlternateContent xmlns:mc="http://schemas.openxmlformats.org/markup-compatibility/2006">
-    <mc:Choice xmlns:p14="http://schemas.microsoft.com/office/powerpoint/2010/main" Requires="p14">
+  <mc:AlternateContent xmlns:mc="http://schemas.openxmlformats.org/markup-compatibility/2006" xmlns:p14="http://schemas.microsoft.com/office/powerpoint/2010/main">
+    <mc:Choice Requires="p14">
       <p:transition spd="slow" p14:dur="1500">
         <p:split orient="vert"/>
       </p:transition>
     </mc:Choice>
-    <mc:Fallback>
+    <mc:Fallback xmlns="">
       <p:transition spd="slow">
         <p:split orient="vert"/>
       </p:transition>
@@ -12271,6 +11684,374 @@
 <file path=ppt/slides/slide6.xml><?xml version="1.0" encoding="utf-8"?>
 <p:sld xmlns:a="http://schemas.openxmlformats.org/drawingml/2006/main" xmlns:r="http://schemas.openxmlformats.org/officeDocument/2006/relationships" xmlns:p="http://schemas.openxmlformats.org/presentationml/2006/main">
   <p:cSld>
+    <p:bg>
+      <p:bgPr>
+        <a:solidFill>
+          <a:schemeClr val="bg1"/>
+        </a:solidFill>
+        <a:effectLst/>
+      </p:bgPr>
+    </p:bg>
+    <p:spTree>
+      <p:nvGrpSpPr>
+        <p:cNvPr id="1" name=""/>
+        <p:cNvGrpSpPr/>
+        <p:nvPr/>
+      </p:nvGrpSpPr>
+      <p:grpSpPr>
+        <a:xfrm>
+          <a:off x="0" y="0"/>
+          <a:ext cx="0" cy="0"/>
+          <a:chOff x="0" y="0"/>
+          <a:chExt cx="0" cy="0"/>
+        </a:xfrm>
+      </p:grpSpPr>
+      <p:sp>
+        <p:nvSpPr>
+          <p:cNvPr id="4" name="Rectangle 3"/>
+          <p:cNvSpPr/>
+          <p:nvPr/>
+        </p:nvSpPr>
+        <p:spPr>
+          <a:xfrm>
+            <a:off x="611560" y="764704"/>
+            <a:ext cx="7920880" cy="1224136"/>
+          </a:xfrm>
+          <a:prstGeom prst="rect">
+            <a:avLst/>
+          </a:prstGeom>
+          <a:noFill/>
+          <a:ln w="57150"/>
+        </p:spPr>
+        <p:style>
+          <a:lnRef idx="2">
+            <a:schemeClr val="accent1">
+              <a:shade val="50000"/>
+            </a:schemeClr>
+          </a:lnRef>
+          <a:fillRef idx="1">
+            <a:schemeClr val="accent1"/>
+          </a:fillRef>
+          <a:effectRef idx="0">
+            <a:schemeClr val="accent1"/>
+          </a:effectRef>
+          <a:fontRef idx="minor">
+            <a:schemeClr val="lt1"/>
+          </a:fontRef>
+        </p:style>
+        <p:txBody>
+          <a:bodyPr rtlCol="0" anchor="ctr"/>
+          <a:lstStyle/>
+          <a:p>
+            <a:pPr algn="ctr"/>
+            <a:endParaRPr lang="en-SG"/>
+          </a:p>
+        </p:txBody>
+      </p:sp>
+      <p:sp>
+        <p:nvSpPr>
+          <p:cNvPr id="5" name="Rectangle 4"/>
+          <p:cNvSpPr/>
+          <p:nvPr/>
+        </p:nvSpPr>
+        <p:spPr>
+          <a:xfrm>
+            <a:off x="611560" y="2348880"/>
+            <a:ext cx="7920880" cy="1224136"/>
+          </a:xfrm>
+          <a:prstGeom prst="rect">
+            <a:avLst/>
+          </a:prstGeom>
+          <a:noFill/>
+          <a:ln w="57150"/>
+        </p:spPr>
+        <p:style>
+          <a:lnRef idx="2">
+            <a:schemeClr val="accent2">
+              <a:shade val="50000"/>
+            </a:schemeClr>
+          </a:lnRef>
+          <a:fillRef idx="1">
+            <a:schemeClr val="accent2"/>
+          </a:fillRef>
+          <a:effectRef idx="0">
+            <a:schemeClr val="accent2"/>
+          </a:effectRef>
+          <a:fontRef idx="minor">
+            <a:schemeClr val="lt1"/>
+          </a:fontRef>
+        </p:style>
+        <p:txBody>
+          <a:bodyPr rtlCol="0" anchor="ctr"/>
+          <a:lstStyle/>
+          <a:p>
+            <a:pPr algn="ctr"/>
+            <a:endParaRPr lang="en-SG"/>
+          </a:p>
+        </p:txBody>
+      </p:sp>
+      <p:sp>
+        <p:nvSpPr>
+          <p:cNvPr id="6" name="Rectangle 5"/>
+          <p:cNvSpPr/>
+          <p:nvPr/>
+        </p:nvSpPr>
+        <p:spPr>
+          <a:xfrm>
+            <a:off x="611560" y="3933056"/>
+            <a:ext cx="7920880" cy="2376264"/>
+          </a:xfrm>
+          <a:prstGeom prst="rect">
+            <a:avLst/>
+          </a:prstGeom>
+          <a:noFill/>
+          <a:ln w="57150"/>
+        </p:spPr>
+        <p:style>
+          <a:lnRef idx="2">
+            <a:schemeClr val="accent4">
+              <a:shade val="50000"/>
+            </a:schemeClr>
+          </a:lnRef>
+          <a:fillRef idx="1">
+            <a:schemeClr val="accent4"/>
+          </a:fillRef>
+          <a:effectRef idx="0">
+            <a:schemeClr val="accent4"/>
+          </a:effectRef>
+          <a:fontRef idx="minor">
+            <a:schemeClr val="lt1"/>
+          </a:fontRef>
+        </p:style>
+        <p:txBody>
+          <a:bodyPr rtlCol="0" anchor="ctr"/>
+          <a:lstStyle/>
+          <a:p>
+            <a:pPr algn="ctr"/>
+            <a:endParaRPr lang="en-SG"/>
+          </a:p>
+        </p:txBody>
+      </p:sp>
+      <p:sp>
+        <p:nvSpPr>
+          <p:cNvPr id="8" name="Rectangle 7" hidden="1"/>
+          <p:cNvSpPr/>
+          <p:nvPr/>
+        </p:nvSpPr>
+        <p:spPr>
+          <a:xfrm>
+            <a:off x="6768752" y="850404"/>
+            <a:ext cx="1403648" cy="1052736"/>
+          </a:xfrm>
+          <a:prstGeom prst="rect">
+            <a:avLst/>
+          </a:prstGeom>
+          <a:ln/>
+        </p:spPr>
+        <p:style>
+          <a:lnRef idx="2">
+            <a:schemeClr val="accent1">
+              <a:shade val="50000"/>
+            </a:schemeClr>
+          </a:lnRef>
+          <a:fillRef idx="1">
+            <a:schemeClr val="accent1"/>
+          </a:fillRef>
+          <a:effectRef idx="0">
+            <a:schemeClr val="accent1"/>
+          </a:effectRef>
+          <a:fontRef idx="minor">
+            <a:schemeClr val="lt1"/>
+          </a:fontRef>
+        </p:style>
+        <p:txBody>
+          <a:bodyPr rtlCol="0" anchor="ctr"/>
+          <a:lstStyle/>
+          <a:p>
+            <a:pPr algn="ctr"/>
+            <a:endParaRPr lang="en-SG" sz="2800" dirty="0"/>
+          </a:p>
+        </p:txBody>
+      </p:sp>
+      <p:pic>
+        <p:nvPicPr>
+          <p:cNvPr id="1026" name="PPTZoomInShape201506181133246659"/>
+          <p:cNvPicPr>
+            <a:picLocks noChangeAspect="1" noChangeArrowheads="1"/>
+          </p:cNvPicPr>
+          <p:nvPr/>
+        </p:nvPicPr>
+        <p:blipFill>
+          <a:blip r:embed="rId2" cstate="print">
+            <a:extLst>
+              <a:ext uri="{28A0092B-C50C-407E-A947-70E740481C1C}">
+                <a14:useLocalDpi xmlns:a14="http://schemas.microsoft.com/office/drawing/2010/main" val="0"/>
+              </a:ext>
+            </a:extLst>
+          </a:blip>
+          <a:srcRect/>
+          <a:stretch>
+            <a:fillRect/>
+          </a:stretch>
+        </p:blipFill>
+        <p:spPr bwMode="auto">
+          <a:xfrm>
+            <a:off x="6768752" y="850404"/>
+            <a:ext cx="1403648" cy="1052736"/>
+          </a:xfrm>
+          <a:prstGeom prst="rect">
+            <a:avLst/>
+          </a:prstGeom>
+          <a:ln/>
+          <a:extLst>
+            <a:ext uri="{909E8E84-426E-40DD-AFC4-6F175D3DCCD1}">
+              <a14:hiddenFill xmlns:a14="http://schemas.microsoft.com/office/drawing/2010/main">
+                <a:solidFill>
+                  <a:schemeClr val="accent1"/>
+                </a:solidFill>
+              </a14:hiddenFill>
+            </a:ext>
+            <a:ext uri="{91240B29-F687-4F45-9708-019B960494DF}">
+              <a14:hiddenLine xmlns:a14="http://schemas.microsoft.com/office/drawing/2010/main" w="9525">
+                <a:solidFill>
+                  <a:schemeClr val="tx1"/>
+                </a:solidFill>
+                <a:miter lim="800000"/>
+                <a:headEnd/>
+                <a:tailEnd/>
+              </a14:hiddenLine>
+            </a:ext>
+            <a:ext uri="{AF507438-7753-43E0-B8FC-AC1667EBCBE1}">
+              <a14:hiddenEffects xmlns:a14="http://schemas.microsoft.com/office/drawing/2010/main">
+                <a:effectLst>
+                  <a:outerShdw dist="35921" dir="2700000" algn="ctr" rotWithShape="0">
+                    <a:schemeClr val="bg2"/>
+                  </a:outerShdw>
+                </a:effectLst>
+              </a14:hiddenEffects>
+            </a:ext>
+          </a:extLst>
+        </p:spPr>
+      </p:pic>
+    </p:spTree>
+    <p:extLst>
+      <p:ext uri="{BB962C8B-B14F-4D97-AF65-F5344CB8AC3E}">
+        <p14:creationId xmlns:p14="http://schemas.microsoft.com/office/powerpoint/2010/main" val="1443550203"/>
+      </p:ext>
+    </p:extLst>
+  </p:cSld>
+  <p:clrMapOvr>
+    <a:masterClrMapping/>
+  </p:clrMapOvr>
+  <mc:AlternateContent xmlns:mc="http://schemas.openxmlformats.org/markup-compatibility/2006" xmlns:p14="http://schemas.microsoft.com/office/powerpoint/2010/main">
+    <mc:Choice Requires="p14">
+      <p:transition spd="med" p14:dur="700">
+        <p:fade/>
+      </p:transition>
+    </mc:Choice>
+    <mc:Fallback xmlns="">
+      <p:transition spd="med">
+        <p:fade/>
+      </p:transition>
+    </mc:Fallback>
+  </mc:AlternateContent>
+  <p:timing>
+    <p:tnLst>
+      <p:par>
+        <p:cTn id="1" dur="indefinite" restart="never" nodeType="tmRoot">
+          <p:childTnLst>
+            <p:seq concurrent="1" nextAc="seek">
+              <p:cTn id="2" dur="indefinite" nodeType="mainSeq">
+                <p:childTnLst>
+                  <p:par>
+                    <p:cTn id="3" fill="hold">
+                      <p:stCondLst>
+                        <p:cond delay="indefinite"/>
+                      </p:stCondLst>
+                      <p:childTnLst>
+                        <p:par>
+                          <p:cTn id="4" fill="hold">
+                            <p:stCondLst>
+                              <p:cond delay="0"/>
+                            </p:stCondLst>
+                            <p:childTnLst>
+                              <p:par>
+                                <p:cTn id="5" presetID="10" presetClass="entr" presetSubtype="0" fill="hold" nodeType="clickEffect">
+                                  <p:stCondLst>
+                                    <p:cond delay="0"/>
+                                  </p:stCondLst>
+                                  <p:childTnLst>
+                                    <p:set>
+                                      <p:cBhvr>
+                                        <p:cTn id="6" dur="1" fill="hold">
+                                          <p:stCondLst>
+                                            <p:cond delay="0"/>
+                                          </p:stCondLst>
+                                        </p:cTn>
+                                        <p:tgtEl>
+                                          <p:spTgt spid="1026"/>
+                                        </p:tgtEl>
+                                        <p:attrNameLst>
+                                          <p:attrName>style.visibility</p:attrName>
+                                        </p:attrNameLst>
+                                      </p:cBhvr>
+                                      <p:to>
+                                        <p:strVal val="visible"/>
+                                      </p:to>
+                                    </p:set>
+                                    <p:animEffect transition="in" filter="fade">
+                                      <p:cBhvr>
+                                        <p:cTn id="7" dur="500"/>
+                                        <p:tgtEl>
+                                          <p:spTgt spid="1026"/>
+                                        </p:tgtEl>
+                                      </p:cBhvr>
+                                    </p:animEffect>
+                                  </p:childTnLst>
+                                </p:cTn>
+                              </p:par>
+                            </p:childTnLst>
+                          </p:cTn>
+                        </p:par>
+                      </p:childTnLst>
+                    </p:cTn>
+                  </p:par>
+                </p:childTnLst>
+              </p:cTn>
+              <p:prevCondLst>
+                <p:cond evt="onPrev" delay="0">
+                  <p:tgtEl>
+                    <p:sldTgt/>
+                  </p:tgtEl>
+                </p:cond>
+              </p:prevCondLst>
+              <p:nextCondLst>
+                <p:cond evt="onNext" delay="0">
+                  <p:tgtEl>
+                    <p:sldTgt/>
+                  </p:tgtEl>
+                </p:cond>
+              </p:nextCondLst>
+            </p:seq>
+          </p:childTnLst>
+        </p:cTn>
+      </p:par>
+    </p:tnLst>
+  </p:timing>
+</p:sld>
+</file>
+
+<file path=ppt/slides/slide7.xml><?xml version="1.0" encoding="utf-8"?>
+<p:sld xmlns:a="http://schemas.openxmlformats.org/drawingml/2006/main" xmlns:r="http://schemas.openxmlformats.org/officeDocument/2006/relationships" xmlns:p="http://schemas.openxmlformats.org/presentationml/2006/main">
+  <p:cSld name="PPTLabsZoomIn201506181133246815">
+    <p:bg>
+      <p:bgPr>
+        <a:solidFill>
+          <a:schemeClr val="bg1"/>
+        </a:solidFill>
+        <a:effectLst/>
+      </p:bgPr>
+    </p:bg>
     <p:spTree>
       <p:nvGrpSpPr>
         <p:cNvPr id="1" name=""/>
@@ -12287,38 +12068,194 @@
       </p:grpSpPr>
       <p:pic>
         <p:nvPicPr>
-          <p:cNvPr id="2" name="图片 1"/>
+          <p:cNvPr id="2050" name="PPTZoomInShape201506181133246971"/>
+          <p:cNvPicPr>
+            <a:picLocks noChangeArrowheads="1"/>
+          </p:cNvPicPr>
+          <p:nvPr/>
+        </p:nvPicPr>
+        <p:blipFill>
+          <a:blip r:embed="rId2">
+            <a:extLst>
+              <a:ext uri="{28A0092B-C50C-407E-A947-70E740481C1C}">
+                <a14:useLocalDpi xmlns:a14="http://schemas.microsoft.com/office/drawing/2010/main" val="0"/>
+              </a:ext>
+            </a:extLst>
+          </a:blip>
+          <a:srcRect/>
+          <a:stretch>
+            <a:fillRect/>
+          </a:stretch>
+        </p:blipFill>
+        <p:spPr bwMode="auto">
+          <a:xfrm>
+            <a:off x="0" y="0"/>
+            <a:ext cx="9144000" cy="6858000"/>
+          </a:xfrm>
+          <a:prstGeom prst="rect">
+            <a:avLst/>
+          </a:prstGeom>
+          <a:ln/>
+          <a:extLst>
+            <a:ext uri="{909E8E84-426E-40DD-AFC4-6F175D3DCCD1}">
+              <a14:hiddenFill xmlns:a14="http://schemas.microsoft.com/office/drawing/2010/main">
+                <a:solidFill>
+                  <a:schemeClr val="accent1"/>
+                </a:solidFill>
+              </a14:hiddenFill>
+            </a:ext>
+            <a:ext uri="{91240B29-F687-4F45-9708-019B960494DF}">
+              <a14:hiddenLine xmlns:a14="http://schemas.microsoft.com/office/drawing/2010/main" w="9525">
+                <a:solidFill>
+                  <a:schemeClr val="tx1"/>
+                </a:solidFill>
+                <a:miter lim="800000"/>
+                <a:headEnd/>
+                <a:tailEnd/>
+              </a14:hiddenLine>
+            </a:ext>
+            <a:ext uri="{AF507438-7753-43E0-B8FC-AC1667EBCBE1}">
+              <a14:hiddenEffects xmlns:a14="http://schemas.microsoft.com/office/drawing/2010/main">
+                <a:effectLst>
+                  <a:outerShdw dist="35921" dir="2700000" algn="ctr" rotWithShape="0">
+                    <a:schemeClr val="bg2"/>
+                  </a:outerShdw>
+                </a:effectLst>
+              </a14:hiddenEffects>
+            </a:ext>
+          </a:extLst>
+        </p:spPr>
+      </p:pic>
+      <p:pic>
+        <p:nvPicPr>
+          <p:cNvPr id="7" name="PPTZoomInShape201506181133246659"/>
+          <p:cNvPicPr>
+            <a:picLocks noChangeArrowheads="1"/>
+          </p:cNvPicPr>
+          <p:nvPr/>
+        </p:nvPicPr>
+        <p:blipFill>
+          <a:blip r:embed="rId3">
+            <a:extLst>
+              <a:ext uri="{28A0092B-C50C-407E-A947-70E740481C1C}">
+                <a14:useLocalDpi xmlns:a14="http://schemas.microsoft.com/office/drawing/2010/main" val="0"/>
+              </a:ext>
+            </a:extLst>
+          </a:blip>
+          <a:srcRect/>
+          <a:stretch>
+            <a:fillRect/>
+          </a:stretch>
+        </p:blipFill>
+        <p:spPr bwMode="auto">
+          <a:xfrm>
+            <a:off x="0" y="0"/>
+            <a:ext cx="9144000" cy="6858000"/>
+          </a:xfrm>
+          <a:prstGeom prst="rect">
+            <a:avLst/>
+          </a:prstGeom>
+          <a:ln/>
+          <a:extLst>
+            <a:ext uri="{909E8E84-426E-40DD-AFC4-6F175D3DCCD1}">
+              <a14:hiddenFill xmlns:a14="http://schemas.microsoft.com/office/drawing/2010/main">
+                <a:solidFill>
+                  <a:schemeClr val="accent1"/>
+                </a:solidFill>
+              </a14:hiddenFill>
+            </a:ext>
+            <a:ext uri="{91240B29-F687-4F45-9708-019B960494DF}">
+              <a14:hiddenLine xmlns:a14="http://schemas.microsoft.com/office/drawing/2010/main" w="9525">
+                <a:solidFill>
+                  <a:schemeClr val="tx1"/>
+                </a:solidFill>
+                <a:miter lim="800000"/>
+                <a:headEnd/>
+                <a:tailEnd/>
+              </a14:hiddenLine>
+            </a:ext>
+            <a:ext uri="{AF507438-7753-43E0-B8FC-AC1667EBCBE1}">
+              <a14:hiddenEffects xmlns:a14="http://schemas.microsoft.com/office/drawing/2010/main">
+                <a:effectLst>
+                  <a:outerShdw dist="35921" dir="2700000" algn="ctr" rotWithShape="0">
+                    <a:schemeClr val="bg2"/>
+                  </a:outerShdw>
+                </a:effectLst>
+              </a14:hiddenEffects>
+            </a:ext>
+          </a:extLst>
+        </p:spPr>
+      </p:pic>
+      <p:pic>
+        <p:nvPicPr>
+          <p:cNvPr id="10" name="PPTZoomInShape201506181133246971"/>
+          <p:cNvPicPr>
+            <a:picLocks noChangeArrowheads="1"/>
+          </p:cNvPicPr>
+          <p:nvPr/>
+        </p:nvPicPr>
+        <p:blipFill>
+          <a:blip r:embed="rId2">
+            <a:extLst>
+              <a:ext uri="{28A0092B-C50C-407E-A947-70E740481C1C}">
+                <a14:useLocalDpi xmlns:a14="http://schemas.microsoft.com/office/drawing/2010/main" val="0"/>
+              </a:ext>
+            </a:extLst>
+          </a:blip>
+          <a:srcRect/>
+          <a:stretch>
+            <a:fillRect/>
+          </a:stretch>
+        </p:blipFill>
+        <p:spPr bwMode="auto">
+          <a:xfrm>
+            <a:off x="0" y="0"/>
+            <a:ext cx="9144000" cy="6858000"/>
+          </a:xfrm>
+          <a:prstGeom prst="rect">
+            <a:avLst/>
+          </a:prstGeom>
+          <a:ln/>
+          <a:extLst>
+            <a:ext uri="{909E8E84-426E-40DD-AFC4-6F175D3DCCD1}">
+              <a14:hiddenFill xmlns:a14="http://schemas.microsoft.com/office/drawing/2010/main">
+                <a:solidFill>
+                  <a:schemeClr val="accent1"/>
+                </a:solidFill>
+              </a14:hiddenFill>
+            </a:ext>
+            <a:ext uri="{91240B29-F687-4F45-9708-019B960494DF}">
+              <a14:hiddenLine xmlns:a14="http://schemas.microsoft.com/office/drawing/2010/main" w="9525">
+                <a:solidFill>
+                  <a:schemeClr val="tx1"/>
+                </a:solidFill>
+                <a:miter lim="800000"/>
+                <a:headEnd/>
+                <a:tailEnd/>
+              </a14:hiddenLine>
+            </a:ext>
+            <a:ext uri="{AF507438-7753-43E0-B8FC-AC1667EBCBE1}">
+              <a14:hiddenEffects xmlns:a14="http://schemas.microsoft.com/office/drawing/2010/main">
+                <a:effectLst>
+                  <a:outerShdw dist="35921" dir="2700000" algn="ctr" rotWithShape="0">
+                    <a:schemeClr val="bg2"/>
+                  </a:outerShdw>
+                </a:effectLst>
+              </a14:hiddenEffects>
+            </a:ext>
+          </a:extLst>
+        </p:spPr>
+      </p:pic>
+      <p:pic>
+        <p:nvPicPr>
+          <p:cNvPr id="2" name="PPTIndicator201506181133247283"/>
           <p:cNvPicPr>
             <a:picLocks/>
           </p:cNvPicPr>
           <p:nvPr/>
         </p:nvPicPr>
         <p:blipFill>
-          <a:blip r:embed="rId2"/>
-          <a:stretch>
-            <a:fillRect/>
-          </a:stretch>
-        </p:blipFill>
-        <p:spPr>
-          <a:xfrm>
-            <a:off x="0" y="-1"/>
-            <a:ext cx="9144000" cy="6858000"/>
-          </a:xfrm>
-          <a:prstGeom prst="rect">
-            <a:avLst/>
-          </a:prstGeom>
-        </p:spPr>
-      </p:pic>
-      <p:pic>
-        <p:nvPicPr>
-          <p:cNvPr id="3" name="PPIndicator201403260332134977"/>
-          <p:cNvPicPr>
-            <a:picLocks/>
-          </p:cNvPicPr>
-          <p:nvPr/>
-        </p:nvPicPr>
-        <p:blipFill>
-          <a:blip r:embed="rId3" cstate="print">
+          <a:blip r:embed="rId4" cstate="print">
             <a:extLst>
               <a:ext uri="{28A0092B-C50C-407E-A947-70E740481C1C}">
                 <a14:useLocalDpi xmlns:a14="http://schemas.microsoft.com/office/drawing/2010/main" val="0"/>
@@ -12339,60 +12276,22 @@
           </a:prstGeom>
         </p:spPr>
       </p:pic>
-      <p:sp>
-        <p:nvSpPr>
-          <p:cNvPr id="4" name="text 3"/>
-          <p:cNvSpPr txBox="1"/>
-          <p:nvPr/>
-        </p:nvSpPr>
-        <p:spPr>
-          <a:xfrm>
-            <a:off x="228600" y="48280"/>
-            <a:ext cx="2693814" cy="523220"/>
-          </a:xfrm>
-          <a:prstGeom prst="rect">
-            <a:avLst/>
-          </a:prstGeom>
-          <a:noFill/>
-        </p:spPr>
-        <p:txBody>
-          <a:bodyPr wrap="none" rtlCol="0">
-            <a:spAutoFit/>
-          </a:bodyPr>
-          <a:lstStyle/>
-          <a:p>
-            <a:r>
-              <a:rPr lang="en-US" sz="2800" b="1" dirty="0" smtClean="0">
-                <a:solidFill>
-                  <a:schemeClr val="accent1"/>
-                </a:solidFill>
-              </a:rPr>
-              <a:t>Expected Output</a:t>
-            </a:r>
-            <a:endParaRPr lang="en-SG" sz="2800" b="1" dirty="0">
-              <a:solidFill>
-                <a:schemeClr val="accent1"/>
-              </a:solidFill>
-            </a:endParaRPr>
-          </a:p>
-        </p:txBody>
-      </p:sp>
     </p:spTree>
     <p:extLst>
       <p:ext uri="{BB962C8B-B14F-4D97-AF65-F5344CB8AC3E}">
-        <p14:creationId xmlns:p14="http://schemas.microsoft.com/office/powerpoint/2010/main" val="4186711368"/>
+        <p14:creationId xmlns:p14="http://schemas.microsoft.com/office/powerpoint/2010/main" val="3881091942"/>
       </p:ext>
     </p:extLst>
   </p:cSld>
   <p:clrMapOvr>
     <a:masterClrMapping/>
   </p:clrMapOvr>
-  <mc:AlternateContent xmlns:mc="http://schemas.openxmlformats.org/markup-compatibility/2006">
-    <mc:Choice xmlns:p14="http://schemas.microsoft.com/office/powerpoint/2010/main" Requires="p14">
-      <p:transition spd="slow" p14:dur="2000" advClick="0" advTm="0"/>
+  <mc:AlternateContent xmlns:mc="http://schemas.openxmlformats.org/markup-compatibility/2006" xmlns:p14="http://schemas.microsoft.com/office/powerpoint/2010/main">
+    <mc:Choice Requires="p14">
+      <p:transition spd="med" p14:dur="700" advClick="0" advTm="0"/>
     </mc:Choice>
-    <mc:Fallback>
-      <p:transition spd="slow" advClick="0" advTm="0"/>
+    <mc:Fallback xmlns="">
+      <p:transition spd="med" advClick="0" advTm="0"/>
     </mc:Fallback>
   </mc:AlternateContent>
   <p:timing>
@@ -12419,20 +12318,55 @@
                             </p:stCondLst>
                             <p:childTnLst>
                               <p:par>
-                                <p:cTn id="5" presetID="1" presetClass="entr" presetSubtype="0" fill="hold" nodeType="withEffect">
+                                <p:cTn id="5" presetID="10" presetClass="exit" presetSubtype="0" fill="hold" nodeType="withEffect">
+                                  <p:stCondLst>
+                                    <p:cond delay="0"/>
+                                  </p:stCondLst>
+                                  <p:childTnLst>
+                                    <p:animEffect transition="out" filter="fade">
+                                      <p:cBhvr>
+                                        <p:cTn id="6" dur="10"/>
+                                        <p:tgtEl>
+                                          <p:spTgt spid="10"/>
+                                        </p:tgtEl>
+                                      </p:cBhvr>
+                                    </p:animEffect>
+                                    <p:set>
+                                      <p:cBhvr>
+                                        <p:cTn id="7" dur="1" fill="hold">
+                                          <p:stCondLst>
+                                            <p:cond delay="9"/>
+                                          </p:stCondLst>
+                                        </p:cTn>
+                                        <p:tgtEl>
+                                          <p:spTgt spid="10"/>
+                                        </p:tgtEl>
+                                        <p:attrNameLst>
+                                          <p:attrName>style.visibility</p:attrName>
+                                        </p:attrNameLst>
+                                      </p:cBhvr>
+                                      <p:to>
+                                        <p:strVal val="hidden"/>
+                                      </p:to>
+                                    </p:set>
+                                  </p:childTnLst>
+                                </p:cTn>
+                              </p:par>
+                              <p:par>
+                                <p:cTn id="8" presetID="1" presetClass="entr" presetSubtype="0" fill="hold" nodeType="withEffect">
                                   <p:stCondLst>
                                     <p:cond delay="0"/>
                                   </p:stCondLst>
                                   <p:childTnLst>
                                     <p:set>
                                       <p:cBhvr>
-                                        <p:cTn id="6" dur="1" fill="hold">
+                                        <p:cTn id="9" dur="1" fill="hold">
                                           <p:stCondLst>
                                             <p:cond delay="0"/>
                                           </p:stCondLst>
                                         </p:cTn>
                                         <p:tgtEl>
-                                          <p:spTgt spid="3"/>
+                                          <p:spTgt spid="2"/>
                                         </p:tgtEl>
                                         <p:attrNameLst>
                                           <p:attrName>style.visibility</p:attrName>
@@ -12446,20 +12380,20 @@
                                 </p:cTn>
                               </p:par>
                               <p:par>
-                                <p:cTn id="7" presetID="1" presetClass="exit" presetSubtype="0" fill="hold" nodeType="withEffect">
+                                <p:cTn id="10" presetID="1" presetClass="exit" presetSubtype="0" fill="hold" nodeType="withEffect">
                                   <p:stCondLst>
                                     <p:cond delay="0"/>
                                   </p:stCondLst>
                                   <p:childTnLst>
                                     <p:set>
                                       <p:cBhvr>
-                                        <p:cTn id="8" dur="1" fill="hold">
+                                        <p:cTn id="11" dur="1" fill="hold">
                                           <p:stCondLst>
                                             <p:cond delay="0"/>
                                           </p:stCondLst>
                                         </p:cTn>
                                         <p:tgtEl>
-                                          <p:spTgt spid="3"/>
+                                          <p:spTgt spid="2"/>
                                         </p:tgtEl>
                                         <p:attrNameLst>
                                           <p:attrName>style.visibility</p:attrName>
@@ -12473,16 +12407,16 @@
                                 </p:cTn>
                               </p:par>
                               <p:par>
-                                <p:cTn id="9" presetID="42" presetClass="path" presetSubtype="0" fill="hold" nodeType="withEffect">
+                                <p:cTn id="12" presetID="42" presetClass="path" presetSubtype="0" fill="hold" nodeType="withEffect">
                                   <p:stCondLst>
                                     <p:cond delay="0"/>
                                   </p:stCondLst>
                                   <p:childTnLst>
-                                    <p:animMotion origin="layout" path="M 0 0 C -1.032515 0.9747115 -1.032515 0.9747115 -2.065031 1.949423 E" pathEditMode="relative" ptsTypes="">
+                                    <p:animMotion origin="layout" path="M 0 0 C -1.032515 0.9747115 -1.032515 0.9747115 -2.06503 1.949423 E" pathEditMode="relative" ptsTypes="">
                                       <p:cBhvr>
-                                        <p:cTn id="10" dur="500" fill="hold"/>
+                                        <p:cTn id="13" dur="500" fill="hold"/>
                                         <p:tgtEl>
-                                          <p:spTgt spid="2"/>
+                                          <p:spTgt spid="2050"/>
                                         </p:tgtEl>
                                         <p:attrNameLst>
                                           <p:attrName>ppt_x</p:attrName>
@@ -12494,16 +12428,94 @@
                                 </p:cTn>
                               </p:par>
                               <p:par>
-                                <p:cTn id="11" presetID="6" presetClass="emph" presetSubtype="0" fill="hold" nodeType="withEffect">
+                                <p:cTn id="14" presetID="6" presetClass="emph" presetSubtype="0" fill="hold" nodeType="withEffect">
                                   <p:stCondLst>
                                     <p:cond delay="0"/>
                                   </p:stCondLst>
                                   <p:childTnLst>
                                     <p:animScale>
                                       <p:cBhvr>
-                                        <p:cTn id="12" dur="500" fill="hold"/>
+                                        <p:cTn id="15" dur="500" fill="hold"/>
                                         <p:tgtEl>
-                                          <p:spTgt spid="2"/>
+                                          <p:spTgt spid="2050"/>
+                                        </p:tgtEl>
+                                      </p:cBhvr>
+                                      <p:by x="651445" y="651445"/>
+                                    </p:animScale>
+                                  </p:childTnLst>
+                                </p:cTn>
+                              </p:par>
+                              <p:par>
+                                <p:cTn id="16" presetID="42" presetClass="path" presetSubtype="0" fill="hold" nodeType="withEffect">
+                                  <p:stCondLst>
+                                    <p:cond delay="0"/>
+                                  </p:stCondLst>
+                                  <p:childTnLst>
+                                    <p:animMotion origin="layout" path="M 0 0 C 0.1584961 -0.1496229 0.1584961 -0.1496229 0.3169921 -0.2992458 E" pathEditMode="relative" ptsTypes="">
+                                      <p:cBhvr>
+                                        <p:cTn id="17" dur="1" fill="hold"/>
+                                        <p:tgtEl>
+                                          <p:spTgt spid="7"/>
+                                        </p:tgtEl>
+                                        <p:attrNameLst>
+                                          <p:attrName>ppt_x</p:attrName>
+                                          <p:attrName>ppt_y</p:attrName>
+                                        </p:attrNameLst>
+                                      </p:cBhvr>
+                                    </p:animMotion>
+                                  </p:childTnLst>
+                                </p:cTn>
+                              </p:par>
+                              <p:par>
+                                <p:cTn id="18" presetID="6" presetClass="emph" presetSubtype="0" fill="hold" nodeType="withEffect">
+                                  <p:stCondLst>
+                                    <p:cond delay="0"/>
+                                  </p:stCondLst>
+                                  <p:childTnLst>
+                                    <p:animScale>
+                                      <p:cBhvr>
+                                        <p:cTn id="19" dur="1" fill="hold"/>
+                                        <p:tgtEl>
+                                          <p:spTgt spid="7"/>
+                                        </p:tgtEl>
+                                      </p:cBhvr>
+                                      <p:by x="15350" y="15350"/>
+                                    </p:animScale>
+                                  </p:childTnLst>
+                                </p:cTn>
+                              </p:par>
+                              <p:par>
+                                <p:cTn id="20" presetID="42" presetClass="path" presetSubtype="0" fill="hold" nodeType="withEffect">
+                                  <p:stCondLst>
+                                    <p:cond delay="0"/>
+                                  </p:stCondLst>
+                                  <p:childTnLst>
+                                    <p:animMotion origin="layout" path="M 0.3169921 -0.2992458 C 0.158496 -0.1496229 0.158496 -0.1496229 2.980232E-08 -2.980232E-08 E" pathEditMode="relative" ptsTypes="">
+                                      <p:cBhvr>
+                                        <p:cTn id="21" dur="500" fill="hold"/>
+                                        <p:tgtEl>
+                                          <p:spTgt spid="7"/>
+                                        </p:tgtEl>
+                                        <p:attrNameLst>
+                                          <p:attrName>ppt_x</p:attrName>
+                                          <p:attrName>ppt_y</p:attrName>
+                                        </p:attrNameLst>
+                                      </p:cBhvr>
+                                    </p:animMotion>
+                                  </p:childTnLst>
+                                </p:cTn>
+                              </p:par>
+                              <p:par>
+                                <p:cTn id="22" presetID="6" presetClass="emph" presetSubtype="0" fill="hold" nodeType="withEffect">
+                                  <p:stCondLst>
+                                    <p:cond delay="0"/>
+                                  </p:stCondLst>
+                                  <p:childTnLst>
+                                    <p:animScale>
+                                      <p:cBhvr>
+                                        <p:cTn id="23" dur="500" fill="hold"/>
+                                        <p:tgtEl>
+                                          <p:spTgt spid="7"/>
                                         </p:tgtEl>
                                       </p:cBhvr>
                                       <p:by x="651445" y="651445"/>
@@ -12542,7 +12554,7 @@
 </p:sld>
 </file>
 
-<file path=ppt/slides/slide7.xml><?xml version="1.0" encoding="utf-8"?>
+<file path=ppt/slides/slide8.xml><?xml version="1.0" encoding="utf-8"?>
 <p:sld xmlns:a="http://schemas.openxmlformats.org/drawingml/2006/main" xmlns:r="http://schemas.openxmlformats.org/officeDocument/2006/relationships" xmlns:p="http://schemas.openxmlformats.org/presentationml/2006/main">
   <p:cSld>
     <p:bg>
@@ -12769,12 +12781,16 @@
   <p:clrMapOvr>
     <a:masterClrMapping/>
   </p:clrMapOvr>
-  <mc:AlternateContent xmlns:mc="http://schemas.openxmlformats.org/markup-compatibility/2006">
-    <mc:Choice xmlns:p14="http://schemas.microsoft.com/office/powerpoint/2010/main" Requires="p14">
-      <p:transition p14:dur="0"/>
+  <mc:AlternateContent xmlns:mc="http://schemas.openxmlformats.org/markup-compatibility/2006" xmlns:p14="http://schemas.microsoft.com/office/powerpoint/2010/main">
+    <mc:Choice Requires="p14">
+      <p:transition p14:dur="250">
+        <p:fade/>
+      </p:transition>
     </mc:Choice>
-    <mc:Fallback>
-      <p:transition/>
+    <mc:Fallback xmlns="">
+      <p:transition>
+        <p:fade/>
+      </p:transition>
     </mc:Fallback>
   </mc:AlternateContent>
   <p:timing>
@@ -12787,7 +12803,7 @@
 </p:sld>
 </file>
 
-<file path=ppt/slides/slide8.xml><?xml version="1.0" encoding="utf-8"?>
+<file path=ppt/slides/slide9.xml><?xml version="1.0" encoding="utf-8"?>
 <p:sld xmlns:a="http://schemas.openxmlformats.org/drawingml/2006/main" xmlns:r="http://schemas.openxmlformats.org/officeDocument/2006/relationships" xmlns:p="http://schemas.openxmlformats.org/presentationml/2006/main">
   <p:cSld>
     <p:spTree>
@@ -12856,217 +12872,6 @@
   <p:clrMapOvr>
     <a:masterClrMapping/>
   </p:clrMapOvr>
-  <p:timing>
-    <p:tnLst>
-      <p:par>
-        <p:cTn id="1" dur="indefinite" restart="never" nodeType="tmRoot"/>
-      </p:par>
-    </p:tnLst>
-  </p:timing>
-</p:sld>
-</file>
-
-<file path=ppt/slides/slide9.xml><?xml version="1.0" encoding="utf-8"?>
-<p:sld xmlns:a="http://schemas.openxmlformats.org/drawingml/2006/main" xmlns:r="http://schemas.openxmlformats.org/officeDocument/2006/relationships" xmlns:p="http://schemas.openxmlformats.org/presentationml/2006/main">
-  <p:cSld>
-    <p:bg>
-      <p:bgPr>
-        <a:solidFill>
-          <a:schemeClr val="bg1"/>
-        </a:solidFill>
-        <a:effectLst/>
-      </p:bgPr>
-    </p:bg>
-    <p:spTree>
-      <p:nvGrpSpPr>
-        <p:cNvPr id="1" name=""/>
-        <p:cNvGrpSpPr/>
-        <p:nvPr/>
-      </p:nvGrpSpPr>
-      <p:grpSpPr>
-        <a:xfrm>
-          <a:off x="0" y="0"/>
-          <a:ext cx="0" cy="0"/>
-          <a:chOff x="0" y="0"/>
-          <a:chExt cx="0" cy="0"/>
-        </a:xfrm>
-      </p:grpSpPr>
-      <p:sp>
-        <p:nvSpPr>
-          <p:cNvPr id="2" name="Rectangle 1"/>
-          <p:cNvSpPr/>
-          <p:nvPr/>
-        </p:nvSpPr>
-        <p:spPr>
-          <a:xfrm>
-            <a:off x="755576" y="836712"/>
-            <a:ext cx="3240360" cy="1944216"/>
-          </a:xfrm>
-          <a:prstGeom prst="rect">
-            <a:avLst/>
-          </a:prstGeom>
-          <a:solidFill>
-            <a:schemeClr val="bg2"/>
-          </a:solidFill>
-          <a:ln>
-            <a:noFill/>
-          </a:ln>
-        </p:spPr>
-        <p:style>
-          <a:lnRef idx="2">
-            <a:schemeClr val="accent1">
-              <a:shade val="50000"/>
-            </a:schemeClr>
-          </a:lnRef>
-          <a:fillRef idx="1">
-            <a:schemeClr val="accent1"/>
-          </a:fillRef>
-          <a:effectRef idx="0">
-            <a:schemeClr val="accent1"/>
-          </a:effectRef>
-          <a:fontRef idx="minor">
-            <a:schemeClr val="lt1"/>
-          </a:fontRef>
-        </p:style>
-        <p:txBody>
-          <a:bodyPr rtlCol="0" anchor="ctr"/>
-          <a:lstStyle/>
-          <a:p>
-            <a:pPr algn="ctr"/>
-            <a:endParaRPr lang="en-SG"/>
-          </a:p>
-        </p:txBody>
-      </p:sp>
-      <p:sp>
-        <p:nvSpPr>
-          <p:cNvPr id="3" name="TextBox 2"/>
-          <p:cNvSpPr txBox="1"/>
-          <p:nvPr/>
-        </p:nvSpPr>
-        <p:spPr>
-          <a:xfrm>
-            <a:off x="899592" y="3356992"/>
-            <a:ext cx="3096344" cy="1754326"/>
-          </a:xfrm>
-          <a:prstGeom prst="rect">
-            <a:avLst/>
-          </a:prstGeom>
-          <a:noFill/>
-        </p:spPr>
-        <p:txBody>
-          <a:bodyPr wrap="square" rtlCol="0">
-            <a:spAutoFit/>
-          </a:bodyPr>
-          <a:lstStyle/>
-          <a:p>
-            <a:pPr marL="571500" indent="-571500">
-              <a:buFont typeface="Arial" panose="020B0604020202020204" pitchFamily="34" charset="0"/>
-              <a:buChar char="•"/>
-            </a:pPr>
-            <a:r>
-              <a:rPr lang="en-US" sz="3600" dirty="0" smtClean="0"/>
-              <a:t>Blah </a:t>
-            </a:r>
-            <a:r>
-              <a:rPr lang="en-US" sz="3600" dirty="0" err="1" smtClean="0"/>
-              <a:t>blah</a:t>
-            </a:r>
-            <a:endParaRPr lang="en-US" sz="3600" dirty="0" smtClean="0"/>
-          </a:p>
-          <a:p>
-            <a:pPr marL="571500" indent="-571500">
-              <a:buFont typeface="Arial" panose="020B0604020202020204" pitchFamily="34" charset="0"/>
-              <a:buChar char="•"/>
-            </a:pPr>
-            <a:r>
-              <a:rPr lang="en-US" sz="3600" dirty="0" smtClean="0"/>
-              <a:t>Blah </a:t>
-            </a:r>
-            <a:r>
-              <a:rPr lang="en-US" sz="3600" dirty="0" err="1" smtClean="0"/>
-              <a:t>blah</a:t>
-            </a:r>
-            <a:endParaRPr lang="en-US" sz="3600" dirty="0" smtClean="0"/>
-          </a:p>
-          <a:p>
-            <a:pPr marL="571500" indent="-571500">
-              <a:buFont typeface="Arial" panose="020B0604020202020204" pitchFamily="34" charset="0"/>
-              <a:buChar char="•"/>
-            </a:pPr>
-            <a:r>
-              <a:rPr lang="en-US" sz="3600" dirty="0" smtClean="0"/>
-              <a:t>Blah </a:t>
-            </a:r>
-            <a:r>
-              <a:rPr lang="en-US" sz="3600" dirty="0" err="1" smtClean="0"/>
-              <a:t>blah</a:t>
-            </a:r>
-            <a:endParaRPr lang="en-SG" sz="3600" dirty="0"/>
-          </a:p>
-        </p:txBody>
-      </p:sp>
-      <p:sp>
-        <p:nvSpPr>
-          <p:cNvPr id="4" name="Rectangle 3"/>
-          <p:cNvSpPr/>
-          <p:nvPr/>
-        </p:nvSpPr>
-        <p:spPr>
-          <a:xfrm>
-            <a:off x="4788024" y="836712"/>
-            <a:ext cx="3600400" cy="4392488"/>
-          </a:xfrm>
-          <a:prstGeom prst="rect">
-            <a:avLst/>
-          </a:prstGeom>
-        </p:spPr>
-        <p:style>
-          <a:lnRef idx="2">
-            <a:schemeClr val="accent3">
-              <a:shade val="50000"/>
-            </a:schemeClr>
-          </a:lnRef>
-          <a:fillRef idx="1">
-            <a:schemeClr val="accent3"/>
-          </a:fillRef>
-          <a:effectRef idx="0">
-            <a:schemeClr val="accent3"/>
-          </a:effectRef>
-          <a:fontRef idx="minor">
-            <a:schemeClr val="lt1"/>
-          </a:fontRef>
-        </p:style>
-        <p:txBody>
-          <a:bodyPr rtlCol="0" anchor="ctr"/>
-          <a:lstStyle/>
-          <a:p>
-            <a:pPr algn="ctr"/>
-            <a:endParaRPr lang="en-SG"/>
-          </a:p>
-        </p:txBody>
-      </p:sp>
-    </p:spTree>
-    <p:extLst>
-      <p:ext uri="{BB962C8B-B14F-4D97-AF65-F5344CB8AC3E}">
-        <p14:creationId xmlns:p14="http://schemas.microsoft.com/office/powerpoint/2010/main" val="3818889738"/>
-      </p:ext>
-    </p:extLst>
-  </p:cSld>
-  <p:clrMapOvr>
-    <a:masterClrMapping/>
-  </p:clrMapOvr>
-  <mc:AlternateContent xmlns:mc="http://schemas.openxmlformats.org/markup-compatibility/2006">
-    <mc:Choice xmlns:p14="http://schemas.microsoft.com/office/powerpoint/2010/main" Requires="p14">
-      <p:transition spd="med" p14:dur="700">
-        <p:fade/>
-      </p:transition>
-    </mc:Choice>
-    <mc:Fallback>
-      <p:transition spd="med">
-        <p:fade/>
-      </p:transition>
-    </mc:Fallback>
-  </mc:AlternateContent>
   <p:timing>
     <p:tnLst>
       <p:par>

</xml_diff>

<commit_message>
Add negative tests for AutoZoom
</commit_message>
<xml_diff>
--- a/doc/test/AutoZoom.pptx
+++ b/doc/test/AutoZoom.pptx
@@ -21,7 +21,9 @@
     <p:sldId id="313" r:id="rId15"/>
     <p:sldId id="315" r:id="rId16"/>
     <p:sldId id="314" r:id="rId17"/>
-    <p:sldId id="312" r:id="rId18"/>
+    <p:sldId id="316" r:id="rId18"/>
+    <p:sldId id="317" r:id="rId19"/>
+    <p:sldId id="312" r:id="rId20"/>
   </p:sldIdLst>
   <p:sldSz cx="9144000" cy="6858000" type="screen4x3"/>
   <p:notesSz cx="6858000" cy="9144000"/>
@@ -143,13 +145,15 @@
             <p14:sldId id="313"/>
             <p14:sldId id="315"/>
             <p14:sldId id="314"/>
+            <p14:sldId id="316"/>
+            <p14:sldId id="317"/>
             <p14:sldId id="312"/>
           </p14:sldIdLst>
         </p14:section>
       </p14:sectionLst>
     </p:ext>
     <p:ext uri="{EFAFB233-063F-42B5-8137-9DF3F51BA10A}">
-      <p15:sldGuideLst xmlns="" xmlns:p15="http://schemas.microsoft.com/office/powerpoint/2012/main">
+      <p15:sldGuideLst xmlns:p15="http://schemas.microsoft.com/office/powerpoint/2012/main" xmlns="">
         <p15:guide id="1" orient="horz" pos="2160">
           <p15:clr>
             <a:srgbClr val="A4A3A4"/>
@@ -347,7 +351,7 @@
           <a:p>
             <a:fld id="{699DC775-C286-4358-8C92-D7E584E969B3}" type="datetimeFigureOut">
               <a:rPr lang="en-US" smtClean="0"/>
-              <a:t>18-Jun-15</a:t>
+              <a:t>25-Jun-15</a:t>
             </a:fld>
             <a:endParaRPr lang="en-US"/>
           </a:p>
@@ -517,7 +521,7 @@
           <a:p>
             <a:fld id="{699DC775-C286-4358-8C92-D7E584E969B3}" type="datetimeFigureOut">
               <a:rPr lang="en-US" smtClean="0"/>
-              <a:t>18-Jun-15</a:t>
+              <a:t>25-Jun-15</a:t>
             </a:fld>
             <a:endParaRPr lang="en-US"/>
           </a:p>
@@ -697,7 +701,7 @@
           <a:p>
             <a:fld id="{699DC775-C286-4358-8C92-D7E584E969B3}" type="datetimeFigureOut">
               <a:rPr lang="en-US" smtClean="0"/>
-              <a:t>18-Jun-15</a:t>
+              <a:t>25-Jun-15</a:t>
             </a:fld>
             <a:endParaRPr lang="en-US"/>
           </a:p>
@@ -939,7 +943,7 @@
           <a:p>
             <a:fld id="{699DC775-C286-4358-8C92-D7E584E969B3}" type="datetimeFigureOut">
               <a:rPr lang="en-US" smtClean="0"/>
-              <a:t>18-Jun-15</a:t>
+              <a:t>25-Jun-15</a:t>
             </a:fld>
             <a:endParaRPr lang="en-US"/>
           </a:p>
@@ -1109,7 +1113,7 @@
           <a:p>
             <a:fld id="{699DC775-C286-4358-8C92-D7E584E969B3}" type="datetimeFigureOut">
               <a:rPr lang="en-US" smtClean="0"/>
-              <a:t>18-Jun-15</a:t>
+              <a:t>25-Jun-15</a:t>
             </a:fld>
             <a:endParaRPr lang="en-US"/>
           </a:p>
@@ -1355,7 +1359,7 @@
           <a:p>
             <a:fld id="{699DC775-C286-4358-8C92-D7E584E969B3}" type="datetimeFigureOut">
               <a:rPr lang="en-US" smtClean="0"/>
-              <a:t>18-Jun-15</a:t>
+              <a:t>25-Jun-15</a:t>
             </a:fld>
             <a:endParaRPr lang="en-US"/>
           </a:p>
@@ -1643,7 +1647,7 @@
           <a:p>
             <a:fld id="{699DC775-C286-4358-8C92-D7E584E969B3}" type="datetimeFigureOut">
               <a:rPr lang="en-US" smtClean="0"/>
-              <a:t>18-Jun-15</a:t>
+              <a:t>25-Jun-15</a:t>
             </a:fld>
             <a:endParaRPr lang="en-US"/>
           </a:p>
@@ -2065,7 +2069,7 @@
           <a:p>
             <a:fld id="{699DC775-C286-4358-8C92-D7E584E969B3}" type="datetimeFigureOut">
               <a:rPr lang="en-US" smtClean="0"/>
-              <a:t>18-Jun-15</a:t>
+              <a:t>25-Jun-15</a:t>
             </a:fld>
             <a:endParaRPr lang="en-US"/>
           </a:p>
@@ -2183,7 +2187,7 @@
           <a:p>
             <a:fld id="{699DC775-C286-4358-8C92-D7E584E969B3}" type="datetimeFigureOut">
               <a:rPr lang="en-US" smtClean="0"/>
-              <a:t>18-Jun-15</a:t>
+              <a:t>25-Jun-15</a:t>
             </a:fld>
             <a:endParaRPr lang="en-US"/>
           </a:p>
@@ -2278,7 +2282,7 @@
           <a:p>
             <a:fld id="{699DC775-C286-4358-8C92-D7E584E969B3}" type="datetimeFigureOut">
               <a:rPr lang="en-US" smtClean="0"/>
-              <a:t>18-Jun-15</a:t>
+              <a:t>25-Jun-15</a:t>
             </a:fld>
             <a:endParaRPr lang="en-US"/>
           </a:p>
@@ -2555,7 +2559,7 @@
           <a:p>
             <a:fld id="{699DC775-C286-4358-8C92-D7E584E969B3}" type="datetimeFigureOut">
               <a:rPr lang="en-US" smtClean="0"/>
-              <a:t>18-Jun-15</a:t>
+              <a:t>25-Jun-15</a:t>
             </a:fld>
             <a:endParaRPr lang="en-US"/>
           </a:p>
@@ -2725,7 +2729,7 @@
           <a:p>
             <a:fld id="{699DC775-C286-4358-8C92-D7E584E969B3}" type="datetimeFigureOut">
               <a:rPr lang="en-US" smtClean="0"/>
-              <a:t>18-Jun-15</a:t>
+              <a:t>25-Jun-15</a:t>
             </a:fld>
             <a:endParaRPr lang="en-US"/>
           </a:p>
@@ -2978,7 +2982,7 @@
           <a:p>
             <a:fld id="{699DC775-C286-4358-8C92-D7E584E969B3}" type="datetimeFigureOut">
               <a:rPr lang="en-US" smtClean="0"/>
-              <a:t>18-Jun-15</a:t>
+              <a:t>25-Jun-15</a:t>
             </a:fld>
             <a:endParaRPr lang="en-US"/>
           </a:p>
@@ -3148,7 +3152,7 @@
           <a:p>
             <a:fld id="{699DC775-C286-4358-8C92-D7E584E969B3}" type="datetimeFigureOut">
               <a:rPr lang="en-US" smtClean="0"/>
-              <a:t>18-Jun-15</a:t>
+              <a:t>25-Jun-15</a:t>
             </a:fld>
             <a:endParaRPr lang="en-US"/>
           </a:p>
@@ -3328,7 +3332,7 @@
           <a:p>
             <a:fld id="{699DC775-C286-4358-8C92-D7E584E969B3}" type="datetimeFigureOut">
               <a:rPr lang="en-US" smtClean="0"/>
-              <a:t>18-Jun-15</a:t>
+              <a:t>25-Jun-15</a:t>
             </a:fld>
             <a:endParaRPr lang="en-US"/>
           </a:p>
@@ -3578,7 +3582,7 @@
           <a:p>
             <a:fld id="{699DC775-C286-4358-8C92-D7E584E969B3}" type="datetimeFigureOut">
               <a:rPr lang="en-US" smtClean="0"/>
-              <a:t>18-Jun-15</a:t>
+              <a:t>25-Jun-15</a:t>
             </a:fld>
             <a:endParaRPr lang="en-US"/>
           </a:p>
@@ -3756,7 +3760,7 @@
           <a:p>
             <a:fld id="{699DC775-C286-4358-8C92-D7E584E969B3}" type="datetimeFigureOut">
               <a:rPr lang="en-US" smtClean="0"/>
-              <a:t>18-Jun-15</a:t>
+              <a:t>25-Jun-15</a:t>
             </a:fld>
             <a:endParaRPr lang="en-US"/>
           </a:p>
@@ -4010,7 +4014,7 @@
           <a:p>
             <a:fld id="{699DC775-C286-4358-8C92-D7E584E969B3}" type="datetimeFigureOut">
               <a:rPr lang="en-US" smtClean="0"/>
-              <a:t>18-Jun-15</a:t>
+              <a:t>25-Jun-15</a:t>
             </a:fld>
             <a:endParaRPr lang="en-US"/>
           </a:p>
@@ -4306,7 +4310,7 @@
           <a:p>
             <a:fld id="{699DC775-C286-4358-8C92-D7E584E969B3}" type="datetimeFigureOut">
               <a:rPr lang="en-US" smtClean="0"/>
-              <a:t>18-Jun-15</a:t>
+              <a:t>25-Jun-15</a:t>
             </a:fld>
             <a:endParaRPr lang="en-US"/>
           </a:p>
@@ -4736,7 +4740,7 @@
           <a:p>
             <a:fld id="{699DC775-C286-4358-8C92-D7E584E969B3}" type="datetimeFigureOut">
               <a:rPr lang="en-US" smtClean="0"/>
-              <a:t>18-Jun-15</a:t>
+              <a:t>25-Jun-15</a:t>
             </a:fld>
             <a:endParaRPr lang="en-US"/>
           </a:p>
@@ -4862,7 +4866,7 @@
           <a:p>
             <a:fld id="{699DC775-C286-4358-8C92-D7E584E969B3}" type="datetimeFigureOut">
               <a:rPr lang="en-US" smtClean="0"/>
-              <a:t>18-Jun-15</a:t>
+              <a:t>25-Jun-15</a:t>
             </a:fld>
             <a:endParaRPr lang="en-US"/>
           </a:p>
@@ -4965,7 +4969,7 @@
           <a:p>
             <a:fld id="{699DC775-C286-4358-8C92-D7E584E969B3}" type="datetimeFigureOut">
               <a:rPr lang="en-US" smtClean="0"/>
-              <a:t>18-Jun-15</a:t>
+              <a:t>25-Jun-15</a:t>
             </a:fld>
             <a:endParaRPr lang="en-US"/>
           </a:p>
@@ -5211,7 +5215,7 @@
           <a:p>
             <a:fld id="{699DC775-C286-4358-8C92-D7E584E969B3}" type="datetimeFigureOut">
               <a:rPr lang="en-US" smtClean="0"/>
-              <a:t>18-Jun-15</a:t>
+              <a:t>25-Jun-15</a:t>
             </a:fld>
             <a:endParaRPr lang="en-US"/>
           </a:p>
@@ -5496,7 +5500,7 @@
           <a:p>
             <a:fld id="{699DC775-C286-4358-8C92-D7E584E969B3}" type="datetimeFigureOut">
               <a:rPr lang="en-US" smtClean="0"/>
-              <a:t>18-Jun-15</a:t>
+              <a:t>25-Jun-15</a:t>
             </a:fld>
             <a:endParaRPr lang="en-US"/>
           </a:p>
@@ -5757,7 +5761,7 @@
           <a:p>
             <a:fld id="{699DC775-C286-4358-8C92-D7E584E969B3}" type="datetimeFigureOut">
               <a:rPr lang="en-US" smtClean="0"/>
-              <a:t>18-Jun-15</a:t>
+              <a:t>25-Jun-15</a:t>
             </a:fld>
             <a:endParaRPr lang="en-US"/>
           </a:p>
@@ -5935,7 +5939,7 @@
           <a:p>
             <a:fld id="{699DC775-C286-4358-8C92-D7E584E969B3}" type="datetimeFigureOut">
               <a:rPr lang="en-US" smtClean="0"/>
-              <a:t>18-Jun-15</a:t>
+              <a:t>25-Jun-15</a:t>
             </a:fld>
             <a:endParaRPr lang="en-US"/>
           </a:p>
@@ -6123,7 +6127,7 @@
           <a:p>
             <a:fld id="{699DC775-C286-4358-8C92-D7E584E969B3}" type="datetimeFigureOut">
               <a:rPr lang="en-US" smtClean="0"/>
-              <a:t>18-Jun-15</a:t>
+              <a:t>25-Jun-15</a:t>
             </a:fld>
             <a:endParaRPr lang="en-US"/>
           </a:p>
@@ -6411,7 +6415,7 @@
           <a:p>
             <a:fld id="{699DC775-C286-4358-8C92-D7E584E969B3}" type="datetimeFigureOut">
               <a:rPr lang="en-US" smtClean="0"/>
-              <a:t>18-Jun-15</a:t>
+              <a:t>25-Jun-15</a:t>
             </a:fld>
             <a:endParaRPr lang="en-US"/>
           </a:p>
@@ -6833,7 +6837,7 @@
           <a:p>
             <a:fld id="{699DC775-C286-4358-8C92-D7E584E969B3}" type="datetimeFigureOut">
               <a:rPr lang="en-US" smtClean="0"/>
-              <a:t>18-Jun-15</a:t>
+              <a:t>25-Jun-15</a:t>
             </a:fld>
             <a:endParaRPr lang="en-US"/>
           </a:p>
@@ -6951,7 +6955,7 @@
           <a:p>
             <a:fld id="{699DC775-C286-4358-8C92-D7E584E969B3}" type="datetimeFigureOut">
               <a:rPr lang="en-US" smtClean="0"/>
-              <a:t>18-Jun-15</a:t>
+              <a:t>25-Jun-15</a:t>
             </a:fld>
             <a:endParaRPr lang="en-US"/>
           </a:p>
@@ -7046,7 +7050,7 @@
           <a:p>
             <a:fld id="{699DC775-C286-4358-8C92-D7E584E969B3}" type="datetimeFigureOut">
               <a:rPr lang="en-US" smtClean="0"/>
-              <a:t>18-Jun-15</a:t>
+              <a:t>25-Jun-15</a:t>
             </a:fld>
             <a:endParaRPr lang="en-US"/>
           </a:p>
@@ -7323,7 +7327,7 @@
           <a:p>
             <a:fld id="{699DC775-C286-4358-8C92-D7E584E969B3}" type="datetimeFigureOut">
               <a:rPr lang="en-US" smtClean="0"/>
-              <a:t>18-Jun-15</a:t>
+              <a:t>25-Jun-15</a:t>
             </a:fld>
             <a:endParaRPr lang="en-US"/>
           </a:p>
@@ -7576,7 +7580,7 @@
           <a:p>
             <a:fld id="{699DC775-C286-4358-8C92-D7E584E969B3}" type="datetimeFigureOut">
               <a:rPr lang="en-US" smtClean="0"/>
-              <a:t>18-Jun-15</a:t>
+              <a:t>25-Jun-15</a:t>
             </a:fld>
             <a:endParaRPr lang="en-US"/>
           </a:p>
@@ -7789,7 +7793,7 @@
           <a:p>
             <a:fld id="{699DC775-C286-4358-8C92-D7E584E969B3}" type="datetimeFigureOut">
               <a:rPr lang="en-US" smtClean="0"/>
-              <a:t>18-Jun-15</a:t>
+              <a:t>25-Jun-15</a:t>
             </a:fld>
             <a:endParaRPr lang="en-US"/>
           </a:p>
@@ -8304,7 +8308,7 @@
           <a:p>
             <a:fld id="{699DC775-C286-4358-8C92-D7E584E969B3}" type="datetimeFigureOut">
               <a:rPr lang="en-US" smtClean="0"/>
-              <a:t>18-Jun-15</a:t>
+              <a:t>25-Jun-15</a:t>
             </a:fld>
             <a:endParaRPr lang="en-US"/>
           </a:p>
@@ -8817,7 +8821,7 @@
           <a:p>
             <a:fld id="{699DC775-C286-4358-8C92-D7E584E969B3}" type="datetimeFigureOut">
               <a:rPr lang="en-US" smtClean="0"/>
-              <a:t>18-Jun-15</a:t>
+              <a:t>25-Jun-15</a:t>
             </a:fld>
             <a:endParaRPr lang="en-US"/>
           </a:p>
@@ -10824,6 +10828,326 @@
 </file>
 
 <file path=ppt/slides/slide15.xml><?xml version="1.0" encoding="utf-8"?>
+<p:sld xmlns:a="http://schemas.openxmlformats.org/drawingml/2006/main" xmlns:r="http://schemas.openxmlformats.org/officeDocument/2006/relationships" xmlns:p="http://schemas.openxmlformats.org/presentationml/2006/main">
+  <p:cSld>
+    <p:spTree>
+      <p:nvGrpSpPr>
+        <p:cNvPr id="1" name=""/>
+        <p:cNvGrpSpPr/>
+        <p:nvPr/>
+      </p:nvGrpSpPr>
+      <p:grpSpPr>
+        <a:xfrm>
+          <a:off x="0" y="0"/>
+          <a:ext cx="0" cy="0"/>
+          <a:chOff x="0" y="0"/>
+          <a:chExt cx="0" cy="0"/>
+        </a:xfrm>
+      </p:grpSpPr>
+      <p:sp>
+        <p:nvSpPr>
+          <p:cNvPr id="2" name="Title 1"/>
+          <p:cNvSpPr>
+            <a:spLocks noGrp="1"/>
+          </p:cNvSpPr>
+          <p:nvPr>
+            <p:ph type="title"/>
+          </p:nvPr>
+        </p:nvSpPr>
+        <p:spPr/>
+        <p:txBody>
+          <a:bodyPr/>
+          <a:lstStyle/>
+          <a:p>
+            <a:r>
+              <a:rPr lang="en-US" dirty="0" smtClean="0"/>
+              <a:t>Auto Zoom:: </a:t>
+            </a:r>
+            <a:r>
+              <a:rPr lang="en-US" dirty="0" err="1" smtClean="0"/>
+              <a:t>Errrors</a:t>
+            </a:r>
+            <a:endParaRPr lang="en-SG" dirty="0"/>
+          </a:p>
+        </p:txBody>
+      </p:sp>
+      <p:sp>
+        <p:nvSpPr>
+          <p:cNvPr id="3" name="Content Placeholder 2"/>
+          <p:cNvSpPr>
+            <a:spLocks noGrp="1"/>
+          </p:cNvSpPr>
+          <p:nvPr>
+            <p:ph idx="1"/>
+          </p:nvPr>
+        </p:nvSpPr>
+        <p:spPr/>
+        <p:txBody>
+          <a:bodyPr/>
+          <a:lstStyle/>
+          <a:p>
+            <a:r>
+              <a:rPr lang="en-SG" dirty="0" smtClean="0"/>
+              <a:t>1) Move slide 16 to the end of the presentation. Attempt to Drill down. This should cause an error.</a:t>
+            </a:r>
+          </a:p>
+          <a:p>
+            <a:r>
+              <a:rPr lang="en-SG" dirty="0" smtClean="0"/>
+              <a:t>2) Move the slide to the start of the presentation. Attempt to Step back. This should also cause an error.</a:t>
+            </a:r>
+            <a:endParaRPr lang="en-SG" dirty="0"/>
+          </a:p>
+        </p:txBody>
+      </p:sp>
+    </p:spTree>
+    <p:extLst>
+      <p:ext uri="{BB962C8B-B14F-4D97-AF65-F5344CB8AC3E}">
+        <p14:creationId xmlns:p14="http://schemas.microsoft.com/office/powerpoint/2010/main" val="968310630"/>
+      </p:ext>
+    </p:extLst>
+  </p:cSld>
+  <p:clrMapOvr>
+    <a:masterClrMapping/>
+  </p:clrMapOvr>
+  <p:timing>
+    <p:tnLst>
+      <p:par>
+        <p:cTn id="1" dur="indefinite" restart="never" nodeType="tmRoot"/>
+      </p:par>
+    </p:tnLst>
+  </p:timing>
+</p:sld>
+</file>
+
+<file path=ppt/slides/slide16.xml><?xml version="1.0" encoding="utf-8"?>
+<p:sld xmlns:a="http://schemas.openxmlformats.org/drawingml/2006/main" xmlns:r="http://schemas.openxmlformats.org/officeDocument/2006/relationships" xmlns:p="http://schemas.openxmlformats.org/presentationml/2006/main">
+  <p:cSld>
+    <p:bg>
+      <p:bgPr>
+        <a:solidFill>
+          <a:schemeClr val="bg1"/>
+        </a:solidFill>
+        <a:effectLst/>
+      </p:bgPr>
+    </p:bg>
+    <p:spTree>
+      <p:nvGrpSpPr>
+        <p:cNvPr id="1" name=""/>
+        <p:cNvGrpSpPr/>
+        <p:nvPr/>
+      </p:nvGrpSpPr>
+      <p:grpSpPr>
+        <a:xfrm>
+          <a:off x="0" y="0"/>
+          <a:ext cx="0" cy="0"/>
+          <a:chOff x="0" y="0"/>
+          <a:chExt cx="0" cy="0"/>
+        </a:xfrm>
+      </p:grpSpPr>
+      <p:sp>
+        <p:nvSpPr>
+          <p:cNvPr id="4" name="Rectangle 3"/>
+          <p:cNvSpPr/>
+          <p:nvPr/>
+        </p:nvSpPr>
+        <p:spPr>
+          <a:xfrm>
+            <a:off x="611560" y="764704"/>
+            <a:ext cx="7920880" cy="1224136"/>
+          </a:xfrm>
+          <a:prstGeom prst="rect">
+            <a:avLst/>
+          </a:prstGeom>
+          <a:noFill/>
+          <a:ln w="57150"/>
+        </p:spPr>
+        <p:style>
+          <a:lnRef idx="2">
+            <a:schemeClr val="accent1">
+              <a:shade val="50000"/>
+            </a:schemeClr>
+          </a:lnRef>
+          <a:fillRef idx="1">
+            <a:schemeClr val="accent1"/>
+          </a:fillRef>
+          <a:effectRef idx="0">
+            <a:schemeClr val="accent1"/>
+          </a:effectRef>
+          <a:fontRef idx="minor">
+            <a:schemeClr val="lt1"/>
+          </a:fontRef>
+        </p:style>
+        <p:txBody>
+          <a:bodyPr rtlCol="0" anchor="ctr"/>
+          <a:lstStyle/>
+          <a:p>
+            <a:pPr algn="ctr"/>
+            <a:endParaRPr lang="en-SG"/>
+          </a:p>
+        </p:txBody>
+      </p:sp>
+      <p:sp>
+        <p:nvSpPr>
+          <p:cNvPr id="5" name="Rectangle 4"/>
+          <p:cNvSpPr/>
+          <p:nvPr/>
+        </p:nvSpPr>
+        <p:spPr>
+          <a:xfrm>
+            <a:off x="611560" y="2348880"/>
+            <a:ext cx="7920880" cy="1224136"/>
+          </a:xfrm>
+          <a:prstGeom prst="rect">
+            <a:avLst/>
+          </a:prstGeom>
+          <a:noFill/>
+          <a:ln w="57150"/>
+        </p:spPr>
+        <p:style>
+          <a:lnRef idx="2">
+            <a:schemeClr val="accent2">
+              <a:shade val="50000"/>
+            </a:schemeClr>
+          </a:lnRef>
+          <a:fillRef idx="1">
+            <a:schemeClr val="accent2"/>
+          </a:fillRef>
+          <a:effectRef idx="0">
+            <a:schemeClr val="accent2"/>
+          </a:effectRef>
+          <a:fontRef idx="minor">
+            <a:schemeClr val="lt1"/>
+          </a:fontRef>
+        </p:style>
+        <p:txBody>
+          <a:bodyPr rtlCol="0" anchor="ctr"/>
+          <a:lstStyle/>
+          <a:p>
+            <a:pPr algn="ctr"/>
+            <a:endParaRPr lang="en-SG"/>
+          </a:p>
+        </p:txBody>
+      </p:sp>
+      <p:sp>
+        <p:nvSpPr>
+          <p:cNvPr id="6" name="Rectangle 5"/>
+          <p:cNvSpPr/>
+          <p:nvPr/>
+        </p:nvSpPr>
+        <p:spPr>
+          <a:xfrm>
+            <a:off x="611560" y="3933056"/>
+            <a:ext cx="7920880" cy="2376264"/>
+          </a:xfrm>
+          <a:prstGeom prst="rect">
+            <a:avLst/>
+          </a:prstGeom>
+          <a:noFill/>
+          <a:ln w="57150"/>
+        </p:spPr>
+        <p:style>
+          <a:lnRef idx="2">
+            <a:schemeClr val="accent4">
+              <a:shade val="50000"/>
+            </a:schemeClr>
+          </a:lnRef>
+          <a:fillRef idx="1">
+            <a:schemeClr val="accent4"/>
+          </a:fillRef>
+          <a:effectRef idx="0">
+            <a:schemeClr val="accent4"/>
+          </a:effectRef>
+          <a:fontRef idx="minor">
+            <a:schemeClr val="lt1"/>
+          </a:fontRef>
+        </p:style>
+        <p:txBody>
+          <a:bodyPr rtlCol="0" anchor="ctr"/>
+          <a:lstStyle/>
+          <a:p>
+            <a:pPr algn="ctr"/>
+            <a:endParaRPr lang="en-SG"/>
+          </a:p>
+        </p:txBody>
+      </p:sp>
+      <p:sp>
+        <p:nvSpPr>
+          <p:cNvPr id="8" name="Zoom This Shape"/>
+          <p:cNvSpPr/>
+          <p:nvPr/>
+        </p:nvSpPr>
+        <p:spPr>
+          <a:xfrm>
+            <a:off x="2382666" y="1849343"/>
+            <a:ext cx="4378668" cy="2673288"/>
+          </a:xfrm>
+          <a:prstGeom prst="rect">
+            <a:avLst/>
+          </a:prstGeom>
+          <a:ln/>
+        </p:spPr>
+        <p:style>
+          <a:lnRef idx="2">
+            <a:schemeClr val="accent1">
+              <a:shade val="50000"/>
+            </a:schemeClr>
+          </a:lnRef>
+          <a:fillRef idx="1">
+            <a:schemeClr val="accent1"/>
+          </a:fillRef>
+          <a:effectRef idx="0">
+            <a:schemeClr val="accent1"/>
+          </a:effectRef>
+          <a:fontRef idx="minor">
+            <a:schemeClr val="lt1"/>
+          </a:fontRef>
+        </p:style>
+        <p:txBody>
+          <a:bodyPr rtlCol="0" anchor="ctr"/>
+          <a:lstStyle/>
+          <a:p>
+            <a:pPr algn="ctr"/>
+            <a:r>
+              <a:rPr lang="en-US" sz="2800" dirty="0" smtClean="0"/>
+              <a:t>Zoom Shape</a:t>
+            </a:r>
+          </a:p>
+        </p:txBody>
+      </p:sp>
+    </p:spTree>
+    <p:extLst>
+      <p:ext uri="{BB962C8B-B14F-4D97-AF65-F5344CB8AC3E}">
+        <p14:creationId xmlns:p14="http://schemas.microsoft.com/office/powerpoint/2010/main" val="1303678980"/>
+      </p:ext>
+    </p:extLst>
+  </p:cSld>
+  <p:clrMapOvr>
+    <a:masterClrMapping/>
+  </p:clrMapOvr>
+  <mc:AlternateContent xmlns:mc="http://schemas.openxmlformats.org/markup-compatibility/2006" xmlns:p14="http://schemas.microsoft.com/office/powerpoint/2010/main">
+    <mc:Choice Requires="p14">
+      <p:transition spd="slow" p14:dur="1500">
+        <p:split orient="vert"/>
+      </p:transition>
+    </mc:Choice>
+    <mc:Fallback xmlns="">
+      <p:transition spd="slow">
+        <p:split orient="vert"/>
+      </p:transition>
+    </mc:Fallback>
+  </mc:AlternateContent>
+  <p:timing>
+    <p:tnLst>
+      <p:par>
+        <p:cTn id="1" dur="indefinite" restart="never" nodeType="tmRoot"/>
+      </p:par>
+    </p:tnLst>
+  </p:timing>
+</p:sld>
+</file>
+
+<file path=ppt/slides/slide17.xml><?xml version="1.0" encoding="utf-8"?>
 <p:sld xmlns:a="http://schemas.openxmlformats.org/drawingml/2006/main" xmlns:r="http://schemas.openxmlformats.org/officeDocument/2006/relationships" xmlns:p="http://schemas.openxmlformats.org/presentationml/2006/main" show="0">
   <p:cSld name="PPTLabsAcknowledgementSlide">
     <p:spTree>

</xml_diff>

<commit_message>
Add background zoom / single slide test to both AutoZoom and ZoomToArea tests
</commit_message>
<xml_diff>
--- a/doc/test/AutoZoom.pptx
+++ b/doc/test/AutoZoom.pptx
@@ -15,15 +15,27 @@
     <p:sldId id="310" r:id="rId9"/>
     <p:sldId id="311" r:id="rId10"/>
     <p:sldId id="308" r:id="rId11"/>
-    <p:sldId id="304" r:id="rId12"/>
-    <p:sldId id="305" r:id="rId13"/>
-    <p:sldId id="306" r:id="rId14"/>
-    <p:sldId id="313" r:id="rId15"/>
-    <p:sldId id="315" r:id="rId16"/>
-    <p:sldId id="314" r:id="rId17"/>
-    <p:sldId id="316" r:id="rId18"/>
-    <p:sldId id="317" r:id="rId19"/>
-    <p:sldId id="312" r:id="rId20"/>
+    <p:sldId id="321" r:id="rId12"/>
+    <p:sldId id="322" r:id="rId13"/>
+    <p:sldId id="323" r:id="rId14"/>
+    <p:sldId id="326" r:id="rId15"/>
+    <p:sldId id="328" r:id="rId16"/>
+    <p:sldId id="327" r:id="rId17"/>
+    <p:sldId id="318" r:id="rId18"/>
+    <p:sldId id="319" r:id="rId19"/>
+    <p:sldId id="320" r:id="rId20"/>
+    <p:sldId id="313" r:id="rId21"/>
+    <p:sldId id="315" r:id="rId22"/>
+    <p:sldId id="314" r:id="rId23"/>
+    <p:sldId id="304" r:id="rId24"/>
+    <p:sldId id="305" r:id="rId25"/>
+    <p:sldId id="306" r:id="rId26"/>
+    <p:sldId id="324" r:id="rId27"/>
+    <p:sldId id="329" r:id="rId28"/>
+    <p:sldId id="325" r:id="rId29"/>
+    <p:sldId id="316" r:id="rId30"/>
+    <p:sldId id="317" r:id="rId31"/>
+    <p:sldId id="312" r:id="rId32"/>
   </p:sldIdLst>
   <p:sldSz cx="9144000" cy="6858000" type="screen4x3"/>
   <p:notesSz cx="6858000" cy="9144000"/>
@@ -139,12 +151,24 @@
             <p14:sldId id="310"/>
             <p14:sldId id="311"/>
             <p14:sldId id="308"/>
+            <p14:sldId id="321"/>
+            <p14:sldId id="322"/>
+            <p14:sldId id="323"/>
+            <p14:sldId id="326"/>
+            <p14:sldId id="328"/>
+            <p14:sldId id="327"/>
+            <p14:sldId id="318"/>
+            <p14:sldId id="319"/>
+            <p14:sldId id="320"/>
+            <p14:sldId id="313"/>
+            <p14:sldId id="315"/>
+            <p14:sldId id="314"/>
             <p14:sldId id="304"/>
             <p14:sldId id="305"/>
             <p14:sldId id="306"/>
-            <p14:sldId id="313"/>
-            <p14:sldId id="315"/>
-            <p14:sldId id="314"/>
+            <p14:sldId id="324"/>
+            <p14:sldId id="329"/>
+            <p14:sldId id="325"/>
             <p14:sldId id="316"/>
             <p14:sldId id="317"/>
             <p14:sldId id="312"/>
@@ -153,7 +177,7 @@
       </p14:sectionLst>
     </p:ext>
     <p:ext uri="{EFAFB233-063F-42B5-8137-9DF3F51BA10A}">
-      <p15:sldGuideLst xmlns:p15="http://schemas.microsoft.com/office/powerpoint/2012/main" xmlns="">
+      <p15:sldGuideLst xmlns="" xmlns:p15="http://schemas.microsoft.com/office/powerpoint/2012/main">
         <p15:guide id="1" orient="horz" pos="2160">
           <p15:clr>
             <a:srgbClr val="A4A3A4"/>
@@ -351,7 +375,7 @@
           <a:p>
             <a:fld id="{699DC775-C286-4358-8C92-D7E584E969B3}" type="datetimeFigureOut">
               <a:rPr lang="en-US" smtClean="0"/>
-              <a:t>25-Jun-15</a:t>
+              <a:t>26-Jun-15</a:t>
             </a:fld>
             <a:endParaRPr lang="en-US"/>
           </a:p>
@@ -521,7 +545,7 @@
           <a:p>
             <a:fld id="{699DC775-C286-4358-8C92-D7E584E969B3}" type="datetimeFigureOut">
               <a:rPr lang="en-US" smtClean="0"/>
-              <a:t>25-Jun-15</a:t>
+              <a:t>26-Jun-15</a:t>
             </a:fld>
             <a:endParaRPr lang="en-US"/>
           </a:p>
@@ -701,7 +725,7 @@
           <a:p>
             <a:fld id="{699DC775-C286-4358-8C92-D7E584E969B3}" type="datetimeFigureOut">
               <a:rPr lang="en-US" smtClean="0"/>
-              <a:t>25-Jun-15</a:t>
+              <a:t>26-Jun-15</a:t>
             </a:fld>
             <a:endParaRPr lang="en-US"/>
           </a:p>
@@ -943,7 +967,7 @@
           <a:p>
             <a:fld id="{699DC775-C286-4358-8C92-D7E584E969B3}" type="datetimeFigureOut">
               <a:rPr lang="en-US" smtClean="0"/>
-              <a:t>25-Jun-15</a:t>
+              <a:t>26-Jun-15</a:t>
             </a:fld>
             <a:endParaRPr lang="en-US"/>
           </a:p>
@@ -1113,7 +1137,7 @@
           <a:p>
             <a:fld id="{699DC775-C286-4358-8C92-D7E584E969B3}" type="datetimeFigureOut">
               <a:rPr lang="en-US" smtClean="0"/>
-              <a:t>25-Jun-15</a:t>
+              <a:t>26-Jun-15</a:t>
             </a:fld>
             <a:endParaRPr lang="en-US"/>
           </a:p>
@@ -1359,7 +1383,7 @@
           <a:p>
             <a:fld id="{699DC775-C286-4358-8C92-D7E584E969B3}" type="datetimeFigureOut">
               <a:rPr lang="en-US" smtClean="0"/>
-              <a:t>25-Jun-15</a:t>
+              <a:t>26-Jun-15</a:t>
             </a:fld>
             <a:endParaRPr lang="en-US"/>
           </a:p>
@@ -1647,7 +1671,7 @@
           <a:p>
             <a:fld id="{699DC775-C286-4358-8C92-D7E584E969B3}" type="datetimeFigureOut">
               <a:rPr lang="en-US" smtClean="0"/>
-              <a:t>25-Jun-15</a:t>
+              <a:t>26-Jun-15</a:t>
             </a:fld>
             <a:endParaRPr lang="en-US"/>
           </a:p>
@@ -2069,7 +2093,7 @@
           <a:p>
             <a:fld id="{699DC775-C286-4358-8C92-D7E584E969B3}" type="datetimeFigureOut">
               <a:rPr lang="en-US" smtClean="0"/>
-              <a:t>25-Jun-15</a:t>
+              <a:t>26-Jun-15</a:t>
             </a:fld>
             <a:endParaRPr lang="en-US"/>
           </a:p>
@@ -2187,7 +2211,7 @@
           <a:p>
             <a:fld id="{699DC775-C286-4358-8C92-D7E584E969B3}" type="datetimeFigureOut">
               <a:rPr lang="en-US" smtClean="0"/>
-              <a:t>25-Jun-15</a:t>
+              <a:t>26-Jun-15</a:t>
             </a:fld>
             <a:endParaRPr lang="en-US"/>
           </a:p>
@@ -2282,7 +2306,7 @@
           <a:p>
             <a:fld id="{699DC775-C286-4358-8C92-D7E584E969B3}" type="datetimeFigureOut">
               <a:rPr lang="en-US" smtClean="0"/>
-              <a:t>25-Jun-15</a:t>
+              <a:t>26-Jun-15</a:t>
             </a:fld>
             <a:endParaRPr lang="en-US"/>
           </a:p>
@@ -2559,7 +2583,7 @@
           <a:p>
             <a:fld id="{699DC775-C286-4358-8C92-D7E584E969B3}" type="datetimeFigureOut">
               <a:rPr lang="en-US" smtClean="0"/>
-              <a:t>25-Jun-15</a:t>
+              <a:t>26-Jun-15</a:t>
             </a:fld>
             <a:endParaRPr lang="en-US"/>
           </a:p>
@@ -2729,7 +2753,7 @@
           <a:p>
             <a:fld id="{699DC775-C286-4358-8C92-D7E584E969B3}" type="datetimeFigureOut">
               <a:rPr lang="en-US" smtClean="0"/>
-              <a:t>25-Jun-15</a:t>
+              <a:t>26-Jun-15</a:t>
             </a:fld>
             <a:endParaRPr lang="en-US"/>
           </a:p>
@@ -2982,7 +3006,7 @@
           <a:p>
             <a:fld id="{699DC775-C286-4358-8C92-D7E584E969B3}" type="datetimeFigureOut">
               <a:rPr lang="en-US" smtClean="0"/>
-              <a:t>25-Jun-15</a:t>
+              <a:t>26-Jun-15</a:t>
             </a:fld>
             <a:endParaRPr lang="en-US"/>
           </a:p>
@@ -3152,7 +3176,7 @@
           <a:p>
             <a:fld id="{699DC775-C286-4358-8C92-D7E584E969B3}" type="datetimeFigureOut">
               <a:rPr lang="en-US" smtClean="0"/>
-              <a:t>25-Jun-15</a:t>
+              <a:t>26-Jun-15</a:t>
             </a:fld>
             <a:endParaRPr lang="en-US"/>
           </a:p>
@@ -3332,7 +3356,7 @@
           <a:p>
             <a:fld id="{699DC775-C286-4358-8C92-D7E584E969B3}" type="datetimeFigureOut">
               <a:rPr lang="en-US" smtClean="0"/>
-              <a:t>25-Jun-15</a:t>
+              <a:t>26-Jun-15</a:t>
             </a:fld>
             <a:endParaRPr lang="en-US"/>
           </a:p>
@@ -3582,7 +3606,7 @@
           <a:p>
             <a:fld id="{699DC775-C286-4358-8C92-D7E584E969B3}" type="datetimeFigureOut">
               <a:rPr lang="en-US" smtClean="0"/>
-              <a:t>25-Jun-15</a:t>
+              <a:t>26-Jun-15</a:t>
             </a:fld>
             <a:endParaRPr lang="en-US"/>
           </a:p>
@@ -3760,7 +3784,7 @@
           <a:p>
             <a:fld id="{699DC775-C286-4358-8C92-D7E584E969B3}" type="datetimeFigureOut">
               <a:rPr lang="en-US" smtClean="0"/>
-              <a:t>25-Jun-15</a:t>
+              <a:t>26-Jun-15</a:t>
             </a:fld>
             <a:endParaRPr lang="en-US"/>
           </a:p>
@@ -4014,7 +4038,7 @@
           <a:p>
             <a:fld id="{699DC775-C286-4358-8C92-D7E584E969B3}" type="datetimeFigureOut">
               <a:rPr lang="en-US" smtClean="0"/>
-              <a:t>25-Jun-15</a:t>
+              <a:t>26-Jun-15</a:t>
             </a:fld>
             <a:endParaRPr lang="en-US"/>
           </a:p>
@@ -4310,7 +4334,7 @@
           <a:p>
             <a:fld id="{699DC775-C286-4358-8C92-D7E584E969B3}" type="datetimeFigureOut">
               <a:rPr lang="en-US" smtClean="0"/>
-              <a:t>25-Jun-15</a:t>
+              <a:t>26-Jun-15</a:t>
             </a:fld>
             <a:endParaRPr lang="en-US"/>
           </a:p>
@@ -4740,7 +4764,7 @@
           <a:p>
             <a:fld id="{699DC775-C286-4358-8C92-D7E584E969B3}" type="datetimeFigureOut">
               <a:rPr lang="en-US" smtClean="0"/>
-              <a:t>25-Jun-15</a:t>
+              <a:t>26-Jun-15</a:t>
             </a:fld>
             <a:endParaRPr lang="en-US"/>
           </a:p>
@@ -4866,7 +4890,7 @@
           <a:p>
             <a:fld id="{699DC775-C286-4358-8C92-D7E584E969B3}" type="datetimeFigureOut">
               <a:rPr lang="en-US" smtClean="0"/>
-              <a:t>25-Jun-15</a:t>
+              <a:t>26-Jun-15</a:t>
             </a:fld>
             <a:endParaRPr lang="en-US"/>
           </a:p>
@@ -4969,7 +4993,7 @@
           <a:p>
             <a:fld id="{699DC775-C286-4358-8C92-D7E584E969B3}" type="datetimeFigureOut">
               <a:rPr lang="en-US" smtClean="0"/>
-              <a:t>25-Jun-15</a:t>
+              <a:t>26-Jun-15</a:t>
             </a:fld>
             <a:endParaRPr lang="en-US"/>
           </a:p>
@@ -5215,7 +5239,7 @@
           <a:p>
             <a:fld id="{699DC775-C286-4358-8C92-D7E584E969B3}" type="datetimeFigureOut">
               <a:rPr lang="en-US" smtClean="0"/>
-              <a:t>25-Jun-15</a:t>
+              <a:t>26-Jun-15</a:t>
             </a:fld>
             <a:endParaRPr lang="en-US"/>
           </a:p>
@@ -5500,7 +5524,7 @@
           <a:p>
             <a:fld id="{699DC775-C286-4358-8C92-D7E584E969B3}" type="datetimeFigureOut">
               <a:rPr lang="en-US" smtClean="0"/>
-              <a:t>25-Jun-15</a:t>
+              <a:t>26-Jun-15</a:t>
             </a:fld>
             <a:endParaRPr lang="en-US"/>
           </a:p>
@@ -5761,7 +5785,7 @@
           <a:p>
             <a:fld id="{699DC775-C286-4358-8C92-D7E584E969B3}" type="datetimeFigureOut">
               <a:rPr lang="en-US" smtClean="0"/>
-              <a:t>25-Jun-15</a:t>
+              <a:t>26-Jun-15</a:t>
             </a:fld>
             <a:endParaRPr lang="en-US"/>
           </a:p>
@@ -5939,7 +5963,7 @@
           <a:p>
             <a:fld id="{699DC775-C286-4358-8C92-D7E584E969B3}" type="datetimeFigureOut">
               <a:rPr lang="en-US" smtClean="0"/>
-              <a:t>25-Jun-15</a:t>
+              <a:t>26-Jun-15</a:t>
             </a:fld>
             <a:endParaRPr lang="en-US"/>
           </a:p>
@@ -6127,7 +6151,7 @@
           <a:p>
             <a:fld id="{699DC775-C286-4358-8C92-D7E584E969B3}" type="datetimeFigureOut">
               <a:rPr lang="en-US" smtClean="0"/>
-              <a:t>25-Jun-15</a:t>
+              <a:t>26-Jun-15</a:t>
             </a:fld>
             <a:endParaRPr lang="en-US"/>
           </a:p>
@@ -6415,7 +6439,7 @@
           <a:p>
             <a:fld id="{699DC775-C286-4358-8C92-D7E584E969B3}" type="datetimeFigureOut">
               <a:rPr lang="en-US" smtClean="0"/>
-              <a:t>25-Jun-15</a:t>
+              <a:t>26-Jun-15</a:t>
             </a:fld>
             <a:endParaRPr lang="en-US"/>
           </a:p>
@@ -6837,7 +6861,7 @@
           <a:p>
             <a:fld id="{699DC775-C286-4358-8C92-D7E584E969B3}" type="datetimeFigureOut">
               <a:rPr lang="en-US" smtClean="0"/>
-              <a:t>25-Jun-15</a:t>
+              <a:t>26-Jun-15</a:t>
             </a:fld>
             <a:endParaRPr lang="en-US"/>
           </a:p>
@@ -6955,7 +6979,7 @@
           <a:p>
             <a:fld id="{699DC775-C286-4358-8C92-D7E584E969B3}" type="datetimeFigureOut">
               <a:rPr lang="en-US" smtClean="0"/>
-              <a:t>25-Jun-15</a:t>
+              <a:t>26-Jun-15</a:t>
             </a:fld>
             <a:endParaRPr lang="en-US"/>
           </a:p>
@@ -7050,7 +7074,7 @@
           <a:p>
             <a:fld id="{699DC775-C286-4358-8C92-D7E584E969B3}" type="datetimeFigureOut">
               <a:rPr lang="en-US" smtClean="0"/>
-              <a:t>25-Jun-15</a:t>
+              <a:t>26-Jun-15</a:t>
             </a:fld>
             <a:endParaRPr lang="en-US"/>
           </a:p>
@@ -7327,7 +7351,7 @@
           <a:p>
             <a:fld id="{699DC775-C286-4358-8C92-D7E584E969B3}" type="datetimeFigureOut">
               <a:rPr lang="en-US" smtClean="0"/>
-              <a:t>25-Jun-15</a:t>
+              <a:t>26-Jun-15</a:t>
             </a:fld>
             <a:endParaRPr lang="en-US"/>
           </a:p>
@@ -7580,7 +7604,7 @@
           <a:p>
             <a:fld id="{699DC775-C286-4358-8C92-D7E584E969B3}" type="datetimeFigureOut">
               <a:rPr lang="en-US" smtClean="0"/>
-              <a:t>25-Jun-15</a:t>
+              <a:t>26-Jun-15</a:t>
             </a:fld>
             <a:endParaRPr lang="en-US"/>
           </a:p>
@@ -7793,7 +7817,7 @@
           <a:p>
             <a:fld id="{699DC775-C286-4358-8C92-D7E584E969B3}" type="datetimeFigureOut">
               <a:rPr lang="en-US" smtClean="0"/>
-              <a:t>25-Jun-15</a:t>
+              <a:t>26-Jun-15</a:t>
             </a:fld>
             <a:endParaRPr lang="en-US"/>
           </a:p>
@@ -8308,7 +8332,7 @@
           <a:p>
             <a:fld id="{699DC775-C286-4358-8C92-D7E584E969B3}" type="datetimeFigureOut">
               <a:rPr lang="en-US" smtClean="0"/>
-              <a:t>25-Jun-15</a:t>
+              <a:t>26-Jun-15</a:t>
             </a:fld>
             <a:endParaRPr lang="en-US"/>
           </a:p>
@@ -8821,7 +8845,7 @@
           <a:p>
             <a:fld id="{699DC775-C286-4358-8C92-D7E584E969B3}" type="datetimeFigureOut">
               <a:rPr lang="en-US" smtClean="0"/>
-              <a:t>25-Jun-15</a:t>
+              <a:t>26-Jun-15</a:t>
             </a:fld>
             <a:endParaRPr lang="en-US"/>
           </a:p>
@@ -9403,24 +9427,20 @@
       </p:grpSpPr>
       <p:sp>
         <p:nvSpPr>
-          <p:cNvPr id="2" name="Rectangle 1"/>
+          <p:cNvPr id="4" name="Rectangle 3"/>
           <p:cNvSpPr/>
           <p:nvPr/>
         </p:nvSpPr>
         <p:spPr>
           <a:xfrm>
-            <a:off x="755576" y="836712"/>
-            <a:ext cx="3240360" cy="1944216"/>
+            <a:off x="611560" y="764704"/>
+            <a:ext cx="7920880" cy="1224136"/>
           </a:xfrm>
           <a:prstGeom prst="rect">
             <a:avLst/>
           </a:prstGeom>
-          <a:solidFill>
-            <a:schemeClr val="bg2"/>
-          </a:solidFill>
-          <a:ln>
-            <a:noFill/>
-          </a:ln>
+          <a:noFill/>
+          <a:ln w="57150"/>
         </p:spPr>
         <p:style>
           <a:lnRef idx="2">
@@ -9449,98 +9469,32 @@
       </p:sp>
       <p:sp>
         <p:nvSpPr>
-          <p:cNvPr id="3" name="TextBox 2"/>
-          <p:cNvSpPr txBox="1"/>
+          <p:cNvPr id="5" name="Rectangle 4"/>
+          <p:cNvSpPr/>
           <p:nvPr/>
         </p:nvSpPr>
         <p:spPr>
           <a:xfrm>
-            <a:off x="899592" y="3356992"/>
-            <a:ext cx="3096344" cy="1754326"/>
+            <a:off x="611560" y="2348880"/>
+            <a:ext cx="7920880" cy="1224136"/>
           </a:xfrm>
           <a:prstGeom prst="rect">
             <a:avLst/>
           </a:prstGeom>
           <a:noFill/>
-        </p:spPr>
-        <p:txBody>
-          <a:bodyPr wrap="square" rtlCol="0">
-            <a:spAutoFit/>
-          </a:bodyPr>
-          <a:lstStyle/>
-          <a:p>
-            <a:pPr marL="571500" indent="-571500">
-              <a:buFont typeface="Arial" panose="020B0604020202020204" pitchFamily="34" charset="0"/>
-              <a:buChar char="•"/>
-            </a:pPr>
-            <a:r>
-              <a:rPr lang="en-US" sz="3600" dirty="0" smtClean="0"/>
-              <a:t>Blah </a:t>
-            </a:r>
-            <a:r>
-              <a:rPr lang="en-US" sz="3600" dirty="0" err="1" smtClean="0"/>
-              <a:t>blah</a:t>
-            </a:r>
-            <a:endParaRPr lang="en-US" sz="3600" dirty="0" smtClean="0"/>
-          </a:p>
-          <a:p>
-            <a:pPr marL="571500" indent="-571500">
-              <a:buFont typeface="Arial" panose="020B0604020202020204" pitchFamily="34" charset="0"/>
-              <a:buChar char="•"/>
-            </a:pPr>
-            <a:r>
-              <a:rPr lang="en-US" sz="3600" dirty="0" smtClean="0"/>
-              <a:t>Blah </a:t>
-            </a:r>
-            <a:r>
-              <a:rPr lang="en-US" sz="3600" dirty="0" err="1" smtClean="0"/>
-              <a:t>blah</a:t>
-            </a:r>
-            <a:endParaRPr lang="en-US" sz="3600" dirty="0" smtClean="0"/>
-          </a:p>
-          <a:p>
-            <a:pPr marL="571500" indent="-571500">
-              <a:buFont typeface="Arial" panose="020B0604020202020204" pitchFamily="34" charset="0"/>
-              <a:buChar char="•"/>
-            </a:pPr>
-            <a:r>
-              <a:rPr lang="en-US" sz="3600" dirty="0" smtClean="0"/>
-              <a:t>Blah </a:t>
-            </a:r>
-            <a:r>
-              <a:rPr lang="en-US" sz="3600" dirty="0" err="1" smtClean="0"/>
-              <a:t>blah</a:t>
-            </a:r>
-            <a:endParaRPr lang="en-SG" sz="3600" dirty="0"/>
-          </a:p>
-        </p:txBody>
-      </p:sp>
-      <p:sp>
-        <p:nvSpPr>
-          <p:cNvPr id="4" name="Rectangle 3"/>
-          <p:cNvSpPr/>
-          <p:nvPr/>
-        </p:nvSpPr>
-        <p:spPr>
-          <a:xfrm>
-            <a:off x="4788024" y="836712"/>
-            <a:ext cx="3600400" cy="4392488"/>
-          </a:xfrm>
-          <a:prstGeom prst="rect">
-            <a:avLst/>
-          </a:prstGeom>
+          <a:ln w="57150"/>
         </p:spPr>
         <p:style>
           <a:lnRef idx="2">
-            <a:schemeClr val="accent3">
+            <a:schemeClr val="accent2">
               <a:shade val="50000"/>
             </a:schemeClr>
           </a:lnRef>
           <a:fillRef idx="1">
-            <a:schemeClr val="accent3"/>
+            <a:schemeClr val="accent2"/>
           </a:fillRef>
           <a:effectRef idx="0">
-            <a:schemeClr val="accent3"/>
+            <a:schemeClr val="accent2"/>
           </a:effectRef>
           <a:fontRef idx="minor">
             <a:schemeClr val="lt1"/>
@@ -9555,10 +9509,97 @@
           </a:p>
         </p:txBody>
       </p:sp>
+      <p:sp>
+        <p:nvSpPr>
+          <p:cNvPr id="6" name="Rectangle 5"/>
+          <p:cNvSpPr/>
+          <p:nvPr/>
+        </p:nvSpPr>
+        <p:spPr>
+          <a:xfrm>
+            <a:off x="611560" y="3933056"/>
+            <a:ext cx="7920880" cy="2376264"/>
+          </a:xfrm>
+          <a:prstGeom prst="rect">
+            <a:avLst/>
+          </a:prstGeom>
+          <a:noFill/>
+          <a:ln w="57150"/>
+        </p:spPr>
+        <p:style>
+          <a:lnRef idx="2">
+            <a:schemeClr val="accent4">
+              <a:shade val="50000"/>
+            </a:schemeClr>
+          </a:lnRef>
+          <a:fillRef idx="1">
+            <a:schemeClr val="accent4"/>
+          </a:fillRef>
+          <a:effectRef idx="0">
+            <a:schemeClr val="accent4"/>
+          </a:effectRef>
+          <a:fontRef idx="minor">
+            <a:schemeClr val="lt1"/>
+          </a:fontRef>
+        </p:style>
+        <p:txBody>
+          <a:bodyPr rtlCol="0" anchor="ctr"/>
+          <a:lstStyle/>
+          <a:p>
+            <a:pPr algn="ctr"/>
+            <a:endParaRPr lang="en-SG"/>
+          </a:p>
+        </p:txBody>
+      </p:sp>
+      <p:sp>
+        <p:nvSpPr>
+          <p:cNvPr id="8" name="Drill Down This Shape"/>
+          <p:cNvSpPr/>
+          <p:nvPr/>
+        </p:nvSpPr>
+        <p:spPr>
+          <a:xfrm>
+            <a:off x="6768752" y="850404"/>
+            <a:ext cx="1403648" cy="1052736"/>
+          </a:xfrm>
+          <a:prstGeom prst="rect">
+            <a:avLst/>
+          </a:prstGeom>
+          <a:ln/>
+        </p:spPr>
+        <p:style>
+          <a:lnRef idx="2">
+            <a:schemeClr val="accent1">
+              <a:shade val="50000"/>
+            </a:schemeClr>
+          </a:lnRef>
+          <a:fillRef idx="1">
+            <a:schemeClr val="accent1"/>
+          </a:fillRef>
+          <a:effectRef idx="0">
+            <a:schemeClr val="accent1"/>
+          </a:effectRef>
+          <a:fontRef idx="minor">
+            <a:schemeClr val="lt1"/>
+          </a:fontRef>
+        </p:style>
+        <p:txBody>
+          <a:bodyPr rtlCol="0" anchor="ctr"/>
+          <a:lstStyle/>
+          <a:p>
+            <a:pPr algn="ctr"/>
+            <a:r>
+              <a:rPr lang="en-US" sz="2800" smtClean="0"/>
+              <a:t>Drill Down</a:t>
+            </a:r>
+            <a:endParaRPr lang="en-SG" sz="2800" dirty="0"/>
+          </a:p>
+        </p:txBody>
+      </p:sp>
     </p:spTree>
     <p:extLst>
       <p:ext uri="{BB962C8B-B14F-4D97-AF65-F5344CB8AC3E}">
-        <p14:creationId xmlns:p14="http://schemas.microsoft.com/office/powerpoint/2010/main" val="3818889738"/>
+        <p14:creationId xmlns:p14="http://schemas.microsoft.com/office/powerpoint/2010/main" val="4136440846"/>
       </p:ext>
     </p:extLst>
   </p:cSld>
@@ -9614,20 +9655,24 @@
       </p:grpSpPr>
       <p:sp>
         <p:nvSpPr>
-          <p:cNvPr id="4" name="Rectangle 3"/>
+          <p:cNvPr id="2" name="Rectangle 1"/>
           <p:cNvSpPr/>
           <p:nvPr/>
         </p:nvSpPr>
         <p:spPr>
           <a:xfrm>
-            <a:off x="611560" y="764704"/>
-            <a:ext cx="7920880" cy="1224136"/>
+            <a:off x="755576" y="836712"/>
+            <a:ext cx="3240360" cy="1944216"/>
           </a:xfrm>
           <a:prstGeom prst="rect">
             <a:avLst/>
           </a:prstGeom>
-          <a:noFill/>
-          <a:ln w="57150"/>
+          <a:solidFill>
+            <a:schemeClr val="bg2"/>
+          </a:solidFill>
+          <a:ln>
+            <a:noFill/>
+          </a:ln>
         </p:spPr>
         <p:style>
           <a:lnRef idx="2">
@@ -9656,32 +9701,98 @@
       </p:sp>
       <p:sp>
         <p:nvSpPr>
-          <p:cNvPr id="5" name="Rectangle 4"/>
-          <p:cNvSpPr/>
+          <p:cNvPr id="3" name="TextBox 2"/>
+          <p:cNvSpPr txBox="1"/>
           <p:nvPr/>
         </p:nvSpPr>
         <p:spPr>
           <a:xfrm>
-            <a:off x="611560" y="2348880"/>
-            <a:ext cx="7920880" cy="1224136"/>
+            <a:off x="899592" y="3356992"/>
+            <a:ext cx="3096344" cy="1754326"/>
           </a:xfrm>
           <a:prstGeom prst="rect">
             <a:avLst/>
           </a:prstGeom>
           <a:noFill/>
-          <a:ln w="57150"/>
+        </p:spPr>
+        <p:txBody>
+          <a:bodyPr wrap="square" rtlCol="0">
+            <a:spAutoFit/>
+          </a:bodyPr>
+          <a:lstStyle/>
+          <a:p>
+            <a:pPr marL="571500" indent="-571500">
+              <a:buFont typeface="Arial" panose="020B0604020202020204" pitchFamily="34" charset="0"/>
+              <a:buChar char="•"/>
+            </a:pPr>
+            <a:r>
+              <a:rPr lang="en-US" sz="3600" dirty="0" smtClean="0"/>
+              <a:t>Blah </a:t>
+            </a:r>
+            <a:r>
+              <a:rPr lang="en-US" sz="3600" dirty="0" err="1" smtClean="0"/>
+              <a:t>blah</a:t>
+            </a:r>
+            <a:endParaRPr lang="en-US" sz="3600" dirty="0" smtClean="0"/>
+          </a:p>
+          <a:p>
+            <a:pPr marL="571500" indent="-571500">
+              <a:buFont typeface="Arial" panose="020B0604020202020204" pitchFamily="34" charset="0"/>
+              <a:buChar char="•"/>
+            </a:pPr>
+            <a:r>
+              <a:rPr lang="en-US" sz="3600" dirty="0" smtClean="0"/>
+              <a:t>Blah </a:t>
+            </a:r>
+            <a:r>
+              <a:rPr lang="en-US" sz="3600" dirty="0" err="1" smtClean="0"/>
+              <a:t>blah</a:t>
+            </a:r>
+            <a:endParaRPr lang="en-US" sz="3600" dirty="0" smtClean="0"/>
+          </a:p>
+          <a:p>
+            <a:pPr marL="571500" indent="-571500">
+              <a:buFont typeface="Arial" panose="020B0604020202020204" pitchFamily="34" charset="0"/>
+              <a:buChar char="•"/>
+            </a:pPr>
+            <a:r>
+              <a:rPr lang="en-US" sz="3600" dirty="0" smtClean="0"/>
+              <a:t>Blah </a:t>
+            </a:r>
+            <a:r>
+              <a:rPr lang="en-US" sz="3600" dirty="0" err="1" smtClean="0"/>
+              <a:t>blah</a:t>
+            </a:r>
+            <a:endParaRPr lang="en-SG" sz="3600" dirty="0"/>
+          </a:p>
+        </p:txBody>
+      </p:sp>
+      <p:sp>
+        <p:nvSpPr>
+          <p:cNvPr id="4" name="Rectangle 3"/>
+          <p:cNvSpPr/>
+          <p:nvPr/>
+        </p:nvSpPr>
+        <p:spPr>
+          <a:xfrm>
+            <a:off x="4788024" y="836712"/>
+            <a:ext cx="3600400" cy="4392488"/>
+          </a:xfrm>
+          <a:prstGeom prst="rect">
+            <a:avLst/>
+          </a:prstGeom>
         </p:spPr>
         <p:style>
           <a:lnRef idx="2">
-            <a:schemeClr val="accent2">
+            <a:schemeClr val="accent3">
               <a:shade val="50000"/>
             </a:schemeClr>
           </a:lnRef>
           <a:fillRef idx="1">
-            <a:schemeClr val="accent2"/>
+            <a:schemeClr val="accent3"/>
           </a:fillRef>
           <a:effectRef idx="0">
-            <a:schemeClr val="accent2"/>
+            <a:schemeClr val="accent3"/>
           </a:effectRef>
           <a:fontRef idx="minor">
             <a:schemeClr val="lt1"/>
@@ -9696,97 +9807,10 @@
           </a:p>
         </p:txBody>
       </p:sp>
-      <p:sp>
-        <p:nvSpPr>
-          <p:cNvPr id="6" name="Rectangle 5"/>
-          <p:cNvSpPr/>
-          <p:nvPr/>
-        </p:nvSpPr>
-        <p:spPr>
-          <a:xfrm>
-            <a:off x="611560" y="3933056"/>
-            <a:ext cx="7920880" cy="2376264"/>
-          </a:xfrm>
-          <a:prstGeom prst="rect">
-            <a:avLst/>
-          </a:prstGeom>
-          <a:noFill/>
-          <a:ln w="57150"/>
-        </p:spPr>
-        <p:style>
-          <a:lnRef idx="2">
-            <a:schemeClr val="accent4">
-              <a:shade val="50000"/>
-            </a:schemeClr>
-          </a:lnRef>
-          <a:fillRef idx="1">
-            <a:schemeClr val="accent4"/>
-          </a:fillRef>
-          <a:effectRef idx="0">
-            <a:schemeClr val="accent4"/>
-          </a:effectRef>
-          <a:fontRef idx="minor">
-            <a:schemeClr val="lt1"/>
-          </a:fontRef>
-        </p:style>
-        <p:txBody>
-          <a:bodyPr rtlCol="0" anchor="ctr"/>
-          <a:lstStyle/>
-          <a:p>
-            <a:pPr algn="ctr"/>
-            <a:endParaRPr lang="en-SG"/>
-          </a:p>
-        </p:txBody>
-      </p:sp>
-      <p:sp>
-        <p:nvSpPr>
-          <p:cNvPr id="8" name="Step Back This Shape"/>
-          <p:cNvSpPr/>
-          <p:nvPr/>
-        </p:nvSpPr>
-        <p:spPr>
-          <a:xfrm>
-            <a:off x="6768752" y="850404"/>
-            <a:ext cx="1403648" cy="1052736"/>
-          </a:xfrm>
-          <a:prstGeom prst="rect">
-            <a:avLst/>
-          </a:prstGeom>
-          <a:ln/>
-        </p:spPr>
-        <p:style>
-          <a:lnRef idx="2">
-            <a:schemeClr val="accent1">
-              <a:shade val="50000"/>
-            </a:schemeClr>
-          </a:lnRef>
-          <a:fillRef idx="1">
-            <a:schemeClr val="accent1"/>
-          </a:fillRef>
-          <a:effectRef idx="0">
-            <a:schemeClr val="accent1"/>
-          </a:effectRef>
-          <a:fontRef idx="minor">
-            <a:schemeClr val="lt1"/>
-          </a:fontRef>
-        </p:style>
-        <p:txBody>
-          <a:bodyPr rtlCol="0" anchor="ctr"/>
-          <a:lstStyle/>
-          <a:p>
-            <a:pPr algn="ctr"/>
-            <a:r>
-              <a:rPr lang="en-US" sz="2800" smtClean="0"/>
-              <a:t>Step Back</a:t>
-            </a:r>
-            <a:endParaRPr lang="en-SG" sz="2800" dirty="0"/>
-          </a:p>
-        </p:txBody>
-      </p:sp>
     </p:spTree>
     <p:extLst>
       <p:ext uri="{BB962C8B-B14F-4D97-AF65-F5344CB8AC3E}">
-        <p14:creationId xmlns:p14="http://schemas.microsoft.com/office/powerpoint/2010/main" val="698598111"/>
+        <p14:creationId xmlns:p14="http://schemas.microsoft.com/office/powerpoint/2010/main" val="5484029"/>
       </p:ext>
     </p:extLst>
   </p:cSld>
@@ -9842,6 +9866,1626 @@
       </p:grpSpPr>
       <p:sp>
         <p:nvSpPr>
+          <p:cNvPr id="4" name="Rectangle 3"/>
+          <p:cNvSpPr/>
+          <p:nvPr/>
+        </p:nvSpPr>
+        <p:spPr>
+          <a:xfrm>
+            <a:off x="611560" y="764704"/>
+            <a:ext cx="7920880" cy="1224136"/>
+          </a:xfrm>
+          <a:prstGeom prst="rect">
+            <a:avLst/>
+          </a:prstGeom>
+          <a:noFill/>
+          <a:ln w="57150"/>
+        </p:spPr>
+        <p:style>
+          <a:lnRef idx="2">
+            <a:schemeClr val="accent1">
+              <a:shade val="50000"/>
+            </a:schemeClr>
+          </a:lnRef>
+          <a:fillRef idx="1">
+            <a:schemeClr val="accent1"/>
+          </a:fillRef>
+          <a:effectRef idx="0">
+            <a:schemeClr val="accent1"/>
+          </a:effectRef>
+          <a:fontRef idx="minor">
+            <a:schemeClr val="lt1"/>
+          </a:fontRef>
+        </p:style>
+        <p:txBody>
+          <a:bodyPr rtlCol="0" anchor="ctr"/>
+          <a:lstStyle/>
+          <a:p>
+            <a:pPr algn="ctr"/>
+            <a:endParaRPr lang="en-SG"/>
+          </a:p>
+        </p:txBody>
+      </p:sp>
+      <p:sp>
+        <p:nvSpPr>
+          <p:cNvPr id="5" name="Rectangle 4"/>
+          <p:cNvSpPr/>
+          <p:nvPr/>
+        </p:nvSpPr>
+        <p:spPr>
+          <a:xfrm>
+            <a:off x="611560" y="2348880"/>
+            <a:ext cx="7920880" cy="1224136"/>
+          </a:xfrm>
+          <a:prstGeom prst="rect">
+            <a:avLst/>
+          </a:prstGeom>
+          <a:noFill/>
+          <a:ln w="57150"/>
+        </p:spPr>
+        <p:style>
+          <a:lnRef idx="2">
+            <a:schemeClr val="accent2">
+              <a:shade val="50000"/>
+            </a:schemeClr>
+          </a:lnRef>
+          <a:fillRef idx="1">
+            <a:schemeClr val="accent2"/>
+          </a:fillRef>
+          <a:effectRef idx="0">
+            <a:schemeClr val="accent2"/>
+          </a:effectRef>
+          <a:fontRef idx="minor">
+            <a:schemeClr val="lt1"/>
+          </a:fontRef>
+        </p:style>
+        <p:txBody>
+          <a:bodyPr rtlCol="0" anchor="ctr"/>
+          <a:lstStyle/>
+          <a:p>
+            <a:pPr algn="ctr"/>
+            <a:endParaRPr lang="en-SG"/>
+          </a:p>
+        </p:txBody>
+      </p:sp>
+      <p:sp>
+        <p:nvSpPr>
+          <p:cNvPr id="6" name="Rectangle 5"/>
+          <p:cNvSpPr/>
+          <p:nvPr/>
+        </p:nvSpPr>
+        <p:spPr>
+          <a:xfrm>
+            <a:off x="611560" y="3933056"/>
+            <a:ext cx="7920880" cy="2376264"/>
+          </a:xfrm>
+          <a:prstGeom prst="rect">
+            <a:avLst/>
+          </a:prstGeom>
+          <a:noFill/>
+          <a:ln w="57150"/>
+        </p:spPr>
+        <p:style>
+          <a:lnRef idx="2">
+            <a:schemeClr val="accent4">
+              <a:shade val="50000"/>
+            </a:schemeClr>
+          </a:lnRef>
+          <a:fillRef idx="1">
+            <a:schemeClr val="accent4"/>
+          </a:fillRef>
+          <a:effectRef idx="0">
+            <a:schemeClr val="accent4"/>
+          </a:effectRef>
+          <a:fontRef idx="minor">
+            <a:schemeClr val="lt1"/>
+          </a:fontRef>
+        </p:style>
+        <p:txBody>
+          <a:bodyPr rtlCol="0" anchor="ctr"/>
+          <a:lstStyle/>
+          <a:p>
+            <a:pPr algn="ctr"/>
+            <a:endParaRPr lang="en-SG"/>
+          </a:p>
+        </p:txBody>
+      </p:sp>
+      <p:sp>
+        <p:nvSpPr>
+          <p:cNvPr id="8" name="Drill Down This Shape" hidden="1"/>
+          <p:cNvSpPr/>
+          <p:nvPr/>
+        </p:nvSpPr>
+        <p:spPr>
+          <a:xfrm>
+            <a:off x="6768752" y="850404"/>
+            <a:ext cx="1403648" cy="1052736"/>
+          </a:xfrm>
+          <a:prstGeom prst="rect">
+            <a:avLst/>
+          </a:prstGeom>
+          <a:ln/>
+        </p:spPr>
+        <p:style>
+          <a:lnRef idx="2">
+            <a:schemeClr val="accent1">
+              <a:shade val="50000"/>
+            </a:schemeClr>
+          </a:lnRef>
+          <a:fillRef idx="1">
+            <a:schemeClr val="accent1"/>
+          </a:fillRef>
+          <a:effectRef idx="0">
+            <a:schemeClr val="accent1"/>
+          </a:effectRef>
+          <a:fontRef idx="minor">
+            <a:schemeClr val="lt1"/>
+          </a:fontRef>
+        </p:style>
+        <p:txBody>
+          <a:bodyPr rtlCol="0" anchor="ctr"/>
+          <a:lstStyle/>
+          <a:p>
+            <a:pPr algn="ctr"/>
+            <a:endParaRPr lang="en-SG" sz="2800" dirty="0"/>
+          </a:p>
+        </p:txBody>
+      </p:sp>
+      <p:pic>
+        <p:nvPicPr>
+          <p:cNvPr id="2050" name="PPTZoomInShape201506261628220442"/>
+          <p:cNvPicPr>
+            <a:picLocks noChangeAspect="1" noChangeArrowheads="1"/>
+          </p:cNvPicPr>
+          <p:nvPr/>
+        </p:nvPicPr>
+        <p:blipFill>
+          <a:blip r:embed="rId2" cstate="print">
+            <a:extLst>
+              <a:ext uri="{28A0092B-C50C-407E-A947-70E740481C1C}">
+                <a14:useLocalDpi xmlns:a14="http://schemas.microsoft.com/office/drawing/2010/main" val="0"/>
+              </a:ext>
+            </a:extLst>
+          </a:blip>
+          <a:srcRect/>
+          <a:stretch>
+            <a:fillRect/>
+          </a:stretch>
+        </p:blipFill>
+        <p:spPr bwMode="auto">
+          <a:xfrm>
+            <a:off x="6574564" y="850404"/>
+            <a:ext cx="1792025" cy="1052736"/>
+          </a:xfrm>
+          <a:prstGeom prst="rect">
+            <a:avLst/>
+          </a:prstGeom>
+          <a:ln/>
+          <a:extLst>
+            <a:ext uri="{909E8E84-426E-40DD-AFC4-6F175D3DCCD1}">
+              <a14:hiddenFill xmlns:a14="http://schemas.microsoft.com/office/drawing/2010/main">
+                <a:solidFill>
+                  <a:schemeClr val="accent1"/>
+                </a:solidFill>
+              </a14:hiddenFill>
+            </a:ext>
+            <a:ext uri="{91240B29-F687-4F45-9708-019B960494DF}">
+              <a14:hiddenLine xmlns:a14="http://schemas.microsoft.com/office/drawing/2010/main" w="9525">
+                <a:solidFill>
+                  <a:schemeClr val="tx1"/>
+                </a:solidFill>
+                <a:miter lim="800000"/>
+                <a:headEnd/>
+                <a:tailEnd/>
+              </a14:hiddenLine>
+            </a:ext>
+            <a:ext uri="{AF507438-7753-43E0-B8FC-AC1667EBCBE1}">
+              <a14:hiddenEffects xmlns:a14="http://schemas.microsoft.com/office/drawing/2010/main">
+                <a:effectLst>
+                  <a:outerShdw dist="35921" dir="2700000" algn="ctr" rotWithShape="0">
+                    <a:schemeClr val="bg2"/>
+                  </a:outerShdw>
+                </a:effectLst>
+              </a14:hiddenEffects>
+            </a:ext>
+          </a:extLst>
+        </p:spPr>
+      </p:pic>
+    </p:spTree>
+    <p:extLst>
+      <p:ext uri="{BB962C8B-B14F-4D97-AF65-F5344CB8AC3E}">
+        <p14:creationId xmlns:p14="http://schemas.microsoft.com/office/powerpoint/2010/main" val="483787502"/>
+      </p:ext>
+    </p:extLst>
+  </p:cSld>
+  <p:clrMapOvr>
+    <a:masterClrMapping/>
+  </p:clrMapOvr>
+  <mc:AlternateContent xmlns:mc="http://schemas.openxmlformats.org/markup-compatibility/2006" xmlns:p14="http://schemas.microsoft.com/office/powerpoint/2010/main">
+    <mc:Choice Requires="p14">
+      <p:transition spd="med" p14:dur="700">
+        <p:fade/>
+      </p:transition>
+    </mc:Choice>
+    <mc:Fallback xmlns="">
+      <p:transition spd="med">
+        <p:fade/>
+      </p:transition>
+    </mc:Fallback>
+  </mc:AlternateContent>
+  <p:timing>
+    <p:tnLst>
+      <p:par>
+        <p:cTn id="1" dur="indefinite" restart="never" nodeType="tmRoot">
+          <p:childTnLst>
+            <p:seq concurrent="1" nextAc="seek">
+              <p:cTn id="2" dur="indefinite" nodeType="mainSeq">
+                <p:childTnLst>
+                  <p:par>
+                    <p:cTn id="3" fill="hold">
+                      <p:stCondLst>
+                        <p:cond delay="indefinite"/>
+                      </p:stCondLst>
+                      <p:childTnLst>
+                        <p:par>
+                          <p:cTn id="4" fill="hold">
+                            <p:stCondLst>
+                              <p:cond delay="0"/>
+                            </p:stCondLst>
+                            <p:childTnLst>
+                              <p:par>
+                                <p:cTn id="5" presetID="10" presetClass="entr" presetSubtype="0" fill="hold" nodeType="clickEffect">
+                                  <p:stCondLst>
+                                    <p:cond delay="0"/>
+                                  </p:stCondLst>
+                                  <p:childTnLst>
+                                    <p:set>
+                                      <p:cBhvr>
+                                        <p:cTn id="6" dur="1" fill="hold">
+                                          <p:stCondLst>
+                                            <p:cond delay="0"/>
+                                          </p:stCondLst>
+                                        </p:cTn>
+                                        <p:tgtEl>
+                                          <p:spTgt spid="2050"/>
+                                        </p:tgtEl>
+                                        <p:attrNameLst>
+                                          <p:attrName>style.visibility</p:attrName>
+                                        </p:attrNameLst>
+                                      </p:cBhvr>
+                                      <p:to>
+                                        <p:strVal val="visible"/>
+                                      </p:to>
+                                    </p:set>
+                                    <p:animEffect transition="in" filter="fade">
+                                      <p:cBhvr>
+                                        <p:cTn id="7" dur="500"/>
+                                        <p:tgtEl>
+                                          <p:spTgt spid="2050"/>
+                                        </p:tgtEl>
+                                      </p:cBhvr>
+                                    </p:animEffect>
+                                  </p:childTnLst>
+                                </p:cTn>
+                              </p:par>
+                            </p:childTnLst>
+                          </p:cTn>
+                        </p:par>
+                      </p:childTnLst>
+                    </p:cTn>
+                  </p:par>
+                </p:childTnLst>
+              </p:cTn>
+              <p:prevCondLst>
+                <p:cond evt="onPrev" delay="0">
+                  <p:tgtEl>
+                    <p:sldTgt/>
+                  </p:tgtEl>
+                </p:cond>
+              </p:prevCondLst>
+              <p:nextCondLst>
+                <p:cond evt="onNext" delay="0">
+                  <p:tgtEl>
+                    <p:sldTgt/>
+                  </p:tgtEl>
+                </p:cond>
+              </p:nextCondLst>
+            </p:seq>
+          </p:childTnLst>
+        </p:cTn>
+      </p:par>
+    </p:tnLst>
+  </p:timing>
+</p:sld>
+</file>
+
+<file path=ppt/slides/slide13.xml><?xml version="1.0" encoding="utf-8"?>
+<p:sld xmlns:a="http://schemas.openxmlformats.org/drawingml/2006/main" xmlns:r="http://schemas.openxmlformats.org/officeDocument/2006/relationships" xmlns:p="http://schemas.openxmlformats.org/presentationml/2006/main">
+  <p:cSld name="PPTLabsZoomIn201506261628220467">
+    <p:bg>
+      <p:bgPr>
+        <a:solidFill>
+          <a:schemeClr val="bg1"/>
+        </a:solidFill>
+        <a:effectLst/>
+      </p:bgPr>
+    </p:bg>
+    <p:spTree>
+      <p:nvGrpSpPr>
+        <p:cNvPr id="1" name=""/>
+        <p:cNvGrpSpPr/>
+        <p:nvPr/>
+      </p:nvGrpSpPr>
+      <p:grpSpPr>
+        <a:xfrm>
+          <a:off x="0" y="0"/>
+          <a:ext cx="0" cy="0"/>
+          <a:chOff x="0" y="0"/>
+          <a:chExt cx="0" cy="0"/>
+        </a:xfrm>
+      </p:grpSpPr>
+      <p:pic>
+        <p:nvPicPr>
+          <p:cNvPr id="3074" name="PPTZoomInShape201506261628220792"/>
+          <p:cNvPicPr>
+            <a:picLocks noChangeArrowheads="1"/>
+          </p:cNvPicPr>
+          <p:nvPr/>
+        </p:nvPicPr>
+        <p:blipFill>
+          <a:blip r:embed="rId2">
+            <a:extLst>
+              <a:ext uri="{28A0092B-C50C-407E-A947-70E740481C1C}">
+                <a14:useLocalDpi xmlns:a14="http://schemas.microsoft.com/office/drawing/2010/main" val="0"/>
+              </a:ext>
+            </a:extLst>
+          </a:blip>
+          <a:srcRect/>
+          <a:stretch>
+            <a:fillRect/>
+          </a:stretch>
+        </p:blipFill>
+        <p:spPr bwMode="auto">
+          <a:xfrm>
+            <a:off x="0" y="0"/>
+            <a:ext cx="9144000" cy="6858000"/>
+          </a:xfrm>
+          <a:prstGeom prst="rect">
+            <a:avLst/>
+          </a:prstGeom>
+          <a:ln/>
+          <a:extLst>
+            <a:ext uri="{909E8E84-426E-40DD-AFC4-6F175D3DCCD1}">
+              <a14:hiddenFill xmlns:a14="http://schemas.microsoft.com/office/drawing/2010/main">
+                <a:solidFill>
+                  <a:schemeClr val="accent1"/>
+                </a:solidFill>
+              </a14:hiddenFill>
+            </a:ext>
+            <a:ext uri="{91240B29-F687-4F45-9708-019B960494DF}">
+              <a14:hiddenLine xmlns:a14="http://schemas.microsoft.com/office/drawing/2010/main" w="9525">
+                <a:solidFill>
+                  <a:schemeClr val="tx1"/>
+                </a:solidFill>
+                <a:miter lim="800000"/>
+                <a:headEnd/>
+                <a:tailEnd/>
+              </a14:hiddenLine>
+            </a:ext>
+            <a:ext uri="{AF507438-7753-43E0-B8FC-AC1667EBCBE1}">
+              <a14:hiddenEffects xmlns:a14="http://schemas.microsoft.com/office/drawing/2010/main">
+                <a:effectLst>
+                  <a:outerShdw dist="35921" dir="2700000" algn="ctr" rotWithShape="0">
+                    <a:schemeClr val="bg2"/>
+                  </a:outerShdw>
+                </a:effectLst>
+              </a14:hiddenEffects>
+            </a:ext>
+          </a:extLst>
+        </p:spPr>
+      </p:pic>
+      <p:pic>
+        <p:nvPicPr>
+          <p:cNvPr id="7" name="PPTZoomInShape201506261628220442"/>
+          <p:cNvPicPr>
+            <a:picLocks noChangeArrowheads="1"/>
+          </p:cNvPicPr>
+          <p:nvPr/>
+        </p:nvPicPr>
+        <p:blipFill>
+          <a:blip r:embed="rId3">
+            <a:extLst>
+              <a:ext uri="{28A0092B-C50C-407E-A947-70E740481C1C}">
+                <a14:useLocalDpi xmlns:a14="http://schemas.microsoft.com/office/drawing/2010/main" val="0"/>
+              </a:ext>
+            </a:extLst>
+          </a:blip>
+          <a:srcRect/>
+          <a:stretch>
+            <a:fillRect/>
+          </a:stretch>
+        </p:blipFill>
+        <p:spPr bwMode="auto">
+          <a:xfrm>
+            <a:off x="-1" y="0"/>
+            <a:ext cx="9144000" cy="5371699"/>
+          </a:xfrm>
+          <a:prstGeom prst="rect">
+            <a:avLst/>
+          </a:prstGeom>
+          <a:ln/>
+          <a:extLst>
+            <a:ext uri="{909E8E84-426E-40DD-AFC4-6F175D3DCCD1}">
+              <a14:hiddenFill xmlns:a14="http://schemas.microsoft.com/office/drawing/2010/main">
+                <a:solidFill>
+                  <a:schemeClr val="accent1"/>
+                </a:solidFill>
+              </a14:hiddenFill>
+            </a:ext>
+            <a:ext uri="{91240B29-F687-4F45-9708-019B960494DF}">
+              <a14:hiddenLine xmlns:a14="http://schemas.microsoft.com/office/drawing/2010/main" w="9525">
+                <a:solidFill>
+                  <a:schemeClr val="tx1"/>
+                </a:solidFill>
+                <a:miter lim="800000"/>
+                <a:headEnd/>
+                <a:tailEnd/>
+              </a14:hiddenLine>
+            </a:ext>
+            <a:ext uri="{AF507438-7753-43E0-B8FC-AC1667EBCBE1}">
+              <a14:hiddenEffects xmlns:a14="http://schemas.microsoft.com/office/drawing/2010/main">
+                <a:effectLst>
+                  <a:outerShdw dist="35921" dir="2700000" algn="ctr" rotWithShape="0">
+                    <a:schemeClr val="bg2"/>
+                  </a:outerShdw>
+                </a:effectLst>
+              </a14:hiddenEffects>
+            </a:ext>
+          </a:extLst>
+        </p:spPr>
+      </p:pic>
+      <p:pic>
+        <p:nvPicPr>
+          <p:cNvPr id="10" name="PPTZoomInShape201506261628220792"/>
+          <p:cNvPicPr>
+            <a:picLocks noChangeArrowheads="1"/>
+          </p:cNvPicPr>
+          <p:nvPr/>
+        </p:nvPicPr>
+        <p:blipFill>
+          <a:blip r:embed="rId2">
+            <a:extLst>
+              <a:ext uri="{28A0092B-C50C-407E-A947-70E740481C1C}">
+                <a14:useLocalDpi xmlns:a14="http://schemas.microsoft.com/office/drawing/2010/main" val="0"/>
+              </a:ext>
+            </a:extLst>
+          </a:blip>
+          <a:srcRect/>
+          <a:stretch>
+            <a:fillRect/>
+          </a:stretch>
+        </p:blipFill>
+        <p:spPr bwMode="auto">
+          <a:xfrm>
+            <a:off x="0" y="0"/>
+            <a:ext cx="9144000" cy="6858000"/>
+          </a:xfrm>
+          <a:prstGeom prst="rect">
+            <a:avLst/>
+          </a:prstGeom>
+          <a:ln/>
+          <a:extLst>
+            <a:ext uri="{909E8E84-426E-40DD-AFC4-6F175D3DCCD1}">
+              <a14:hiddenFill xmlns:a14="http://schemas.microsoft.com/office/drawing/2010/main">
+                <a:solidFill>
+                  <a:schemeClr val="accent1"/>
+                </a:solidFill>
+              </a14:hiddenFill>
+            </a:ext>
+            <a:ext uri="{91240B29-F687-4F45-9708-019B960494DF}">
+              <a14:hiddenLine xmlns:a14="http://schemas.microsoft.com/office/drawing/2010/main" w="9525">
+                <a:solidFill>
+                  <a:schemeClr val="tx1"/>
+                </a:solidFill>
+                <a:miter lim="800000"/>
+                <a:headEnd/>
+                <a:tailEnd/>
+              </a14:hiddenLine>
+            </a:ext>
+            <a:ext uri="{AF507438-7753-43E0-B8FC-AC1667EBCBE1}">
+              <a14:hiddenEffects xmlns:a14="http://schemas.microsoft.com/office/drawing/2010/main">
+                <a:effectLst>
+                  <a:outerShdw dist="35921" dir="2700000" algn="ctr" rotWithShape="0">
+                    <a:schemeClr val="bg2"/>
+                  </a:outerShdw>
+                </a:effectLst>
+              </a14:hiddenEffects>
+            </a:ext>
+          </a:extLst>
+        </p:spPr>
+      </p:pic>
+      <p:pic>
+        <p:nvPicPr>
+          <p:cNvPr id="2" name="PPTIndicator201506261628220892"/>
+          <p:cNvPicPr>
+            <a:picLocks/>
+          </p:cNvPicPr>
+          <p:nvPr/>
+        </p:nvPicPr>
+        <p:blipFill>
+          <a:blip r:embed="rId4" cstate="print">
+            <a:extLst>
+              <a:ext uri="{28A0092B-C50C-407E-A947-70E740481C1C}">
+                <a14:useLocalDpi xmlns:a14="http://schemas.microsoft.com/office/drawing/2010/main" val="0"/>
+              </a:ext>
+            </a:extLst>
+          </a:blip>
+          <a:stretch>
+            <a:fillRect/>
+          </a:stretch>
+        </p:blipFill>
+        <p:spPr>
+          <a:xfrm>
+            <a:off x="7620000" y="0"/>
+            <a:ext cx="1524000" cy="1066800"/>
+          </a:xfrm>
+          <a:prstGeom prst="rect">
+            <a:avLst/>
+          </a:prstGeom>
+        </p:spPr>
+      </p:pic>
+    </p:spTree>
+    <p:extLst>
+      <p:ext uri="{BB962C8B-B14F-4D97-AF65-F5344CB8AC3E}">
+        <p14:creationId xmlns:p14="http://schemas.microsoft.com/office/powerpoint/2010/main" val="798302823"/>
+      </p:ext>
+    </p:extLst>
+  </p:cSld>
+  <p:clrMapOvr>
+    <a:masterClrMapping/>
+  </p:clrMapOvr>
+  <mc:AlternateContent xmlns:mc="http://schemas.openxmlformats.org/markup-compatibility/2006">
+    <mc:Choice xmlns:p14="http://schemas.microsoft.com/office/powerpoint/2010/main" Requires="p14">
+      <p:transition spd="med" p14:dur="700" advClick="0" advTm="0"/>
+    </mc:Choice>
+    <mc:Fallback>
+      <p:transition spd="med" advClick="0" advTm="0"/>
+    </mc:Fallback>
+  </mc:AlternateContent>
+  <p:timing>
+    <p:tnLst>
+      <p:par>
+        <p:cTn id="1" dur="indefinite" restart="never" nodeType="tmRoot">
+          <p:childTnLst>
+            <p:seq concurrent="1" nextAc="seek">
+              <p:cTn id="2" dur="indefinite" nodeType="mainSeq">
+                <p:childTnLst>
+                  <p:par>
+                    <p:cTn id="3" fill="hold">
+                      <p:stCondLst>
+                        <p:cond delay="indefinite"/>
+                        <p:cond evt="onBegin" delay="0">
+                          <p:tn val="2"/>
+                        </p:cond>
+                      </p:stCondLst>
+                      <p:childTnLst>
+                        <p:par>
+                          <p:cTn id="4" fill="hold">
+                            <p:stCondLst>
+                              <p:cond delay="0"/>
+                            </p:stCondLst>
+                            <p:childTnLst>
+                              <p:par>
+                                <p:cTn id="5" presetID="10" presetClass="exit" presetSubtype="0" fill="hold" nodeType="withEffect">
+                                  <p:stCondLst>
+                                    <p:cond delay="0"/>
+                                  </p:stCondLst>
+                                  <p:childTnLst>
+                                    <p:animEffect transition="out" filter="fade">
+                                      <p:cBhvr>
+                                        <p:cTn id="6" dur="10"/>
+                                        <p:tgtEl>
+                                          <p:spTgt spid="10"/>
+                                        </p:tgtEl>
+                                      </p:cBhvr>
+                                    </p:animEffect>
+                                    <p:set>
+                                      <p:cBhvr>
+                                        <p:cTn id="7" dur="1" fill="hold">
+                                          <p:stCondLst>
+                                            <p:cond delay="9"/>
+                                          </p:stCondLst>
+                                        </p:cTn>
+                                        <p:tgtEl>
+                                          <p:spTgt spid="10"/>
+                                        </p:tgtEl>
+                                        <p:attrNameLst>
+                                          <p:attrName>style.visibility</p:attrName>
+                                        </p:attrNameLst>
+                                      </p:cBhvr>
+                                      <p:to>
+                                        <p:strVal val="hidden"/>
+                                      </p:to>
+                                    </p:set>
+                                  </p:childTnLst>
+                                </p:cTn>
+                              </p:par>
+                              <p:par>
+                                <p:cTn id="8" presetID="1" presetClass="entr" presetSubtype="0" fill="hold" nodeType="withEffect">
+                                  <p:stCondLst>
+                                    <p:cond delay="0"/>
+                                  </p:stCondLst>
+                                  <p:childTnLst>
+                                    <p:set>
+                                      <p:cBhvr>
+                                        <p:cTn id="9" dur="1" fill="hold">
+                                          <p:stCondLst>
+                                            <p:cond delay="0"/>
+                                          </p:stCondLst>
+                                        </p:cTn>
+                                        <p:tgtEl>
+                                          <p:spTgt spid="2"/>
+                                        </p:tgtEl>
+                                        <p:attrNameLst>
+                                          <p:attrName>style.visibility</p:attrName>
+                                        </p:attrNameLst>
+                                      </p:cBhvr>
+                                      <p:to>
+                                        <p:strVal val="visible"/>
+                                      </p:to>
+                                    </p:set>
+                                  </p:childTnLst>
+                                </p:cTn>
+                              </p:par>
+                              <p:par>
+                                <p:cTn id="10" presetID="1" presetClass="exit" presetSubtype="0" fill="hold" nodeType="withEffect">
+                                  <p:stCondLst>
+                                    <p:cond delay="0"/>
+                                  </p:stCondLst>
+                                  <p:childTnLst>
+                                    <p:set>
+                                      <p:cBhvr>
+                                        <p:cTn id="11" dur="1" fill="hold">
+                                          <p:stCondLst>
+                                            <p:cond delay="0"/>
+                                          </p:stCondLst>
+                                        </p:cTn>
+                                        <p:tgtEl>
+                                          <p:spTgt spid="2"/>
+                                        </p:tgtEl>
+                                        <p:attrNameLst>
+                                          <p:attrName>style.visibility</p:attrName>
+                                        </p:attrNameLst>
+                                      </p:cBhvr>
+                                      <p:to>
+                                        <p:strVal val="hidden"/>
+                                      </p:to>
+                                    </p:set>
+                                  </p:childTnLst>
+                                </p:cTn>
+                              </p:par>
+                              <p:par>
+                                <p:cTn id="12" presetID="10" presetClass="exit" presetSubtype="0" fill="hold" nodeType="withEffect">
+                                  <p:stCondLst>
+                                    <p:cond delay="0"/>
+                                  </p:stCondLst>
+                                  <p:childTnLst>
+                                    <p:animEffect transition="out" filter="fade">
+                                      <p:cBhvr>
+                                        <p:cTn id="13" dur="500"/>
+                                        <p:tgtEl>
+                                          <p:spTgt spid="3074"/>
+                                        </p:tgtEl>
+                                      </p:cBhvr>
+                                    </p:animEffect>
+                                    <p:set>
+                                      <p:cBhvr>
+                                        <p:cTn id="14" dur="1" fill="hold">
+                                          <p:stCondLst>
+                                            <p:cond delay="499"/>
+                                          </p:stCondLst>
+                                        </p:cTn>
+                                        <p:tgtEl>
+                                          <p:spTgt spid="3074"/>
+                                        </p:tgtEl>
+                                        <p:attrNameLst>
+                                          <p:attrName>style.visibility</p:attrName>
+                                        </p:attrNameLst>
+                                      </p:cBhvr>
+                                      <p:to>
+                                        <p:strVal val="hidden"/>
+                                      </p:to>
+                                    </p:set>
+                                  </p:childTnLst>
+                                </p:cTn>
+                              </p:par>
+                              <p:par>
+                                <p:cTn id="15" presetID="42" presetClass="path" presetSubtype="0" fill="hold" nodeType="withEffect">
+                                  <p:stCondLst>
+                                    <p:cond delay="0"/>
+                                  </p:stCondLst>
+                                  <p:childTnLst>
+                                    <p:animMotion origin="layout" path="M 0 0 C 0.1584961 -0.09544163 0.1584961 -0.09544163 0.3169923 -0.1908833 E" pathEditMode="relative" ptsTypes="">
+                                      <p:cBhvr>
+                                        <p:cTn id="16" dur="1" fill="hold"/>
+                                        <p:tgtEl>
+                                          <p:spTgt spid="7"/>
+                                        </p:tgtEl>
+                                        <p:attrNameLst>
+                                          <p:attrName>ppt_x</p:attrName>
+                                          <p:attrName>ppt_y</p:attrName>
+                                        </p:attrNameLst>
+                                      </p:cBhvr>
+                                    </p:animMotion>
+                                  </p:childTnLst>
+                                </p:cTn>
+                              </p:par>
+                              <p:par>
+                                <p:cTn id="17" presetID="6" presetClass="emph" presetSubtype="0" fill="hold" nodeType="withEffect">
+                                  <p:stCondLst>
+                                    <p:cond delay="0"/>
+                                  </p:stCondLst>
+                                  <p:childTnLst>
+                                    <p:animScale>
+                                      <p:cBhvr>
+                                        <p:cTn id="18" dur="1" fill="hold"/>
+                                        <p:tgtEl>
+                                          <p:spTgt spid="7"/>
+                                        </p:tgtEl>
+                                      </p:cBhvr>
+                                      <p:by x="19598" y="19598"/>
+                                    </p:animScale>
+                                  </p:childTnLst>
+                                </p:cTn>
+                              </p:par>
+                              <p:par>
+                                <p:cTn id="19" presetID="42" presetClass="path" presetSubtype="0" fill="hold" nodeType="withEffect">
+                                  <p:stCondLst>
+                                    <p:cond delay="0"/>
+                                  </p:stCondLst>
+                                  <p:childTnLst>
+                                    <p:animMotion origin="layout" path="M 0.3169921 -0.1908833 C 0.158496 -0.07013497 0.158496 -0.07013497 -5.960464E-08 0.05061343 E" pathEditMode="relative" ptsTypes="">
+                                      <p:cBhvr>
+                                        <p:cTn id="20" dur="500" fill="hold"/>
+                                        <p:tgtEl>
+                                          <p:spTgt spid="7"/>
+                                        </p:tgtEl>
+                                        <p:attrNameLst>
+                                          <p:attrName>ppt_x</p:attrName>
+                                          <p:attrName>ppt_y</p:attrName>
+                                        </p:attrNameLst>
+                                      </p:cBhvr>
+                                    </p:animMotion>
+                                  </p:childTnLst>
+                                </p:cTn>
+                              </p:par>
+                              <p:par>
+                                <p:cTn id="21" presetID="6" presetClass="emph" presetSubtype="0" fill="hold" nodeType="withEffect">
+                                  <p:stCondLst>
+                                    <p:cond delay="0"/>
+                                  </p:stCondLst>
+                                  <p:childTnLst>
+                                    <p:animScale>
+                                      <p:cBhvr>
+                                        <p:cTn id="22" dur="500" fill="hold"/>
+                                        <p:tgtEl>
+                                          <p:spTgt spid="7"/>
+                                        </p:tgtEl>
+                                      </p:cBhvr>
+                                      <p:by x="427964" y="427964"/>
+                                    </p:animScale>
+                                  </p:childTnLst>
+                                </p:cTn>
+                              </p:par>
+                            </p:childTnLst>
+                          </p:cTn>
+                        </p:par>
+                      </p:childTnLst>
+                    </p:cTn>
+                  </p:par>
+                </p:childTnLst>
+              </p:cTn>
+              <p:prevCondLst>
+                <p:cond evt="onPrev" delay="0">
+                  <p:tgtEl>
+                    <p:sldTgt/>
+                  </p:tgtEl>
+                </p:cond>
+              </p:prevCondLst>
+              <p:nextCondLst>
+                <p:cond evt="onNext" delay="0">
+                  <p:tgtEl>
+                    <p:sldTgt/>
+                  </p:tgtEl>
+                </p:cond>
+              </p:nextCondLst>
+            </p:seq>
+          </p:childTnLst>
+        </p:cTn>
+      </p:par>
+    </p:tnLst>
+  </p:timing>
+</p:sld>
+</file>
+
+<file path=ppt/slides/slide14.xml><?xml version="1.0" encoding="utf-8"?>
+<p:sld xmlns:a="http://schemas.openxmlformats.org/drawingml/2006/main" xmlns:r="http://schemas.openxmlformats.org/officeDocument/2006/relationships" xmlns:p="http://schemas.openxmlformats.org/presentationml/2006/main">
+  <p:cSld>
+    <p:bg>
+      <p:bgPr>
+        <a:solidFill>
+          <a:schemeClr val="bg1"/>
+        </a:solidFill>
+        <a:effectLst/>
+      </p:bgPr>
+    </p:bg>
+    <p:spTree>
+      <p:nvGrpSpPr>
+        <p:cNvPr id="1" name=""/>
+        <p:cNvGrpSpPr/>
+        <p:nvPr/>
+      </p:nvGrpSpPr>
+      <p:grpSpPr>
+        <a:xfrm>
+          <a:off x="0" y="0"/>
+          <a:ext cx="0" cy="0"/>
+          <a:chOff x="0" y="0"/>
+          <a:chExt cx="0" cy="0"/>
+        </a:xfrm>
+      </p:grpSpPr>
+      <p:sp>
+        <p:nvSpPr>
+          <p:cNvPr id="2" name="Rectangle 1"/>
+          <p:cNvSpPr/>
+          <p:nvPr/>
+        </p:nvSpPr>
+        <p:spPr>
+          <a:xfrm>
+            <a:off x="755576" y="836712"/>
+            <a:ext cx="3240360" cy="1944216"/>
+          </a:xfrm>
+          <a:prstGeom prst="rect">
+            <a:avLst/>
+          </a:prstGeom>
+          <a:solidFill>
+            <a:schemeClr val="bg2"/>
+          </a:solidFill>
+          <a:ln>
+            <a:noFill/>
+          </a:ln>
+        </p:spPr>
+        <p:style>
+          <a:lnRef idx="2">
+            <a:schemeClr val="accent1">
+              <a:shade val="50000"/>
+            </a:schemeClr>
+          </a:lnRef>
+          <a:fillRef idx="1">
+            <a:schemeClr val="accent1"/>
+          </a:fillRef>
+          <a:effectRef idx="0">
+            <a:schemeClr val="accent1"/>
+          </a:effectRef>
+          <a:fontRef idx="minor">
+            <a:schemeClr val="lt1"/>
+          </a:fontRef>
+        </p:style>
+        <p:txBody>
+          <a:bodyPr rtlCol="0" anchor="ctr"/>
+          <a:lstStyle/>
+          <a:p>
+            <a:pPr algn="ctr"/>
+            <a:endParaRPr lang="en-SG"/>
+          </a:p>
+        </p:txBody>
+      </p:sp>
+      <p:sp>
+        <p:nvSpPr>
+          <p:cNvPr id="3" name="TextBox 2"/>
+          <p:cNvSpPr txBox="1"/>
+          <p:nvPr/>
+        </p:nvSpPr>
+        <p:spPr>
+          <a:xfrm>
+            <a:off x="899592" y="3356992"/>
+            <a:ext cx="3096344" cy="1754326"/>
+          </a:xfrm>
+          <a:prstGeom prst="rect">
+            <a:avLst/>
+          </a:prstGeom>
+          <a:noFill/>
+        </p:spPr>
+        <p:txBody>
+          <a:bodyPr wrap="square" rtlCol="0">
+            <a:spAutoFit/>
+          </a:bodyPr>
+          <a:lstStyle/>
+          <a:p>
+            <a:pPr marL="571500" indent="-571500">
+              <a:buFont typeface="Arial" panose="020B0604020202020204" pitchFamily="34" charset="0"/>
+              <a:buChar char="•"/>
+            </a:pPr>
+            <a:r>
+              <a:rPr lang="en-US" sz="3600" dirty="0" smtClean="0"/>
+              <a:t>Blah </a:t>
+            </a:r>
+            <a:r>
+              <a:rPr lang="en-US" sz="3600" dirty="0" err="1" smtClean="0"/>
+              <a:t>blah</a:t>
+            </a:r>
+            <a:endParaRPr lang="en-US" sz="3600" dirty="0" smtClean="0"/>
+          </a:p>
+          <a:p>
+            <a:pPr marL="571500" indent="-571500">
+              <a:buFont typeface="Arial" panose="020B0604020202020204" pitchFamily="34" charset="0"/>
+              <a:buChar char="•"/>
+            </a:pPr>
+            <a:r>
+              <a:rPr lang="en-US" sz="3600" dirty="0" smtClean="0"/>
+              <a:t>Blah </a:t>
+            </a:r>
+            <a:r>
+              <a:rPr lang="en-US" sz="3600" dirty="0" err="1" smtClean="0"/>
+              <a:t>blah</a:t>
+            </a:r>
+            <a:endParaRPr lang="en-US" sz="3600" dirty="0" smtClean="0"/>
+          </a:p>
+          <a:p>
+            <a:pPr marL="571500" indent="-571500">
+              <a:buFont typeface="Arial" panose="020B0604020202020204" pitchFamily="34" charset="0"/>
+              <a:buChar char="•"/>
+            </a:pPr>
+            <a:r>
+              <a:rPr lang="en-US" sz="3600" dirty="0" smtClean="0"/>
+              <a:t>Blah </a:t>
+            </a:r>
+            <a:r>
+              <a:rPr lang="en-US" sz="3600" dirty="0" err="1" smtClean="0"/>
+              <a:t>blah</a:t>
+            </a:r>
+            <a:endParaRPr lang="en-SG" sz="3600" dirty="0"/>
+          </a:p>
+        </p:txBody>
+      </p:sp>
+      <p:sp>
+        <p:nvSpPr>
+          <p:cNvPr id="4" name="Rectangle 3"/>
+          <p:cNvSpPr/>
+          <p:nvPr/>
+        </p:nvSpPr>
+        <p:spPr>
+          <a:xfrm>
+            <a:off x="4788024" y="836712"/>
+            <a:ext cx="3600400" cy="4392488"/>
+          </a:xfrm>
+          <a:prstGeom prst="rect">
+            <a:avLst/>
+          </a:prstGeom>
+        </p:spPr>
+        <p:style>
+          <a:lnRef idx="2">
+            <a:schemeClr val="accent3">
+              <a:shade val="50000"/>
+            </a:schemeClr>
+          </a:lnRef>
+          <a:fillRef idx="1">
+            <a:schemeClr val="accent3"/>
+          </a:fillRef>
+          <a:effectRef idx="0">
+            <a:schemeClr val="accent3"/>
+          </a:effectRef>
+          <a:fontRef idx="minor">
+            <a:schemeClr val="lt1"/>
+          </a:fontRef>
+        </p:style>
+        <p:txBody>
+          <a:bodyPr rtlCol="0" anchor="ctr"/>
+          <a:lstStyle/>
+          <a:p>
+            <a:pPr algn="ctr"/>
+            <a:endParaRPr lang="en-SG"/>
+          </a:p>
+        </p:txBody>
+      </p:sp>
+    </p:spTree>
+    <p:extLst>
+      <p:ext uri="{BB962C8B-B14F-4D97-AF65-F5344CB8AC3E}">
+        <p14:creationId xmlns:p14="http://schemas.microsoft.com/office/powerpoint/2010/main" val="1765406563"/>
+      </p:ext>
+    </p:extLst>
+  </p:cSld>
+  <p:clrMapOvr>
+    <a:masterClrMapping/>
+  </p:clrMapOvr>
+  <mc:AlternateContent xmlns:mc="http://schemas.openxmlformats.org/markup-compatibility/2006">
+    <mc:Choice xmlns:p14="http://schemas.microsoft.com/office/powerpoint/2010/main" Requires="p14">
+      <p:transition p14:dur="250">
+        <p:fade/>
+      </p:transition>
+    </mc:Choice>
+    <mc:Fallback>
+      <p:transition>
+        <p:fade/>
+      </p:transition>
+    </mc:Fallback>
+  </mc:AlternateContent>
+  <p:timing>
+    <p:tnLst>
+      <p:par>
+        <p:cTn id="1" dur="indefinite" restart="never" nodeType="tmRoot"/>
+      </p:par>
+    </p:tnLst>
+  </p:timing>
+</p:sld>
+</file>
+
+<file path=ppt/slides/slide15.xml><?xml version="1.0" encoding="utf-8"?>
+<p:sld xmlns:a="http://schemas.openxmlformats.org/drawingml/2006/main" xmlns:r="http://schemas.openxmlformats.org/officeDocument/2006/relationships" xmlns:p="http://schemas.openxmlformats.org/presentationml/2006/main">
+  <p:cSld>
+    <p:spTree>
+      <p:nvGrpSpPr>
+        <p:cNvPr id="1" name=""/>
+        <p:cNvGrpSpPr/>
+        <p:nvPr/>
+      </p:nvGrpSpPr>
+      <p:grpSpPr>
+        <a:xfrm>
+          <a:off x="0" y="0"/>
+          <a:ext cx="0" cy="0"/>
+          <a:chOff x="0" y="0"/>
+          <a:chExt cx="0" cy="0"/>
+        </a:xfrm>
+      </p:grpSpPr>
+      <p:sp>
+        <p:nvSpPr>
+          <p:cNvPr id="2" name="Title 1"/>
+          <p:cNvSpPr>
+            <a:spLocks noGrp="1"/>
+          </p:cNvSpPr>
+          <p:nvPr>
+            <p:ph type="title"/>
+          </p:nvPr>
+        </p:nvSpPr>
+        <p:spPr/>
+        <p:txBody>
+          <a:bodyPr/>
+          <a:lstStyle/>
+          <a:p>
+            <a:r>
+              <a:rPr lang="en-US" dirty="0" smtClean="0"/>
+              <a:t>Auto Zoom:: Simple Zoom Out (Step Back)</a:t>
+            </a:r>
+            <a:endParaRPr lang="en-SG" dirty="0"/>
+          </a:p>
+        </p:txBody>
+      </p:sp>
+      <p:sp>
+        <p:nvSpPr>
+          <p:cNvPr id="3" name="Content Placeholder 2"/>
+          <p:cNvSpPr>
+            <a:spLocks noGrp="1"/>
+          </p:cNvSpPr>
+          <p:nvPr>
+            <p:ph idx="1"/>
+          </p:nvPr>
+        </p:nvSpPr>
+        <p:spPr/>
+        <p:txBody>
+          <a:bodyPr/>
+          <a:lstStyle/>
+          <a:p>
+            <a:r>
+              <a:rPr lang="en-SG" dirty="0" smtClean="0"/>
+              <a:t>Enable </a:t>
+            </a:r>
+            <a:r>
+              <a:rPr lang="en-SG" dirty="0"/>
+              <a:t>slide background </a:t>
+            </a:r>
+            <a:r>
+              <a:rPr lang="en-SG" dirty="0" smtClean="0"/>
+              <a:t>in </a:t>
+            </a:r>
+            <a:r>
+              <a:rPr lang="en-SG" dirty="0" err="1"/>
+              <a:t>AutoZoom</a:t>
+            </a:r>
+            <a:r>
+              <a:rPr lang="en-SG" dirty="0"/>
+              <a:t> settings</a:t>
+            </a:r>
+          </a:p>
+          <a:p>
+            <a:endParaRPr lang="en-SG" dirty="0"/>
+          </a:p>
+        </p:txBody>
+      </p:sp>
+    </p:spTree>
+    <p:extLst>
+      <p:ext uri="{BB962C8B-B14F-4D97-AF65-F5344CB8AC3E}">
+        <p14:creationId xmlns:p14="http://schemas.microsoft.com/office/powerpoint/2010/main" val="872004853"/>
+      </p:ext>
+    </p:extLst>
+  </p:cSld>
+  <p:clrMapOvr>
+    <a:masterClrMapping/>
+  </p:clrMapOvr>
+  <p:timing>
+    <p:tnLst>
+      <p:par>
+        <p:cTn id="1" dur="indefinite" restart="never" nodeType="tmRoot"/>
+      </p:par>
+    </p:tnLst>
+  </p:timing>
+</p:sld>
+</file>
+
+<file path=ppt/slides/slide16.xml><?xml version="1.0" encoding="utf-8"?>
+<p:sld xmlns:a="http://schemas.openxmlformats.org/drawingml/2006/main" xmlns:r="http://schemas.openxmlformats.org/officeDocument/2006/relationships" xmlns:p="http://schemas.openxmlformats.org/presentationml/2006/main">
+  <p:cSld>
+    <p:bg>
+      <p:bgPr>
+        <a:solidFill>
+          <a:schemeClr val="bg1"/>
+        </a:solidFill>
+        <a:effectLst/>
+      </p:bgPr>
+    </p:bg>
+    <p:spTree>
+      <p:nvGrpSpPr>
+        <p:cNvPr id="1" name=""/>
+        <p:cNvGrpSpPr/>
+        <p:nvPr/>
+      </p:nvGrpSpPr>
+      <p:grpSpPr>
+        <a:xfrm>
+          <a:off x="0" y="0"/>
+          <a:ext cx="0" cy="0"/>
+          <a:chOff x="0" y="0"/>
+          <a:chExt cx="0" cy="0"/>
+        </a:xfrm>
+      </p:grpSpPr>
+      <p:sp>
+        <p:nvSpPr>
+          <p:cNvPr id="2" name="Rectangle 1"/>
+          <p:cNvSpPr/>
+          <p:nvPr/>
+        </p:nvSpPr>
+        <p:spPr>
+          <a:xfrm>
+            <a:off x="755576" y="836712"/>
+            <a:ext cx="3240360" cy="1944216"/>
+          </a:xfrm>
+          <a:prstGeom prst="rect">
+            <a:avLst/>
+          </a:prstGeom>
+          <a:solidFill>
+            <a:schemeClr val="bg2"/>
+          </a:solidFill>
+          <a:ln>
+            <a:noFill/>
+          </a:ln>
+        </p:spPr>
+        <p:style>
+          <a:lnRef idx="2">
+            <a:schemeClr val="accent1">
+              <a:shade val="50000"/>
+            </a:schemeClr>
+          </a:lnRef>
+          <a:fillRef idx="1">
+            <a:schemeClr val="accent1"/>
+          </a:fillRef>
+          <a:effectRef idx="0">
+            <a:schemeClr val="accent1"/>
+          </a:effectRef>
+          <a:fontRef idx="minor">
+            <a:schemeClr val="lt1"/>
+          </a:fontRef>
+        </p:style>
+        <p:txBody>
+          <a:bodyPr rtlCol="0" anchor="ctr"/>
+          <a:lstStyle/>
+          <a:p>
+            <a:pPr algn="ctr"/>
+            <a:endParaRPr lang="en-SG"/>
+          </a:p>
+        </p:txBody>
+      </p:sp>
+      <p:sp>
+        <p:nvSpPr>
+          <p:cNvPr id="3" name="TextBox 2"/>
+          <p:cNvSpPr txBox="1"/>
+          <p:nvPr/>
+        </p:nvSpPr>
+        <p:spPr>
+          <a:xfrm>
+            <a:off x="899592" y="3356992"/>
+            <a:ext cx="3096344" cy="1754326"/>
+          </a:xfrm>
+          <a:prstGeom prst="rect">
+            <a:avLst/>
+          </a:prstGeom>
+          <a:noFill/>
+        </p:spPr>
+        <p:txBody>
+          <a:bodyPr wrap="square" rtlCol="0">
+            <a:spAutoFit/>
+          </a:bodyPr>
+          <a:lstStyle/>
+          <a:p>
+            <a:pPr marL="571500" indent="-571500">
+              <a:buFont typeface="Arial" panose="020B0604020202020204" pitchFamily="34" charset="0"/>
+              <a:buChar char="•"/>
+            </a:pPr>
+            <a:r>
+              <a:rPr lang="en-US" sz="3600" dirty="0" smtClean="0"/>
+              <a:t>Blah </a:t>
+            </a:r>
+            <a:r>
+              <a:rPr lang="en-US" sz="3600" dirty="0" err="1" smtClean="0"/>
+              <a:t>blah</a:t>
+            </a:r>
+            <a:endParaRPr lang="en-US" sz="3600" dirty="0" smtClean="0"/>
+          </a:p>
+          <a:p>
+            <a:pPr marL="571500" indent="-571500">
+              <a:buFont typeface="Arial" panose="020B0604020202020204" pitchFamily="34" charset="0"/>
+              <a:buChar char="•"/>
+            </a:pPr>
+            <a:r>
+              <a:rPr lang="en-US" sz="3600" dirty="0" smtClean="0"/>
+              <a:t>Blah </a:t>
+            </a:r>
+            <a:r>
+              <a:rPr lang="en-US" sz="3600" dirty="0" err="1" smtClean="0"/>
+              <a:t>blah</a:t>
+            </a:r>
+            <a:endParaRPr lang="en-US" sz="3600" dirty="0" smtClean="0"/>
+          </a:p>
+          <a:p>
+            <a:pPr marL="571500" indent="-571500">
+              <a:buFont typeface="Arial" panose="020B0604020202020204" pitchFamily="34" charset="0"/>
+              <a:buChar char="•"/>
+            </a:pPr>
+            <a:r>
+              <a:rPr lang="en-US" sz="3600" dirty="0" smtClean="0"/>
+              <a:t>Blah </a:t>
+            </a:r>
+            <a:r>
+              <a:rPr lang="en-US" sz="3600" dirty="0" err="1" smtClean="0"/>
+              <a:t>blah</a:t>
+            </a:r>
+            <a:endParaRPr lang="en-SG" sz="3600" dirty="0"/>
+          </a:p>
+        </p:txBody>
+      </p:sp>
+      <p:sp>
+        <p:nvSpPr>
+          <p:cNvPr id="4" name="Rectangle 3"/>
+          <p:cNvSpPr/>
+          <p:nvPr/>
+        </p:nvSpPr>
+        <p:spPr>
+          <a:xfrm>
+            <a:off x="4788024" y="836712"/>
+            <a:ext cx="3600400" cy="4392488"/>
+          </a:xfrm>
+          <a:prstGeom prst="rect">
+            <a:avLst/>
+          </a:prstGeom>
+        </p:spPr>
+        <p:style>
+          <a:lnRef idx="2">
+            <a:schemeClr val="accent3">
+              <a:shade val="50000"/>
+            </a:schemeClr>
+          </a:lnRef>
+          <a:fillRef idx="1">
+            <a:schemeClr val="accent3"/>
+          </a:fillRef>
+          <a:effectRef idx="0">
+            <a:schemeClr val="accent3"/>
+          </a:effectRef>
+          <a:fontRef idx="minor">
+            <a:schemeClr val="lt1"/>
+          </a:fontRef>
+        </p:style>
+        <p:txBody>
+          <a:bodyPr rtlCol="0" anchor="ctr"/>
+          <a:lstStyle/>
+          <a:p>
+            <a:pPr algn="ctr"/>
+            <a:endParaRPr lang="en-SG"/>
+          </a:p>
+        </p:txBody>
+      </p:sp>
+    </p:spTree>
+    <p:extLst>
+      <p:ext uri="{BB962C8B-B14F-4D97-AF65-F5344CB8AC3E}">
+        <p14:creationId xmlns:p14="http://schemas.microsoft.com/office/powerpoint/2010/main" val="1107125949"/>
+      </p:ext>
+    </p:extLst>
+  </p:cSld>
+  <p:clrMapOvr>
+    <a:masterClrMapping/>
+  </p:clrMapOvr>
+  <mc:AlternateContent xmlns:mc="http://schemas.openxmlformats.org/markup-compatibility/2006" xmlns:p14="http://schemas.microsoft.com/office/powerpoint/2010/main">
+    <mc:Choice Requires="p14">
+      <p:transition spd="med" p14:dur="700">
+        <p:fade/>
+      </p:transition>
+    </mc:Choice>
+    <mc:Fallback xmlns="">
+      <p:transition spd="med">
+        <p:fade/>
+      </p:transition>
+    </mc:Fallback>
+  </mc:AlternateContent>
+  <p:timing>
+    <p:tnLst>
+      <p:par>
+        <p:cTn id="1" dur="indefinite" restart="never" nodeType="tmRoot"/>
+      </p:par>
+    </p:tnLst>
+  </p:timing>
+</p:sld>
+</file>
+
+<file path=ppt/slides/slide17.xml><?xml version="1.0" encoding="utf-8"?>
+<p:sld xmlns:a="http://schemas.openxmlformats.org/drawingml/2006/main" xmlns:r="http://schemas.openxmlformats.org/officeDocument/2006/relationships" xmlns:p="http://schemas.openxmlformats.org/presentationml/2006/main">
+  <p:cSld>
+    <p:bg>
+      <p:bgPr>
+        <a:solidFill>
+          <a:schemeClr val="bg1"/>
+        </a:solidFill>
+        <a:effectLst/>
+      </p:bgPr>
+    </p:bg>
+    <p:spTree>
+      <p:nvGrpSpPr>
+        <p:cNvPr id="1" name=""/>
+        <p:cNvGrpSpPr/>
+        <p:nvPr/>
+      </p:nvGrpSpPr>
+      <p:grpSpPr>
+        <a:xfrm>
+          <a:off x="0" y="0"/>
+          <a:ext cx="0" cy="0"/>
+          <a:chOff x="0" y="0"/>
+          <a:chExt cx="0" cy="0"/>
+        </a:xfrm>
+      </p:grpSpPr>
+      <p:sp>
+        <p:nvSpPr>
+          <p:cNvPr id="4" name="Rectangle 3"/>
+          <p:cNvSpPr/>
+          <p:nvPr/>
+        </p:nvSpPr>
+        <p:spPr>
+          <a:xfrm>
+            <a:off x="611560" y="764704"/>
+            <a:ext cx="7920880" cy="1224136"/>
+          </a:xfrm>
+          <a:prstGeom prst="rect">
+            <a:avLst/>
+          </a:prstGeom>
+          <a:noFill/>
+          <a:ln w="57150"/>
+        </p:spPr>
+        <p:style>
+          <a:lnRef idx="2">
+            <a:schemeClr val="accent1">
+              <a:shade val="50000"/>
+            </a:schemeClr>
+          </a:lnRef>
+          <a:fillRef idx="1">
+            <a:schemeClr val="accent1"/>
+          </a:fillRef>
+          <a:effectRef idx="0">
+            <a:schemeClr val="accent1"/>
+          </a:effectRef>
+          <a:fontRef idx="minor">
+            <a:schemeClr val="lt1"/>
+          </a:fontRef>
+        </p:style>
+        <p:txBody>
+          <a:bodyPr rtlCol="0" anchor="ctr"/>
+          <a:lstStyle/>
+          <a:p>
+            <a:pPr algn="ctr"/>
+            <a:endParaRPr lang="en-SG"/>
+          </a:p>
+        </p:txBody>
+      </p:sp>
+      <p:sp>
+        <p:nvSpPr>
+          <p:cNvPr id="5" name="Rectangle 4"/>
+          <p:cNvSpPr/>
+          <p:nvPr/>
+        </p:nvSpPr>
+        <p:spPr>
+          <a:xfrm>
+            <a:off x="611560" y="2348880"/>
+            <a:ext cx="7920880" cy="1224136"/>
+          </a:xfrm>
+          <a:prstGeom prst="rect">
+            <a:avLst/>
+          </a:prstGeom>
+          <a:noFill/>
+          <a:ln w="57150"/>
+        </p:spPr>
+        <p:style>
+          <a:lnRef idx="2">
+            <a:schemeClr val="accent2">
+              <a:shade val="50000"/>
+            </a:schemeClr>
+          </a:lnRef>
+          <a:fillRef idx="1">
+            <a:schemeClr val="accent2"/>
+          </a:fillRef>
+          <a:effectRef idx="0">
+            <a:schemeClr val="accent2"/>
+          </a:effectRef>
+          <a:fontRef idx="minor">
+            <a:schemeClr val="lt1"/>
+          </a:fontRef>
+        </p:style>
+        <p:txBody>
+          <a:bodyPr rtlCol="0" anchor="ctr"/>
+          <a:lstStyle/>
+          <a:p>
+            <a:pPr algn="ctr"/>
+            <a:endParaRPr lang="en-SG"/>
+          </a:p>
+        </p:txBody>
+      </p:sp>
+      <p:sp>
+        <p:nvSpPr>
+          <p:cNvPr id="6" name="Rectangle 5"/>
+          <p:cNvSpPr/>
+          <p:nvPr/>
+        </p:nvSpPr>
+        <p:spPr>
+          <a:xfrm>
+            <a:off x="611560" y="3933056"/>
+            <a:ext cx="7920880" cy="2376264"/>
+          </a:xfrm>
+          <a:prstGeom prst="rect">
+            <a:avLst/>
+          </a:prstGeom>
+          <a:noFill/>
+          <a:ln w="57150"/>
+        </p:spPr>
+        <p:style>
+          <a:lnRef idx="2">
+            <a:schemeClr val="accent4">
+              <a:shade val="50000"/>
+            </a:schemeClr>
+          </a:lnRef>
+          <a:fillRef idx="1">
+            <a:schemeClr val="accent4"/>
+          </a:fillRef>
+          <a:effectRef idx="0">
+            <a:schemeClr val="accent4"/>
+          </a:effectRef>
+          <a:fontRef idx="minor">
+            <a:schemeClr val="lt1"/>
+          </a:fontRef>
+        </p:style>
+        <p:txBody>
+          <a:bodyPr rtlCol="0" anchor="ctr"/>
+          <a:lstStyle/>
+          <a:p>
+            <a:pPr algn="ctr"/>
+            <a:endParaRPr lang="en-SG"/>
+          </a:p>
+        </p:txBody>
+      </p:sp>
+      <p:sp>
+        <p:nvSpPr>
+          <p:cNvPr id="8" name="Step Back This Shape"/>
+          <p:cNvSpPr/>
+          <p:nvPr/>
+        </p:nvSpPr>
+        <p:spPr>
+          <a:xfrm>
+            <a:off x="6768752" y="850404"/>
+            <a:ext cx="1403648" cy="1052736"/>
+          </a:xfrm>
+          <a:prstGeom prst="rect">
+            <a:avLst/>
+          </a:prstGeom>
+          <a:ln/>
+        </p:spPr>
+        <p:style>
+          <a:lnRef idx="2">
+            <a:schemeClr val="accent1">
+              <a:shade val="50000"/>
+            </a:schemeClr>
+          </a:lnRef>
+          <a:fillRef idx="1">
+            <a:schemeClr val="accent1"/>
+          </a:fillRef>
+          <a:effectRef idx="0">
+            <a:schemeClr val="accent1"/>
+          </a:effectRef>
+          <a:fontRef idx="minor">
+            <a:schemeClr val="lt1"/>
+          </a:fontRef>
+        </p:style>
+        <p:txBody>
+          <a:bodyPr rtlCol="0" anchor="ctr"/>
+          <a:lstStyle/>
+          <a:p>
+            <a:pPr algn="ctr"/>
+            <a:r>
+              <a:rPr lang="en-US" sz="2800" smtClean="0"/>
+              <a:t>Step Back</a:t>
+            </a:r>
+            <a:endParaRPr lang="en-SG" sz="2800" dirty="0"/>
+          </a:p>
+        </p:txBody>
+      </p:sp>
+    </p:spTree>
+    <p:extLst>
+      <p:ext uri="{BB962C8B-B14F-4D97-AF65-F5344CB8AC3E}">
+        <p14:creationId xmlns:p14="http://schemas.microsoft.com/office/powerpoint/2010/main" val="1288570284"/>
+      </p:ext>
+    </p:extLst>
+  </p:cSld>
+  <p:clrMapOvr>
+    <a:masterClrMapping/>
+  </p:clrMapOvr>
+  <mc:AlternateContent xmlns:mc="http://schemas.openxmlformats.org/markup-compatibility/2006" xmlns:p14="http://schemas.microsoft.com/office/powerpoint/2010/main">
+    <mc:Choice Requires="p14">
+      <p:transition spd="slow" p14:dur="1500">
+        <p:split orient="vert"/>
+      </p:transition>
+    </mc:Choice>
+    <mc:Fallback xmlns="">
+      <p:transition spd="slow">
+        <p:split orient="vert"/>
+      </p:transition>
+    </mc:Fallback>
+  </mc:AlternateContent>
+  <p:timing>
+    <p:tnLst>
+      <p:par>
+        <p:cTn id="1" dur="indefinite" restart="never" nodeType="tmRoot"/>
+      </p:par>
+    </p:tnLst>
+  </p:timing>
+</p:sld>
+</file>
+
+<file path=ppt/slides/slide18.xml><?xml version="1.0" encoding="utf-8"?>
+<p:sld xmlns:a="http://schemas.openxmlformats.org/drawingml/2006/main" xmlns:r="http://schemas.openxmlformats.org/officeDocument/2006/relationships" xmlns:p="http://schemas.openxmlformats.org/presentationml/2006/main">
+  <p:cSld>
+    <p:bg>
+      <p:bgPr>
+        <a:solidFill>
+          <a:schemeClr val="bg1"/>
+        </a:solidFill>
+        <a:effectLst/>
+      </p:bgPr>
+    </p:bg>
+    <p:spTree>
+      <p:nvGrpSpPr>
+        <p:cNvPr id="1" name=""/>
+        <p:cNvGrpSpPr/>
+        <p:nvPr/>
+      </p:nvGrpSpPr>
+      <p:grpSpPr>
+        <a:xfrm>
+          <a:off x="0" y="0"/>
+          <a:ext cx="0" cy="0"/>
+          <a:chOff x="0" y="0"/>
+          <a:chExt cx="0" cy="0"/>
+        </a:xfrm>
+      </p:grpSpPr>
+      <p:sp>
+        <p:nvSpPr>
           <p:cNvPr id="2" name="Rectangle 1"/>
           <p:cNvSpPr/>
           <p:nvPr/>
@@ -10026,7 +11670,7 @@
 </p:sld>
 </file>
 
-<file path=ppt/slides/slide13.xml><?xml version="1.0" encoding="utf-8"?>
+<file path=ppt/slides/slide19.xml><?xml version="1.0" encoding="utf-8"?>
 <p:sld xmlns:a="http://schemas.openxmlformats.org/drawingml/2006/main" xmlns:r="http://schemas.openxmlformats.org/officeDocument/2006/relationships" xmlns:p="http://schemas.openxmlformats.org/presentationml/2006/main">
   <p:cSld name="PPTLabsZoomOut201506181134006137">
     <p:bg>
@@ -10543,7 +12187,279 @@
 </p:sld>
 </file>
 
-<file path=ppt/slides/slide14.xml><?xml version="1.0" encoding="utf-8"?>
+<file path=ppt/slides/slide2.xml><?xml version="1.0" encoding="utf-8"?>
+<p:sld xmlns:a="http://schemas.openxmlformats.org/drawingml/2006/main" xmlns:r="http://schemas.openxmlformats.org/officeDocument/2006/relationships" xmlns:p="http://schemas.openxmlformats.org/presentationml/2006/main">
+  <p:cSld>
+    <p:bg>
+      <p:bgPr>
+        <a:solidFill>
+          <a:schemeClr val="accent6">
+            <a:lumMod val="75000"/>
+          </a:schemeClr>
+        </a:solidFill>
+        <a:effectLst/>
+      </p:bgPr>
+    </p:bg>
+    <p:spTree>
+      <p:nvGrpSpPr>
+        <p:cNvPr id="1" name=""/>
+        <p:cNvGrpSpPr/>
+        <p:nvPr/>
+      </p:nvGrpSpPr>
+      <p:grpSpPr>
+        <a:xfrm>
+          <a:off x="0" y="0"/>
+          <a:ext cx="0" cy="0"/>
+          <a:chOff x="0" y="0"/>
+          <a:chExt cx="0" cy="0"/>
+        </a:xfrm>
+      </p:grpSpPr>
+      <p:sp>
+        <p:nvSpPr>
+          <p:cNvPr id="2" name="Title 1"/>
+          <p:cNvSpPr>
+            <a:spLocks noGrp="1"/>
+          </p:cNvSpPr>
+          <p:nvPr>
+            <p:ph type="title"/>
+          </p:nvPr>
+        </p:nvSpPr>
+        <p:spPr>
+          <a:xfrm>
+            <a:off x="381000" y="609600"/>
+            <a:ext cx="8229600" cy="1143000"/>
+          </a:xfrm>
+        </p:spPr>
+        <p:txBody>
+          <a:bodyPr>
+            <a:noAutofit/>
+          </a:bodyPr>
+          <a:lstStyle/>
+          <a:p>
+            <a:pPr algn="l"/>
+            <a:r>
+              <a:rPr lang="en-US" sz="7200" dirty="0" smtClean="0">
+                <a:solidFill>
+                  <a:schemeClr val="bg1"/>
+                </a:solidFill>
+              </a:rPr>
+              <a:t>Auto Zoom</a:t>
+            </a:r>
+            <a:endParaRPr lang="en-SG" sz="7200" dirty="0">
+              <a:solidFill>
+                <a:schemeClr val="bg1"/>
+              </a:solidFill>
+            </a:endParaRPr>
+          </a:p>
+        </p:txBody>
+      </p:sp>
+      <p:sp>
+        <p:nvSpPr>
+          <p:cNvPr id="3" name="text 5"/>
+          <p:cNvSpPr txBox="1"/>
+          <p:nvPr/>
+        </p:nvSpPr>
+        <p:spPr>
+          <a:xfrm>
+            <a:off x="542636" y="2819400"/>
+            <a:ext cx="7620000" cy="3046988"/>
+          </a:xfrm>
+          <a:prstGeom prst="rect">
+            <a:avLst/>
+          </a:prstGeom>
+          <a:noFill/>
+        </p:spPr>
+        <p:txBody>
+          <a:bodyPr wrap="square" rtlCol="0">
+            <a:spAutoFit/>
+          </a:bodyPr>
+          <a:lstStyle/>
+          <a:p>
+            <a:r>
+              <a:rPr lang="en-US" sz="2400" b="1" dirty="0" smtClean="0">
+                <a:solidFill>
+                  <a:schemeClr val="bg1"/>
+                </a:solidFill>
+              </a:rPr>
+              <a:t>Additional instructions:</a:t>
+            </a:r>
+          </a:p>
+          <a:p>
+            <a:pPr marL="285750" indent="-285750">
+              <a:buFont typeface="Arial" panose="020B0604020202020204" pitchFamily="34" charset="0"/>
+              <a:buChar char="•"/>
+            </a:pPr>
+            <a:r>
+              <a:rPr lang="en-US" sz="2400" dirty="0" smtClean="0">
+                <a:solidFill>
+                  <a:schemeClr val="bg1"/>
+                </a:solidFill>
+              </a:rPr>
+              <a:t>Select the </a:t>
+            </a:r>
+            <a:r>
+              <a:rPr lang="en-US" sz="2400" b="1" dirty="0" smtClean="0">
+                <a:solidFill>
+                  <a:schemeClr val="bg1"/>
+                </a:solidFill>
+              </a:rPr>
+              <a:t>BLUE</a:t>
+            </a:r>
+            <a:r>
+              <a:rPr lang="en-US" sz="2400" dirty="0" smtClean="0">
+                <a:solidFill>
+                  <a:schemeClr val="bg1"/>
+                </a:solidFill>
+              </a:rPr>
+              <a:t> color </a:t>
+            </a:r>
+            <a:r>
+              <a:rPr lang="en-US" sz="2400" b="1" dirty="0" smtClean="0">
+                <a:solidFill>
+                  <a:schemeClr val="bg1"/>
+                </a:solidFill>
+              </a:rPr>
+              <a:t>Rectangle</a:t>
+            </a:r>
+            <a:r>
+              <a:rPr lang="en-US" sz="2400" dirty="0" smtClean="0">
+                <a:solidFill>
+                  <a:schemeClr val="bg1"/>
+                </a:solidFill>
+              </a:rPr>
+              <a:t> shape(s).</a:t>
+            </a:r>
+          </a:p>
+          <a:p>
+            <a:pPr marL="285750" indent="-285750">
+              <a:buFont typeface="Arial" panose="020B0604020202020204" pitchFamily="34" charset="0"/>
+              <a:buChar char="•"/>
+            </a:pPr>
+            <a:r>
+              <a:rPr lang="en-US" sz="2400" dirty="0" smtClean="0">
+                <a:solidFill>
+                  <a:schemeClr val="bg1"/>
+                </a:solidFill>
+              </a:rPr>
+              <a:t>Click </a:t>
+            </a:r>
+            <a:r>
+              <a:rPr lang="en-US" sz="2400" b="1" dirty="0" smtClean="0">
+                <a:solidFill>
+                  <a:schemeClr val="bg1"/>
+                </a:solidFill>
+              </a:rPr>
+              <a:t>“Drill Down” or “Step Back”</a:t>
+            </a:r>
+            <a:r>
+              <a:rPr lang="en-US" sz="2400" dirty="0" smtClean="0">
+                <a:solidFill>
+                  <a:schemeClr val="bg1"/>
+                </a:solidFill>
+              </a:rPr>
+              <a:t> button in the ribbon. </a:t>
+            </a:r>
+          </a:p>
+          <a:p>
+            <a:pPr marL="285750" indent="-285750">
+              <a:buFont typeface="Arial" panose="020B0604020202020204" pitchFamily="34" charset="0"/>
+              <a:buChar char="•"/>
+            </a:pPr>
+            <a:r>
+              <a:rPr lang="en-US" sz="2400" dirty="0" smtClean="0">
+                <a:solidFill>
+                  <a:schemeClr val="bg1"/>
+                </a:solidFill>
+              </a:rPr>
+              <a:t>Compare the result with the expected output.</a:t>
+            </a:r>
+          </a:p>
+          <a:p>
+            <a:pPr marL="285750" indent="-285750">
+              <a:buFont typeface="Arial" panose="020B0604020202020204" pitchFamily="34" charset="0"/>
+              <a:buChar char="•"/>
+            </a:pPr>
+            <a:r>
+              <a:rPr lang="en-SG" sz="2400" dirty="0">
+                <a:solidFill>
+                  <a:schemeClr val="bg1"/>
+                </a:solidFill>
+              </a:rPr>
+              <a:t>Also try tweaking these:</a:t>
+            </a:r>
+          </a:p>
+          <a:p>
+            <a:pPr marL="742950" lvl="1" indent="-285750">
+              <a:buFont typeface="Arial" panose="020B0604020202020204" pitchFamily="34" charset="0"/>
+              <a:buChar char="•"/>
+            </a:pPr>
+            <a:r>
+              <a:rPr lang="en-SG" sz="2400" dirty="0" smtClean="0">
+                <a:solidFill>
+                  <a:schemeClr val="bg1"/>
+                </a:solidFill>
+              </a:rPr>
+              <a:t>Include Slide Background</a:t>
+            </a:r>
+            <a:endParaRPr lang="en-SG" sz="2400" dirty="0">
+              <a:solidFill>
+                <a:schemeClr val="bg1"/>
+              </a:solidFill>
+            </a:endParaRPr>
+          </a:p>
+          <a:p>
+            <a:pPr marL="742950" lvl="1" indent="-285750">
+              <a:buFont typeface="Arial" panose="020B0604020202020204" pitchFamily="34" charset="0"/>
+              <a:buChar char="•"/>
+            </a:pPr>
+            <a:r>
+              <a:rPr lang="en-SG" sz="2400" dirty="0" smtClean="0">
+                <a:solidFill>
+                  <a:schemeClr val="bg1"/>
+                </a:solidFill>
+              </a:rPr>
+              <a:t>Put All Zoom Effects on Separate Slides</a:t>
+            </a:r>
+            <a:endParaRPr lang="en-SG" sz="2400" dirty="0">
+              <a:solidFill>
+                <a:schemeClr val="bg1"/>
+              </a:solidFill>
+            </a:endParaRPr>
+          </a:p>
+          <a:p>
+            <a:pPr marL="285750" indent="-285750">
+              <a:buFont typeface="Arial" panose="020B0604020202020204" pitchFamily="34" charset="0"/>
+              <a:buChar char="•"/>
+            </a:pPr>
+            <a:endParaRPr lang="en-SG" sz="2400" dirty="0">
+              <a:solidFill>
+                <a:schemeClr val="bg1"/>
+              </a:solidFill>
+            </a:endParaRPr>
+          </a:p>
+        </p:txBody>
+      </p:sp>
+    </p:spTree>
+    <p:extLst>
+      <p:ext uri="{BB962C8B-B14F-4D97-AF65-F5344CB8AC3E}">
+        <p14:creationId xmlns:p14="http://schemas.microsoft.com/office/powerpoint/2010/main" val="1569131388"/>
+      </p:ext>
+    </p:extLst>
+  </p:cSld>
+  <p:clrMapOvr>
+    <a:masterClrMapping/>
+  </p:clrMapOvr>
+  <p:timing>
+    <p:tnLst>
+      <p:par>
+        <p:cTn id="1" dur="indefinite" restart="never" nodeType="tmRoot"/>
+      </p:par>
+    </p:tnLst>
+  </p:timing>
+</p:sld>
+</file>
+
+<file path=ppt/slides/slide20.xml><?xml version="1.0" encoding="utf-8"?>
 <p:sld xmlns:a="http://schemas.openxmlformats.org/drawingml/2006/main" xmlns:r="http://schemas.openxmlformats.org/officeDocument/2006/relationships" xmlns:p="http://schemas.openxmlformats.org/presentationml/2006/main">
   <p:cSld>
     <p:bg>
@@ -10827,7 +12743,1312 @@
 </p:sld>
 </file>
 
-<file path=ppt/slides/slide15.xml><?xml version="1.0" encoding="utf-8"?>
+<file path=ppt/slides/slide21.xml><?xml version="1.0" encoding="utf-8"?>
+<p:sld xmlns:a="http://schemas.openxmlformats.org/drawingml/2006/main" xmlns:r="http://schemas.openxmlformats.org/officeDocument/2006/relationships" xmlns:p="http://schemas.openxmlformats.org/presentationml/2006/main">
+  <p:cSld>
+    <p:spTree>
+      <p:nvGrpSpPr>
+        <p:cNvPr id="1" name=""/>
+        <p:cNvGrpSpPr/>
+        <p:nvPr/>
+      </p:nvGrpSpPr>
+      <p:grpSpPr>
+        <a:xfrm>
+          <a:off x="0" y="0"/>
+          <a:ext cx="0" cy="0"/>
+          <a:chOff x="0" y="0"/>
+          <a:chExt cx="0" cy="0"/>
+        </a:xfrm>
+      </p:grpSpPr>
+      <p:sp>
+        <p:nvSpPr>
+          <p:cNvPr id="2" name="Title 1"/>
+          <p:cNvSpPr>
+            <a:spLocks noGrp="1"/>
+          </p:cNvSpPr>
+          <p:nvPr>
+            <p:ph type="title"/>
+          </p:nvPr>
+        </p:nvSpPr>
+        <p:spPr/>
+        <p:txBody>
+          <a:bodyPr/>
+          <a:lstStyle/>
+          <a:p>
+            <a:r>
+              <a:rPr lang="en-US" dirty="0" smtClean="0"/>
+              <a:t>Auto Zoom:: Simple Zoom Out (Step Back)</a:t>
+            </a:r>
+            <a:endParaRPr lang="en-SG" dirty="0"/>
+          </a:p>
+        </p:txBody>
+      </p:sp>
+      <p:sp>
+        <p:nvSpPr>
+          <p:cNvPr id="3" name="Content Placeholder 2"/>
+          <p:cNvSpPr>
+            <a:spLocks noGrp="1"/>
+          </p:cNvSpPr>
+          <p:nvPr>
+            <p:ph idx="1"/>
+          </p:nvPr>
+        </p:nvSpPr>
+        <p:spPr/>
+        <p:txBody>
+          <a:bodyPr/>
+          <a:lstStyle/>
+          <a:p>
+            <a:r>
+              <a:rPr lang="en-SG" dirty="0"/>
+              <a:t>Disable slide background in </a:t>
+            </a:r>
+            <a:r>
+              <a:rPr lang="en-SG" dirty="0" err="1" smtClean="0"/>
+              <a:t>AutoZoom</a:t>
+            </a:r>
+            <a:r>
+              <a:rPr lang="en-SG" dirty="0" smtClean="0"/>
+              <a:t> settings</a:t>
+            </a:r>
+            <a:endParaRPr lang="en-SG" dirty="0"/>
+          </a:p>
+        </p:txBody>
+      </p:sp>
+    </p:spTree>
+    <p:extLst>
+      <p:ext uri="{BB962C8B-B14F-4D97-AF65-F5344CB8AC3E}">
+        <p14:creationId xmlns:p14="http://schemas.microsoft.com/office/powerpoint/2010/main" val="3977557748"/>
+      </p:ext>
+    </p:extLst>
+  </p:cSld>
+  <p:clrMapOvr>
+    <a:masterClrMapping/>
+  </p:clrMapOvr>
+  <p:timing>
+    <p:tnLst>
+      <p:par>
+        <p:cTn id="1" dur="indefinite" restart="never" nodeType="tmRoot"/>
+      </p:par>
+    </p:tnLst>
+  </p:timing>
+</p:sld>
+</file>
+
+<file path=ppt/slides/slide22.xml><?xml version="1.0" encoding="utf-8"?>
+<p:sld xmlns:a="http://schemas.openxmlformats.org/drawingml/2006/main" xmlns:r="http://schemas.openxmlformats.org/officeDocument/2006/relationships" xmlns:p="http://schemas.openxmlformats.org/presentationml/2006/main">
+  <p:cSld>
+    <p:bg>
+      <p:bgPr>
+        <a:solidFill>
+          <a:schemeClr val="bg1"/>
+        </a:solidFill>
+        <a:effectLst/>
+      </p:bgPr>
+    </p:bg>
+    <p:spTree>
+      <p:nvGrpSpPr>
+        <p:cNvPr id="1" name=""/>
+        <p:cNvGrpSpPr/>
+        <p:nvPr/>
+      </p:nvGrpSpPr>
+      <p:grpSpPr>
+        <a:xfrm>
+          <a:off x="0" y="0"/>
+          <a:ext cx="0" cy="0"/>
+          <a:chOff x="0" y="0"/>
+          <a:chExt cx="0" cy="0"/>
+        </a:xfrm>
+      </p:grpSpPr>
+      <p:sp>
+        <p:nvSpPr>
+          <p:cNvPr id="2" name="Rectangle 1"/>
+          <p:cNvSpPr/>
+          <p:nvPr/>
+        </p:nvSpPr>
+        <p:spPr>
+          <a:xfrm>
+            <a:off x="755576" y="836712"/>
+            <a:ext cx="3240360" cy="1944216"/>
+          </a:xfrm>
+          <a:prstGeom prst="rect">
+            <a:avLst/>
+          </a:prstGeom>
+          <a:solidFill>
+            <a:schemeClr val="bg2"/>
+          </a:solidFill>
+          <a:ln>
+            <a:noFill/>
+          </a:ln>
+        </p:spPr>
+        <p:style>
+          <a:lnRef idx="2">
+            <a:schemeClr val="accent1">
+              <a:shade val="50000"/>
+            </a:schemeClr>
+          </a:lnRef>
+          <a:fillRef idx="1">
+            <a:schemeClr val="accent1"/>
+          </a:fillRef>
+          <a:effectRef idx="0">
+            <a:schemeClr val="accent1"/>
+          </a:effectRef>
+          <a:fontRef idx="minor">
+            <a:schemeClr val="lt1"/>
+          </a:fontRef>
+        </p:style>
+        <p:txBody>
+          <a:bodyPr rtlCol="0" anchor="ctr"/>
+          <a:lstStyle/>
+          <a:p>
+            <a:pPr algn="ctr"/>
+            <a:endParaRPr lang="en-SG"/>
+          </a:p>
+        </p:txBody>
+      </p:sp>
+      <p:sp>
+        <p:nvSpPr>
+          <p:cNvPr id="3" name="TextBox 2"/>
+          <p:cNvSpPr txBox="1"/>
+          <p:nvPr/>
+        </p:nvSpPr>
+        <p:spPr>
+          <a:xfrm>
+            <a:off x="899592" y="3356992"/>
+            <a:ext cx="3096344" cy="1754326"/>
+          </a:xfrm>
+          <a:prstGeom prst="rect">
+            <a:avLst/>
+          </a:prstGeom>
+          <a:noFill/>
+        </p:spPr>
+        <p:txBody>
+          <a:bodyPr wrap="square" rtlCol="0">
+            <a:spAutoFit/>
+          </a:bodyPr>
+          <a:lstStyle/>
+          <a:p>
+            <a:pPr marL="571500" indent="-571500">
+              <a:buFont typeface="Arial" panose="020B0604020202020204" pitchFamily="34" charset="0"/>
+              <a:buChar char="•"/>
+            </a:pPr>
+            <a:r>
+              <a:rPr lang="en-US" sz="3600" dirty="0" smtClean="0"/>
+              <a:t>Blah </a:t>
+            </a:r>
+            <a:r>
+              <a:rPr lang="en-US" sz="3600" dirty="0" err="1" smtClean="0"/>
+              <a:t>blah</a:t>
+            </a:r>
+            <a:endParaRPr lang="en-US" sz="3600" dirty="0" smtClean="0"/>
+          </a:p>
+          <a:p>
+            <a:pPr marL="571500" indent="-571500">
+              <a:buFont typeface="Arial" panose="020B0604020202020204" pitchFamily="34" charset="0"/>
+              <a:buChar char="•"/>
+            </a:pPr>
+            <a:r>
+              <a:rPr lang="en-US" sz="3600" dirty="0" smtClean="0"/>
+              <a:t>Blah </a:t>
+            </a:r>
+            <a:r>
+              <a:rPr lang="en-US" sz="3600" dirty="0" err="1" smtClean="0"/>
+              <a:t>blah</a:t>
+            </a:r>
+            <a:endParaRPr lang="en-US" sz="3600" dirty="0" smtClean="0"/>
+          </a:p>
+          <a:p>
+            <a:pPr marL="571500" indent="-571500">
+              <a:buFont typeface="Arial" panose="020B0604020202020204" pitchFamily="34" charset="0"/>
+              <a:buChar char="•"/>
+            </a:pPr>
+            <a:r>
+              <a:rPr lang="en-US" sz="3600" dirty="0" smtClean="0"/>
+              <a:t>Blah </a:t>
+            </a:r>
+            <a:r>
+              <a:rPr lang="en-US" sz="3600" dirty="0" err="1" smtClean="0"/>
+              <a:t>blah</a:t>
+            </a:r>
+            <a:endParaRPr lang="en-SG" sz="3600" dirty="0"/>
+          </a:p>
+        </p:txBody>
+      </p:sp>
+      <p:sp>
+        <p:nvSpPr>
+          <p:cNvPr id="4" name="Rectangle 3"/>
+          <p:cNvSpPr/>
+          <p:nvPr/>
+        </p:nvSpPr>
+        <p:spPr>
+          <a:xfrm>
+            <a:off x="4788024" y="836712"/>
+            <a:ext cx="3600400" cy="4392488"/>
+          </a:xfrm>
+          <a:prstGeom prst="rect">
+            <a:avLst/>
+          </a:prstGeom>
+        </p:spPr>
+        <p:style>
+          <a:lnRef idx="2">
+            <a:schemeClr val="accent3">
+              <a:shade val="50000"/>
+            </a:schemeClr>
+          </a:lnRef>
+          <a:fillRef idx="1">
+            <a:schemeClr val="accent3"/>
+          </a:fillRef>
+          <a:effectRef idx="0">
+            <a:schemeClr val="accent3"/>
+          </a:effectRef>
+          <a:fontRef idx="minor">
+            <a:schemeClr val="lt1"/>
+          </a:fontRef>
+        </p:style>
+        <p:txBody>
+          <a:bodyPr rtlCol="0" anchor="ctr"/>
+          <a:lstStyle/>
+          <a:p>
+            <a:pPr algn="ctr"/>
+            <a:endParaRPr lang="en-SG"/>
+          </a:p>
+        </p:txBody>
+      </p:sp>
+    </p:spTree>
+    <p:extLst>
+      <p:ext uri="{BB962C8B-B14F-4D97-AF65-F5344CB8AC3E}">
+        <p14:creationId xmlns:p14="http://schemas.microsoft.com/office/powerpoint/2010/main" val="3818889738"/>
+      </p:ext>
+    </p:extLst>
+  </p:cSld>
+  <p:clrMapOvr>
+    <a:masterClrMapping/>
+  </p:clrMapOvr>
+  <mc:AlternateContent xmlns:mc="http://schemas.openxmlformats.org/markup-compatibility/2006" xmlns:p14="http://schemas.microsoft.com/office/powerpoint/2010/main">
+    <mc:Choice Requires="p14">
+      <p:transition spd="med" p14:dur="700">
+        <p:fade/>
+      </p:transition>
+    </mc:Choice>
+    <mc:Fallback xmlns="">
+      <p:transition spd="med">
+        <p:fade/>
+      </p:transition>
+    </mc:Fallback>
+  </mc:AlternateContent>
+  <p:timing>
+    <p:tnLst>
+      <p:par>
+        <p:cTn id="1" dur="indefinite" restart="never" nodeType="tmRoot"/>
+      </p:par>
+    </p:tnLst>
+  </p:timing>
+</p:sld>
+</file>
+
+<file path=ppt/slides/slide23.xml><?xml version="1.0" encoding="utf-8"?>
+<p:sld xmlns:a="http://schemas.openxmlformats.org/drawingml/2006/main" xmlns:r="http://schemas.openxmlformats.org/officeDocument/2006/relationships" xmlns:p="http://schemas.openxmlformats.org/presentationml/2006/main">
+  <p:cSld>
+    <p:bg>
+      <p:bgPr>
+        <a:solidFill>
+          <a:schemeClr val="bg1"/>
+        </a:solidFill>
+        <a:effectLst/>
+      </p:bgPr>
+    </p:bg>
+    <p:spTree>
+      <p:nvGrpSpPr>
+        <p:cNvPr id="1" name=""/>
+        <p:cNvGrpSpPr/>
+        <p:nvPr/>
+      </p:nvGrpSpPr>
+      <p:grpSpPr>
+        <a:xfrm>
+          <a:off x="0" y="0"/>
+          <a:ext cx="0" cy="0"/>
+          <a:chOff x="0" y="0"/>
+          <a:chExt cx="0" cy="0"/>
+        </a:xfrm>
+      </p:grpSpPr>
+      <p:sp>
+        <p:nvSpPr>
+          <p:cNvPr id="4" name="Rectangle 3"/>
+          <p:cNvSpPr/>
+          <p:nvPr/>
+        </p:nvSpPr>
+        <p:spPr>
+          <a:xfrm>
+            <a:off x="611560" y="764704"/>
+            <a:ext cx="7920880" cy="1224136"/>
+          </a:xfrm>
+          <a:prstGeom prst="rect">
+            <a:avLst/>
+          </a:prstGeom>
+          <a:noFill/>
+          <a:ln w="57150"/>
+        </p:spPr>
+        <p:style>
+          <a:lnRef idx="2">
+            <a:schemeClr val="accent1">
+              <a:shade val="50000"/>
+            </a:schemeClr>
+          </a:lnRef>
+          <a:fillRef idx="1">
+            <a:schemeClr val="accent1"/>
+          </a:fillRef>
+          <a:effectRef idx="0">
+            <a:schemeClr val="accent1"/>
+          </a:effectRef>
+          <a:fontRef idx="minor">
+            <a:schemeClr val="lt1"/>
+          </a:fontRef>
+        </p:style>
+        <p:txBody>
+          <a:bodyPr rtlCol="0" anchor="ctr"/>
+          <a:lstStyle/>
+          <a:p>
+            <a:pPr algn="ctr"/>
+            <a:endParaRPr lang="en-SG"/>
+          </a:p>
+        </p:txBody>
+      </p:sp>
+      <p:sp>
+        <p:nvSpPr>
+          <p:cNvPr id="5" name="Rectangle 4"/>
+          <p:cNvSpPr/>
+          <p:nvPr/>
+        </p:nvSpPr>
+        <p:spPr>
+          <a:xfrm>
+            <a:off x="611560" y="2348880"/>
+            <a:ext cx="7920880" cy="1224136"/>
+          </a:xfrm>
+          <a:prstGeom prst="rect">
+            <a:avLst/>
+          </a:prstGeom>
+          <a:noFill/>
+          <a:ln w="57150"/>
+        </p:spPr>
+        <p:style>
+          <a:lnRef idx="2">
+            <a:schemeClr val="accent2">
+              <a:shade val="50000"/>
+            </a:schemeClr>
+          </a:lnRef>
+          <a:fillRef idx="1">
+            <a:schemeClr val="accent2"/>
+          </a:fillRef>
+          <a:effectRef idx="0">
+            <a:schemeClr val="accent2"/>
+          </a:effectRef>
+          <a:fontRef idx="minor">
+            <a:schemeClr val="lt1"/>
+          </a:fontRef>
+        </p:style>
+        <p:txBody>
+          <a:bodyPr rtlCol="0" anchor="ctr"/>
+          <a:lstStyle/>
+          <a:p>
+            <a:pPr algn="ctr"/>
+            <a:endParaRPr lang="en-SG"/>
+          </a:p>
+        </p:txBody>
+      </p:sp>
+      <p:sp>
+        <p:nvSpPr>
+          <p:cNvPr id="6" name="Rectangle 5"/>
+          <p:cNvSpPr/>
+          <p:nvPr/>
+        </p:nvSpPr>
+        <p:spPr>
+          <a:xfrm>
+            <a:off x="611560" y="3933056"/>
+            <a:ext cx="7920880" cy="2376264"/>
+          </a:xfrm>
+          <a:prstGeom prst="rect">
+            <a:avLst/>
+          </a:prstGeom>
+          <a:noFill/>
+          <a:ln w="57150"/>
+        </p:spPr>
+        <p:style>
+          <a:lnRef idx="2">
+            <a:schemeClr val="accent4">
+              <a:shade val="50000"/>
+            </a:schemeClr>
+          </a:lnRef>
+          <a:fillRef idx="1">
+            <a:schemeClr val="accent4"/>
+          </a:fillRef>
+          <a:effectRef idx="0">
+            <a:schemeClr val="accent4"/>
+          </a:effectRef>
+          <a:fontRef idx="minor">
+            <a:schemeClr val="lt1"/>
+          </a:fontRef>
+        </p:style>
+        <p:txBody>
+          <a:bodyPr rtlCol="0" anchor="ctr"/>
+          <a:lstStyle/>
+          <a:p>
+            <a:pPr algn="ctr"/>
+            <a:endParaRPr lang="en-SG"/>
+          </a:p>
+        </p:txBody>
+      </p:sp>
+      <p:sp>
+        <p:nvSpPr>
+          <p:cNvPr id="8" name="Step Back This Shape"/>
+          <p:cNvSpPr/>
+          <p:nvPr/>
+        </p:nvSpPr>
+        <p:spPr>
+          <a:xfrm>
+            <a:off x="6768752" y="850404"/>
+            <a:ext cx="1403648" cy="1052736"/>
+          </a:xfrm>
+          <a:prstGeom prst="rect">
+            <a:avLst/>
+          </a:prstGeom>
+          <a:ln/>
+        </p:spPr>
+        <p:style>
+          <a:lnRef idx="2">
+            <a:schemeClr val="accent1">
+              <a:shade val="50000"/>
+            </a:schemeClr>
+          </a:lnRef>
+          <a:fillRef idx="1">
+            <a:schemeClr val="accent1"/>
+          </a:fillRef>
+          <a:effectRef idx="0">
+            <a:schemeClr val="accent1"/>
+          </a:effectRef>
+          <a:fontRef idx="minor">
+            <a:schemeClr val="lt1"/>
+          </a:fontRef>
+        </p:style>
+        <p:txBody>
+          <a:bodyPr rtlCol="0" anchor="ctr"/>
+          <a:lstStyle/>
+          <a:p>
+            <a:pPr algn="ctr"/>
+            <a:r>
+              <a:rPr lang="en-US" sz="2800" smtClean="0"/>
+              <a:t>Step Back</a:t>
+            </a:r>
+            <a:endParaRPr lang="en-SG" sz="2800" dirty="0"/>
+          </a:p>
+        </p:txBody>
+      </p:sp>
+    </p:spTree>
+    <p:extLst>
+      <p:ext uri="{BB962C8B-B14F-4D97-AF65-F5344CB8AC3E}">
+        <p14:creationId xmlns:p14="http://schemas.microsoft.com/office/powerpoint/2010/main" val="698598111"/>
+      </p:ext>
+    </p:extLst>
+  </p:cSld>
+  <p:clrMapOvr>
+    <a:masterClrMapping/>
+  </p:clrMapOvr>
+  <mc:AlternateContent xmlns:mc="http://schemas.openxmlformats.org/markup-compatibility/2006" xmlns:p14="http://schemas.microsoft.com/office/powerpoint/2010/main">
+    <mc:Choice Requires="p14">
+      <p:transition spd="slow" p14:dur="1500">
+        <p:split orient="vert"/>
+      </p:transition>
+    </mc:Choice>
+    <mc:Fallback xmlns="">
+      <p:transition spd="slow">
+        <p:split orient="vert"/>
+      </p:transition>
+    </mc:Fallback>
+  </mc:AlternateContent>
+  <p:timing>
+    <p:tnLst>
+      <p:par>
+        <p:cTn id="1" dur="indefinite" restart="never" nodeType="tmRoot"/>
+      </p:par>
+    </p:tnLst>
+  </p:timing>
+</p:sld>
+</file>
+
+<file path=ppt/slides/slide24.xml><?xml version="1.0" encoding="utf-8"?>
+<p:sld xmlns:a="http://schemas.openxmlformats.org/drawingml/2006/main" xmlns:r="http://schemas.openxmlformats.org/officeDocument/2006/relationships" xmlns:p="http://schemas.openxmlformats.org/presentationml/2006/main">
+  <p:cSld>
+    <p:bg>
+      <p:bgPr>
+        <a:solidFill>
+          <a:schemeClr val="bg1"/>
+        </a:solidFill>
+        <a:effectLst/>
+      </p:bgPr>
+    </p:bg>
+    <p:spTree>
+      <p:nvGrpSpPr>
+        <p:cNvPr id="1" name=""/>
+        <p:cNvGrpSpPr/>
+        <p:nvPr/>
+      </p:nvGrpSpPr>
+      <p:grpSpPr>
+        <a:xfrm>
+          <a:off x="0" y="0"/>
+          <a:ext cx="0" cy="0"/>
+          <a:chOff x="0" y="0"/>
+          <a:chExt cx="0" cy="0"/>
+        </a:xfrm>
+      </p:grpSpPr>
+      <p:sp>
+        <p:nvSpPr>
+          <p:cNvPr id="2" name="Rectangle 1"/>
+          <p:cNvSpPr/>
+          <p:nvPr/>
+        </p:nvSpPr>
+        <p:spPr>
+          <a:xfrm>
+            <a:off x="755576" y="836712"/>
+            <a:ext cx="3240360" cy="1944216"/>
+          </a:xfrm>
+          <a:prstGeom prst="rect">
+            <a:avLst/>
+          </a:prstGeom>
+          <a:solidFill>
+            <a:schemeClr val="bg2"/>
+          </a:solidFill>
+          <a:ln>
+            <a:noFill/>
+          </a:ln>
+        </p:spPr>
+        <p:style>
+          <a:lnRef idx="2">
+            <a:schemeClr val="accent1">
+              <a:shade val="50000"/>
+            </a:schemeClr>
+          </a:lnRef>
+          <a:fillRef idx="1">
+            <a:schemeClr val="accent1"/>
+          </a:fillRef>
+          <a:effectRef idx="0">
+            <a:schemeClr val="accent1"/>
+          </a:effectRef>
+          <a:fontRef idx="minor">
+            <a:schemeClr val="lt1"/>
+          </a:fontRef>
+        </p:style>
+        <p:txBody>
+          <a:bodyPr rtlCol="0" anchor="ctr"/>
+          <a:lstStyle/>
+          <a:p>
+            <a:pPr algn="ctr"/>
+            <a:endParaRPr lang="en-SG"/>
+          </a:p>
+        </p:txBody>
+      </p:sp>
+      <p:sp>
+        <p:nvSpPr>
+          <p:cNvPr id="3" name="TextBox 2"/>
+          <p:cNvSpPr txBox="1"/>
+          <p:nvPr/>
+        </p:nvSpPr>
+        <p:spPr>
+          <a:xfrm>
+            <a:off x="899592" y="3356992"/>
+            <a:ext cx="3096344" cy="1754326"/>
+          </a:xfrm>
+          <a:prstGeom prst="rect">
+            <a:avLst/>
+          </a:prstGeom>
+          <a:noFill/>
+        </p:spPr>
+        <p:txBody>
+          <a:bodyPr wrap="square" rtlCol="0">
+            <a:spAutoFit/>
+          </a:bodyPr>
+          <a:lstStyle/>
+          <a:p>
+            <a:pPr marL="571500" indent="-571500">
+              <a:buFont typeface="Arial" panose="020B0604020202020204" pitchFamily="34" charset="0"/>
+              <a:buChar char="•"/>
+            </a:pPr>
+            <a:r>
+              <a:rPr lang="en-US" sz="3600" dirty="0" smtClean="0"/>
+              <a:t>Blah </a:t>
+            </a:r>
+            <a:r>
+              <a:rPr lang="en-US" sz="3600" dirty="0" err="1" smtClean="0"/>
+              <a:t>blah</a:t>
+            </a:r>
+            <a:endParaRPr lang="en-US" sz="3600" dirty="0" smtClean="0"/>
+          </a:p>
+          <a:p>
+            <a:pPr marL="571500" indent="-571500">
+              <a:buFont typeface="Arial" panose="020B0604020202020204" pitchFamily="34" charset="0"/>
+              <a:buChar char="•"/>
+            </a:pPr>
+            <a:r>
+              <a:rPr lang="en-US" sz="3600" dirty="0" smtClean="0"/>
+              <a:t>Blah </a:t>
+            </a:r>
+            <a:r>
+              <a:rPr lang="en-US" sz="3600" dirty="0" err="1" smtClean="0"/>
+              <a:t>blah</a:t>
+            </a:r>
+            <a:endParaRPr lang="en-US" sz="3600" dirty="0" smtClean="0"/>
+          </a:p>
+          <a:p>
+            <a:pPr marL="571500" indent="-571500">
+              <a:buFont typeface="Arial" panose="020B0604020202020204" pitchFamily="34" charset="0"/>
+              <a:buChar char="•"/>
+            </a:pPr>
+            <a:r>
+              <a:rPr lang="en-US" sz="3600" dirty="0" smtClean="0"/>
+              <a:t>Blah </a:t>
+            </a:r>
+            <a:r>
+              <a:rPr lang="en-US" sz="3600" dirty="0" err="1" smtClean="0"/>
+              <a:t>blah</a:t>
+            </a:r>
+            <a:endParaRPr lang="en-SG" sz="3600" dirty="0"/>
+          </a:p>
+        </p:txBody>
+      </p:sp>
+      <p:sp>
+        <p:nvSpPr>
+          <p:cNvPr id="4" name="Rectangle 3"/>
+          <p:cNvSpPr/>
+          <p:nvPr/>
+        </p:nvSpPr>
+        <p:spPr>
+          <a:xfrm>
+            <a:off x="4788024" y="836712"/>
+            <a:ext cx="3600400" cy="4392488"/>
+          </a:xfrm>
+          <a:prstGeom prst="rect">
+            <a:avLst/>
+          </a:prstGeom>
+        </p:spPr>
+        <p:style>
+          <a:lnRef idx="2">
+            <a:schemeClr val="accent3">
+              <a:shade val="50000"/>
+            </a:schemeClr>
+          </a:lnRef>
+          <a:fillRef idx="1">
+            <a:schemeClr val="accent3"/>
+          </a:fillRef>
+          <a:effectRef idx="0">
+            <a:schemeClr val="accent3"/>
+          </a:effectRef>
+          <a:fontRef idx="minor">
+            <a:schemeClr val="lt1"/>
+          </a:fontRef>
+        </p:style>
+        <p:txBody>
+          <a:bodyPr rtlCol="0" anchor="ctr"/>
+          <a:lstStyle/>
+          <a:p>
+            <a:pPr algn="ctr"/>
+            <a:endParaRPr lang="en-SG"/>
+          </a:p>
+        </p:txBody>
+      </p:sp>
+    </p:spTree>
+    <p:extLst>
+      <p:ext uri="{BB962C8B-B14F-4D97-AF65-F5344CB8AC3E}">
+        <p14:creationId xmlns:p14="http://schemas.microsoft.com/office/powerpoint/2010/main" val="3052038167"/>
+      </p:ext>
+    </p:extLst>
+  </p:cSld>
+  <p:clrMapOvr>
+    <a:masterClrMapping/>
+  </p:clrMapOvr>
+  <mc:AlternateContent xmlns:mc="http://schemas.openxmlformats.org/markup-compatibility/2006" xmlns:p14="http://schemas.microsoft.com/office/powerpoint/2010/main">
+    <mc:Choice Requires="p14">
+      <p:transition spd="med" p14:dur="700">
+        <p:fade/>
+      </p:transition>
+    </mc:Choice>
+    <mc:Fallback xmlns="">
+      <p:transition spd="med">
+        <p:fade/>
+      </p:transition>
+    </mc:Fallback>
+  </mc:AlternateContent>
+  <p:timing>
+    <p:tnLst>
+      <p:par>
+        <p:cTn id="1" dur="indefinite" restart="never" nodeType="tmRoot"/>
+      </p:par>
+    </p:tnLst>
+  </p:timing>
+</p:sld>
+</file>
+
+<file path=ppt/slides/slide25.xml><?xml version="1.0" encoding="utf-8"?>
+<p:sld xmlns:a="http://schemas.openxmlformats.org/drawingml/2006/main" xmlns:r="http://schemas.openxmlformats.org/officeDocument/2006/relationships" xmlns:p="http://schemas.openxmlformats.org/presentationml/2006/main">
+  <p:cSld name="PPTLabsZoomOut201506261628286238">
+    <p:bg>
+      <p:bgPr>
+        <a:solidFill>
+          <a:schemeClr val="bg1"/>
+        </a:solidFill>
+        <a:effectLst/>
+      </p:bgPr>
+    </p:bg>
+    <p:spTree>
+      <p:nvGrpSpPr>
+        <p:cNvPr id="1" name=""/>
+        <p:cNvGrpSpPr/>
+        <p:nvPr/>
+      </p:nvGrpSpPr>
+      <p:grpSpPr>
+        <a:xfrm>
+          <a:off x="0" y="0"/>
+          <a:ext cx="0" cy="0"/>
+          <a:chOff x="0" y="0"/>
+          <a:chExt cx="0" cy="0"/>
+        </a:xfrm>
+      </p:grpSpPr>
+      <p:pic>
+        <p:nvPicPr>
+          <p:cNvPr id="4098" name="PPTZoomOutShape201506261628286663"/>
+          <p:cNvPicPr>
+            <a:picLocks noChangeArrowheads="1"/>
+          </p:cNvPicPr>
+          <p:nvPr/>
+        </p:nvPicPr>
+        <p:blipFill>
+          <a:blip r:embed="rId2">
+            <a:extLst>
+              <a:ext uri="{28A0092B-C50C-407E-A947-70E740481C1C}">
+                <a14:useLocalDpi xmlns:a14="http://schemas.microsoft.com/office/drawing/2010/main" val="0"/>
+              </a:ext>
+            </a:extLst>
+          </a:blip>
+          <a:srcRect/>
+          <a:stretch>
+            <a:fillRect/>
+          </a:stretch>
+        </p:blipFill>
+        <p:spPr bwMode="auto">
+          <a:xfrm>
+            <a:off x="737393" y="780293"/>
+            <a:ext cx="7669213" cy="4505326"/>
+          </a:xfrm>
+          <a:prstGeom prst="rect">
+            <a:avLst/>
+          </a:prstGeom>
+          <a:ln/>
+          <a:extLst>
+            <a:ext uri="{909E8E84-426E-40DD-AFC4-6F175D3DCCD1}">
+              <a14:hiddenFill xmlns:a14="http://schemas.microsoft.com/office/drawing/2010/main">
+                <a:solidFill>
+                  <a:schemeClr val="accent1"/>
+                </a:solidFill>
+              </a14:hiddenFill>
+            </a:ext>
+            <a:ext uri="{91240B29-F687-4F45-9708-019B960494DF}">
+              <a14:hiddenLine xmlns:a14="http://schemas.microsoft.com/office/drawing/2010/main" w="9525">
+                <a:solidFill>
+                  <a:schemeClr val="tx1"/>
+                </a:solidFill>
+                <a:miter lim="800000"/>
+                <a:headEnd/>
+                <a:tailEnd/>
+              </a14:hiddenLine>
+            </a:ext>
+            <a:ext uri="{AF507438-7753-43E0-B8FC-AC1667EBCBE1}">
+              <a14:hiddenEffects xmlns:a14="http://schemas.microsoft.com/office/drawing/2010/main">
+                <a:effectLst>
+                  <a:outerShdw dist="35921" dir="2700000" algn="ctr" rotWithShape="0">
+                    <a:schemeClr val="bg2"/>
+                  </a:outerShdw>
+                </a:effectLst>
+              </a14:hiddenEffects>
+            </a:ext>
+          </a:extLst>
+        </p:spPr>
+      </p:pic>
+      <p:pic>
+        <p:nvPicPr>
+          <p:cNvPr id="9" name="PPTIndicator201506261628287163"/>
+          <p:cNvPicPr>
+            <a:picLocks/>
+          </p:cNvPicPr>
+          <p:nvPr/>
+        </p:nvPicPr>
+        <p:blipFill>
+          <a:blip r:embed="rId3" cstate="print">
+            <a:extLst>
+              <a:ext uri="{28A0092B-C50C-407E-A947-70E740481C1C}">
+                <a14:useLocalDpi xmlns:a14="http://schemas.microsoft.com/office/drawing/2010/main" val="0"/>
+              </a:ext>
+            </a:extLst>
+          </a:blip>
+          <a:stretch>
+            <a:fillRect/>
+          </a:stretch>
+        </p:blipFill>
+        <p:spPr>
+          <a:xfrm>
+            <a:off x="7620000" y="0"/>
+            <a:ext cx="1524000" cy="1066800"/>
+          </a:xfrm>
+          <a:prstGeom prst="rect">
+            <a:avLst/>
+          </a:prstGeom>
+        </p:spPr>
+      </p:pic>
+    </p:spTree>
+    <p:extLst>
+      <p:ext uri="{BB962C8B-B14F-4D97-AF65-F5344CB8AC3E}">
+        <p14:creationId xmlns:p14="http://schemas.microsoft.com/office/powerpoint/2010/main" val="2908905983"/>
+      </p:ext>
+    </p:extLst>
+  </p:cSld>
+  <p:clrMapOvr>
+    <a:masterClrMapping/>
+  </p:clrMapOvr>
+  <mc:AlternateContent xmlns:mc="http://schemas.openxmlformats.org/markup-compatibility/2006">
+    <mc:Choice xmlns:p14="http://schemas.microsoft.com/office/powerpoint/2010/main" Requires="p14">
+      <p:transition spd="med" p14:dur="700" advClick="0" advTm="0"/>
+    </mc:Choice>
+    <mc:Fallback>
+      <p:transition spd="med" advClick="0" advTm="0"/>
+    </mc:Fallback>
+  </mc:AlternateContent>
+  <p:timing>
+    <p:tnLst>
+      <p:par>
+        <p:cTn id="1" dur="indefinite" restart="never" nodeType="tmRoot">
+          <p:childTnLst>
+            <p:seq concurrent="1" nextAc="seek">
+              <p:cTn id="2" dur="indefinite" nodeType="mainSeq">
+                <p:childTnLst>
+                  <p:par>
+                    <p:cTn id="3" fill="hold">
+                      <p:stCondLst>
+                        <p:cond delay="indefinite"/>
+                        <p:cond evt="onBegin" delay="0">
+                          <p:tn val="2"/>
+                        </p:cond>
+                      </p:stCondLst>
+                      <p:childTnLst>
+                        <p:par>
+                          <p:cTn id="4" fill="hold">
+                            <p:stCondLst>
+                              <p:cond delay="0"/>
+                            </p:stCondLst>
+                            <p:childTnLst>
+                              <p:par>
+                                <p:cTn id="5" presetID="1" presetClass="entr" presetSubtype="0" fill="hold" nodeType="withEffect">
+                                  <p:stCondLst>
+                                    <p:cond delay="0"/>
+                                  </p:stCondLst>
+                                  <p:childTnLst>
+                                    <p:set>
+                                      <p:cBhvr>
+                                        <p:cTn id="6" dur="1" fill="hold">
+                                          <p:stCondLst>
+                                            <p:cond delay="0"/>
+                                          </p:stCondLst>
+                                        </p:cTn>
+                                        <p:tgtEl>
+                                          <p:spTgt spid="9"/>
+                                        </p:tgtEl>
+                                        <p:attrNameLst>
+                                          <p:attrName>style.visibility</p:attrName>
+                                        </p:attrNameLst>
+                                      </p:cBhvr>
+                                      <p:to>
+                                        <p:strVal val="visible"/>
+                                      </p:to>
+                                    </p:set>
+                                  </p:childTnLst>
+                                </p:cTn>
+                              </p:par>
+                              <p:par>
+                                <p:cTn id="7" presetID="1" presetClass="exit" presetSubtype="0" fill="hold" nodeType="withEffect">
+                                  <p:stCondLst>
+                                    <p:cond delay="0"/>
+                                  </p:stCondLst>
+                                  <p:childTnLst>
+                                    <p:set>
+                                      <p:cBhvr>
+                                        <p:cTn id="8" dur="1" fill="hold">
+                                          <p:stCondLst>
+                                            <p:cond delay="0"/>
+                                          </p:stCondLst>
+                                        </p:cTn>
+                                        <p:tgtEl>
+                                          <p:spTgt spid="9"/>
+                                        </p:tgtEl>
+                                        <p:attrNameLst>
+                                          <p:attrName>style.visibility</p:attrName>
+                                        </p:attrNameLst>
+                                      </p:cBhvr>
+                                      <p:to>
+                                        <p:strVal val="hidden"/>
+                                      </p:to>
+                                    </p:set>
+                                  </p:childTnLst>
+                                </p:cTn>
+                              </p:par>
+                              <p:par>
+                                <p:cTn id="9" presetID="42" presetClass="path" presetSubtype="0" fill="hold" nodeType="withEffect">
+                                  <p:stCondLst>
+                                    <p:cond delay="0"/>
+                                  </p:stCondLst>
+                                  <p:childTnLst>
+                                    <p:animMotion origin="layout" path="M 0 0 C 0.1584961 -0.1207483 0.1584961 -0.1207483 0.3169922 -0.2414967 E" pathEditMode="relative" ptsTypes="">
+                                      <p:cBhvr>
+                                        <p:cTn id="10" dur="500" fill="hold"/>
+                                        <p:tgtEl>
+                                          <p:spTgt spid="4098"/>
+                                        </p:tgtEl>
+                                        <p:attrNameLst>
+                                          <p:attrName>ppt_x</p:attrName>
+                                          <p:attrName>ppt_y</p:attrName>
+                                        </p:attrNameLst>
+                                      </p:cBhvr>
+                                    </p:animMotion>
+                                  </p:childTnLst>
+                                </p:cTn>
+                              </p:par>
+                              <p:par>
+                                <p:cTn id="11" presetID="6" presetClass="emph" presetSubtype="0" fill="hold" nodeType="withEffect">
+                                  <p:stCondLst>
+                                    <p:cond delay="0"/>
+                                  </p:stCondLst>
+                                  <p:childTnLst>
+                                    <p:animScale>
+                                      <p:cBhvr>
+                                        <p:cTn id="12" dur="500" fill="hold"/>
+                                        <p:tgtEl>
+                                          <p:spTgt spid="4098"/>
+                                        </p:tgtEl>
+                                      </p:cBhvr>
+                                      <p:by x="23366" y="23366"/>
+                                    </p:animScale>
+                                  </p:childTnLst>
+                                </p:cTn>
+                              </p:par>
+                            </p:childTnLst>
+                          </p:cTn>
+                        </p:par>
+                      </p:childTnLst>
+                    </p:cTn>
+                  </p:par>
+                </p:childTnLst>
+              </p:cTn>
+              <p:prevCondLst>
+                <p:cond evt="onPrev" delay="0">
+                  <p:tgtEl>
+                    <p:sldTgt/>
+                  </p:tgtEl>
+                </p:cond>
+              </p:prevCondLst>
+              <p:nextCondLst>
+                <p:cond evt="onNext" delay="0">
+                  <p:tgtEl>
+                    <p:sldTgt/>
+                  </p:tgtEl>
+                </p:cond>
+              </p:nextCondLst>
+            </p:seq>
+          </p:childTnLst>
+        </p:cTn>
+      </p:par>
+    </p:tnLst>
+  </p:timing>
+</p:sld>
+</file>
+
+<file path=ppt/slides/slide26.xml><?xml version="1.0" encoding="utf-8"?>
+<p:sld xmlns:a="http://schemas.openxmlformats.org/drawingml/2006/main" xmlns:r="http://schemas.openxmlformats.org/officeDocument/2006/relationships" xmlns:p="http://schemas.openxmlformats.org/presentationml/2006/main">
+  <p:cSld>
+    <p:bg>
+      <p:bgPr>
+        <a:solidFill>
+          <a:schemeClr val="bg1"/>
+        </a:solidFill>
+        <a:effectLst/>
+      </p:bgPr>
+    </p:bg>
+    <p:spTree>
+      <p:nvGrpSpPr>
+        <p:cNvPr id="1" name=""/>
+        <p:cNvGrpSpPr/>
+        <p:nvPr/>
+      </p:nvGrpSpPr>
+      <p:grpSpPr>
+        <a:xfrm>
+          <a:off x="0" y="0"/>
+          <a:ext cx="0" cy="0"/>
+          <a:chOff x="0" y="0"/>
+          <a:chExt cx="0" cy="0"/>
+        </a:xfrm>
+      </p:grpSpPr>
+      <p:sp>
+        <p:nvSpPr>
+          <p:cNvPr id="4" name="Rectangle 3"/>
+          <p:cNvSpPr/>
+          <p:nvPr/>
+        </p:nvSpPr>
+        <p:spPr>
+          <a:xfrm>
+            <a:off x="611560" y="764704"/>
+            <a:ext cx="7920880" cy="1224136"/>
+          </a:xfrm>
+          <a:prstGeom prst="rect">
+            <a:avLst/>
+          </a:prstGeom>
+          <a:noFill/>
+          <a:ln w="57150"/>
+        </p:spPr>
+        <p:style>
+          <a:lnRef idx="2">
+            <a:schemeClr val="accent1">
+              <a:shade val="50000"/>
+            </a:schemeClr>
+          </a:lnRef>
+          <a:fillRef idx="1">
+            <a:schemeClr val="accent1"/>
+          </a:fillRef>
+          <a:effectRef idx="0">
+            <a:schemeClr val="accent1"/>
+          </a:effectRef>
+          <a:fontRef idx="minor">
+            <a:schemeClr val="lt1"/>
+          </a:fontRef>
+        </p:style>
+        <p:txBody>
+          <a:bodyPr rtlCol="0" anchor="ctr"/>
+          <a:lstStyle/>
+          <a:p>
+            <a:pPr algn="ctr"/>
+            <a:endParaRPr lang="en-SG"/>
+          </a:p>
+        </p:txBody>
+      </p:sp>
+      <p:sp>
+        <p:nvSpPr>
+          <p:cNvPr id="5" name="Rectangle 4"/>
+          <p:cNvSpPr/>
+          <p:nvPr/>
+        </p:nvSpPr>
+        <p:spPr>
+          <a:xfrm>
+            <a:off x="611560" y="2348880"/>
+            <a:ext cx="7920880" cy="1224136"/>
+          </a:xfrm>
+          <a:prstGeom prst="rect">
+            <a:avLst/>
+          </a:prstGeom>
+          <a:noFill/>
+          <a:ln w="57150"/>
+        </p:spPr>
+        <p:style>
+          <a:lnRef idx="2">
+            <a:schemeClr val="accent2">
+              <a:shade val="50000"/>
+            </a:schemeClr>
+          </a:lnRef>
+          <a:fillRef idx="1">
+            <a:schemeClr val="accent2"/>
+          </a:fillRef>
+          <a:effectRef idx="0">
+            <a:schemeClr val="accent2"/>
+          </a:effectRef>
+          <a:fontRef idx="minor">
+            <a:schemeClr val="lt1"/>
+          </a:fontRef>
+        </p:style>
+        <p:txBody>
+          <a:bodyPr rtlCol="0" anchor="ctr"/>
+          <a:lstStyle/>
+          <a:p>
+            <a:pPr algn="ctr"/>
+            <a:endParaRPr lang="en-SG"/>
+          </a:p>
+        </p:txBody>
+      </p:sp>
+      <p:sp>
+        <p:nvSpPr>
+          <p:cNvPr id="6" name="Rectangle 5"/>
+          <p:cNvSpPr/>
+          <p:nvPr/>
+        </p:nvSpPr>
+        <p:spPr>
+          <a:xfrm>
+            <a:off x="611560" y="3933056"/>
+            <a:ext cx="7920880" cy="2376264"/>
+          </a:xfrm>
+          <a:prstGeom prst="rect">
+            <a:avLst/>
+          </a:prstGeom>
+          <a:noFill/>
+          <a:ln w="57150"/>
+        </p:spPr>
+        <p:style>
+          <a:lnRef idx="2">
+            <a:schemeClr val="accent4">
+              <a:shade val="50000"/>
+            </a:schemeClr>
+          </a:lnRef>
+          <a:fillRef idx="1">
+            <a:schemeClr val="accent4"/>
+          </a:fillRef>
+          <a:effectRef idx="0">
+            <a:schemeClr val="accent4"/>
+          </a:effectRef>
+          <a:fontRef idx="minor">
+            <a:schemeClr val="lt1"/>
+          </a:fontRef>
+        </p:style>
+        <p:txBody>
+          <a:bodyPr rtlCol="0" anchor="ctr"/>
+          <a:lstStyle/>
+          <a:p>
+            <a:pPr algn="ctr"/>
+            <a:endParaRPr lang="en-SG"/>
+          </a:p>
+        </p:txBody>
+      </p:sp>
+      <p:sp>
+        <p:nvSpPr>
+          <p:cNvPr id="8" name="Step Back This Shape" hidden="1"/>
+          <p:cNvSpPr/>
+          <p:nvPr/>
+        </p:nvSpPr>
+        <p:spPr>
+          <a:xfrm>
+            <a:off x="6768752" y="850404"/>
+            <a:ext cx="1403648" cy="1052736"/>
+          </a:xfrm>
+          <a:prstGeom prst="rect">
+            <a:avLst/>
+          </a:prstGeom>
+          <a:ln/>
+        </p:spPr>
+        <p:style>
+          <a:lnRef idx="2">
+            <a:schemeClr val="accent1">
+              <a:shade val="50000"/>
+            </a:schemeClr>
+          </a:lnRef>
+          <a:fillRef idx="1">
+            <a:schemeClr val="accent1"/>
+          </a:fillRef>
+          <a:effectRef idx="0">
+            <a:schemeClr val="accent1"/>
+          </a:effectRef>
+          <a:fontRef idx="minor">
+            <a:schemeClr val="lt1"/>
+          </a:fontRef>
+        </p:style>
+        <p:txBody>
+          <a:bodyPr rtlCol="0" anchor="ctr"/>
+          <a:lstStyle/>
+          <a:p>
+            <a:pPr algn="ctr"/>
+            <a:endParaRPr lang="en-SG" sz="2800" dirty="0"/>
+          </a:p>
+        </p:txBody>
+      </p:sp>
+      <p:pic>
+        <p:nvPicPr>
+          <p:cNvPr id="5122" name="PPTZoomOutShape201506261628287063"/>
+          <p:cNvPicPr>
+            <a:picLocks noChangeAspect="1" noChangeArrowheads="1"/>
+          </p:cNvPicPr>
+          <p:nvPr/>
+        </p:nvPicPr>
+        <p:blipFill>
+          <a:blip r:embed="rId2" cstate="print">
+            <a:extLst>
+              <a:ext uri="{28A0092B-C50C-407E-A947-70E740481C1C}">
+                <a14:useLocalDpi xmlns:a14="http://schemas.microsoft.com/office/drawing/2010/main" val="0"/>
+              </a:ext>
+            </a:extLst>
+          </a:blip>
+          <a:srcRect/>
+          <a:stretch>
+            <a:fillRect/>
+          </a:stretch>
+        </p:blipFill>
+        <p:spPr bwMode="auto">
+          <a:xfrm>
+            <a:off x="6574564" y="850404"/>
+            <a:ext cx="1792025" cy="1052736"/>
+          </a:xfrm>
+          <a:prstGeom prst="rect">
+            <a:avLst/>
+          </a:prstGeom>
+          <a:ln/>
+          <a:extLst>
+            <a:ext uri="{909E8E84-426E-40DD-AFC4-6F175D3DCCD1}">
+              <a14:hiddenFill xmlns:a14="http://schemas.microsoft.com/office/drawing/2010/main">
+                <a:solidFill>
+                  <a:schemeClr val="accent1"/>
+                </a:solidFill>
+              </a14:hiddenFill>
+            </a:ext>
+            <a:ext uri="{91240B29-F687-4F45-9708-019B960494DF}">
+              <a14:hiddenLine xmlns:a14="http://schemas.microsoft.com/office/drawing/2010/main" w="9525">
+                <a:solidFill>
+                  <a:schemeClr val="tx1"/>
+                </a:solidFill>
+                <a:miter lim="800000"/>
+                <a:headEnd/>
+                <a:tailEnd/>
+              </a14:hiddenLine>
+            </a:ext>
+            <a:ext uri="{AF507438-7753-43E0-B8FC-AC1667EBCBE1}">
+              <a14:hiddenEffects xmlns:a14="http://schemas.microsoft.com/office/drawing/2010/main">
+                <a:effectLst>
+                  <a:outerShdw dist="35921" dir="2700000" algn="ctr" rotWithShape="0">
+                    <a:schemeClr val="bg2"/>
+                  </a:outerShdw>
+                </a:effectLst>
+              </a14:hiddenEffects>
+            </a:ext>
+          </a:extLst>
+        </p:spPr>
+      </p:pic>
+    </p:spTree>
+    <p:extLst>
+      <p:ext uri="{BB962C8B-B14F-4D97-AF65-F5344CB8AC3E}">
+        <p14:creationId xmlns:p14="http://schemas.microsoft.com/office/powerpoint/2010/main" val="1329337919"/>
+      </p:ext>
+    </p:extLst>
+  </p:cSld>
+  <p:clrMapOvr>
+    <a:masterClrMapping/>
+  </p:clrMapOvr>
+  <mc:AlternateContent xmlns:mc="http://schemas.openxmlformats.org/markup-compatibility/2006">
+    <mc:Choice xmlns:p14="http://schemas.microsoft.com/office/powerpoint/2010/main" Requires="p14">
+      <p:transition p14:dur="250">
+        <p:fade/>
+      </p:transition>
+    </mc:Choice>
+    <mc:Fallback>
+      <p:transition>
+        <p:fade/>
+      </p:transition>
+    </mc:Fallback>
+  </mc:AlternateContent>
+  <p:timing>
+    <p:tnLst>
+      <p:par>
+        <p:cTn id="1" dur="indefinite" restart="never" nodeType="tmRoot"/>
+      </p:par>
+    </p:tnLst>
+  </p:timing>
+</p:sld>
+</file>
+
+<file path=ppt/slides/slide27.xml><?xml version="1.0" encoding="utf-8"?>
 <p:sld xmlns:a="http://schemas.openxmlformats.org/drawingml/2006/main" xmlns:r="http://schemas.openxmlformats.org/officeDocument/2006/relationships" xmlns:p="http://schemas.openxmlformats.org/presentationml/2006/main">
   <p:cSld>
     <p:spTree>
@@ -10920,7 +14141,7 @@
 </p:sld>
 </file>
 
-<file path=ppt/slides/slide16.xml><?xml version="1.0" encoding="utf-8"?>
+<file path=ppt/slides/slide28.xml><?xml version="1.0" encoding="utf-8"?>
 <p:sld xmlns:a="http://schemas.openxmlformats.org/drawingml/2006/main" xmlns:r="http://schemas.openxmlformats.org/officeDocument/2006/relationships" xmlns:p="http://schemas.openxmlformats.org/presentationml/2006/main">
   <p:cSld>
     <p:bg>
@@ -11147,7 +14368,7 @@
 </p:sld>
 </file>
 
-<file path=ppt/slides/slide17.xml><?xml version="1.0" encoding="utf-8"?>
+<file path=ppt/slides/slide29.xml><?xml version="1.0" encoding="utf-8"?>
 <p:sld xmlns:a="http://schemas.openxmlformats.org/drawingml/2006/main" xmlns:r="http://schemas.openxmlformats.org/officeDocument/2006/relationships" xmlns:p="http://schemas.openxmlformats.org/presentationml/2006/main" show="0">
   <p:cSld name="PPTLabsAcknowledgementSlide">
     <p:spTree>
@@ -11215,278 +14436,6 @@
 </p:sld>
 </file>
 
-<file path=ppt/slides/slide2.xml><?xml version="1.0" encoding="utf-8"?>
-<p:sld xmlns:a="http://schemas.openxmlformats.org/drawingml/2006/main" xmlns:r="http://schemas.openxmlformats.org/officeDocument/2006/relationships" xmlns:p="http://schemas.openxmlformats.org/presentationml/2006/main">
-  <p:cSld>
-    <p:bg>
-      <p:bgPr>
-        <a:solidFill>
-          <a:schemeClr val="accent6">
-            <a:lumMod val="75000"/>
-          </a:schemeClr>
-        </a:solidFill>
-        <a:effectLst/>
-      </p:bgPr>
-    </p:bg>
-    <p:spTree>
-      <p:nvGrpSpPr>
-        <p:cNvPr id="1" name=""/>
-        <p:cNvGrpSpPr/>
-        <p:nvPr/>
-      </p:nvGrpSpPr>
-      <p:grpSpPr>
-        <a:xfrm>
-          <a:off x="0" y="0"/>
-          <a:ext cx="0" cy="0"/>
-          <a:chOff x="0" y="0"/>
-          <a:chExt cx="0" cy="0"/>
-        </a:xfrm>
-      </p:grpSpPr>
-      <p:sp>
-        <p:nvSpPr>
-          <p:cNvPr id="2" name="Title 1"/>
-          <p:cNvSpPr>
-            <a:spLocks noGrp="1"/>
-          </p:cNvSpPr>
-          <p:nvPr>
-            <p:ph type="title"/>
-          </p:nvPr>
-        </p:nvSpPr>
-        <p:spPr>
-          <a:xfrm>
-            <a:off x="381000" y="609600"/>
-            <a:ext cx="8229600" cy="1143000"/>
-          </a:xfrm>
-        </p:spPr>
-        <p:txBody>
-          <a:bodyPr>
-            <a:noAutofit/>
-          </a:bodyPr>
-          <a:lstStyle/>
-          <a:p>
-            <a:pPr algn="l"/>
-            <a:r>
-              <a:rPr lang="en-US" sz="7200" dirty="0" smtClean="0">
-                <a:solidFill>
-                  <a:schemeClr val="bg1"/>
-                </a:solidFill>
-              </a:rPr>
-              <a:t>Auto Zoom</a:t>
-            </a:r>
-            <a:endParaRPr lang="en-SG" sz="7200" dirty="0">
-              <a:solidFill>
-                <a:schemeClr val="bg1"/>
-              </a:solidFill>
-            </a:endParaRPr>
-          </a:p>
-        </p:txBody>
-      </p:sp>
-      <p:sp>
-        <p:nvSpPr>
-          <p:cNvPr id="3" name="text 5"/>
-          <p:cNvSpPr txBox="1"/>
-          <p:nvPr/>
-        </p:nvSpPr>
-        <p:spPr>
-          <a:xfrm>
-            <a:off x="542636" y="2819400"/>
-            <a:ext cx="7620000" cy="3046988"/>
-          </a:xfrm>
-          <a:prstGeom prst="rect">
-            <a:avLst/>
-          </a:prstGeom>
-          <a:noFill/>
-        </p:spPr>
-        <p:txBody>
-          <a:bodyPr wrap="square" rtlCol="0">
-            <a:spAutoFit/>
-          </a:bodyPr>
-          <a:lstStyle/>
-          <a:p>
-            <a:r>
-              <a:rPr lang="en-US" sz="2400" b="1" dirty="0" smtClean="0">
-                <a:solidFill>
-                  <a:schemeClr val="bg1"/>
-                </a:solidFill>
-              </a:rPr>
-              <a:t>Additional instructions:</a:t>
-            </a:r>
-          </a:p>
-          <a:p>
-            <a:pPr marL="285750" indent="-285750">
-              <a:buFont typeface="Arial" panose="020B0604020202020204" pitchFamily="34" charset="0"/>
-              <a:buChar char="•"/>
-            </a:pPr>
-            <a:r>
-              <a:rPr lang="en-US" sz="2400" dirty="0" smtClean="0">
-                <a:solidFill>
-                  <a:schemeClr val="bg1"/>
-                </a:solidFill>
-              </a:rPr>
-              <a:t>Select the </a:t>
-            </a:r>
-            <a:r>
-              <a:rPr lang="en-US" sz="2400" b="1" dirty="0" smtClean="0">
-                <a:solidFill>
-                  <a:schemeClr val="bg1"/>
-                </a:solidFill>
-              </a:rPr>
-              <a:t>BLUE</a:t>
-            </a:r>
-            <a:r>
-              <a:rPr lang="en-US" sz="2400" dirty="0" smtClean="0">
-                <a:solidFill>
-                  <a:schemeClr val="bg1"/>
-                </a:solidFill>
-              </a:rPr>
-              <a:t> color </a:t>
-            </a:r>
-            <a:r>
-              <a:rPr lang="en-US" sz="2400" b="1" dirty="0" smtClean="0">
-                <a:solidFill>
-                  <a:schemeClr val="bg1"/>
-                </a:solidFill>
-              </a:rPr>
-              <a:t>Rectangle</a:t>
-            </a:r>
-            <a:r>
-              <a:rPr lang="en-US" sz="2400" dirty="0" smtClean="0">
-                <a:solidFill>
-                  <a:schemeClr val="bg1"/>
-                </a:solidFill>
-              </a:rPr>
-              <a:t> shape(s).</a:t>
-            </a:r>
-          </a:p>
-          <a:p>
-            <a:pPr marL="285750" indent="-285750">
-              <a:buFont typeface="Arial" panose="020B0604020202020204" pitchFamily="34" charset="0"/>
-              <a:buChar char="•"/>
-            </a:pPr>
-            <a:r>
-              <a:rPr lang="en-US" sz="2400" dirty="0" smtClean="0">
-                <a:solidFill>
-                  <a:schemeClr val="bg1"/>
-                </a:solidFill>
-              </a:rPr>
-              <a:t>Click </a:t>
-            </a:r>
-            <a:r>
-              <a:rPr lang="en-US" sz="2400" b="1" dirty="0" smtClean="0">
-                <a:solidFill>
-                  <a:schemeClr val="bg1"/>
-                </a:solidFill>
-              </a:rPr>
-              <a:t>“Drill Down” or “Step Back”</a:t>
-            </a:r>
-            <a:r>
-              <a:rPr lang="en-US" sz="2400" dirty="0" smtClean="0">
-                <a:solidFill>
-                  <a:schemeClr val="bg1"/>
-                </a:solidFill>
-              </a:rPr>
-              <a:t> button in the ribbon. </a:t>
-            </a:r>
-          </a:p>
-          <a:p>
-            <a:pPr marL="285750" indent="-285750">
-              <a:buFont typeface="Arial" panose="020B0604020202020204" pitchFamily="34" charset="0"/>
-              <a:buChar char="•"/>
-            </a:pPr>
-            <a:r>
-              <a:rPr lang="en-US" sz="2400" dirty="0" smtClean="0">
-                <a:solidFill>
-                  <a:schemeClr val="bg1"/>
-                </a:solidFill>
-              </a:rPr>
-              <a:t>Compare the result with the expected output.</a:t>
-            </a:r>
-          </a:p>
-          <a:p>
-            <a:pPr marL="285750" indent="-285750">
-              <a:buFont typeface="Arial" panose="020B0604020202020204" pitchFamily="34" charset="0"/>
-              <a:buChar char="•"/>
-            </a:pPr>
-            <a:r>
-              <a:rPr lang="en-SG" sz="2400" dirty="0">
-                <a:solidFill>
-                  <a:schemeClr val="bg1"/>
-                </a:solidFill>
-              </a:rPr>
-              <a:t>Also try tweaking these:</a:t>
-            </a:r>
-          </a:p>
-          <a:p>
-            <a:pPr marL="742950" lvl="1" indent="-285750">
-              <a:buFont typeface="Arial" panose="020B0604020202020204" pitchFamily="34" charset="0"/>
-              <a:buChar char="•"/>
-            </a:pPr>
-            <a:r>
-              <a:rPr lang="en-SG" sz="2400" dirty="0" smtClean="0">
-                <a:solidFill>
-                  <a:schemeClr val="bg1"/>
-                </a:solidFill>
-              </a:rPr>
-              <a:t>Include Slide Background</a:t>
-            </a:r>
-            <a:endParaRPr lang="en-SG" sz="2400" dirty="0">
-              <a:solidFill>
-                <a:schemeClr val="bg1"/>
-              </a:solidFill>
-            </a:endParaRPr>
-          </a:p>
-          <a:p>
-            <a:pPr marL="742950" lvl="1" indent="-285750">
-              <a:buFont typeface="Arial" panose="020B0604020202020204" pitchFamily="34" charset="0"/>
-              <a:buChar char="•"/>
-            </a:pPr>
-            <a:r>
-              <a:rPr lang="en-SG" sz="2400" dirty="0" smtClean="0">
-                <a:solidFill>
-                  <a:schemeClr val="bg1"/>
-                </a:solidFill>
-              </a:rPr>
-              <a:t>Put All Zoom Effects on Separate Slides</a:t>
-            </a:r>
-            <a:endParaRPr lang="en-SG" sz="2400" dirty="0">
-              <a:solidFill>
-                <a:schemeClr val="bg1"/>
-              </a:solidFill>
-            </a:endParaRPr>
-          </a:p>
-          <a:p>
-            <a:pPr marL="285750" indent="-285750">
-              <a:buFont typeface="Arial" panose="020B0604020202020204" pitchFamily="34" charset="0"/>
-              <a:buChar char="•"/>
-            </a:pPr>
-            <a:endParaRPr lang="en-SG" sz="2400" dirty="0">
-              <a:solidFill>
-                <a:schemeClr val="bg1"/>
-              </a:solidFill>
-            </a:endParaRPr>
-          </a:p>
-        </p:txBody>
-      </p:sp>
-    </p:spTree>
-    <p:extLst>
-      <p:ext uri="{BB962C8B-B14F-4D97-AF65-F5344CB8AC3E}">
-        <p14:creationId xmlns:p14="http://schemas.microsoft.com/office/powerpoint/2010/main" val="1569131388"/>
-      </p:ext>
-    </p:extLst>
-  </p:cSld>
-  <p:clrMapOvr>
-    <a:masterClrMapping/>
-  </p:clrMapOvr>
-  <p:timing>
-    <p:tnLst>
-      <p:par>
-        <p:cTn id="1" dur="indefinite" restart="never" nodeType="tmRoot"/>
-      </p:par>
-    </p:tnLst>
-  </p:timing>
-</p:sld>
-</file>
-
 <file path=ppt/slides/slide3.xml><?xml version="1.0" encoding="utf-8"?>
 <p:sld xmlns:a="http://schemas.openxmlformats.org/drawingml/2006/main" xmlns:r="http://schemas.openxmlformats.org/officeDocument/2006/relationships" xmlns:p="http://schemas.openxmlformats.org/presentationml/2006/main">
   <p:cSld>
@@ -11541,6 +14490,28 @@
         <p:txBody>
           <a:bodyPr/>
           <a:lstStyle/>
+          <a:p>
+            <a:r>
+              <a:rPr lang="en-SG" dirty="0" smtClean="0"/>
+              <a:t>Enable </a:t>
+            </a:r>
+            <a:r>
+              <a:rPr lang="en-SG" dirty="0"/>
+              <a:t>slide background </a:t>
+            </a:r>
+            <a:r>
+              <a:rPr lang="en-SG" dirty="0" smtClean="0"/>
+              <a:t>in </a:t>
+            </a:r>
+            <a:r>
+              <a:rPr lang="en-SG" dirty="0" err="1"/>
+              <a:t>AutoZoom</a:t>
+            </a:r>
+            <a:r>
+              <a:rPr lang="en-SG" dirty="0"/>
+              <a:t> settings</a:t>
+            </a:r>
+          </a:p>
           <a:p>
             <a:endParaRPr lang="en-SG" dirty="0"/>
           </a:p>
@@ -13161,7 +16132,7 @@
           <a:p>
             <a:r>
               <a:rPr lang="en-US" dirty="0" smtClean="0"/>
-              <a:t>Auto Zoom:: Simple Zoom Out (Step Back)</a:t>
+              <a:t>Auto Zoom:: Simple Zoom In (Drill Down)</a:t>
             </a:r>
             <a:endParaRPr lang="en-SG" dirty="0"/>
           </a:p>
@@ -13181,6 +16152,24 @@
         <p:txBody>
           <a:bodyPr/>
           <a:lstStyle/>
+          <a:p>
+            <a:r>
+              <a:rPr lang="en-SG" dirty="0"/>
+              <a:t>Disable </a:t>
+            </a:r>
+            <a:r>
+              <a:rPr lang="en-SG" dirty="0" smtClean="0"/>
+              <a:t>slide background in </a:t>
+            </a:r>
+            <a:r>
+              <a:rPr lang="en-SG" dirty="0" err="1"/>
+              <a:t>AutoZoom</a:t>
+            </a:r>
+            <a:r>
+              <a:rPr lang="en-SG" dirty="0"/>
+              <a:t> settings</a:t>
+            </a:r>
+          </a:p>
           <a:p>
             <a:endParaRPr lang="en-SG" dirty="0"/>
           </a:p>
@@ -13189,7 +16178,7 @@
     </p:spTree>
     <p:extLst>
       <p:ext uri="{BB962C8B-B14F-4D97-AF65-F5344CB8AC3E}">
-        <p14:creationId xmlns:p14="http://schemas.microsoft.com/office/powerpoint/2010/main" val="3977557748"/>
+        <p14:creationId xmlns:p14="http://schemas.microsoft.com/office/powerpoint/2010/main" val="2487773077"/>
       </p:ext>
     </p:extLst>
   </p:cSld>

</xml_diff>

<commit_message>
Make AutoZoom and ZoomToArea tests harder by adding hidden shapes
</commit_message>
<xml_diff>
--- a/doc/test/AutoZoom.pptx
+++ b/doc/test/AutoZoom.pptx
@@ -24,18 +24,20 @@
     <p:sldId id="318" r:id="rId18"/>
     <p:sldId id="319" r:id="rId19"/>
     <p:sldId id="320" r:id="rId20"/>
-    <p:sldId id="313" r:id="rId21"/>
-    <p:sldId id="315" r:id="rId22"/>
-    <p:sldId id="314" r:id="rId23"/>
-    <p:sldId id="304" r:id="rId24"/>
-    <p:sldId id="305" r:id="rId25"/>
-    <p:sldId id="306" r:id="rId26"/>
-    <p:sldId id="324" r:id="rId27"/>
-    <p:sldId id="329" r:id="rId28"/>
-    <p:sldId id="325" r:id="rId29"/>
-    <p:sldId id="316" r:id="rId30"/>
-    <p:sldId id="317" r:id="rId31"/>
-    <p:sldId id="312" r:id="rId32"/>
+    <p:sldId id="331" r:id="rId21"/>
+    <p:sldId id="313" r:id="rId22"/>
+    <p:sldId id="315" r:id="rId23"/>
+    <p:sldId id="314" r:id="rId24"/>
+    <p:sldId id="304" r:id="rId25"/>
+    <p:sldId id="305" r:id="rId26"/>
+    <p:sldId id="306" r:id="rId27"/>
+    <p:sldId id="332" r:id="rId28"/>
+    <p:sldId id="324" r:id="rId29"/>
+    <p:sldId id="329" r:id="rId30"/>
+    <p:sldId id="325" r:id="rId31"/>
+    <p:sldId id="316" r:id="rId32"/>
+    <p:sldId id="317" r:id="rId33"/>
+    <p:sldId id="312" r:id="rId34"/>
   </p:sldIdLst>
   <p:sldSz cx="9144000" cy="6858000" type="screen4x3"/>
   <p:notesSz cx="6858000" cy="9144000"/>
@@ -160,12 +162,14 @@
             <p14:sldId id="318"/>
             <p14:sldId id="319"/>
             <p14:sldId id="320"/>
+            <p14:sldId id="331"/>
             <p14:sldId id="313"/>
             <p14:sldId id="315"/>
             <p14:sldId id="314"/>
             <p14:sldId id="304"/>
             <p14:sldId id="305"/>
             <p14:sldId id="306"/>
+            <p14:sldId id="332"/>
             <p14:sldId id="324"/>
             <p14:sldId id="329"/>
             <p14:sldId id="325"/>
@@ -177,7 +181,7 @@
       </p14:sectionLst>
     </p:ext>
     <p:ext uri="{EFAFB233-063F-42B5-8137-9DF3F51BA10A}">
-      <p15:sldGuideLst xmlns="" xmlns:p15="http://schemas.microsoft.com/office/powerpoint/2012/main">
+      <p15:sldGuideLst xmlns:p15="http://schemas.microsoft.com/office/powerpoint/2012/main" xmlns="">
         <p15:guide id="1" orient="horz" pos="2160">
           <p15:clr>
             <a:srgbClr val="A4A3A4"/>
@@ -9596,6 +9600,100 @@
           </a:p>
         </p:txBody>
       </p:sp>
+      <p:sp>
+        <p:nvSpPr>
+          <p:cNvPr id="7" name="Rectangle 1" hidden="1"/>
+          <p:cNvSpPr/>
+          <p:nvPr/>
+        </p:nvSpPr>
+        <p:spPr>
+          <a:xfrm>
+            <a:off x="914400" y="533400"/>
+            <a:ext cx="3048000" cy="2556284"/>
+          </a:xfrm>
+          <a:prstGeom prst="rect">
+            <a:avLst/>
+          </a:prstGeom>
+          <a:solidFill>
+            <a:srgbClr val="FF0000"/>
+          </a:solidFill>
+        </p:spPr>
+        <p:style>
+          <a:lnRef idx="2">
+            <a:schemeClr val="accent1">
+              <a:shade val="50000"/>
+            </a:schemeClr>
+          </a:lnRef>
+          <a:fillRef idx="1">
+            <a:schemeClr val="accent1"/>
+          </a:fillRef>
+          <a:effectRef idx="0">
+            <a:schemeClr val="accent1"/>
+          </a:effectRef>
+          <a:fontRef idx="minor">
+            <a:schemeClr val="lt1"/>
+          </a:fontRef>
+        </p:style>
+        <p:txBody>
+          <a:bodyPr rtlCol="0" anchor="ctr"/>
+          <a:lstStyle/>
+          <a:p>
+            <a:pPr algn="ctr"/>
+            <a:r>
+              <a:rPr lang="en-US" dirty="0" smtClean="0"/>
+              <a:t>HIDDEN SHAPE</a:t>
+            </a:r>
+            <a:endParaRPr lang="en-US" dirty="0"/>
+          </a:p>
+        </p:txBody>
+      </p:sp>
+      <p:sp>
+        <p:nvSpPr>
+          <p:cNvPr id="9" name="Oval 2" hidden="1"/>
+          <p:cNvSpPr/>
+          <p:nvPr/>
+        </p:nvSpPr>
+        <p:spPr>
+          <a:xfrm>
+            <a:off x="5130452" y="3188532"/>
+            <a:ext cx="3276600" cy="3124200"/>
+          </a:xfrm>
+          <a:prstGeom prst="ellipse">
+            <a:avLst/>
+          </a:prstGeom>
+          <a:solidFill>
+            <a:schemeClr val="tx1"/>
+          </a:solidFill>
+        </p:spPr>
+        <p:style>
+          <a:lnRef idx="2">
+            <a:schemeClr val="accent1">
+              <a:shade val="50000"/>
+            </a:schemeClr>
+          </a:lnRef>
+          <a:fillRef idx="1">
+            <a:schemeClr val="accent1"/>
+          </a:fillRef>
+          <a:effectRef idx="0">
+            <a:schemeClr val="accent1"/>
+          </a:effectRef>
+          <a:fontRef idx="minor">
+            <a:schemeClr val="lt1"/>
+          </a:fontRef>
+        </p:style>
+        <p:txBody>
+          <a:bodyPr rtlCol="0" anchor="ctr"/>
+          <a:lstStyle/>
+          <a:p>
+            <a:pPr algn="ctr"/>
+            <a:r>
+              <a:rPr lang="en-US" dirty="0" smtClean="0"/>
+              <a:t>HIDDEN SHAPE</a:t>
+            </a:r>
+            <a:endParaRPr lang="en-US" dirty="0"/>
+          </a:p>
+        </p:txBody>
+      </p:sp>
     </p:spTree>
     <p:extLst>
       <p:ext uri="{BB962C8B-B14F-4D97-AF65-F5344CB8AC3E}">
@@ -9804,6 +9902,100 @@
           <a:p>
             <a:pPr algn="ctr"/>
             <a:endParaRPr lang="en-SG"/>
+          </a:p>
+        </p:txBody>
+      </p:sp>
+      <p:sp>
+        <p:nvSpPr>
+          <p:cNvPr id="5" name="Rectangle 1" hidden="1"/>
+          <p:cNvSpPr/>
+          <p:nvPr/>
+        </p:nvSpPr>
+        <p:spPr>
+          <a:xfrm>
+            <a:off x="914400" y="533400"/>
+            <a:ext cx="3048000" cy="2556284"/>
+          </a:xfrm>
+          <a:prstGeom prst="rect">
+            <a:avLst/>
+          </a:prstGeom>
+          <a:solidFill>
+            <a:srgbClr val="FF0000"/>
+          </a:solidFill>
+        </p:spPr>
+        <p:style>
+          <a:lnRef idx="2">
+            <a:schemeClr val="accent1">
+              <a:shade val="50000"/>
+            </a:schemeClr>
+          </a:lnRef>
+          <a:fillRef idx="1">
+            <a:schemeClr val="accent1"/>
+          </a:fillRef>
+          <a:effectRef idx="0">
+            <a:schemeClr val="accent1"/>
+          </a:effectRef>
+          <a:fontRef idx="minor">
+            <a:schemeClr val="lt1"/>
+          </a:fontRef>
+        </p:style>
+        <p:txBody>
+          <a:bodyPr rtlCol="0" anchor="ctr"/>
+          <a:lstStyle/>
+          <a:p>
+            <a:pPr algn="ctr"/>
+            <a:r>
+              <a:rPr lang="en-US" dirty="0" smtClean="0"/>
+              <a:t>HIDDEN SHAPE</a:t>
+            </a:r>
+            <a:endParaRPr lang="en-US" dirty="0"/>
+          </a:p>
+        </p:txBody>
+      </p:sp>
+      <p:sp>
+        <p:nvSpPr>
+          <p:cNvPr id="6" name="Oval 2" hidden="1"/>
+          <p:cNvSpPr/>
+          <p:nvPr/>
+        </p:nvSpPr>
+        <p:spPr>
+          <a:xfrm>
+            <a:off x="5130452" y="3188532"/>
+            <a:ext cx="3276600" cy="3124200"/>
+          </a:xfrm>
+          <a:prstGeom prst="ellipse">
+            <a:avLst/>
+          </a:prstGeom>
+          <a:solidFill>
+            <a:schemeClr val="tx1"/>
+          </a:solidFill>
+        </p:spPr>
+        <p:style>
+          <a:lnRef idx="2">
+            <a:schemeClr val="accent1">
+              <a:shade val="50000"/>
+            </a:schemeClr>
+          </a:lnRef>
+          <a:fillRef idx="1">
+            <a:schemeClr val="accent1"/>
+          </a:fillRef>
+          <a:effectRef idx="0">
+            <a:schemeClr val="accent1"/>
+          </a:effectRef>
+          <a:fontRef idx="minor">
+            <a:schemeClr val="lt1"/>
+          </a:fontRef>
+        </p:style>
+        <p:txBody>
+          <a:bodyPr rtlCol="0" anchor="ctr"/>
+          <a:lstStyle/>
+          <a:p>
+            <a:pPr algn="ctr"/>
+            <a:r>
+              <a:rPr lang="en-US" dirty="0" smtClean="0"/>
+              <a:t>HIDDEN SHAPE</a:t>
+            </a:r>
+            <a:endParaRPr lang="en-US" dirty="0"/>
           </a:p>
         </p:txBody>
       </p:sp>
@@ -10444,11 +10636,11 @@
   <p:clrMapOvr>
     <a:masterClrMapping/>
   </p:clrMapOvr>
-  <mc:AlternateContent xmlns:mc="http://schemas.openxmlformats.org/markup-compatibility/2006">
-    <mc:Choice xmlns:p14="http://schemas.microsoft.com/office/powerpoint/2010/main" Requires="p14">
+  <mc:AlternateContent xmlns:mc="http://schemas.openxmlformats.org/markup-compatibility/2006" xmlns:p14="http://schemas.microsoft.com/office/powerpoint/2010/main">
+    <mc:Choice Requires="p14">
       <p:transition spd="med" p14:dur="700" advClick="0" advTm="0"/>
     </mc:Choice>
-    <mc:Fallback>
+    <mc:Fallback xmlns="">
       <p:transition spd="med" advClick="0" advTm="0"/>
     </mc:Fallback>
   </mc:AlternateContent>
@@ -10897,13 +11089,13 @@
   <p:clrMapOvr>
     <a:masterClrMapping/>
   </p:clrMapOvr>
-  <mc:AlternateContent xmlns:mc="http://schemas.openxmlformats.org/markup-compatibility/2006">
-    <mc:Choice xmlns:p14="http://schemas.microsoft.com/office/powerpoint/2010/main" Requires="p14">
+  <mc:AlternateContent xmlns:mc="http://schemas.openxmlformats.org/markup-compatibility/2006" xmlns:p14="http://schemas.microsoft.com/office/powerpoint/2010/main">
+    <mc:Choice Requires="p14">
       <p:transition p14:dur="250">
         <p:fade/>
       </p:transition>
     </mc:Choice>
-    <mc:Fallback>
+    <mc:Fallback xmlns="">
       <p:transition>
         <p:fade/>
       </p:transition>
@@ -11196,6 +11388,100 @@
           <a:p>
             <a:pPr algn="ctr"/>
             <a:endParaRPr lang="en-SG"/>
+          </a:p>
+        </p:txBody>
+      </p:sp>
+      <p:sp>
+        <p:nvSpPr>
+          <p:cNvPr id="5" name="Rectangle 1" hidden="1"/>
+          <p:cNvSpPr/>
+          <p:nvPr/>
+        </p:nvSpPr>
+        <p:spPr>
+          <a:xfrm>
+            <a:off x="914400" y="533400"/>
+            <a:ext cx="3048000" cy="2556284"/>
+          </a:xfrm>
+          <a:prstGeom prst="rect">
+            <a:avLst/>
+          </a:prstGeom>
+          <a:solidFill>
+            <a:srgbClr val="FF0000"/>
+          </a:solidFill>
+        </p:spPr>
+        <p:style>
+          <a:lnRef idx="2">
+            <a:schemeClr val="accent1">
+              <a:shade val="50000"/>
+            </a:schemeClr>
+          </a:lnRef>
+          <a:fillRef idx="1">
+            <a:schemeClr val="accent1"/>
+          </a:fillRef>
+          <a:effectRef idx="0">
+            <a:schemeClr val="accent1"/>
+          </a:effectRef>
+          <a:fontRef idx="minor">
+            <a:schemeClr val="lt1"/>
+          </a:fontRef>
+        </p:style>
+        <p:txBody>
+          <a:bodyPr rtlCol="0" anchor="ctr"/>
+          <a:lstStyle/>
+          <a:p>
+            <a:pPr algn="ctr"/>
+            <a:r>
+              <a:rPr lang="en-US" dirty="0" smtClean="0"/>
+              <a:t>HIDDEN SHAPE</a:t>
+            </a:r>
+            <a:endParaRPr lang="en-US" dirty="0"/>
+          </a:p>
+        </p:txBody>
+      </p:sp>
+      <p:sp>
+        <p:nvSpPr>
+          <p:cNvPr id="6" name="Oval 2" hidden="1"/>
+          <p:cNvSpPr/>
+          <p:nvPr/>
+        </p:nvSpPr>
+        <p:spPr>
+          <a:xfrm>
+            <a:off x="5130452" y="3188532"/>
+            <a:ext cx="3276600" cy="3124200"/>
+          </a:xfrm>
+          <a:prstGeom prst="ellipse">
+            <a:avLst/>
+          </a:prstGeom>
+          <a:solidFill>
+            <a:schemeClr val="tx1"/>
+          </a:solidFill>
+        </p:spPr>
+        <p:style>
+          <a:lnRef idx="2">
+            <a:schemeClr val="accent1">
+              <a:shade val="50000"/>
+            </a:schemeClr>
+          </a:lnRef>
+          <a:fillRef idx="1">
+            <a:schemeClr val="accent1"/>
+          </a:fillRef>
+          <a:effectRef idx="0">
+            <a:schemeClr val="accent1"/>
+          </a:effectRef>
+          <a:fontRef idx="minor">
+            <a:schemeClr val="lt1"/>
+          </a:fontRef>
+        </p:style>
+        <p:txBody>
+          <a:bodyPr rtlCol="0" anchor="ctr"/>
+          <a:lstStyle/>
+          <a:p>
+            <a:pPr algn="ctr"/>
+            <a:r>
+              <a:rPr lang="en-US" dirty="0" smtClean="0"/>
+              <a:t>HIDDEN SHAPE</a:t>
+            </a:r>
+            <a:endParaRPr lang="en-US" dirty="0"/>
           </a:p>
         </p:txBody>
       </p:sp>
@@ -11427,6 +11713,100 @@
           </a:p>
         </p:txBody>
       </p:sp>
+      <p:sp>
+        <p:nvSpPr>
+          <p:cNvPr id="7" name="Rectangle 1" hidden="1"/>
+          <p:cNvSpPr/>
+          <p:nvPr/>
+        </p:nvSpPr>
+        <p:spPr>
+          <a:xfrm>
+            <a:off x="914400" y="533400"/>
+            <a:ext cx="3048000" cy="2556284"/>
+          </a:xfrm>
+          <a:prstGeom prst="rect">
+            <a:avLst/>
+          </a:prstGeom>
+          <a:solidFill>
+            <a:srgbClr val="FF0000"/>
+          </a:solidFill>
+        </p:spPr>
+        <p:style>
+          <a:lnRef idx="2">
+            <a:schemeClr val="accent1">
+              <a:shade val="50000"/>
+            </a:schemeClr>
+          </a:lnRef>
+          <a:fillRef idx="1">
+            <a:schemeClr val="accent1"/>
+          </a:fillRef>
+          <a:effectRef idx="0">
+            <a:schemeClr val="accent1"/>
+          </a:effectRef>
+          <a:fontRef idx="minor">
+            <a:schemeClr val="lt1"/>
+          </a:fontRef>
+        </p:style>
+        <p:txBody>
+          <a:bodyPr rtlCol="0" anchor="ctr"/>
+          <a:lstStyle/>
+          <a:p>
+            <a:pPr algn="ctr"/>
+            <a:r>
+              <a:rPr lang="en-US" dirty="0" smtClean="0"/>
+              <a:t>HIDDEN SHAPE</a:t>
+            </a:r>
+            <a:endParaRPr lang="en-US" dirty="0"/>
+          </a:p>
+        </p:txBody>
+      </p:sp>
+      <p:sp>
+        <p:nvSpPr>
+          <p:cNvPr id="9" name="Oval 2" hidden="1"/>
+          <p:cNvSpPr/>
+          <p:nvPr/>
+        </p:nvSpPr>
+        <p:spPr>
+          <a:xfrm>
+            <a:off x="5130452" y="3188532"/>
+            <a:ext cx="3276600" cy="3124200"/>
+          </a:xfrm>
+          <a:prstGeom prst="ellipse">
+            <a:avLst/>
+          </a:prstGeom>
+          <a:solidFill>
+            <a:schemeClr val="tx1"/>
+          </a:solidFill>
+        </p:spPr>
+        <p:style>
+          <a:lnRef idx="2">
+            <a:schemeClr val="accent1">
+              <a:shade val="50000"/>
+            </a:schemeClr>
+          </a:lnRef>
+          <a:fillRef idx="1">
+            <a:schemeClr val="accent1"/>
+          </a:fillRef>
+          <a:effectRef idx="0">
+            <a:schemeClr val="accent1"/>
+          </a:effectRef>
+          <a:fontRef idx="minor">
+            <a:schemeClr val="lt1"/>
+          </a:fontRef>
+        </p:style>
+        <p:txBody>
+          <a:bodyPr rtlCol="0" anchor="ctr"/>
+          <a:lstStyle/>
+          <a:p>
+            <a:pPr algn="ctr"/>
+            <a:r>
+              <a:rPr lang="en-US" dirty="0" smtClean="0"/>
+              <a:t>HIDDEN SHAPE</a:t>
+            </a:r>
+            <a:endParaRPr lang="en-US" dirty="0"/>
+          </a:p>
+        </p:txBody>
+      </p:sp>
     </p:spTree>
     <p:extLst>
       <p:ext uri="{BB962C8B-B14F-4D97-AF65-F5344CB8AC3E}">
@@ -11462,6 +11842,72 @@
 <file path=ppt/slides/slide18.xml><?xml version="1.0" encoding="utf-8"?>
 <p:sld xmlns:a="http://schemas.openxmlformats.org/drawingml/2006/main" xmlns:r="http://schemas.openxmlformats.org/officeDocument/2006/relationships" xmlns:p="http://schemas.openxmlformats.org/presentationml/2006/main">
   <p:cSld>
+    <p:spTree>
+      <p:nvGrpSpPr>
+        <p:cNvPr id="1" name=""/>
+        <p:cNvGrpSpPr/>
+        <p:nvPr/>
+      </p:nvGrpSpPr>
+      <p:grpSpPr>
+        <a:xfrm>
+          <a:off x="0" y="0"/>
+          <a:ext cx="0" cy="0"/>
+          <a:chOff x="0" y="0"/>
+          <a:chExt cx="0" cy="0"/>
+        </a:xfrm>
+      </p:grpSpPr>
+      <p:sp>
+        <p:nvSpPr>
+          <p:cNvPr id="2" name="Title 1"/>
+          <p:cNvSpPr>
+            <a:spLocks noGrp="1"/>
+          </p:cNvSpPr>
+          <p:nvPr>
+            <p:ph type="title"/>
+          </p:nvPr>
+        </p:nvSpPr>
+        <p:spPr>
+          <a:xfrm>
+            <a:off x="457200" y="2438400"/>
+            <a:ext cx="8229600" cy="1143000"/>
+          </a:xfrm>
+        </p:spPr>
+        <p:txBody>
+          <a:bodyPr/>
+          <a:lstStyle/>
+          <a:p>
+            <a:pPr algn="ctr"/>
+            <a:r>
+              <a:rPr lang="en-US" b="1" dirty="0" smtClean="0"/>
+              <a:t>Dummy slide</a:t>
+            </a:r>
+            <a:endParaRPr lang="en-SG" b="1" dirty="0"/>
+          </a:p>
+        </p:txBody>
+      </p:sp>
+    </p:spTree>
+    <p:extLst>
+      <p:ext uri="{BB962C8B-B14F-4D97-AF65-F5344CB8AC3E}">
+        <p14:creationId xmlns:p14="http://schemas.microsoft.com/office/powerpoint/2010/main" val="1709568505"/>
+      </p:ext>
+    </p:extLst>
+  </p:cSld>
+  <p:clrMapOvr>
+    <a:masterClrMapping/>
+  </p:clrMapOvr>
+  <p:timing>
+    <p:tnLst>
+      <p:par>
+        <p:cTn id="1" dur="indefinite" restart="never" nodeType="tmRoot"/>
+      </p:par>
+    </p:tnLst>
+  </p:timing>
+</p:sld>
+</file>
+
+<file path=ppt/slides/slide19.xml><?xml version="1.0" encoding="utf-8"?>
+<p:sld xmlns:a="http://schemas.openxmlformats.org/drawingml/2006/main" xmlns:r="http://schemas.openxmlformats.org/officeDocument/2006/relationships" xmlns:p="http://schemas.openxmlformats.org/presentationml/2006/main">
+  <p:cSld>
     <p:bg>
       <p:bgPr>
         <a:solidFill>
@@ -11670,7 +12116,279 @@
 </p:sld>
 </file>
 
-<file path=ppt/slides/slide19.xml><?xml version="1.0" encoding="utf-8"?>
+<file path=ppt/slides/slide2.xml><?xml version="1.0" encoding="utf-8"?>
+<p:sld xmlns:a="http://schemas.openxmlformats.org/drawingml/2006/main" xmlns:r="http://schemas.openxmlformats.org/officeDocument/2006/relationships" xmlns:p="http://schemas.openxmlformats.org/presentationml/2006/main">
+  <p:cSld>
+    <p:bg>
+      <p:bgPr>
+        <a:solidFill>
+          <a:schemeClr val="accent6">
+            <a:lumMod val="75000"/>
+          </a:schemeClr>
+        </a:solidFill>
+        <a:effectLst/>
+      </p:bgPr>
+    </p:bg>
+    <p:spTree>
+      <p:nvGrpSpPr>
+        <p:cNvPr id="1" name=""/>
+        <p:cNvGrpSpPr/>
+        <p:nvPr/>
+      </p:nvGrpSpPr>
+      <p:grpSpPr>
+        <a:xfrm>
+          <a:off x="0" y="0"/>
+          <a:ext cx="0" cy="0"/>
+          <a:chOff x="0" y="0"/>
+          <a:chExt cx="0" cy="0"/>
+        </a:xfrm>
+      </p:grpSpPr>
+      <p:sp>
+        <p:nvSpPr>
+          <p:cNvPr id="2" name="Title 1"/>
+          <p:cNvSpPr>
+            <a:spLocks noGrp="1"/>
+          </p:cNvSpPr>
+          <p:nvPr>
+            <p:ph type="title"/>
+          </p:nvPr>
+        </p:nvSpPr>
+        <p:spPr>
+          <a:xfrm>
+            <a:off x="381000" y="609600"/>
+            <a:ext cx="8229600" cy="1143000"/>
+          </a:xfrm>
+        </p:spPr>
+        <p:txBody>
+          <a:bodyPr>
+            <a:noAutofit/>
+          </a:bodyPr>
+          <a:lstStyle/>
+          <a:p>
+            <a:pPr algn="l"/>
+            <a:r>
+              <a:rPr lang="en-US" sz="7200" dirty="0" smtClean="0">
+                <a:solidFill>
+                  <a:schemeClr val="bg1"/>
+                </a:solidFill>
+              </a:rPr>
+              <a:t>Auto Zoom</a:t>
+            </a:r>
+            <a:endParaRPr lang="en-SG" sz="7200" dirty="0">
+              <a:solidFill>
+                <a:schemeClr val="bg1"/>
+              </a:solidFill>
+            </a:endParaRPr>
+          </a:p>
+        </p:txBody>
+      </p:sp>
+      <p:sp>
+        <p:nvSpPr>
+          <p:cNvPr id="3" name="text 5"/>
+          <p:cNvSpPr txBox="1"/>
+          <p:nvPr/>
+        </p:nvSpPr>
+        <p:spPr>
+          <a:xfrm>
+            <a:off x="542636" y="2819400"/>
+            <a:ext cx="7620000" cy="3046988"/>
+          </a:xfrm>
+          <a:prstGeom prst="rect">
+            <a:avLst/>
+          </a:prstGeom>
+          <a:noFill/>
+        </p:spPr>
+        <p:txBody>
+          <a:bodyPr wrap="square" rtlCol="0">
+            <a:spAutoFit/>
+          </a:bodyPr>
+          <a:lstStyle/>
+          <a:p>
+            <a:r>
+              <a:rPr lang="en-US" sz="2400" b="1" dirty="0" smtClean="0">
+                <a:solidFill>
+                  <a:schemeClr val="bg1"/>
+                </a:solidFill>
+              </a:rPr>
+              <a:t>Additional instructions:</a:t>
+            </a:r>
+          </a:p>
+          <a:p>
+            <a:pPr marL="285750" indent="-285750">
+              <a:buFont typeface="Arial" panose="020B0604020202020204" pitchFamily="34" charset="0"/>
+              <a:buChar char="•"/>
+            </a:pPr>
+            <a:r>
+              <a:rPr lang="en-US" sz="2400" dirty="0" smtClean="0">
+                <a:solidFill>
+                  <a:schemeClr val="bg1"/>
+                </a:solidFill>
+              </a:rPr>
+              <a:t>Select the </a:t>
+            </a:r>
+            <a:r>
+              <a:rPr lang="en-US" sz="2400" b="1" dirty="0" smtClean="0">
+                <a:solidFill>
+                  <a:schemeClr val="bg1"/>
+                </a:solidFill>
+              </a:rPr>
+              <a:t>BLUE</a:t>
+            </a:r>
+            <a:r>
+              <a:rPr lang="en-US" sz="2400" dirty="0" smtClean="0">
+                <a:solidFill>
+                  <a:schemeClr val="bg1"/>
+                </a:solidFill>
+              </a:rPr>
+              <a:t> color </a:t>
+            </a:r>
+            <a:r>
+              <a:rPr lang="en-US" sz="2400" b="1" dirty="0" smtClean="0">
+                <a:solidFill>
+                  <a:schemeClr val="bg1"/>
+                </a:solidFill>
+              </a:rPr>
+              <a:t>Rectangle</a:t>
+            </a:r>
+            <a:r>
+              <a:rPr lang="en-US" sz="2400" dirty="0" smtClean="0">
+                <a:solidFill>
+                  <a:schemeClr val="bg1"/>
+                </a:solidFill>
+              </a:rPr>
+              <a:t> shape(s).</a:t>
+            </a:r>
+          </a:p>
+          <a:p>
+            <a:pPr marL="285750" indent="-285750">
+              <a:buFont typeface="Arial" panose="020B0604020202020204" pitchFamily="34" charset="0"/>
+              <a:buChar char="•"/>
+            </a:pPr>
+            <a:r>
+              <a:rPr lang="en-US" sz="2400" dirty="0" smtClean="0">
+                <a:solidFill>
+                  <a:schemeClr val="bg1"/>
+                </a:solidFill>
+              </a:rPr>
+              <a:t>Click </a:t>
+            </a:r>
+            <a:r>
+              <a:rPr lang="en-US" sz="2400" b="1" dirty="0" smtClean="0">
+                <a:solidFill>
+                  <a:schemeClr val="bg1"/>
+                </a:solidFill>
+              </a:rPr>
+              <a:t>“Drill Down” or “Step Back”</a:t>
+            </a:r>
+            <a:r>
+              <a:rPr lang="en-US" sz="2400" dirty="0" smtClean="0">
+                <a:solidFill>
+                  <a:schemeClr val="bg1"/>
+                </a:solidFill>
+              </a:rPr>
+              <a:t> button in the ribbon. </a:t>
+            </a:r>
+          </a:p>
+          <a:p>
+            <a:pPr marL="285750" indent="-285750">
+              <a:buFont typeface="Arial" panose="020B0604020202020204" pitchFamily="34" charset="0"/>
+              <a:buChar char="•"/>
+            </a:pPr>
+            <a:r>
+              <a:rPr lang="en-US" sz="2400" dirty="0" smtClean="0">
+                <a:solidFill>
+                  <a:schemeClr val="bg1"/>
+                </a:solidFill>
+              </a:rPr>
+              <a:t>Compare the result with the expected output.</a:t>
+            </a:r>
+          </a:p>
+          <a:p>
+            <a:pPr marL="285750" indent="-285750">
+              <a:buFont typeface="Arial" panose="020B0604020202020204" pitchFamily="34" charset="0"/>
+              <a:buChar char="•"/>
+            </a:pPr>
+            <a:r>
+              <a:rPr lang="en-SG" sz="2400" dirty="0">
+                <a:solidFill>
+                  <a:schemeClr val="bg1"/>
+                </a:solidFill>
+              </a:rPr>
+              <a:t>Also try tweaking these:</a:t>
+            </a:r>
+          </a:p>
+          <a:p>
+            <a:pPr marL="742950" lvl="1" indent="-285750">
+              <a:buFont typeface="Arial" panose="020B0604020202020204" pitchFamily="34" charset="0"/>
+              <a:buChar char="•"/>
+            </a:pPr>
+            <a:r>
+              <a:rPr lang="en-SG" sz="2400" dirty="0" smtClean="0">
+                <a:solidFill>
+                  <a:schemeClr val="bg1"/>
+                </a:solidFill>
+              </a:rPr>
+              <a:t>Include Slide Background</a:t>
+            </a:r>
+            <a:endParaRPr lang="en-SG" sz="2400" dirty="0">
+              <a:solidFill>
+                <a:schemeClr val="bg1"/>
+              </a:solidFill>
+            </a:endParaRPr>
+          </a:p>
+          <a:p>
+            <a:pPr marL="742950" lvl="1" indent="-285750">
+              <a:buFont typeface="Arial" panose="020B0604020202020204" pitchFamily="34" charset="0"/>
+              <a:buChar char="•"/>
+            </a:pPr>
+            <a:r>
+              <a:rPr lang="en-SG" sz="2400" dirty="0" smtClean="0">
+                <a:solidFill>
+                  <a:schemeClr val="bg1"/>
+                </a:solidFill>
+              </a:rPr>
+              <a:t>Put All Zoom Effects on Separate Slides</a:t>
+            </a:r>
+            <a:endParaRPr lang="en-SG" sz="2400" dirty="0">
+              <a:solidFill>
+                <a:schemeClr val="bg1"/>
+              </a:solidFill>
+            </a:endParaRPr>
+          </a:p>
+          <a:p>
+            <a:pPr marL="285750" indent="-285750">
+              <a:buFont typeface="Arial" panose="020B0604020202020204" pitchFamily="34" charset="0"/>
+              <a:buChar char="•"/>
+            </a:pPr>
+            <a:endParaRPr lang="en-SG" sz="2400" dirty="0">
+              <a:solidFill>
+                <a:schemeClr val="bg1"/>
+              </a:solidFill>
+            </a:endParaRPr>
+          </a:p>
+        </p:txBody>
+      </p:sp>
+    </p:spTree>
+    <p:extLst>
+      <p:ext uri="{BB962C8B-B14F-4D97-AF65-F5344CB8AC3E}">
+        <p14:creationId xmlns:p14="http://schemas.microsoft.com/office/powerpoint/2010/main" val="1569131388"/>
+      </p:ext>
+    </p:extLst>
+  </p:cSld>
+  <p:clrMapOvr>
+    <a:masterClrMapping/>
+  </p:clrMapOvr>
+  <p:timing>
+    <p:tnLst>
+      <p:par>
+        <p:cTn id="1" dur="indefinite" restart="never" nodeType="tmRoot"/>
+      </p:par>
+    </p:tnLst>
+  </p:timing>
+</p:sld>
+</file>
+
+<file path=ppt/slides/slide20.xml><?xml version="1.0" encoding="utf-8"?>
 <p:sld xmlns:a="http://schemas.openxmlformats.org/drawingml/2006/main" xmlns:r="http://schemas.openxmlformats.org/officeDocument/2006/relationships" xmlns:p="http://schemas.openxmlformats.org/presentationml/2006/main">
   <p:cSld name="PPTLabsZoomOut201506181134006137">
     <p:bg>
@@ -12187,279 +12905,7 @@
 </p:sld>
 </file>
 
-<file path=ppt/slides/slide2.xml><?xml version="1.0" encoding="utf-8"?>
-<p:sld xmlns:a="http://schemas.openxmlformats.org/drawingml/2006/main" xmlns:r="http://schemas.openxmlformats.org/officeDocument/2006/relationships" xmlns:p="http://schemas.openxmlformats.org/presentationml/2006/main">
-  <p:cSld>
-    <p:bg>
-      <p:bgPr>
-        <a:solidFill>
-          <a:schemeClr val="accent6">
-            <a:lumMod val="75000"/>
-          </a:schemeClr>
-        </a:solidFill>
-        <a:effectLst/>
-      </p:bgPr>
-    </p:bg>
-    <p:spTree>
-      <p:nvGrpSpPr>
-        <p:cNvPr id="1" name=""/>
-        <p:cNvGrpSpPr/>
-        <p:nvPr/>
-      </p:nvGrpSpPr>
-      <p:grpSpPr>
-        <a:xfrm>
-          <a:off x="0" y="0"/>
-          <a:ext cx="0" cy="0"/>
-          <a:chOff x="0" y="0"/>
-          <a:chExt cx="0" cy="0"/>
-        </a:xfrm>
-      </p:grpSpPr>
-      <p:sp>
-        <p:nvSpPr>
-          <p:cNvPr id="2" name="Title 1"/>
-          <p:cNvSpPr>
-            <a:spLocks noGrp="1"/>
-          </p:cNvSpPr>
-          <p:nvPr>
-            <p:ph type="title"/>
-          </p:nvPr>
-        </p:nvSpPr>
-        <p:spPr>
-          <a:xfrm>
-            <a:off x="381000" y="609600"/>
-            <a:ext cx="8229600" cy="1143000"/>
-          </a:xfrm>
-        </p:spPr>
-        <p:txBody>
-          <a:bodyPr>
-            <a:noAutofit/>
-          </a:bodyPr>
-          <a:lstStyle/>
-          <a:p>
-            <a:pPr algn="l"/>
-            <a:r>
-              <a:rPr lang="en-US" sz="7200" dirty="0" smtClean="0">
-                <a:solidFill>
-                  <a:schemeClr val="bg1"/>
-                </a:solidFill>
-              </a:rPr>
-              <a:t>Auto Zoom</a:t>
-            </a:r>
-            <a:endParaRPr lang="en-SG" sz="7200" dirty="0">
-              <a:solidFill>
-                <a:schemeClr val="bg1"/>
-              </a:solidFill>
-            </a:endParaRPr>
-          </a:p>
-        </p:txBody>
-      </p:sp>
-      <p:sp>
-        <p:nvSpPr>
-          <p:cNvPr id="3" name="text 5"/>
-          <p:cNvSpPr txBox="1"/>
-          <p:nvPr/>
-        </p:nvSpPr>
-        <p:spPr>
-          <a:xfrm>
-            <a:off x="542636" y="2819400"/>
-            <a:ext cx="7620000" cy="3046988"/>
-          </a:xfrm>
-          <a:prstGeom prst="rect">
-            <a:avLst/>
-          </a:prstGeom>
-          <a:noFill/>
-        </p:spPr>
-        <p:txBody>
-          <a:bodyPr wrap="square" rtlCol="0">
-            <a:spAutoFit/>
-          </a:bodyPr>
-          <a:lstStyle/>
-          <a:p>
-            <a:r>
-              <a:rPr lang="en-US" sz="2400" b="1" dirty="0" smtClean="0">
-                <a:solidFill>
-                  <a:schemeClr val="bg1"/>
-                </a:solidFill>
-              </a:rPr>
-              <a:t>Additional instructions:</a:t>
-            </a:r>
-          </a:p>
-          <a:p>
-            <a:pPr marL="285750" indent="-285750">
-              <a:buFont typeface="Arial" panose="020B0604020202020204" pitchFamily="34" charset="0"/>
-              <a:buChar char="•"/>
-            </a:pPr>
-            <a:r>
-              <a:rPr lang="en-US" sz="2400" dirty="0" smtClean="0">
-                <a:solidFill>
-                  <a:schemeClr val="bg1"/>
-                </a:solidFill>
-              </a:rPr>
-              <a:t>Select the </a:t>
-            </a:r>
-            <a:r>
-              <a:rPr lang="en-US" sz="2400" b="1" dirty="0" smtClean="0">
-                <a:solidFill>
-                  <a:schemeClr val="bg1"/>
-                </a:solidFill>
-              </a:rPr>
-              <a:t>BLUE</a:t>
-            </a:r>
-            <a:r>
-              <a:rPr lang="en-US" sz="2400" dirty="0" smtClean="0">
-                <a:solidFill>
-                  <a:schemeClr val="bg1"/>
-                </a:solidFill>
-              </a:rPr>
-              <a:t> color </a:t>
-            </a:r>
-            <a:r>
-              <a:rPr lang="en-US" sz="2400" b="1" dirty="0" smtClean="0">
-                <a:solidFill>
-                  <a:schemeClr val="bg1"/>
-                </a:solidFill>
-              </a:rPr>
-              <a:t>Rectangle</a:t>
-            </a:r>
-            <a:r>
-              <a:rPr lang="en-US" sz="2400" dirty="0" smtClean="0">
-                <a:solidFill>
-                  <a:schemeClr val="bg1"/>
-                </a:solidFill>
-              </a:rPr>
-              <a:t> shape(s).</a:t>
-            </a:r>
-          </a:p>
-          <a:p>
-            <a:pPr marL="285750" indent="-285750">
-              <a:buFont typeface="Arial" panose="020B0604020202020204" pitchFamily="34" charset="0"/>
-              <a:buChar char="•"/>
-            </a:pPr>
-            <a:r>
-              <a:rPr lang="en-US" sz="2400" dirty="0" smtClean="0">
-                <a:solidFill>
-                  <a:schemeClr val="bg1"/>
-                </a:solidFill>
-              </a:rPr>
-              <a:t>Click </a:t>
-            </a:r>
-            <a:r>
-              <a:rPr lang="en-US" sz="2400" b="1" dirty="0" smtClean="0">
-                <a:solidFill>
-                  <a:schemeClr val="bg1"/>
-                </a:solidFill>
-              </a:rPr>
-              <a:t>“Drill Down” or “Step Back”</a:t>
-            </a:r>
-            <a:r>
-              <a:rPr lang="en-US" sz="2400" dirty="0" smtClean="0">
-                <a:solidFill>
-                  <a:schemeClr val="bg1"/>
-                </a:solidFill>
-              </a:rPr>
-              <a:t> button in the ribbon. </a:t>
-            </a:r>
-          </a:p>
-          <a:p>
-            <a:pPr marL="285750" indent="-285750">
-              <a:buFont typeface="Arial" panose="020B0604020202020204" pitchFamily="34" charset="0"/>
-              <a:buChar char="•"/>
-            </a:pPr>
-            <a:r>
-              <a:rPr lang="en-US" sz="2400" dirty="0" smtClean="0">
-                <a:solidFill>
-                  <a:schemeClr val="bg1"/>
-                </a:solidFill>
-              </a:rPr>
-              <a:t>Compare the result with the expected output.</a:t>
-            </a:r>
-          </a:p>
-          <a:p>
-            <a:pPr marL="285750" indent="-285750">
-              <a:buFont typeface="Arial" panose="020B0604020202020204" pitchFamily="34" charset="0"/>
-              <a:buChar char="•"/>
-            </a:pPr>
-            <a:r>
-              <a:rPr lang="en-SG" sz="2400" dirty="0">
-                <a:solidFill>
-                  <a:schemeClr val="bg1"/>
-                </a:solidFill>
-              </a:rPr>
-              <a:t>Also try tweaking these:</a:t>
-            </a:r>
-          </a:p>
-          <a:p>
-            <a:pPr marL="742950" lvl="1" indent="-285750">
-              <a:buFont typeface="Arial" panose="020B0604020202020204" pitchFamily="34" charset="0"/>
-              <a:buChar char="•"/>
-            </a:pPr>
-            <a:r>
-              <a:rPr lang="en-SG" sz="2400" dirty="0" smtClean="0">
-                <a:solidFill>
-                  <a:schemeClr val="bg1"/>
-                </a:solidFill>
-              </a:rPr>
-              <a:t>Include Slide Background</a:t>
-            </a:r>
-            <a:endParaRPr lang="en-SG" sz="2400" dirty="0">
-              <a:solidFill>
-                <a:schemeClr val="bg1"/>
-              </a:solidFill>
-            </a:endParaRPr>
-          </a:p>
-          <a:p>
-            <a:pPr marL="742950" lvl="1" indent="-285750">
-              <a:buFont typeface="Arial" panose="020B0604020202020204" pitchFamily="34" charset="0"/>
-              <a:buChar char="•"/>
-            </a:pPr>
-            <a:r>
-              <a:rPr lang="en-SG" sz="2400" dirty="0" smtClean="0">
-                <a:solidFill>
-                  <a:schemeClr val="bg1"/>
-                </a:solidFill>
-              </a:rPr>
-              <a:t>Put All Zoom Effects on Separate Slides</a:t>
-            </a:r>
-            <a:endParaRPr lang="en-SG" sz="2400" dirty="0">
-              <a:solidFill>
-                <a:schemeClr val="bg1"/>
-              </a:solidFill>
-            </a:endParaRPr>
-          </a:p>
-          <a:p>
-            <a:pPr marL="285750" indent="-285750">
-              <a:buFont typeface="Arial" panose="020B0604020202020204" pitchFamily="34" charset="0"/>
-              <a:buChar char="•"/>
-            </a:pPr>
-            <a:endParaRPr lang="en-SG" sz="2400" dirty="0">
-              <a:solidFill>
-                <a:schemeClr val="bg1"/>
-              </a:solidFill>
-            </a:endParaRPr>
-          </a:p>
-        </p:txBody>
-      </p:sp>
-    </p:spTree>
-    <p:extLst>
-      <p:ext uri="{BB962C8B-B14F-4D97-AF65-F5344CB8AC3E}">
-        <p14:creationId xmlns:p14="http://schemas.microsoft.com/office/powerpoint/2010/main" val="1569131388"/>
-      </p:ext>
-    </p:extLst>
-  </p:cSld>
-  <p:clrMapOvr>
-    <a:masterClrMapping/>
-  </p:clrMapOvr>
-  <p:timing>
-    <p:tnLst>
-      <p:par>
-        <p:cTn id="1" dur="indefinite" restart="never" nodeType="tmRoot"/>
-      </p:par>
-    </p:tnLst>
-  </p:timing>
-</p:sld>
-</file>
-
-<file path=ppt/slides/slide20.xml><?xml version="1.0" encoding="utf-8"?>
+<file path=ppt/slides/slide21.xml><?xml version="1.0" encoding="utf-8"?>
 <p:sld xmlns:a="http://schemas.openxmlformats.org/drawingml/2006/main" xmlns:r="http://schemas.openxmlformats.org/officeDocument/2006/relationships" xmlns:p="http://schemas.openxmlformats.org/presentationml/2006/main">
   <p:cSld>
     <p:bg>
@@ -12743,7 +13189,7 @@
 </p:sld>
 </file>
 
-<file path=ppt/slides/slide21.xml><?xml version="1.0" encoding="utf-8"?>
+<file path=ppt/slides/slide22.xml><?xml version="1.0" encoding="utf-8"?>
 <p:sld xmlns:a="http://schemas.openxmlformats.org/drawingml/2006/main" xmlns:r="http://schemas.openxmlformats.org/officeDocument/2006/relationships" xmlns:p="http://schemas.openxmlformats.org/presentationml/2006/main">
   <p:cSld>
     <p:spTree>
@@ -12824,217 +13270,6 @@
   <p:clrMapOvr>
     <a:masterClrMapping/>
   </p:clrMapOvr>
-  <p:timing>
-    <p:tnLst>
-      <p:par>
-        <p:cTn id="1" dur="indefinite" restart="never" nodeType="tmRoot"/>
-      </p:par>
-    </p:tnLst>
-  </p:timing>
-</p:sld>
-</file>
-
-<file path=ppt/slides/slide22.xml><?xml version="1.0" encoding="utf-8"?>
-<p:sld xmlns:a="http://schemas.openxmlformats.org/drawingml/2006/main" xmlns:r="http://schemas.openxmlformats.org/officeDocument/2006/relationships" xmlns:p="http://schemas.openxmlformats.org/presentationml/2006/main">
-  <p:cSld>
-    <p:bg>
-      <p:bgPr>
-        <a:solidFill>
-          <a:schemeClr val="bg1"/>
-        </a:solidFill>
-        <a:effectLst/>
-      </p:bgPr>
-    </p:bg>
-    <p:spTree>
-      <p:nvGrpSpPr>
-        <p:cNvPr id="1" name=""/>
-        <p:cNvGrpSpPr/>
-        <p:nvPr/>
-      </p:nvGrpSpPr>
-      <p:grpSpPr>
-        <a:xfrm>
-          <a:off x="0" y="0"/>
-          <a:ext cx="0" cy="0"/>
-          <a:chOff x="0" y="0"/>
-          <a:chExt cx="0" cy="0"/>
-        </a:xfrm>
-      </p:grpSpPr>
-      <p:sp>
-        <p:nvSpPr>
-          <p:cNvPr id="2" name="Rectangle 1"/>
-          <p:cNvSpPr/>
-          <p:nvPr/>
-        </p:nvSpPr>
-        <p:spPr>
-          <a:xfrm>
-            <a:off x="755576" y="836712"/>
-            <a:ext cx="3240360" cy="1944216"/>
-          </a:xfrm>
-          <a:prstGeom prst="rect">
-            <a:avLst/>
-          </a:prstGeom>
-          <a:solidFill>
-            <a:schemeClr val="bg2"/>
-          </a:solidFill>
-          <a:ln>
-            <a:noFill/>
-          </a:ln>
-        </p:spPr>
-        <p:style>
-          <a:lnRef idx="2">
-            <a:schemeClr val="accent1">
-              <a:shade val="50000"/>
-            </a:schemeClr>
-          </a:lnRef>
-          <a:fillRef idx="1">
-            <a:schemeClr val="accent1"/>
-          </a:fillRef>
-          <a:effectRef idx="0">
-            <a:schemeClr val="accent1"/>
-          </a:effectRef>
-          <a:fontRef idx="minor">
-            <a:schemeClr val="lt1"/>
-          </a:fontRef>
-        </p:style>
-        <p:txBody>
-          <a:bodyPr rtlCol="0" anchor="ctr"/>
-          <a:lstStyle/>
-          <a:p>
-            <a:pPr algn="ctr"/>
-            <a:endParaRPr lang="en-SG"/>
-          </a:p>
-        </p:txBody>
-      </p:sp>
-      <p:sp>
-        <p:nvSpPr>
-          <p:cNvPr id="3" name="TextBox 2"/>
-          <p:cNvSpPr txBox="1"/>
-          <p:nvPr/>
-        </p:nvSpPr>
-        <p:spPr>
-          <a:xfrm>
-            <a:off x="899592" y="3356992"/>
-            <a:ext cx="3096344" cy="1754326"/>
-          </a:xfrm>
-          <a:prstGeom prst="rect">
-            <a:avLst/>
-          </a:prstGeom>
-          <a:noFill/>
-        </p:spPr>
-        <p:txBody>
-          <a:bodyPr wrap="square" rtlCol="0">
-            <a:spAutoFit/>
-          </a:bodyPr>
-          <a:lstStyle/>
-          <a:p>
-            <a:pPr marL="571500" indent="-571500">
-              <a:buFont typeface="Arial" panose="020B0604020202020204" pitchFamily="34" charset="0"/>
-              <a:buChar char="•"/>
-            </a:pPr>
-            <a:r>
-              <a:rPr lang="en-US" sz="3600" dirty="0" smtClean="0"/>
-              <a:t>Blah </a:t>
-            </a:r>
-            <a:r>
-              <a:rPr lang="en-US" sz="3600" dirty="0" err="1" smtClean="0"/>
-              <a:t>blah</a:t>
-            </a:r>
-            <a:endParaRPr lang="en-US" sz="3600" dirty="0" smtClean="0"/>
-          </a:p>
-          <a:p>
-            <a:pPr marL="571500" indent="-571500">
-              <a:buFont typeface="Arial" panose="020B0604020202020204" pitchFamily="34" charset="0"/>
-              <a:buChar char="•"/>
-            </a:pPr>
-            <a:r>
-              <a:rPr lang="en-US" sz="3600" dirty="0" smtClean="0"/>
-              <a:t>Blah </a:t>
-            </a:r>
-            <a:r>
-              <a:rPr lang="en-US" sz="3600" dirty="0" err="1" smtClean="0"/>
-              <a:t>blah</a:t>
-            </a:r>
-            <a:endParaRPr lang="en-US" sz="3600" dirty="0" smtClean="0"/>
-          </a:p>
-          <a:p>
-            <a:pPr marL="571500" indent="-571500">
-              <a:buFont typeface="Arial" panose="020B0604020202020204" pitchFamily="34" charset="0"/>
-              <a:buChar char="•"/>
-            </a:pPr>
-            <a:r>
-              <a:rPr lang="en-US" sz="3600" dirty="0" smtClean="0"/>
-              <a:t>Blah </a:t>
-            </a:r>
-            <a:r>
-              <a:rPr lang="en-US" sz="3600" dirty="0" err="1" smtClean="0"/>
-              <a:t>blah</a:t>
-            </a:r>
-            <a:endParaRPr lang="en-SG" sz="3600" dirty="0"/>
-          </a:p>
-        </p:txBody>
-      </p:sp>
-      <p:sp>
-        <p:nvSpPr>
-          <p:cNvPr id="4" name="Rectangle 3"/>
-          <p:cNvSpPr/>
-          <p:nvPr/>
-        </p:nvSpPr>
-        <p:spPr>
-          <a:xfrm>
-            <a:off x="4788024" y="836712"/>
-            <a:ext cx="3600400" cy="4392488"/>
-          </a:xfrm>
-          <a:prstGeom prst="rect">
-            <a:avLst/>
-          </a:prstGeom>
-        </p:spPr>
-        <p:style>
-          <a:lnRef idx="2">
-            <a:schemeClr val="accent3">
-              <a:shade val="50000"/>
-            </a:schemeClr>
-          </a:lnRef>
-          <a:fillRef idx="1">
-            <a:schemeClr val="accent3"/>
-          </a:fillRef>
-          <a:effectRef idx="0">
-            <a:schemeClr val="accent3"/>
-          </a:effectRef>
-          <a:fontRef idx="minor">
-            <a:schemeClr val="lt1"/>
-          </a:fontRef>
-        </p:style>
-        <p:txBody>
-          <a:bodyPr rtlCol="0" anchor="ctr"/>
-          <a:lstStyle/>
-          <a:p>
-            <a:pPr algn="ctr"/>
-            <a:endParaRPr lang="en-SG"/>
-          </a:p>
-        </p:txBody>
-      </p:sp>
-    </p:spTree>
-    <p:extLst>
-      <p:ext uri="{BB962C8B-B14F-4D97-AF65-F5344CB8AC3E}">
-        <p14:creationId xmlns:p14="http://schemas.microsoft.com/office/powerpoint/2010/main" val="3818889738"/>
-      </p:ext>
-    </p:extLst>
-  </p:cSld>
-  <p:clrMapOvr>
-    <a:masterClrMapping/>
-  </p:clrMapOvr>
-  <mc:AlternateContent xmlns:mc="http://schemas.openxmlformats.org/markup-compatibility/2006" xmlns:p14="http://schemas.microsoft.com/office/powerpoint/2010/main">
-    <mc:Choice Requires="p14">
-      <p:transition spd="med" p14:dur="700">
-        <p:fade/>
-      </p:transition>
-    </mc:Choice>
-    <mc:Fallback xmlns="">
-      <p:transition spd="med">
-        <p:fade/>
-      </p:transition>
-    </mc:Fallback>
-  </mc:AlternateContent>
   <p:timing>
     <p:tnLst>
       <p:par>
@@ -13072,20 +13307,24 @@
       </p:grpSpPr>
       <p:sp>
         <p:nvSpPr>
-          <p:cNvPr id="4" name="Rectangle 3"/>
+          <p:cNvPr id="2" name="Rectangle 1"/>
           <p:cNvSpPr/>
           <p:nvPr/>
         </p:nvSpPr>
         <p:spPr>
           <a:xfrm>
-            <a:off x="611560" y="764704"/>
-            <a:ext cx="7920880" cy="1224136"/>
+            <a:off x="755576" y="836712"/>
+            <a:ext cx="3240360" cy="1944216"/>
           </a:xfrm>
           <a:prstGeom prst="rect">
             <a:avLst/>
           </a:prstGeom>
-          <a:noFill/>
-          <a:ln w="57150"/>
+          <a:solidFill>
+            <a:schemeClr val="bg2"/>
+          </a:solidFill>
+          <a:ln>
+            <a:noFill/>
+          </a:ln>
         </p:spPr>
         <p:style>
           <a:lnRef idx="2">
@@ -13114,32 +13353,98 @@
       </p:sp>
       <p:sp>
         <p:nvSpPr>
-          <p:cNvPr id="5" name="Rectangle 4"/>
-          <p:cNvSpPr/>
+          <p:cNvPr id="3" name="TextBox 2"/>
+          <p:cNvSpPr txBox="1"/>
           <p:nvPr/>
         </p:nvSpPr>
         <p:spPr>
           <a:xfrm>
-            <a:off x="611560" y="2348880"/>
-            <a:ext cx="7920880" cy="1224136"/>
+            <a:off x="899592" y="3356992"/>
+            <a:ext cx="3096344" cy="1754326"/>
           </a:xfrm>
           <a:prstGeom prst="rect">
             <a:avLst/>
           </a:prstGeom>
           <a:noFill/>
-          <a:ln w="57150"/>
+        </p:spPr>
+        <p:txBody>
+          <a:bodyPr wrap="square" rtlCol="0">
+            <a:spAutoFit/>
+          </a:bodyPr>
+          <a:lstStyle/>
+          <a:p>
+            <a:pPr marL="571500" indent="-571500">
+              <a:buFont typeface="Arial" panose="020B0604020202020204" pitchFamily="34" charset="0"/>
+              <a:buChar char="•"/>
+            </a:pPr>
+            <a:r>
+              <a:rPr lang="en-US" sz="3600" dirty="0" smtClean="0"/>
+              <a:t>Blah </a:t>
+            </a:r>
+            <a:r>
+              <a:rPr lang="en-US" sz="3600" dirty="0" err="1" smtClean="0"/>
+              <a:t>blah</a:t>
+            </a:r>
+            <a:endParaRPr lang="en-US" sz="3600" dirty="0" smtClean="0"/>
+          </a:p>
+          <a:p>
+            <a:pPr marL="571500" indent="-571500">
+              <a:buFont typeface="Arial" panose="020B0604020202020204" pitchFamily="34" charset="0"/>
+              <a:buChar char="•"/>
+            </a:pPr>
+            <a:r>
+              <a:rPr lang="en-US" sz="3600" dirty="0" smtClean="0"/>
+              <a:t>Blah </a:t>
+            </a:r>
+            <a:r>
+              <a:rPr lang="en-US" sz="3600" dirty="0" err="1" smtClean="0"/>
+              <a:t>blah</a:t>
+            </a:r>
+            <a:endParaRPr lang="en-US" sz="3600" dirty="0" smtClean="0"/>
+          </a:p>
+          <a:p>
+            <a:pPr marL="571500" indent="-571500">
+              <a:buFont typeface="Arial" panose="020B0604020202020204" pitchFamily="34" charset="0"/>
+              <a:buChar char="•"/>
+            </a:pPr>
+            <a:r>
+              <a:rPr lang="en-US" sz="3600" dirty="0" smtClean="0"/>
+              <a:t>Blah </a:t>
+            </a:r>
+            <a:r>
+              <a:rPr lang="en-US" sz="3600" dirty="0" err="1" smtClean="0"/>
+              <a:t>blah</a:t>
+            </a:r>
+            <a:endParaRPr lang="en-SG" sz="3600" dirty="0"/>
+          </a:p>
+        </p:txBody>
+      </p:sp>
+      <p:sp>
+        <p:nvSpPr>
+          <p:cNvPr id="4" name="Rectangle 3"/>
+          <p:cNvSpPr/>
+          <p:nvPr/>
+        </p:nvSpPr>
+        <p:spPr>
+          <a:xfrm>
+            <a:off x="4788024" y="836712"/>
+            <a:ext cx="3600400" cy="4392488"/>
+          </a:xfrm>
+          <a:prstGeom prst="rect">
+            <a:avLst/>
+          </a:prstGeom>
         </p:spPr>
         <p:style>
           <a:lnRef idx="2">
-            <a:schemeClr val="accent2">
+            <a:schemeClr val="accent3">
               <a:shade val="50000"/>
             </a:schemeClr>
           </a:lnRef>
           <a:fillRef idx="1">
-            <a:schemeClr val="accent2"/>
+            <a:schemeClr val="accent3"/>
           </a:fillRef>
           <a:effectRef idx="0">
-            <a:schemeClr val="accent2"/>
+            <a:schemeClr val="accent3"/>
           </a:effectRef>
           <a:fontRef idx="minor">
             <a:schemeClr val="lt1"/>
@@ -13156,61 +13461,21 @@
       </p:sp>
       <p:sp>
         <p:nvSpPr>
-          <p:cNvPr id="6" name="Rectangle 5"/>
+          <p:cNvPr id="5" name="Rectangle 1" hidden="1"/>
           <p:cNvSpPr/>
           <p:nvPr/>
         </p:nvSpPr>
         <p:spPr>
           <a:xfrm>
-            <a:off x="611560" y="3933056"/>
-            <a:ext cx="7920880" cy="2376264"/>
+            <a:off x="914400" y="533400"/>
+            <a:ext cx="3048000" cy="2556284"/>
           </a:xfrm>
           <a:prstGeom prst="rect">
             <a:avLst/>
           </a:prstGeom>
-          <a:noFill/>
-          <a:ln w="57150"/>
-        </p:spPr>
-        <p:style>
-          <a:lnRef idx="2">
-            <a:schemeClr val="accent4">
-              <a:shade val="50000"/>
-            </a:schemeClr>
-          </a:lnRef>
-          <a:fillRef idx="1">
-            <a:schemeClr val="accent4"/>
-          </a:fillRef>
-          <a:effectRef idx="0">
-            <a:schemeClr val="accent4"/>
-          </a:effectRef>
-          <a:fontRef idx="minor">
-            <a:schemeClr val="lt1"/>
-          </a:fontRef>
-        </p:style>
-        <p:txBody>
-          <a:bodyPr rtlCol="0" anchor="ctr"/>
-          <a:lstStyle/>
-          <a:p>
-            <a:pPr algn="ctr"/>
-            <a:endParaRPr lang="en-SG"/>
-          </a:p>
-        </p:txBody>
-      </p:sp>
-      <p:sp>
-        <p:nvSpPr>
-          <p:cNvPr id="8" name="Step Back This Shape"/>
-          <p:cNvSpPr/>
-          <p:nvPr/>
-        </p:nvSpPr>
-        <p:spPr>
-          <a:xfrm>
-            <a:off x="6768752" y="850404"/>
-            <a:ext cx="1403648" cy="1052736"/>
-          </a:xfrm>
-          <a:prstGeom prst="rect">
-            <a:avLst/>
-          </a:prstGeom>
-          <a:ln/>
+          <a:solidFill>
+            <a:srgbClr val="FF0000"/>
+          </a:solidFill>
         </p:spPr>
         <p:style>
           <a:lnRef idx="2">
@@ -13234,17 +13499,64 @@
           <a:p>
             <a:pPr algn="ctr"/>
             <a:r>
-              <a:rPr lang="en-US" sz="2800" smtClean="0"/>
-              <a:t>Step Back</a:t>
-            </a:r>
-            <a:endParaRPr lang="en-SG" sz="2800" dirty="0"/>
+              <a:rPr lang="en-US" dirty="0" smtClean="0"/>
+              <a:t>HIDDEN SHAPE</a:t>
+            </a:r>
+            <a:endParaRPr lang="en-US" dirty="0"/>
+          </a:p>
+        </p:txBody>
+      </p:sp>
+      <p:sp>
+        <p:nvSpPr>
+          <p:cNvPr id="6" name="Oval 2" hidden="1"/>
+          <p:cNvSpPr/>
+          <p:nvPr/>
+        </p:nvSpPr>
+        <p:spPr>
+          <a:xfrm>
+            <a:off x="5130452" y="3188532"/>
+            <a:ext cx="3276600" cy="3124200"/>
+          </a:xfrm>
+          <a:prstGeom prst="ellipse">
+            <a:avLst/>
+          </a:prstGeom>
+          <a:solidFill>
+            <a:schemeClr val="tx1"/>
+          </a:solidFill>
+        </p:spPr>
+        <p:style>
+          <a:lnRef idx="2">
+            <a:schemeClr val="accent1">
+              <a:shade val="50000"/>
+            </a:schemeClr>
+          </a:lnRef>
+          <a:fillRef idx="1">
+            <a:schemeClr val="accent1"/>
+          </a:fillRef>
+          <a:effectRef idx="0">
+            <a:schemeClr val="accent1"/>
+          </a:effectRef>
+          <a:fontRef idx="minor">
+            <a:schemeClr val="lt1"/>
+          </a:fontRef>
+        </p:style>
+        <p:txBody>
+          <a:bodyPr rtlCol="0" anchor="ctr"/>
+          <a:lstStyle/>
+          <a:p>
+            <a:pPr algn="ctr"/>
+            <a:r>
+              <a:rPr lang="en-US" dirty="0" smtClean="0"/>
+              <a:t>HIDDEN SHAPE</a:t>
+            </a:r>
+            <a:endParaRPr lang="en-US" dirty="0"/>
           </a:p>
         </p:txBody>
       </p:sp>
     </p:spTree>
     <p:extLst>
       <p:ext uri="{BB962C8B-B14F-4D97-AF65-F5344CB8AC3E}">
-        <p14:creationId xmlns:p14="http://schemas.microsoft.com/office/powerpoint/2010/main" val="698598111"/>
+        <p14:creationId xmlns:p14="http://schemas.microsoft.com/office/powerpoint/2010/main" val="3818889738"/>
       </p:ext>
     </p:extLst>
   </p:cSld>
@@ -13253,13 +13565,13 @@
   </p:clrMapOvr>
   <mc:AlternateContent xmlns:mc="http://schemas.openxmlformats.org/markup-compatibility/2006" xmlns:p14="http://schemas.microsoft.com/office/powerpoint/2010/main">
     <mc:Choice Requires="p14">
-      <p:transition spd="slow" p14:dur="1500">
-        <p:split orient="vert"/>
+      <p:transition spd="med" p14:dur="700">
+        <p:fade/>
       </p:transition>
     </mc:Choice>
     <mc:Fallback xmlns="">
-      <p:transition spd="slow">
-        <p:split orient="vert"/>
+      <p:transition spd="med">
+        <p:fade/>
       </p:transition>
     </mc:Fallback>
   </mc:AlternateContent>
@@ -13300,6 +13612,394 @@
       </p:grpSpPr>
       <p:sp>
         <p:nvSpPr>
+          <p:cNvPr id="4" name="Rectangle 3"/>
+          <p:cNvSpPr/>
+          <p:nvPr/>
+        </p:nvSpPr>
+        <p:spPr>
+          <a:xfrm>
+            <a:off x="611560" y="764704"/>
+            <a:ext cx="7920880" cy="1224136"/>
+          </a:xfrm>
+          <a:prstGeom prst="rect">
+            <a:avLst/>
+          </a:prstGeom>
+          <a:noFill/>
+          <a:ln w="57150"/>
+        </p:spPr>
+        <p:style>
+          <a:lnRef idx="2">
+            <a:schemeClr val="accent1">
+              <a:shade val="50000"/>
+            </a:schemeClr>
+          </a:lnRef>
+          <a:fillRef idx="1">
+            <a:schemeClr val="accent1"/>
+          </a:fillRef>
+          <a:effectRef idx="0">
+            <a:schemeClr val="accent1"/>
+          </a:effectRef>
+          <a:fontRef idx="minor">
+            <a:schemeClr val="lt1"/>
+          </a:fontRef>
+        </p:style>
+        <p:txBody>
+          <a:bodyPr rtlCol="0" anchor="ctr"/>
+          <a:lstStyle/>
+          <a:p>
+            <a:pPr algn="ctr"/>
+            <a:endParaRPr lang="en-SG"/>
+          </a:p>
+        </p:txBody>
+      </p:sp>
+      <p:sp>
+        <p:nvSpPr>
+          <p:cNvPr id="5" name="Rectangle 4"/>
+          <p:cNvSpPr/>
+          <p:nvPr/>
+        </p:nvSpPr>
+        <p:spPr>
+          <a:xfrm>
+            <a:off x="611560" y="2348880"/>
+            <a:ext cx="7920880" cy="1224136"/>
+          </a:xfrm>
+          <a:prstGeom prst="rect">
+            <a:avLst/>
+          </a:prstGeom>
+          <a:noFill/>
+          <a:ln w="57150"/>
+        </p:spPr>
+        <p:style>
+          <a:lnRef idx="2">
+            <a:schemeClr val="accent2">
+              <a:shade val="50000"/>
+            </a:schemeClr>
+          </a:lnRef>
+          <a:fillRef idx="1">
+            <a:schemeClr val="accent2"/>
+          </a:fillRef>
+          <a:effectRef idx="0">
+            <a:schemeClr val="accent2"/>
+          </a:effectRef>
+          <a:fontRef idx="minor">
+            <a:schemeClr val="lt1"/>
+          </a:fontRef>
+        </p:style>
+        <p:txBody>
+          <a:bodyPr rtlCol="0" anchor="ctr"/>
+          <a:lstStyle/>
+          <a:p>
+            <a:pPr algn="ctr"/>
+            <a:endParaRPr lang="en-SG"/>
+          </a:p>
+        </p:txBody>
+      </p:sp>
+      <p:sp>
+        <p:nvSpPr>
+          <p:cNvPr id="6" name="Rectangle 5"/>
+          <p:cNvSpPr/>
+          <p:nvPr/>
+        </p:nvSpPr>
+        <p:spPr>
+          <a:xfrm>
+            <a:off x="611560" y="3933056"/>
+            <a:ext cx="7920880" cy="2376264"/>
+          </a:xfrm>
+          <a:prstGeom prst="rect">
+            <a:avLst/>
+          </a:prstGeom>
+          <a:noFill/>
+          <a:ln w="57150"/>
+        </p:spPr>
+        <p:style>
+          <a:lnRef idx="2">
+            <a:schemeClr val="accent4">
+              <a:shade val="50000"/>
+            </a:schemeClr>
+          </a:lnRef>
+          <a:fillRef idx="1">
+            <a:schemeClr val="accent4"/>
+          </a:fillRef>
+          <a:effectRef idx="0">
+            <a:schemeClr val="accent4"/>
+          </a:effectRef>
+          <a:fontRef idx="minor">
+            <a:schemeClr val="lt1"/>
+          </a:fontRef>
+        </p:style>
+        <p:txBody>
+          <a:bodyPr rtlCol="0" anchor="ctr"/>
+          <a:lstStyle/>
+          <a:p>
+            <a:pPr algn="ctr"/>
+            <a:endParaRPr lang="en-SG"/>
+          </a:p>
+        </p:txBody>
+      </p:sp>
+      <p:sp>
+        <p:nvSpPr>
+          <p:cNvPr id="8" name="Step Back This Shape"/>
+          <p:cNvSpPr/>
+          <p:nvPr/>
+        </p:nvSpPr>
+        <p:spPr>
+          <a:xfrm>
+            <a:off x="6768752" y="850404"/>
+            <a:ext cx="1403648" cy="1052736"/>
+          </a:xfrm>
+          <a:prstGeom prst="rect">
+            <a:avLst/>
+          </a:prstGeom>
+          <a:ln/>
+        </p:spPr>
+        <p:style>
+          <a:lnRef idx="2">
+            <a:schemeClr val="accent1">
+              <a:shade val="50000"/>
+            </a:schemeClr>
+          </a:lnRef>
+          <a:fillRef idx="1">
+            <a:schemeClr val="accent1"/>
+          </a:fillRef>
+          <a:effectRef idx="0">
+            <a:schemeClr val="accent1"/>
+          </a:effectRef>
+          <a:fontRef idx="minor">
+            <a:schemeClr val="lt1"/>
+          </a:fontRef>
+        </p:style>
+        <p:txBody>
+          <a:bodyPr rtlCol="0" anchor="ctr"/>
+          <a:lstStyle/>
+          <a:p>
+            <a:pPr algn="ctr"/>
+            <a:r>
+              <a:rPr lang="en-US" sz="2800" smtClean="0"/>
+              <a:t>Step Back</a:t>
+            </a:r>
+            <a:endParaRPr lang="en-SG" sz="2800" dirty="0"/>
+          </a:p>
+        </p:txBody>
+      </p:sp>
+      <p:sp>
+        <p:nvSpPr>
+          <p:cNvPr id="7" name="Rectangle 1" hidden="1"/>
+          <p:cNvSpPr/>
+          <p:nvPr/>
+        </p:nvSpPr>
+        <p:spPr>
+          <a:xfrm>
+            <a:off x="914400" y="533400"/>
+            <a:ext cx="3048000" cy="2556284"/>
+          </a:xfrm>
+          <a:prstGeom prst="rect">
+            <a:avLst/>
+          </a:prstGeom>
+          <a:solidFill>
+            <a:srgbClr val="FF0000"/>
+          </a:solidFill>
+        </p:spPr>
+        <p:style>
+          <a:lnRef idx="2">
+            <a:schemeClr val="accent1">
+              <a:shade val="50000"/>
+            </a:schemeClr>
+          </a:lnRef>
+          <a:fillRef idx="1">
+            <a:schemeClr val="accent1"/>
+          </a:fillRef>
+          <a:effectRef idx="0">
+            <a:schemeClr val="accent1"/>
+          </a:effectRef>
+          <a:fontRef idx="minor">
+            <a:schemeClr val="lt1"/>
+          </a:fontRef>
+        </p:style>
+        <p:txBody>
+          <a:bodyPr rtlCol="0" anchor="ctr"/>
+          <a:lstStyle/>
+          <a:p>
+            <a:pPr algn="ctr"/>
+            <a:r>
+              <a:rPr lang="en-US" dirty="0" smtClean="0"/>
+              <a:t>HIDDEN SHAPE</a:t>
+            </a:r>
+            <a:endParaRPr lang="en-US" dirty="0"/>
+          </a:p>
+        </p:txBody>
+      </p:sp>
+      <p:sp>
+        <p:nvSpPr>
+          <p:cNvPr id="9" name="Oval 2" hidden="1"/>
+          <p:cNvSpPr/>
+          <p:nvPr/>
+        </p:nvSpPr>
+        <p:spPr>
+          <a:xfrm>
+            <a:off x="5130452" y="3188532"/>
+            <a:ext cx="3276600" cy="3124200"/>
+          </a:xfrm>
+          <a:prstGeom prst="ellipse">
+            <a:avLst/>
+          </a:prstGeom>
+          <a:solidFill>
+            <a:schemeClr val="tx1"/>
+          </a:solidFill>
+        </p:spPr>
+        <p:style>
+          <a:lnRef idx="2">
+            <a:schemeClr val="accent1">
+              <a:shade val="50000"/>
+            </a:schemeClr>
+          </a:lnRef>
+          <a:fillRef idx="1">
+            <a:schemeClr val="accent1"/>
+          </a:fillRef>
+          <a:effectRef idx="0">
+            <a:schemeClr val="accent1"/>
+          </a:effectRef>
+          <a:fontRef idx="minor">
+            <a:schemeClr val="lt1"/>
+          </a:fontRef>
+        </p:style>
+        <p:txBody>
+          <a:bodyPr rtlCol="0" anchor="ctr"/>
+          <a:lstStyle/>
+          <a:p>
+            <a:pPr algn="ctr"/>
+            <a:r>
+              <a:rPr lang="en-US" dirty="0" smtClean="0"/>
+              <a:t>HIDDEN SHAPE</a:t>
+            </a:r>
+            <a:endParaRPr lang="en-US" dirty="0"/>
+          </a:p>
+        </p:txBody>
+      </p:sp>
+    </p:spTree>
+    <p:extLst>
+      <p:ext uri="{BB962C8B-B14F-4D97-AF65-F5344CB8AC3E}">
+        <p14:creationId xmlns:p14="http://schemas.microsoft.com/office/powerpoint/2010/main" val="698598111"/>
+      </p:ext>
+    </p:extLst>
+  </p:cSld>
+  <p:clrMapOvr>
+    <a:masterClrMapping/>
+  </p:clrMapOvr>
+  <mc:AlternateContent xmlns:mc="http://schemas.openxmlformats.org/markup-compatibility/2006" xmlns:p14="http://schemas.microsoft.com/office/powerpoint/2010/main">
+    <mc:Choice Requires="p14">
+      <p:transition spd="slow" p14:dur="1500">
+        <p:split orient="vert"/>
+      </p:transition>
+    </mc:Choice>
+    <mc:Fallback xmlns="">
+      <p:transition spd="slow">
+        <p:split orient="vert"/>
+      </p:transition>
+    </mc:Fallback>
+  </mc:AlternateContent>
+  <p:timing>
+    <p:tnLst>
+      <p:par>
+        <p:cTn id="1" dur="indefinite" restart="never" nodeType="tmRoot"/>
+      </p:par>
+    </p:tnLst>
+  </p:timing>
+</p:sld>
+</file>
+
+<file path=ppt/slides/slide25.xml><?xml version="1.0" encoding="utf-8"?>
+<p:sld xmlns:a="http://schemas.openxmlformats.org/drawingml/2006/main" xmlns:r="http://schemas.openxmlformats.org/officeDocument/2006/relationships" xmlns:p="http://schemas.openxmlformats.org/presentationml/2006/main">
+  <p:cSld>
+    <p:spTree>
+      <p:nvGrpSpPr>
+        <p:cNvPr id="1" name=""/>
+        <p:cNvGrpSpPr/>
+        <p:nvPr/>
+      </p:nvGrpSpPr>
+      <p:grpSpPr>
+        <a:xfrm>
+          <a:off x="0" y="0"/>
+          <a:ext cx="0" cy="0"/>
+          <a:chOff x="0" y="0"/>
+          <a:chExt cx="0" cy="0"/>
+        </a:xfrm>
+      </p:grpSpPr>
+      <p:sp>
+        <p:nvSpPr>
+          <p:cNvPr id="2" name="Title 1"/>
+          <p:cNvSpPr>
+            <a:spLocks noGrp="1"/>
+          </p:cNvSpPr>
+          <p:nvPr>
+            <p:ph type="title"/>
+          </p:nvPr>
+        </p:nvSpPr>
+        <p:spPr>
+          <a:xfrm>
+            <a:off x="457200" y="2438400"/>
+            <a:ext cx="8229600" cy="1143000"/>
+          </a:xfrm>
+        </p:spPr>
+        <p:txBody>
+          <a:bodyPr/>
+          <a:lstStyle/>
+          <a:p>
+            <a:pPr algn="ctr"/>
+            <a:r>
+              <a:rPr lang="en-US" b="1" dirty="0" smtClean="0"/>
+              <a:t>Dummy slide</a:t>
+            </a:r>
+            <a:endParaRPr lang="en-SG" b="1" dirty="0"/>
+          </a:p>
+        </p:txBody>
+      </p:sp>
+    </p:spTree>
+    <p:extLst>
+      <p:ext uri="{BB962C8B-B14F-4D97-AF65-F5344CB8AC3E}">
+        <p14:creationId xmlns:p14="http://schemas.microsoft.com/office/powerpoint/2010/main" val="1745616996"/>
+      </p:ext>
+    </p:extLst>
+  </p:cSld>
+  <p:clrMapOvr>
+    <a:masterClrMapping/>
+  </p:clrMapOvr>
+  <p:timing>
+    <p:tnLst>
+      <p:par>
+        <p:cTn id="1" dur="indefinite" restart="never" nodeType="tmRoot"/>
+      </p:par>
+    </p:tnLst>
+  </p:timing>
+</p:sld>
+</file>
+
+<file path=ppt/slides/slide26.xml><?xml version="1.0" encoding="utf-8"?>
+<p:sld xmlns:a="http://schemas.openxmlformats.org/drawingml/2006/main" xmlns:r="http://schemas.openxmlformats.org/officeDocument/2006/relationships" xmlns:p="http://schemas.openxmlformats.org/presentationml/2006/main">
+  <p:cSld>
+    <p:bg>
+      <p:bgPr>
+        <a:solidFill>
+          <a:schemeClr val="bg1"/>
+        </a:solidFill>
+        <a:effectLst/>
+      </p:bgPr>
+    </p:bg>
+    <p:spTree>
+      <p:nvGrpSpPr>
+        <p:cNvPr id="1" name=""/>
+        <p:cNvGrpSpPr/>
+        <p:nvPr/>
+      </p:nvGrpSpPr>
+      <p:grpSpPr>
+        <a:xfrm>
+          <a:off x="0" y="0"/>
+          <a:ext cx="0" cy="0"/>
+          <a:chOff x="0" y="0"/>
+          <a:chExt cx="0" cy="0"/>
+        </a:xfrm>
+      </p:grpSpPr>
+      <p:sp>
+        <p:nvSpPr>
           <p:cNvPr id="2" name="Rectangle 1"/>
           <p:cNvSpPr/>
           <p:nvPr/>
@@ -13484,7 +14184,7 @@
 </p:sld>
 </file>
 
-<file path=ppt/slides/slide25.xml><?xml version="1.0" encoding="utf-8"?>
+<file path=ppt/slides/slide27.xml><?xml version="1.0" encoding="utf-8"?>
 <p:sld xmlns:a="http://schemas.openxmlformats.org/drawingml/2006/main" xmlns:r="http://schemas.openxmlformats.org/officeDocument/2006/relationships" xmlns:p="http://schemas.openxmlformats.org/presentationml/2006/main">
   <p:cSld name="PPTLabsZoomOut201506261628286238">
     <p:bg>
@@ -13609,11 +14309,11 @@
   <p:clrMapOvr>
     <a:masterClrMapping/>
   </p:clrMapOvr>
-  <mc:AlternateContent xmlns:mc="http://schemas.openxmlformats.org/markup-compatibility/2006">
-    <mc:Choice xmlns:p14="http://schemas.microsoft.com/office/powerpoint/2010/main" Requires="p14">
+  <mc:AlternateContent xmlns:mc="http://schemas.openxmlformats.org/markup-compatibility/2006" xmlns:p14="http://schemas.microsoft.com/office/powerpoint/2010/main">
+    <mc:Choice Requires="p14">
       <p:transition spd="med" p14:dur="700" advClick="0" advTm="0"/>
     </mc:Choice>
-    <mc:Fallback>
+    <mc:Fallback xmlns="">
       <p:transition spd="med" advClick="0" advTm="0"/>
     </mc:Fallback>
   </mc:AlternateContent>
@@ -13764,7 +14464,7 @@
 </p:sld>
 </file>
 
-<file path=ppt/slides/slide26.xml><?xml version="1.0" encoding="utf-8"?>
+<file path=ppt/slides/slide28.xml><?xml version="1.0" encoding="utf-8"?>
 <p:sld xmlns:a="http://schemas.openxmlformats.org/drawingml/2006/main" xmlns:r="http://schemas.openxmlformats.org/officeDocument/2006/relationships" xmlns:p="http://schemas.openxmlformats.org/presentationml/2006/main">
   <p:cSld>
     <p:bg>
@@ -14026,13 +14726,13 @@
   <p:clrMapOvr>
     <a:masterClrMapping/>
   </p:clrMapOvr>
-  <mc:AlternateContent xmlns:mc="http://schemas.openxmlformats.org/markup-compatibility/2006">
-    <mc:Choice xmlns:p14="http://schemas.microsoft.com/office/powerpoint/2010/main" Requires="p14">
+  <mc:AlternateContent xmlns:mc="http://schemas.openxmlformats.org/markup-compatibility/2006" xmlns:p14="http://schemas.microsoft.com/office/powerpoint/2010/main">
+    <mc:Choice Requires="p14">
       <p:transition p14:dur="250">
         <p:fade/>
       </p:transition>
     </mc:Choice>
-    <mc:Fallback>
+    <mc:Fallback xmlns="">
       <p:transition>
         <p:fade/>
       </p:transition>
@@ -14048,7 +14748,7 @@
 </p:sld>
 </file>
 
-<file path=ppt/slides/slide27.xml><?xml version="1.0" encoding="utf-8"?>
+<file path=ppt/slides/slide29.xml><?xml version="1.0" encoding="utf-8"?>
 <p:sld xmlns:a="http://schemas.openxmlformats.org/drawingml/2006/main" xmlns:r="http://schemas.openxmlformats.org/officeDocument/2006/relationships" xmlns:p="http://schemas.openxmlformats.org/presentationml/2006/main">
   <p:cSld>
     <p:spTree>
@@ -14141,7 +14841,108 @@
 </p:sld>
 </file>
 
-<file path=ppt/slides/slide28.xml><?xml version="1.0" encoding="utf-8"?>
+<file path=ppt/slides/slide3.xml><?xml version="1.0" encoding="utf-8"?>
+<p:sld xmlns:a="http://schemas.openxmlformats.org/drawingml/2006/main" xmlns:r="http://schemas.openxmlformats.org/officeDocument/2006/relationships" xmlns:p="http://schemas.openxmlformats.org/presentationml/2006/main">
+  <p:cSld>
+    <p:spTree>
+      <p:nvGrpSpPr>
+        <p:cNvPr id="1" name=""/>
+        <p:cNvGrpSpPr/>
+        <p:nvPr/>
+      </p:nvGrpSpPr>
+      <p:grpSpPr>
+        <a:xfrm>
+          <a:off x="0" y="0"/>
+          <a:ext cx="0" cy="0"/>
+          <a:chOff x="0" y="0"/>
+          <a:chExt cx="0" cy="0"/>
+        </a:xfrm>
+      </p:grpSpPr>
+      <p:sp>
+        <p:nvSpPr>
+          <p:cNvPr id="2" name="Title 1"/>
+          <p:cNvSpPr>
+            <a:spLocks noGrp="1"/>
+          </p:cNvSpPr>
+          <p:nvPr>
+            <p:ph type="title"/>
+          </p:nvPr>
+        </p:nvSpPr>
+        <p:spPr/>
+        <p:txBody>
+          <a:bodyPr/>
+          <a:lstStyle/>
+          <a:p>
+            <a:r>
+              <a:rPr lang="en-US" dirty="0" smtClean="0"/>
+              <a:t>Auto Zoom:: Simple Zoom In (Drill Down)</a:t>
+            </a:r>
+            <a:endParaRPr lang="en-SG" dirty="0"/>
+          </a:p>
+        </p:txBody>
+      </p:sp>
+      <p:sp>
+        <p:nvSpPr>
+          <p:cNvPr id="3" name="Content Placeholder 2"/>
+          <p:cNvSpPr>
+            <a:spLocks noGrp="1"/>
+          </p:cNvSpPr>
+          <p:nvPr>
+            <p:ph idx="1"/>
+          </p:nvPr>
+        </p:nvSpPr>
+        <p:spPr/>
+        <p:txBody>
+          <a:bodyPr/>
+          <a:lstStyle/>
+          <a:p>
+            <a:r>
+              <a:rPr lang="en-SG" dirty="0" smtClean="0"/>
+              <a:t>Enable </a:t>
+            </a:r>
+            <a:r>
+              <a:rPr lang="en-SG" dirty="0"/>
+              <a:t>slide background </a:t>
+            </a:r>
+            <a:r>
+              <a:rPr lang="en-SG" dirty="0" smtClean="0"/>
+              <a:t>in </a:t>
+            </a:r>
+            <a:r>
+              <a:rPr lang="en-SG" dirty="0" err="1"/>
+              <a:t>AutoZoom</a:t>
+            </a:r>
+            <a:r>
+              <a:rPr lang="en-SG" dirty="0"/>
+              <a:t> settings</a:t>
+            </a:r>
+          </a:p>
+          <a:p>
+            <a:endParaRPr lang="en-SG" dirty="0"/>
+          </a:p>
+        </p:txBody>
+      </p:sp>
+    </p:spTree>
+    <p:extLst>
+      <p:ext uri="{BB962C8B-B14F-4D97-AF65-F5344CB8AC3E}">
+        <p14:creationId xmlns:p14="http://schemas.microsoft.com/office/powerpoint/2010/main" val="1286891872"/>
+      </p:ext>
+    </p:extLst>
+  </p:cSld>
+  <p:clrMapOvr>
+    <a:masterClrMapping/>
+  </p:clrMapOvr>
+  <p:timing>
+    <p:tnLst>
+      <p:par>
+        <p:cTn id="1" dur="indefinite" restart="never" nodeType="tmRoot"/>
+      </p:par>
+    </p:tnLst>
+  </p:timing>
+</p:sld>
+</file>
+
+<file path=ppt/slides/slide30.xml><?xml version="1.0" encoding="utf-8"?>
 <p:sld xmlns:a="http://schemas.openxmlformats.org/drawingml/2006/main" xmlns:r="http://schemas.openxmlformats.org/officeDocument/2006/relationships" xmlns:p="http://schemas.openxmlformats.org/presentationml/2006/main">
   <p:cSld>
     <p:bg>
@@ -14333,6 +15134,100 @@
               <a:rPr lang="en-US" sz="2800" dirty="0" smtClean="0"/>
               <a:t>Zoom Shape</a:t>
             </a:r>
+          </a:p>
+        </p:txBody>
+      </p:sp>
+      <p:sp>
+        <p:nvSpPr>
+          <p:cNvPr id="7" name="Rectangle 1" hidden="1"/>
+          <p:cNvSpPr/>
+          <p:nvPr/>
+        </p:nvSpPr>
+        <p:spPr>
+          <a:xfrm>
+            <a:off x="914400" y="533400"/>
+            <a:ext cx="3048000" cy="2556284"/>
+          </a:xfrm>
+          <a:prstGeom prst="rect">
+            <a:avLst/>
+          </a:prstGeom>
+          <a:solidFill>
+            <a:srgbClr val="FF0000"/>
+          </a:solidFill>
+        </p:spPr>
+        <p:style>
+          <a:lnRef idx="2">
+            <a:schemeClr val="accent1">
+              <a:shade val="50000"/>
+            </a:schemeClr>
+          </a:lnRef>
+          <a:fillRef idx="1">
+            <a:schemeClr val="accent1"/>
+          </a:fillRef>
+          <a:effectRef idx="0">
+            <a:schemeClr val="accent1"/>
+          </a:effectRef>
+          <a:fontRef idx="minor">
+            <a:schemeClr val="lt1"/>
+          </a:fontRef>
+        </p:style>
+        <p:txBody>
+          <a:bodyPr rtlCol="0" anchor="ctr"/>
+          <a:lstStyle/>
+          <a:p>
+            <a:pPr algn="ctr"/>
+            <a:r>
+              <a:rPr lang="en-US" dirty="0" smtClean="0"/>
+              <a:t>HIDDEN SHAPE</a:t>
+            </a:r>
+            <a:endParaRPr lang="en-US" dirty="0"/>
+          </a:p>
+        </p:txBody>
+      </p:sp>
+      <p:sp>
+        <p:nvSpPr>
+          <p:cNvPr id="9" name="Oval 2" hidden="1"/>
+          <p:cNvSpPr/>
+          <p:nvPr/>
+        </p:nvSpPr>
+        <p:spPr>
+          <a:xfrm>
+            <a:off x="5130452" y="3188532"/>
+            <a:ext cx="3276600" cy="3124200"/>
+          </a:xfrm>
+          <a:prstGeom prst="ellipse">
+            <a:avLst/>
+          </a:prstGeom>
+          <a:solidFill>
+            <a:schemeClr val="tx1"/>
+          </a:solidFill>
+        </p:spPr>
+        <p:style>
+          <a:lnRef idx="2">
+            <a:schemeClr val="accent1">
+              <a:shade val="50000"/>
+            </a:schemeClr>
+          </a:lnRef>
+          <a:fillRef idx="1">
+            <a:schemeClr val="accent1"/>
+          </a:fillRef>
+          <a:effectRef idx="0">
+            <a:schemeClr val="accent1"/>
+          </a:effectRef>
+          <a:fontRef idx="minor">
+            <a:schemeClr val="lt1"/>
+          </a:fontRef>
+        </p:style>
+        <p:txBody>
+          <a:bodyPr rtlCol="0" anchor="ctr"/>
+          <a:lstStyle/>
+          <a:p>
+            <a:pPr algn="ctr"/>
+            <a:r>
+              <a:rPr lang="en-US" dirty="0" smtClean="0"/>
+              <a:t>HIDDEN SHAPE</a:t>
+            </a:r>
+            <a:endParaRPr lang="en-US" dirty="0"/>
           </a:p>
         </p:txBody>
       </p:sp>
@@ -14368,7 +15263,7 @@
 </p:sld>
 </file>
 
-<file path=ppt/slides/slide29.xml><?xml version="1.0" encoding="utf-8"?>
+<file path=ppt/slides/slide31.xml><?xml version="1.0" encoding="utf-8"?>
 <p:sld xmlns:a="http://schemas.openxmlformats.org/drawingml/2006/main" xmlns:r="http://schemas.openxmlformats.org/officeDocument/2006/relationships" xmlns:p="http://schemas.openxmlformats.org/presentationml/2006/main" show="0">
   <p:cSld name="PPTLabsAcknowledgementSlide">
     <p:spTree>
@@ -14436,107 +15331,6 @@
 </p:sld>
 </file>
 
-<file path=ppt/slides/slide3.xml><?xml version="1.0" encoding="utf-8"?>
-<p:sld xmlns:a="http://schemas.openxmlformats.org/drawingml/2006/main" xmlns:r="http://schemas.openxmlformats.org/officeDocument/2006/relationships" xmlns:p="http://schemas.openxmlformats.org/presentationml/2006/main">
-  <p:cSld>
-    <p:spTree>
-      <p:nvGrpSpPr>
-        <p:cNvPr id="1" name=""/>
-        <p:cNvGrpSpPr/>
-        <p:nvPr/>
-      </p:nvGrpSpPr>
-      <p:grpSpPr>
-        <a:xfrm>
-          <a:off x="0" y="0"/>
-          <a:ext cx="0" cy="0"/>
-          <a:chOff x="0" y="0"/>
-          <a:chExt cx="0" cy="0"/>
-        </a:xfrm>
-      </p:grpSpPr>
-      <p:sp>
-        <p:nvSpPr>
-          <p:cNvPr id="2" name="Title 1"/>
-          <p:cNvSpPr>
-            <a:spLocks noGrp="1"/>
-          </p:cNvSpPr>
-          <p:nvPr>
-            <p:ph type="title"/>
-          </p:nvPr>
-        </p:nvSpPr>
-        <p:spPr/>
-        <p:txBody>
-          <a:bodyPr/>
-          <a:lstStyle/>
-          <a:p>
-            <a:r>
-              <a:rPr lang="en-US" dirty="0" smtClean="0"/>
-              <a:t>Auto Zoom:: Simple Zoom In (Drill Down)</a:t>
-            </a:r>
-            <a:endParaRPr lang="en-SG" dirty="0"/>
-          </a:p>
-        </p:txBody>
-      </p:sp>
-      <p:sp>
-        <p:nvSpPr>
-          <p:cNvPr id="3" name="Content Placeholder 2"/>
-          <p:cNvSpPr>
-            <a:spLocks noGrp="1"/>
-          </p:cNvSpPr>
-          <p:nvPr>
-            <p:ph idx="1"/>
-          </p:nvPr>
-        </p:nvSpPr>
-        <p:spPr/>
-        <p:txBody>
-          <a:bodyPr/>
-          <a:lstStyle/>
-          <a:p>
-            <a:r>
-              <a:rPr lang="en-SG" dirty="0" smtClean="0"/>
-              <a:t>Enable </a:t>
-            </a:r>
-            <a:r>
-              <a:rPr lang="en-SG" dirty="0"/>
-              <a:t>slide background </a:t>
-            </a:r>
-            <a:r>
-              <a:rPr lang="en-SG" dirty="0" smtClean="0"/>
-              <a:t>in </a:t>
-            </a:r>
-            <a:r>
-              <a:rPr lang="en-SG" dirty="0" err="1"/>
-              <a:t>AutoZoom</a:t>
-            </a:r>
-            <a:r>
-              <a:rPr lang="en-SG" dirty="0"/>
-              <a:t> settings</a:t>
-            </a:r>
-          </a:p>
-          <a:p>
-            <a:endParaRPr lang="en-SG" dirty="0"/>
-          </a:p>
-        </p:txBody>
-      </p:sp>
-    </p:spTree>
-    <p:extLst>
-      <p:ext uri="{BB962C8B-B14F-4D97-AF65-F5344CB8AC3E}">
-        <p14:creationId xmlns:p14="http://schemas.microsoft.com/office/powerpoint/2010/main" val="1286891872"/>
-      </p:ext>
-    </p:extLst>
-  </p:cSld>
-  <p:clrMapOvr>
-    <a:masterClrMapping/>
-  </p:clrMapOvr>
-  <p:timing>
-    <p:tnLst>
-      <p:par>
-        <p:cTn id="1" dur="indefinite" restart="never" nodeType="tmRoot"/>
-      </p:par>
-    </p:tnLst>
-  </p:timing>
-</p:sld>
-</file>
-
 <file path=ppt/slides/slide4.xml><?xml version="1.0" encoding="utf-8"?>
 <p:sld xmlns:a="http://schemas.openxmlformats.org/drawingml/2006/main" xmlns:r="http://schemas.openxmlformats.org/officeDocument/2006/relationships" xmlns:p="http://schemas.openxmlformats.org/presentationml/2006/main">
   <p:cSld>
@@ -14730,6 +15524,100 @@
               <a:t>Drill Down</a:t>
             </a:r>
             <a:endParaRPr lang="en-SG" sz="2800" dirty="0"/>
+          </a:p>
+        </p:txBody>
+      </p:sp>
+      <p:sp>
+        <p:nvSpPr>
+          <p:cNvPr id="2" name="Rectangle 1" hidden="1"/>
+          <p:cNvSpPr/>
+          <p:nvPr/>
+        </p:nvSpPr>
+        <p:spPr>
+          <a:xfrm>
+            <a:off x="914400" y="533400"/>
+            <a:ext cx="3048000" cy="2556284"/>
+          </a:xfrm>
+          <a:prstGeom prst="rect">
+            <a:avLst/>
+          </a:prstGeom>
+          <a:solidFill>
+            <a:srgbClr val="FF0000"/>
+          </a:solidFill>
+        </p:spPr>
+        <p:style>
+          <a:lnRef idx="2">
+            <a:schemeClr val="accent1">
+              <a:shade val="50000"/>
+            </a:schemeClr>
+          </a:lnRef>
+          <a:fillRef idx="1">
+            <a:schemeClr val="accent1"/>
+          </a:fillRef>
+          <a:effectRef idx="0">
+            <a:schemeClr val="accent1"/>
+          </a:effectRef>
+          <a:fontRef idx="minor">
+            <a:schemeClr val="lt1"/>
+          </a:fontRef>
+        </p:style>
+        <p:txBody>
+          <a:bodyPr rtlCol="0" anchor="ctr"/>
+          <a:lstStyle/>
+          <a:p>
+            <a:pPr algn="ctr"/>
+            <a:r>
+              <a:rPr lang="en-US" dirty="0" smtClean="0"/>
+              <a:t>HIDDEN SHAPE</a:t>
+            </a:r>
+            <a:endParaRPr lang="en-US" dirty="0"/>
+          </a:p>
+        </p:txBody>
+      </p:sp>
+      <p:sp>
+        <p:nvSpPr>
+          <p:cNvPr id="3" name="Oval 2" hidden="1"/>
+          <p:cNvSpPr/>
+          <p:nvPr/>
+        </p:nvSpPr>
+        <p:spPr>
+          <a:xfrm>
+            <a:off x="5130452" y="3188532"/>
+            <a:ext cx="3276600" cy="3124200"/>
+          </a:xfrm>
+          <a:prstGeom prst="ellipse">
+            <a:avLst/>
+          </a:prstGeom>
+          <a:solidFill>
+            <a:schemeClr val="tx1"/>
+          </a:solidFill>
+        </p:spPr>
+        <p:style>
+          <a:lnRef idx="2">
+            <a:schemeClr val="accent1">
+              <a:shade val="50000"/>
+            </a:schemeClr>
+          </a:lnRef>
+          <a:fillRef idx="1">
+            <a:schemeClr val="accent1"/>
+          </a:fillRef>
+          <a:effectRef idx="0">
+            <a:schemeClr val="accent1"/>
+          </a:effectRef>
+          <a:fontRef idx="minor">
+            <a:schemeClr val="lt1"/>
+          </a:fontRef>
+        </p:style>
+        <p:txBody>
+          <a:bodyPr rtlCol="0" anchor="ctr"/>
+          <a:lstStyle/>
+          <a:p>
+            <a:pPr algn="ctr"/>
+            <a:r>
+              <a:rPr lang="en-US" dirty="0" smtClean="0"/>
+              <a:t>HIDDEN SHAPE</a:t>
+            </a:r>
+            <a:endParaRPr lang="en-US" dirty="0"/>
           </a:p>
         </p:txBody>
       </p:sp>
@@ -14941,6 +15829,100 @@
           <a:p>
             <a:pPr algn="ctr"/>
             <a:endParaRPr lang="en-SG"/>
+          </a:p>
+        </p:txBody>
+      </p:sp>
+      <p:sp>
+        <p:nvSpPr>
+          <p:cNvPr id="5" name="Rectangle 1" hidden="1"/>
+          <p:cNvSpPr/>
+          <p:nvPr/>
+        </p:nvSpPr>
+        <p:spPr>
+          <a:xfrm>
+            <a:off x="914400" y="533400"/>
+            <a:ext cx="3048000" cy="2556284"/>
+          </a:xfrm>
+          <a:prstGeom prst="rect">
+            <a:avLst/>
+          </a:prstGeom>
+          <a:solidFill>
+            <a:srgbClr val="FF0000"/>
+          </a:solidFill>
+        </p:spPr>
+        <p:style>
+          <a:lnRef idx="2">
+            <a:schemeClr val="accent1">
+              <a:shade val="50000"/>
+            </a:schemeClr>
+          </a:lnRef>
+          <a:fillRef idx="1">
+            <a:schemeClr val="accent1"/>
+          </a:fillRef>
+          <a:effectRef idx="0">
+            <a:schemeClr val="accent1"/>
+          </a:effectRef>
+          <a:fontRef idx="minor">
+            <a:schemeClr val="lt1"/>
+          </a:fontRef>
+        </p:style>
+        <p:txBody>
+          <a:bodyPr rtlCol="0" anchor="ctr"/>
+          <a:lstStyle/>
+          <a:p>
+            <a:pPr algn="ctr"/>
+            <a:r>
+              <a:rPr lang="en-US" dirty="0" smtClean="0"/>
+              <a:t>HIDDEN SHAPE</a:t>
+            </a:r>
+            <a:endParaRPr lang="en-US" dirty="0"/>
+          </a:p>
+        </p:txBody>
+      </p:sp>
+      <p:sp>
+        <p:nvSpPr>
+          <p:cNvPr id="6" name="Oval 2" hidden="1"/>
+          <p:cNvSpPr/>
+          <p:nvPr/>
+        </p:nvSpPr>
+        <p:spPr>
+          <a:xfrm>
+            <a:off x="5130452" y="3188532"/>
+            <a:ext cx="3276600" cy="3124200"/>
+          </a:xfrm>
+          <a:prstGeom prst="ellipse">
+            <a:avLst/>
+          </a:prstGeom>
+          <a:solidFill>
+            <a:schemeClr val="tx1"/>
+          </a:solidFill>
+        </p:spPr>
+        <p:style>
+          <a:lnRef idx="2">
+            <a:schemeClr val="accent1">
+              <a:shade val="50000"/>
+            </a:schemeClr>
+          </a:lnRef>
+          <a:fillRef idx="1">
+            <a:schemeClr val="accent1"/>
+          </a:fillRef>
+          <a:effectRef idx="0">
+            <a:schemeClr val="accent1"/>
+          </a:effectRef>
+          <a:fontRef idx="minor">
+            <a:schemeClr val="lt1"/>
+          </a:fontRef>
+        </p:style>
+        <p:txBody>
+          <a:bodyPr rtlCol="0" anchor="ctr"/>
+          <a:lstStyle/>
+          <a:p>
+            <a:pPr algn="ctr"/>
+            <a:r>
+              <a:rPr lang="en-US" dirty="0" smtClean="0"/>
+              <a:t>HIDDEN SHAPE</a:t>
+            </a:r>
+            <a:endParaRPr lang="en-US" dirty="0"/>
           </a:p>
         </p:txBody>
       </p:sp>

</xml_diff>